<commit_message>
Update the project design section of the readme file.
</commit_message>
<xml_diff>
--- a/doc/designDoc.pptx
+++ b/doc/designDoc.pptx
@@ -5,10 +5,11 @@
     <p:sldMasterId id="2147483648" r:id="rId1"/>
   </p:sldMasterIdLst>
   <p:notesMasterIdLst>
-    <p:notesMasterId r:id="rId3"/>
+    <p:notesMasterId r:id="rId4"/>
   </p:notesMasterIdLst>
   <p:sldIdLst>
     <p:sldId id="256" r:id="rId2"/>
+    <p:sldId id="268" r:id="rId3"/>
   </p:sldIdLst>
   <p:sldSz cx="12192000" cy="6858000"/>
   <p:notesSz cx="6858000" cy="9144000"/>
@@ -2951,7 +2952,7 @@
           <a:p>
             <a:fld id="{7600FCCF-5CF4-404D-AD1B-36BEF022C4C2}" type="datetimeFigureOut">
               <a:rPr lang="en-SG" smtClean="0"/>
-              <a:t>24/2/2026</a:t>
+              <a:t>25/2/2026</a:t>
             </a:fld>
             <a:endParaRPr lang="en-SG"/>
           </a:p>
@@ -3303,6 +3304,90 @@
 </p:notes>
 </file>
 
+<file path=ppt/notesSlides/notesSlide2.xml><?xml version="1.0" encoding="utf-8"?>
+<p:notes xmlns:a="http://schemas.openxmlformats.org/drawingml/2006/main" xmlns:r="http://schemas.openxmlformats.org/officeDocument/2006/relationships" xmlns:p="http://schemas.openxmlformats.org/presentationml/2006/main">
+  <p:cSld>
+    <p:spTree>
+      <p:nvGrpSpPr>
+        <p:cNvPr id="1" name=""/>
+        <p:cNvGrpSpPr/>
+        <p:nvPr/>
+      </p:nvGrpSpPr>
+      <p:grpSpPr>
+        <a:xfrm>
+          <a:off x="0" y="0"/>
+          <a:ext cx="0" cy="0"/>
+          <a:chOff x="0" y="0"/>
+          <a:chExt cx="0" cy="0"/>
+        </a:xfrm>
+      </p:grpSpPr>
+      <p:sp>
+        <p:nvSpPr>
+          <p:cNvPr id="2" name="Slide Image Placeholder 1"/>
+          <p:cNvSpPr>
+            <a:spLocks noGrp="1" noRot="1" noChangeAspect="1"/>
+          </p:cNvSpPr>
+          <p:nvPr>
+            <p:ph type="sldImg"/>
+          </p:nvPr>
+        </p:nvSpPr>
+        <p:spPr/>
+      </p:sp>
+      <p:sp>
+        <p:nvSpPr>
+          <p:cNvPr id="3" name="Notes Placeholder 2"/>
+          <p:cNvSpPr>
+            <a:spLocks noGrp="1"/>
+          </p:cNvSpPr>
+          <p:nvPr>
+            <p:ph type="body" idx="1"/>
+          </p:nvPr>
+        </p:nvSpPr>
+        <p:spPr/>
+        <p:txBody>
+          <a:bodyPr/>
+          <a:lstStyle/>
+          <a:p>
+            <a:endParaRPr lang="en-SG" dirty="0"/>
+          </a:p>
+        </p:txBody>
+      </p:sp>
+      <p:sp>
+        <p:nvSpPr>
+          <p:cNvPr id="4" name="Slide Number Placeholder 3"/>
+          <p:cNvSpPr>
+            <a:spLocks noGrp="1"/>
+          </p:cNvSpPr>
+          <p:nvPr>
+            <p:ph type="sldNum" sz="quarter" idx="5"/>
+          </p:nvPr>
+        </p:nvSpPr>
+        <p:spPr/>
+        <p:txBody>
+          <a:bodyPr/>
+          <a:lstStyle/>
+          <a:p>
+            <a:fld id="{F1BC0FA0-4E75-4E8D-BF09-11B6D569D5EA}" type="slidenum">
+              <a:rPr lang="en-SG" smtClean="0"/>
+              <a:t>2</a:t>
+            </a:fld>
+            <a:endParaRPr lang="en-SG"/>
+          </a:p>
+        </p:txBody>
+      </p:sp>
+    </p:spTree>
+    <p:extLst>
+      <p:ext uri="{BB962C8B-B14F-4D97-AF65-F5344CB8AC3E}">
+        <p14:creationId xmlns:p14="http://schemas.microsoft.com/office/powerpoint/2010/main" val="2078074775"/>
+      </p:ext>
+    </p:extLst>
+  </p:cSld>
+  <p:clrMapOvr>
+    <a:masterClrMapping/>
+  </p:clrMapOvr>
+</p:notes>
+</file>
+
 <file path=ppt/slideLayouts/slideLayout1.xml><?xml version="1.0" encoding="utf-8"?>
 <p:sldLayout xmlns:a="http://schemas.openxmlformats.org/drawingml/2006/main" xmlns:r="http://schemas.openxmlformats.org/officeDocument/2006/relationships" xmlns:p="http://schemas.openxmlformats.org/presentationml/2006/main" type="title" preserve="1">
   <p:cSld name="Title Slide">
@@ -3452,7 +3537,7 @@
           <a:p>
             <a:fld id="{24E8A18A-5CE4-40C1-8227-52475E3DF71E}" type="datetimeFigureOut">
               <a:rPr lang="en-SG" smtClean="0"/>
-              <a:t>24/2/2026</a:t>
+              <a:t>25/2/2026</a:t>
             </a:fld>
             <a:endParaRPr lang="en-SG"/>
           </a:p>
@@ -3652,7 +3737,7 @@
           <a:p>
             <a:fld id="{24E8A18A-5CE4-40C1-8227-52475E3DF71E}" type="datetimeFigureOut">
               <a:rPr lang="en-SG" smtClean="0"/>
-              <a:t>24/2/2026</a:t>
+              <a:t>25/2/2026</a:t>
             </a:fld>
             <a:endParaRPr lang="en-SG"/>
           </a:p>
@@ -3862,7 +3947,7 @@
           <a:p>
             <a:fld id="{24E8A18A-5CE4-40C1-8227-52475E3DF71E}" type="datetimeFigureOut">
               <a:rPr lang="en-SG" smtClean="0"/>
-              <a:t>24/2/2026</a:t>
+              <a:t>25/2/2026</a:t>
             </a:fld>
             <a:endParaRPr lang="en-SG"/>
           </a:p>
@@ -4062,7 +4147,7 @@
           <a:p>
             <a:fld id="{24E8A18A-5CE4-40C1-8227-52475E3DF71E}" type="datetimeFigureOut">
               <a:rPr lang="en-SG" smtClean="0"/>
-              <a:t>24/2/2026</a:t>
+              <a:t>25/2/2026</a:t>
             </a:fld>
             <a:endParaRPr lang="en-SG"/>
           </a:p>
@@ -4338,7 +4423,7 @@
           <a:p>
             <a:fld id="{24E8A18A-5CE4-40C1-8227-52475E3DF71E}" type="datetimeFigureOut">
               <a:rPr lang="en-SG" smtClean="0"/>
-              <a:t>24/2/2026</a:t>
+              <a:t>25/2/2026</a:t>
             </a:fld>
             <a:endParaRPr lang="en-SG"/>
           </a:p>
@@ -4606,7 +4691,7 @@
           <a:p>
             <a:fld id="{24E8A18A-5CE4-40C1-8227-52475E3DF71E}" type="datetimeFigureOut">
               <a:rPr lang="en-SG" smtClean="0"/>
-              <a:t>24/2/2026</a:t>
+              <a:t>25/2/2026</a:t>
             </a:fld>
             <a:endParaRPr lang="en-SG"/>
           </a:p>
@@ -5021,7 +5106,7 @@
           <a:p>
             <a:fld id="{24E8A18A-5CE4-40C1-8227-52475E3DF71E}" type="datetimeFigureOut">
               <a:rPr lang="en-SG" smtClean="0"/>
-              <a:t>24/2/2026</a:t>
+              <a:t>25/2/2026</a:t>
             </a:fld>
             <a:endParaRPr lang="en-SG"/>
           </a:p>
@@ -5163,7 +5248,7 @@
           <a:p>
             <a:fld id="{24E8A18A-5CE4-40C1-8227-52475E3DF71E}" type="datetimeFigureOut">
               <a:rPr lang="en-SG" smtClean="0"/>
-              <a:t>24/2/2026</a:t>
+              <a:t>25/2/2026</a:t>
             </a:fld>
             <a:endParaRPr lang="en-SG"/>
           </a:p>
@@ -5276,7 +5361,7 @@
           <a:p>
             <a:fld id="{24E8A18A-5CE4-40C1-8227-52475E3DF71E}" type="datetimeFigureOut">
               <a:rPr lang="en-SG" smtClean="0"/>
-              <a:t>24/2/2026</a:t>
+              <a:t>25/2/2026</a:t>
             </a:fld>
             <a:endParaRPr lang="en-SG"/>
           </a:p>
@@ -5589,7 +5674,7 @@
           <a:p>
             <a:fld id="{24E8A18A-5CE4-40C1-8227-52475E3DF71E}" type="datetimeFigureOut">
               <a:rPr lang="en-SG" smtClean="0"/>
-              <a:t>24/2/2026</a:t>
+              <a:t>25/2/2026</a:t>
             </a:fld>
             <a:endParaRPr lang="en-SG"/>
           </a:p>
@@ -5878,7 +5963,7 @@
           <a:p>
             <a:fld id="{24E8A18A-5CE4-40C1-8227-52475E3DF71E}" type="datetimeFigureOut">
               <a:rPr lang="en-SG" smtClean="0"/>
-              <a:t>24/2/2026</a:t>
+              <a:t>25/2/2026</a:t>
             </a:fld>
             <a:endParaRPr lang="en-SG"/>
           </a:p>
@@ -6121,7 +6206,7 @@
           <a:p>
             <a:fld id="{24E8A18A-5CE4-40C1-8227-52475E3DF71E}" type="datetimeFigureOut">
               <a:rPr lang="en-SG" smtClean="0"/>
-              <a:t>24/2/2026</a:t>
+              <a:t>25/2/2026</a:t>
             </a:fld>
             <a:endParaRPr lang="en-SG"/>
           </a:p>
@@ -7126,7 +7211,7 @@
                 <a:ea typeface="+mn-ea"/>
                 <a:cs typeface="+mn-cs"/>
               </a:rPr>
-              <a:t>Robot Servo Motor Singal: base</a:t>
+              <a:t>Robot Servo Motor Signal: base</a:t>
             </a:r>
             <a:r>
               <a:rPr lang="en-US" sz="1000" b="1" dirty="0">
@@ -8438,6 +8523,4038 @@
     <p:extLst>
       <p:ext uri="{BB962C8B-B14F-4D97-AF65-F5344CB8AC3E}">
         <p14:creationId xmlns:p14="http://schemas.microsoft.com/office/powerpoint/2010/main" val="932442759"/>
+      </p:ext>
+    </p:extLst>
+  </p:cSld>
+  <p:clrMapOvr>
+    <a:masterClrMapping/>
+  </p:clrMapOvr>
+</p:sld>
+</file>
+
+<file path=ppt/slides/slide2.xml><?xml version="1.0" encoding="utf-8"?>
+<p:sld xmlns:a="http://schemas.openxmlformats.org/drawingml/2006/main" xmlns:r="http://schemas.openxmlformats.org/officeDocument/2006/relationships" xmlns:p="http://schemas.openxmlformats.org/presentationml/2006/main">
+  <p:cSld>
+    <p:spTree>
+      <p:nvGrpSpPr>
+        <p:cNvPr id="1" name=""/>
+        <p:cNvGrpSpPr/>
+        <p:nvPr/>
+      </p:nvGrpSpPr>
+      <p:grpSpPr>
+        <a:xfrm>
+          <a:off x="0" y="0"/>
+          <a:ext cx="0" cy="0"/>
+          <a:chOff x="0" y="0"/>
+          <a:chExt cx="0" cy="0"/>
+        </a:xfrm>
+      </p:grpSpPr>
+      <p:sp>
+        <p:nvSpPr>
+          <p:cNvPr id="167" name="Rectangle 166">
+            <a:extLst>
+              <a:ext uri="{FF2B5EF4-FFF2-40B4-BE49-F238E27FC236}">
+                <a16:creationId xmlns:a16="http://schemas.microsoft.com/office/drawing/2014/main" id="{A18B5A0A-6969-7F67-02FE-B5FCC3964F98}"/>
+              </a:ext>
+            </a:extLst>
+          </p:cNvPr>
+          <p:cNvSpPr/>
+          <p:nvPr/>
+        </p:nvSpPr>
+        <p:spPr>
+          <a:xfrm>
+            <a:off x="8689344" y="1609746"/>
+            <a:ext cx="3211175" cy="4012346"/>
+          </a:xfrm>
+          <a:prstGeom prst="rect">
+            <a:avLst/>
+          </a:prstGeom>
+          <a:solidFill>
+            <a:schemeClr val="accent2">
+              <a:lumMod val="20000"/>
+              <a:lumOff val="80000"/>
+            </a:schemeClr>
+          </a:solidFill>
+        </p:spPr>
+        <p:style>
+          <a:lnRef idx="2">
+            <a:schemeClr val="accent1">
+              <a:shade val="15000"/>
+            </a:schemeClr>
+          </a:lnRef>
+          <a:fillRef idx="1">
+            <a:schemeClr val="accent1"/>
+          </a:fillRef>
+          <a:effectRef idx="0">
+            <a:schemeClr val="accent1"/>
+          </a:effectRef>
+          <a:fontRef idx="minor">
+            <a:schemeClr val="lt1"/>
+          </a:fontRef>
+        </p:style>
+        <p:txBody>
+          <a:bodyPr rtlCol="0" anchor="ctr"/>
+          <a:lstStyle/>
+          <a:p>
+            <a:pPr algn="ctr"/>
+            <a:endParaRPr lang="en-SG" dirty="0"/>
+          </a:p>
+        </p:txBody>
+      </p:sp>
+      <p:sp>
+        <p:nvSpPr>
+          <p:cNvPr id="50" name="Rectangle 49">
+            <a:extLst>
+              <a:ext uri="{FF2B5EF4-FFF2-40B4-BE49-F238E27FC236}">
+                <a16:creationId xmlns:a16="http://schemas.microsoft.com/office/drawing/2014/main" id="{9962A4AD-77BC-3C4F-146F-68E995CC99B8}"/>
+              </a:ext>
+            </a:extLst>
+          </p:cNvPr>
+          <p:cNvSpPr/>
+          <p:nvPr/>
+        </p:nvSpPr>
+        <p:spPr>
+          <a:xfrm>
+            <a:off x="4522296" y="1578985"/>
+            <a:ext cx="3579817" cy="4762071"/>
+          </a:xfrm>
+          <a:prstGeom prst="rect">
+            <a:avLst/>
+          </a:prstGeom>
+          <a:solidFill>
+            <a:schemeClr val="accent6">
+              <a:lumMod val="20000"/>
+              <a:lumOff val="80000"/>
+            </a:schemeClr>
+          </a:solidFill>
+        </p:spPr>
+        <p:style>
+          <a:lnRef idx="2">
+            <a:schemeClr val="accent1">
+              <a:shade val="15000"/>
+            </a:schemeClr>
+          </a:lnRef>
+          <a:fillRef idx="1">
+            <a:schemeClr val="accent1"/>
+          </a:fillRef>
+          <a:effectRef idx="0">
+            <a:schemeClr val="accent1"/>
+          </a:effectRef>
+          <a:fontRef idx="minor">
+            <a:schemeClr val="lt1"/>
+          </a:fontRef>
+        </p:style>
+        <p:txBody>
+          <a:bodyPr rtlCol="0" anchor="ctr"/>
+          <a:lstStyle/>
+          <a:p>
+            <a:pPr algn="ctr"/>
+            <a:endParaRPr lang="en-SG" dirty="0"/>
+          </a:p>
+        </p:txBody>
+      </p:sp>
+      <p:cxnSp>
+        <p:nvCxnSpPr>
+          <p:cNvPr id="48" name="Straight Connector 47">
+            <a:extLst>
+              <a:ext uri="{FF2B5EF4-FFF2-40B4-BE49-F238E27FC236}">
+                <a16:creationId xmlns:a16="http://schemas.microsoft.com/office/drawing/2014/main" id="{4F94F508-0E63-A8B0-4AFC-01A2330280AE}"/>
+              </a:ext>
+            </a:extLst>
+          </p:cNvPr>
+          <p:cNvCxnSpPr>
+            <a:cxnSpLocks/>
+          </p:cNvCxnSpPr>
+          <p:nvPr/>
+        </p:nvCxnSpPr>
+        <p:spPr>
+          <a:xfrm>
+            <a:off x="4209464" y="1331614"/>
+            <a:ext cx="0" cy="5114217"/>
+          </a:xfrm>
+          <a:prstGeom prst="line">
+            <a:avLst/>
+          </a:prstGeom>
+          <a:ln>
+            <a:solidFill>
+              <a:schemeClr val="bg2">
+                <a:lumMod val="75000"/>
+              </a:schemeClr>
+            </a:solidFill>
+            <a:prstDash val="sysDash"/>
+          </a:ln>
+        </p:spPr>
+        <p:style>
+          <a:lnRef idx="2">
+            <a:schemeClr val="accent1"/>
+          </a:lnRef>
+          <a:fillRef idx="0">
+            <a:schemeClr val="accent1"/>
+          </a:fillRef>
+          <a:effectRef idx="1">
+            <a:schemeClr val="accent1"/>
+          </a:effectRef>
+          <a:fontRef idx="minor">
+            <a:schemeClr val="tx1"/>
+          </a:fontRef>
+        </p:style>
+      </p:cxnSp>
+      <p:sp>
+        <p:nvSpPr>
+          <p:cNvPr id="9" name="Rectangle 8">
+            <a:extLst>
+              <a:ext uri="{FF2B5EF4-FFF2-40B4-BE49-F238E27FC236}">
+                <a16:creationId xmlns:a16="http://schemas.microsoft.com/office/drawing/2014/main" id="{943F286D-9BD1-56BB-59F9-6B6E3B4B205E}"/>
+              </a:ext>
+            </a:extLst>
+          </p:cNvPr>
+          <p:cNvSpPr/>
+          <p:nvPr/>
+        </p:nvSpPr>
+        <p:spPr>
+          <a:xfrm>
+            <a:off x="356119" y="1578985"/>
+            <a:ext cx="3476351" cy="4762071"/>
+          </a:xfrm>
+          <a:prstGeom prst="rect">
+            <a:avLst/>
+          </a:prstGeom>
+          <a:solidFill>
+            <a:schemeClr val="accent1">
+              <a:lumMod val="20000"/>
+              <a:lumOff val="80000"/>
+            </a:schemeClr>
+          </a:solidFill>
+        </p:spPr>
+        <p:style>
+          <a:lnRef idx="2">
+            <a:schemeClr val="accent1">
+              <a:shade val="15000"/>
+            </a:schemeClr>
+          </a:lnRef>
+          <a:fillRef idx="1">
+            <a:schemeClr val="accent1"/>
+          </a:fillRef>
+          <a:effectRef idx="0">
+            <a:schemeClr val="accent1"/>
+          </a:effectRef>
+          <a:fontRef idx="minor">
+            <a:schemeClr val="lt1"/>
+          </a:fontRef>
+        </p:style>
+        <p:txBody>
+          <a:bodyPr rtlCol="0" anchor="ctr"/>
+          <a:lstStyle/>
+          <a:p>
+            <a:pPr algn="ctr"/>
+            <a:endParaRPr lang="en-SG" dirty="0"/>
+          </a:p>
+        </p:txBody>
+      </p:sp>
+      <p:sp>
+        <p:nvSpPr>
+          <p:cNvPr id="5" name="TextBox 4">
+            <a:extLst>
+              <a:ext uri="{FF2B5EF4-FFF2-40B4-BE49-F238E27FC236}">
+                <a16:creationId xmlns:a16="http://schemas.microsoft.com/office/drawing/2014/main" id="{67EAA913-A29B-D91E-B019-B340E80FDE59}"/>
+              </a:ext>
+            </a:extLst>
+          </p:cNvPr>
+          <p:cNvSpPr txBox="1"/>
+          <p:nvPr/>
+        </p:nvSpPr>
+        <p:spPr>
+          <a:xfrm>
+            <a:off x="292654" y="1188336"/>
+            <a:ext cx="2683945" cy="307777"/>
+          </a:xfrm>
+          <a:prstGeom prst="rect">
+            <a:avLst/>
+          </a:prstGeom>
+          <a:noFill/>
+        </p:spPr>
+        <p:txBody>
+          <a:bodyPr wrap="square" rtlCol="0">
+            <a:spAutoFit/>
+          </a:bodyPr>
+          <a:lstStyle/>
+          <a:p>
+            <a:r>
+              <a:rPr lang="en-US" sz="1400" b="1" dirty="0"/>
+              <a:t>LEVEL0 Production Process</a:t>
+            </a:r>
+            <a:endParaRPr lang="en-SG" sz="1400" b="1" dirty="0"/>
+          </a:p>
+        </p:txBody>
+      </p:sp>
+      <p:sp>
+        <p:nvSpPr>
+          <p:cNvPr id="7" name="Rectangle 6">
+            <a:extLst>
+              <a:ext uri="{FF2B5EF4-FFF2-40B4-BE49-F238E27FC236}">
+                <a16:creationId xmlns:a16="http://schemas.microsoft.com/office/drawing/2014/main" id="{403114E0-A6D3-730A-DA37-3038D4FDF4DE}"/>
+              </a:ext>
+            </a:extLst>
+          </p:cNvPr>
+          <p:cNvSpPr/>
+          <p:nvPr/>
+        </p:nvSpPr>
+        <p:spPr>
+          <a:xfrm>
+            <a:off x="3249603" y="4219379"/>
+            <a:ext cx="1617223" cy="429658"/>
+          </a:xfrm>
+          <a:prstGeom prst="rect">
+            <a:avLst/>
+          </a:prstGeom>
+          <a:solidFill>
+            <a:schemeClr val="accent2"/>
+          </a:solidFill>
+        </p:spPr>
+        <p:style>
+          <a:lnRef idx="2">
+            <a:schemeClr val="accent1">
+              <a:shade val="50000"/>
+            </a:schemeClr>
+          </a:lnRef>
+          <a:fillRef idx="1">
+            <a:schemeClr val="accent1"/>
+          </a:fillRef>
+          <a:effectRef idx="0">
+            <a:schemeClr val="accent1"/>
+          </a:effectRef>
+          <a:fontRef idx="minor">
+            <a:schemeClr val="lt1"/>
+          </a:fontRef>
+        </p:style>
+        <p:txBody>
+          <a:bodyPr rtlCol="0" anchor="ctr"/>
+          <a:lstStyle/>
+          <a:p>
+            <a:r>
+              <a:rPr lang="en-US" sz="1050" b="1" dirty="0"/>
+              <a:t>UDP Simulated Sensor Value to  PLC input </a:t>
+            </a:r>
+            <a:endParaRPr lang="en-SG" sz="1050" b="1" dirty="0"/>
+          </a:p>
+        </p:txBody>
+      </p:sp>
+      <p:sp>
+        <p:nvSpPr>
+          <p:cNvPr id="8" name="TextBox 7">
+            <a:extLst>
+              <a:ext uri="{FF2B5EF4-FFF2-40B4-BE49-F238E27FC236}">
+                <a16:creationId xmlns:a16="http://schemas.microsoft.com/office/drawing/2014/main" id="{C07E869A-F5A6-2EEE-EB85-695572B0278F}"/>
+              </a:ext>
+            </a:extLst>
+          </p:cNvPr>
+          <p:cNvSpPr txBox="1"/>
+          <p:nvPr/>
+        </p:nvSpPr>
+        <p:spPr>
+          <a:xfrm>
+            <a:off x="356119" y="1594256"/>
+            <a:ext cx="3434101" cy="307777"/>
+          </a:xfrm>
+          <a:prstGeom prst="rect">
+            <a:avLst/>
+          </a:prstGeom>
+          <a:noFill/>
+        </p:spPr>
+        <p:txBody>
+          <a:bodyPr wrap="square" rtlCol="0">
+            <a:spAutoFit/>
+          </a:bodyPr>
+          <a:lstStyle/>
+          <a:p>
+            <a:r>
+              <a:rPr lang="en-US" sz="1400" b="1" dirty="0">
+                <a:solidFill>
+                  <a:schemeClr val="tx2">
+                    <a:lumMod val="75000"/>
+                    <a:lumOff val="25000"/>
+                  </a:schemeClr>
+                </a:solidFill>
+              </a:rPr>
+              <a:t>3D Robot Arm Simulator</a:t>
+            </a:r>
+            <a:endParaRPr lang="en-SG" sz="1400" b="1" dirty="0">
+              <a:solidFill>
+                <a:schemeClr val="tx2">
+                  <a:lumMod val="75000"/>
+                  <a:lumOff val="25000"/>
+                </a:schemeClr>
+              </a:solidFill>
+            </a:endParaRPr>
+          </a:p>
+        </p:txBody>
+      </p:sp>
+      <p:sp>
+        <p:nvSpPr>
+          <p:cNvPr id="14" name="Rectangle 13">
+            <a:extLst>
+              <a:ext uri="{FF2B5EF4-FFF2-40B4-BE49-F238E27FC236}">
+                <a16:creationId xmlns:a16="http://schemas.microsoft.com/office/drawing/2014/main" id="{223973C2-7D9E-5CA7-BDC3-BF564838FC68}"/>
+              </a:ext>
+            </a:extLst>
+          </p:cNvPr>
+          <p:cNvSpPr/>
+          <p:nvPr/>
+        </p:nvSpPr>
+        <p:spPr>
+          <a:xfrm>
+            <a:off x="970616" y="4280319"/>
+            <a:ext cx="2005983" cy="307778"/>
+          </a:xfrm>
+          <a:prstGeom prst="rect">
+            <a:avLst/>
+          </a:prstGeom>
+          <a:solidFill>
+            <a:schemeClr val="tx2">
+              <a:lumMod val="75000"/>
+              <a:lumOff val="25000"/>
+            </a:schemeClr>
+          </a:solidFill>
+          <a:ln>
+            <a:solidFill>
+              <a:schemeClr val="tx1"/>
+            </a:solidFill>
+          </a:ln>
+        </p:spPr>
+        <p:style>
+          <a:lnRef idx="2">
+            <a:schemeClr val="accent1">
+              <a:shade val="50000"/>
+            </a:schemeClr>
+          </a:lnRef>
+          <a:fillRef idx="1">
+            <a:schemeClr val="accent1"/>
+          </a:fillRef>
+          <a:effectRef idx="0">
+            <a:schemeClr val="accent1"/>
+          </a:effectRef>
+          <a:fontRef idx="minor">
+            <a:schemeClr val="lt1"/>
+          </a:fontRef>
+        </p:style>
+        <p:txBody>
+          <a:bodyPr rtlCol="0" anchor="ctr"/>
+          <a:lstStyle/>
+          <a:p>
+            <a:r>
+              <a:rPr lang="en-US" sz="1050" b="1" dirty="0"/>
+              <a:t>Ground Cube Position Sensor </a:t>
+            </a:r>
+            <a:endParaRPr lang="en-SG" sz="1050" b="1" dirty="0"/>
+          </a:p>
+        </p:txBody>
+      </p:sp>
+      <p:sp>
+        <p:nvSpPr>
+          <p:cNvPr id="18" name="Rectangle 17">
+            <a:extLst>
+              <a:ext uri="{FF2B5EF4-FFF2-40B4-BE49-F238E27FC236}">
+                <a16:creationId xmlns:a16="http://schemas.microsoft.com/office/drawing/2014/main" id="{4A39DF91-A8B2-730E-FFA1-BDF0D574BBD9}"/>
+              </a:ext>
+            </a:extLst>
+          </p:cNvPr>
+          <p:cNvSpPr/>
+          <p:nvPr/>
+        </p:nvSpPr>
+        <p:spPr>
+          <a:xfrm>
+            <a:off x="970616" y="4753841"/>
+            <a:ext cx="2076196" cy="509903"/>
+          </a:xfrm>
+          <a:prstGeom prst="rect">
+            <a:avLst/>
+          </a:prstGeom>
+          <a:solidFill>
+            <a:schemeClr val="tx2">
+              <a:lumMod val="75000"/>
+              <a:lumOff val="25000"/>
+            </a:schemeClr>
+          </a:solidFill>
+          <a:ln>
+            <a:solidFill>
+              <a:schemeClr val="tx1"/>
+            </a:solidFill>
+          </a:ln>
+        </p:spPr>
+        <p:style>
+          <a:lnRef idx="2">
+            <a:schemeClr val="accent1">
+              <a:shade val="50000"/>
+            </a:schemeClr>
+          </a:lnRef>
+          <a:fillRef idx="1">
+            <a:schemeClr val="accent1"/>
+          </a:fillRef>
+          <a:effectRef idx="0">
+            <a:schemeClr val="accent1"/>
+          </a:effectRef>
+          <a:fontRef idx="minor">
+            <a:schemeClr val="lt1"/>
+          </a:fontRef>
+        </p:style>
+        <p:txBody>
+          <a:bodyPr rtlCol="0" anchor="ctr"/>
+          <a:lstStyle/>
+          <a:p>
+            <a:r>
+              <a:rPr lang="en-US" sz="1050" b="1" dirty="0"/>
+              <a:t>Robot Joint Rotation Angle Sensors : base, Shoulder, Elbow, Wrist, Gripper Rotation</a:t>
+            </a:r>
+            <a:endParaRPr lang="en-SG" sz="1050" b="1" dirty="0"/>
+          </a:p>
+        </p:txBody>
+      </p:sp>
+      <p:sp>
+        <p:nvSpPr>
+          <p:cNvPr id="57" name="TextBox 56">
+            <a:extLst>
+              <a:ext uri="{FF2B5EF4-FFF2-40B4-BE49-F238E27FC236}">
+                <a16:creationId xmlns:a16="http://schemas.microsoft.com/office/drawing/2014/main" id="{E3A7C4FE-59D4-DB55-6480-BA0AD44A69D7}"/>
+              </a:ext>
+            </a:extLst>
+          </p:cNvPr>
+          <p:cNvSpPr txBox="1"/>
+          <p:nvPr/>
+        </p:nvSpPr>
+        <p:spPr>
+          <a:xfrm>
+            <a:off x="4557058" y="1609745"/>
+            <a:ext cx="3437569" cy="307777"/>
+          </a:xfrm>
+          <a:prstGeom prst="rect">
+            <a:avLst/>
+          </a:prstGeom>
+          <a:noFill/>
+        </p:spPr>
+        <p:txBody>
+          <a:bodyPr wrap="square" rtlCol="0">
+            <a:spAutoFit/>
+          </a:bodyPr>
+          <a:lstStyle/>
+          <a:p>
+            <a:r>
+              <a:rPr lang="en-US" sz="1400" b="1" dirty="0">
+                <a:solidFill>
+                  <a:schemeClr val="accent6">
+                    <a:lumMod val="50000"/>
+                  </a:schemeClr>
+                </a:solidFill>
+              </a:rPr>
+              <a:t>OPC-UA PLC Simulation</a:t>
+            </a:r>
+            <a:endParaRPr lang="en-SG" sz="1400" b="1" dirty="0">
+              <a:solidFill>
+                <a:schemeClr val="accent6">
+                  <a:lumMod val="50000"/>
+                </a:schemeClr>
+              </a:solidFill>
+            </a:endParaRPr>
+          </a:p>
+        </p:txBody>
+      </p:sp>
+      <p:sp>
+        <p:nvSpPr>
+          <p:cNvPr id="58" name="TextBox 57">
+            <a:extLst>
+              <a:ext uri="{FF2B5EF4-FFF2-40B4-BE49-F238E27FC236}">
+                <a16:creationId xmlns:a16="http://schemas.microsoft.com/office/drawing/2014/main" id="{82E29B4C-04C6-3BB3-AD78-7DE58C8D2B6D}"/>
+              </a:ext>
+            </a:extLst>
+          </p:cNvPr>
+          <p:cNvSpPr txBox="1"/>
+          <p:nvPr/>
+        </p:nvSpPr>
+        <p:spPr>
+          <a:xfrm>
+            <a:off x="4465979" y="1214207"/>
+            <a:ext cx="3211175" cy="307777"/>
+          </a:xfrm>
+          <a:prstGeom prst="rect">
+            <a:avLst/>
+          </a:prstGeom>
+          <a:noFill/>
+        </p:spPr>
+        <p:txBody>
+          <a:bodyPr wrap="square" rtlCol="0">
+            <a:spAutoFit/>
+          </a:bodyPr>
+          <a:lstStyle/>
+          <a:p>
+            <a:r>
+              <a:rPr lang="en-US" sz="1400" b="1" dirty="0"/>
+              <a:t>LEVEL1 Sensing &amp; Manipulating </a:t>
+            </a:r>
+            <a:endParaRPr lang="en-SG" sz="1400" b="1" dirty="0"/>
+          </a:p>
+        </p:txBody>
+      </p:sp>
+      <p:sp>
+        <p:nvSpPr>
+          <p:cNvPr id="60" name="Rectangle 59">
+            <a:extLst>
+              <a:ext uri="{FF2B5EF4-FFF2-40B4-BE49-F238E27FC236}">
+                <a16:creationId xmlns:a16="http://schemas.microsoft.com/office/drawing/2014/main" id="{1ABB435E-D1C5-2A1D-D5B6-FF9D65A294BC}"/>
+              </a:ext>
+            </a:extLst>
+          </p:cNvPr>
+          <p:cNvSpPr/>
+          <p:nvPr/>
+        </p:nvSpPr>
+        <p:spPr>
+          <a:xfrm>
+            <a:off x="5174675" y="2448998"/>
+            <a:ext cx="800111" cy="295727"/>
+          </a:xfrm>
+          <a:prstGeom prst="rect">
+            <a:avLst/>
+          </a:prstGeom>
+          <a:solidFill>
+            <a:schemeClr val="accent6">
+              <a:lumMod val="75000"/>
+            </a:schemeClr>
+          </a:solidFill>
+          <a:ln>
+            <a:solidFill>
+              <a:schemeClr val="tx1"/>
+            </a:solidFill>
+          </a:ln>
+        </p:spPr>
+        <p:style>
+          <a:lnRef idx="2">
+            <a:schemeClr val="accent1">
+              <a:shade val="50000"/>
+            </a:schemeClr>
+          </a:lnRef>
+          <a:fillRef idx="1">
+            <a:schemeClr val="accent1"/>
+          </a:fillRef>
+          <a:effectRef idx="0">
+            <a:schemeClr val="accent1"/>
+          </a:effectRef>
+          <a:fontRef idx="minor">
+            <a:schemeClr val="lt1"/>
+          </a:fontRef>
+        </p:style>
+        <p:txBody>
+          <a:bodyPr rtlCol="0" anchor="ctr"/>
+          <a:lstStyle/>
+          <a:p>
+            <a:pPr algn="ctr"/>
+            <a:r>
+              <a:rPr lang="en-US" sz="1050" b="1" dirty="0"/>
+              <a:t>V</a:t>
+            </a:r>
+            <a:r>
+              <a:rPr lang="en-SG" sz="1050" b="1" dirty="0"/>
+              <a:t>ar_Int16</a:t>
+            </a:r>
+          </a:p>
+        </p:txBody>
+      </p:sp>
+      <p:sp>
+        <p:nvSpPr>
+          <p:cNvPr id="73" name="TextBox 72">
+            <a:extLst>
+              <a:ext uri="{FF2B5EF4-FFF2-40B4-BE49-F238E27FC236}">
+                <a16:creationId xmlns:a16="http://schemas.microsoft.com/office/drawing/2014/main" id="{01E8581F-D3D3-6078-F256-4DE00D9D11B5}"/>
+              </a:ext>
+            </a:extLst>
+          </p:cNvPr>
+          <p:cNvSpPr txBox="1"/>
+          <p:nvPr/>
+        </p:nvSpPr>
+        <p:spPr>
+          <a:xfrm>
+            <a:off x="4544774" y="2052508"/>
+            <a:ext cx="1539240" cy="276999"/>
+          </a:xfrm>
+          <a:prstGeom prst="rect">
+            <a:avLst/>
+          </a:prstGeom>
+          <a:noFill/>
+        </p:spPr>
+        <p:txBody>
+          <a:bodyPr wrap="square" rtlCol="0">
+            <a:spAutoFit/>
+          </a:bodyPr>
+          <a:lstStyle/>
+          <a:p>
+            <a:r>
+              <a:rPr lang="en-US" sz="1200" b="1" dirty="0"/>
+              <a:t>PLC input variables</a:t>
+            </a:r>
+            <a:endParaRPr lang="en-SG" sz="1200" b="1" dirty="0"/>
+          </a:p>
+        </p:txBody>
+      </p:sp>
+      <p:sp>
+        <p:nvSpPr>
+          <p:cNvPr id="87" name="Rectangle 86">
+            <a:extLst>
+              <a:ext uri="{FF2B5EF4-FFF2-40B4-BE49-F238E27FC236}">
+                <a16:creationId xmlns:a16="http://schemas.microsoft.com/office/drawing/2014/main" id="{DC6982E0-F568-FDEB-F36D-A8A4B4ECAAC2}"/>
+              </a:ext>
+            </a:extLst>
+          </p:cNvPr>
+          <p:cNvSpPr/>
+          <p:nvPr/>
+        </p:nvSpPr>
+        <p:spPr>
+          <a:xfrm>
+            <a:off x="6477215" y="3218997"/>
+            <a:ext cx="1193597" cy="292311"/>
+          </a:xfrm>
+          <a:prstGeom prst="rect">
+            <a:avLst/>
+          </a:prstGeom>
+          <a:solidFill>
+            <a:schemeClr val="accent6">
+              <a:lumMod val="50000"/>
+            </a:schemeClr>
+          </a:solidFill>
+          <a:ln>
+            <a:solidFill>
+              <a:schemeClr val="tx1"/>
+            </a:solidFill>
+          </a:ln>
+        </p:spPr>
+        <p:style>
+          <a:lnRef idx="2">
+            <a:schemeClr val="accent1">
+              <a:shade val="50000"/>
+            </a:schemeClr>
+          </a:lnRef>
+          <a:fillRef idx="1">
+            <a:schemeClr val="accent1"/>
+          </a:fillRef>
+          <a:effectRef idx="0">
+            <a:schemeClr val="accent1"/>
+          </a:effectRef>
+          <a:fontRef idx="minor">
+            <a:schemeClr val="lt1"/>
+          </a:fontRef>
+        </p:style>
+        <p:txBody>
+          <a:bodyPr rtlCol="0" anchor="ctr"/>
+          <a:lstStyle/>
+          <a:p>
+            <a:r>
+              <a:rPr lang="en-US" sz="1050" b="1" dirty="0"/>
+              <a:t>UA-Name Space</a:t>
+            </a:r>
+            <a:endParaRPr lang="en-SG" sz="1050" b="1" dirty="0"/>
+          </a:p>
+        </p:txBody>
+      </p:sp>
+      <p:cxnSp>
+        <p:nvCxnSpPr>
+          <p:cNvPr id="89" name="Straight Connector 88">
+            <a:extLst>
+              <a:ext uri="{FF2B5EF4-FFF2-40B4-BE49-F238E27FC236}">
+                <a16:creationId xmlns:a16="http://schemas.microsoft.com/office/drawing/2014/main" id="{3DEF1424-FF7D-72FE-F53F-C306F472F681}"/>
+              </a:ext>
+            </a:extLst>
+          </p:cNvPr>
+          <p:cNvCxnSpPr>
+            <a:cxnSpLocks/>
+          </p:cNvCxnSpPr>
+          <p:nvPr/>
+        </p:nvCxnSpPr>
+        <p:spPr>
+          <a:xfrm flipH="1">
+            <a:off x="6262032" y="2596861"/>
+            <a:ext cx="10038" cy="3295444"/>
+          </a:xfrm>
+          <a:prstGeom prst="line">
+            <a:avLst/>
+          </a:prstGeom>
+          <a:ln>
+            <a:prstDash val="sysDash"/>
+          </a:ln>
+        </p:spPr>
+        <p:style>
+          <a:lnRef idx="2">
+            <a:schemeClr val="accent1"/>
+          </a:lnRef>
+          <a:fillRef idx="0">
+            <a:schemeClr val="accent1"/>
+          </a:fillRef>
+          <a:effectRef idx="1">
+            <a:schemeClr val="accent1"/>
+          </a:effectRef>
+          <a:fontRef idx="minor">
+            <a:schemeClr val="tx1"/>
+          </a:fontRef>
+        </p:style>
+      </p:cxnSp>
+      <p:cxnSp>
+        <p:nvCxnSpPr>
+          <p:cNvPr id="101" name="Straight Connector 100">
+            <a:extLst>
+              <a:ext uri="{FF2B5EF4-FFF2-40B4-BE49-F238E27FC236}">
+                <a16:creationId xmlns:a16="http://schemas.microsoft.com/office/drawing/2014/main" id="{0B07DB28-A322-EE63-4405-11479194F6BA}"/>
+              </a:ext>
+            </a:extLst>
+          </p:cNvPr>
+          <p:cNvCxnSpPr/>
+          <p:nvPr/>
+        </p:nvCxnSpPr>
+        <p:spPr>
+          <a:xfrm>
+            <a:off x="10645209" y="5938131"/>
+            <a:ext cx="0" cy="0"/>
+          </a:xfrm>
+          <a:prstGeom prst="line">
+            <a:avLst/>
+          </a:prstGeom>
+        </p:spPr>
+        <p:style>
+          <a:lnRef idx="2">
+            <a:schemeClr val="accent1"/>
+          </a:lnRef>
+          <a:fillRef idx="0">
+            <a:schemeClr val="accent1"/>
+          </a:fillRef>
+          <a:effectRef idx="1">
+            <a:schemeClr val="accent1"/>
+          </a:effectRef>
+          <a:fontRef idx="minor">
+            <a:schemeClr val="tx1"/>
+          </a:fontRef>
+        </p:style>
+      </p:cxnSp>
+      <p:sp>
+        <p:nvSpPr>
+          <p:cNvPr id="150" name="Rectangle 149">
+            <a:extLst>
+              <a:ext uri="{FF2B5EF4-FFF2-40B4-BE49-F238E27FC236}">
+                <a16:creationId xmlns:a16="http://schemas.microsoft.com/office/drawing/2014/main" id="{5FE92F7D-928C-1178-B356-6B2C0362C822}"/>
+              </a:ext>
+            </a:extLst>
+          </p:cNvPr>
+          <p:cNvSpPr/>
+          <p:nvPr/>
+        </p:nvSpPr>
+        <p:spPr>
+          <a:xfrm>
+            <a:off x="7103765" y="2183517"/>
+            <a:ext cx="1193597" cy="425591"/>
+          </a:xfrm>
+          <a:prstGeom prst="rect">
+            <a:avLst/>
+          </a:prstGeom>
+          <a:solidFill>
+            <a:schemeClr val="accent2"/>
+          </a:solidFill>
+        </p:spPr>
+        <p:style>
+          <a:lnRef idx="2">
+            <a:schemeClr val="accent1">
+              <a:shade val="50000"/>
+            </a:schemeClr>
+          </a:lnRef>
+          <a:fillRef idx="1">
+            <a:schemeClr val="accent1"/>
+          </a:fillRef>
+          <a:effectRef idx="0">
+            <a:schemeClr val="accent1"/>
+          </a:effectRef>
+          <a:fontRef idx="minor">
+            <a:schemeClr val="lt1"/>
+          </a:fontRef>
+        </p:style>
+        <p:txBody>
+          <a:bodyPr rtlCol="0" anchor="ctr"/>
+          <a:lstStyle/>
+          <a:p>
+            <a:r>
+              <a:rPr lang="en-US" sz="1050" b="1" dirty="0"/>
+              <a:t>OPC-UA-TCP Server </a:t>
+            </a:r>
+            <a:endParaRPr lang="en-SG" sz="1050" b="1" dirty="0"/>
+          </a:p>
+        </p:txBody>
+      </p:sp>
+      <p:cxnSp>
+        <p:nvCxnSpPr>
+          <p:cNvPr id="166" name="Straight Connector 165">
+            <a:extLst>
+              <a:ext uri="{FF2B5EF4-FFF2-40B4-BE49-F238E27FC236}">
+                <a16:creationId xmlns:a16="http://schemas.microsoft.com/office/drawing/2014/main" id="{8EC21AE7-940A-A782-B415-D8135DE4BCD8}"/>
+              </a:ext>
+            </a:extLst>
+          </p:cNvPr>
+          <p:cNvCxnSpPr>
+            <a:cxnSpLocks/>
+          </p:cNvCxnSpPr>
+          <p:nvPr/>
+        </p:nvCxnSpPr>
+        <p:spPr>
+          <a:xfrm>
+            <a:off x="8474892" y="1281995"/>
+            <a:ext cx="0" cy="5059061"/>
+          </a:xfrm>
+          <a:prstGeom prst="line">
+            <a:avLst/>
+          </a:prstGeom>
+          <a:ln>
+            <a:solidFill>
+              <a:schemeClr val="bg2">
+                <a:lumMod val="75000"/>
+              </a:schemeClr>
+            </a:solidFill>
+            <a:prstDash val="sysDash"/>
+          </a:ln>
+        </p:spPr>
+        <p:style>
+          <a:lnRef idx="2">
+            <a:schemeClr val="accent1"/>
+          </a:lnRef>
+          <a:fillRef idx="0">
+            <a:schemeClr val="accent1"/>
+          </a:fillRef>
+          <a:effectRef idx="1">
+            <a:schemeClr val="accent1"/>
+          </a:effectRef>
+          <a:fontRef idx="minor">
+            <a:schemeClr val="tx1"/>
+          </a:fontRef>
+        </p:style>
+      </p:cxnSp>
+      <p:sp>
+        <p:nvSpPr>
+          <p:cNvPr id="168" name="TextBox 167">
+            <a:extLst>
+              <a:ext uri="{FF2B5EF4-FFF2-40B4-BE49-F238E27FC236}">
+                <a16:creationId xmlns:a16="http://schemas.microsoft.com/office/drawing/2014/main" id="{1A359336-8DCF-D73D-017F-3F3B60206625}"/>
+              </a:ext>
+            </a:extLst>
+          </p:cNvPr>
+          <p:cNvSpPr txBox="1"/>
+          <p:nvPr/>
+        </p:nvSpPr>
+        <p:spPr>
+          <a:xfrm>
+            <a:off x="8725166" y="1611237"/>
+            <a:ext cx="3048369" cy="307777"/>
+          </a:xfrm>
+          <a:prstGeom prst="rect">
+            <a:avLst/>
+          </a:prstGeom>
+          <a:noFill/>
+        </p:spPr>
+        <p:txBody>
+          <a:bodyPr wrap="square" rtlCol="0">
+            <a:spAutoFit/>
+          </a:bodyPr>
+          <a:lstStyle/>
+          <a:p>
+            <a:r>
+              <a:rPr lang="en-US" sz="1400" b="1" dirty="0">
+                <a:solidFill>
+                  <a:schemeClr val="accent2">
+                    <a:lumMod val="75000"/>
+                  </a:schemeClr>
+                </a:solidFill>
+              </a:rPr>
+              <a:t>SCADA HMI/Console Program</a:t>
+            </a:r>
+            <a:endParaRPr lang="en-SG" sz="1400" b="1" dirty="0">
+              <a:solidFill>
+                <a:schemeClr val="accent2">
+                  <a:lumMod val="75000"/>
+                </a:schemeClr>
+              </a:solidFill>
+            </a:endParaRPr>
+          </a:p>
+        </p:txBody>
+      </p:sp>
+      <p:sp>
+        <p:nvSpPr>
+          <p:cNvPr id="173" name="Rectangle 172">
+            <a:extLst>
+              <a:ext uri="{FF2B5EF4-FFF2-40B4-BE49-F238E27FC236}">
+                <a16:creationId xmlns:a16="http://schemas.microsoft.com/office/drawing/2014/main" id="{E81F40CF-233A-6A23-E3ED-3D7D7080726B}"/>
+              </a:ext>
+            </a:extLst>
+          </p:cNvPr>
+          <p:cNvSpPr/>
+          <p:nvPr/>
+        </p:nvSpPr>
+        <p:spPr>
+          <a:xfrm>
+            <a:off x="8864794" y="2192712"/>
+            <a:ext cx="1145147" cy="379302"/>
+          </a:xfrm>
+          <a:prstGeom prst="rect">
+            <a:avLst/>
+          </a:prstGeom>
+          <a:solidFill>
+            <a:schemeClr val="accent2"/>
+          </a:solidFill>
+        </p:spPr>
+        <p:style>
+          <a:lnRef idx="2">
+            <a:schemeClr val="accent1">
+              <a:shade val="50000"/>
+            </a:schemeClr>
+          </a:lnRef>
+          <a:fillRef idx="1">
+            <a:schemeClr val="accent1"/>
+          </a:fillRef>
+          <a:effectRef idx="0">
+            <a:schemeClr val="accent1"/>
+          </a:effectRef>
+          <a:fontRef idx="minor">
+            <a:schemeClr val="lt1"/>
+          </a:fontRef>
+        </p:style>
+        <p:txBody>
+          <a:bodyPr rtlCol="0" anchor="ctr"/>
+          <a:lstStyle/>
+          <a:p>
+            <a:r>
+              <a:rPr lang="en-US" sz="1050" b="1" dirty="0"/>
+              <a:t>OPC-UA-TCP Client</a:t>
+            </a:r>
+            <a:endParaRPr lang="en-SG" sz="1050" b="1" dirty="0"/>
+          </a:p>
+        </p:txBody>
+      </p:sp>
+      <p:sp>
+        <p:nvSpPr>
+          <p:cNvPr id="177" name="TextBox 176">
+            <a:extLst>
+              <a:ext uri="{FF2B5EF4-FFF2-40B4-BE49-F238E27FC236}">
+                <a16:creationId xmlns:a16="http://schemas.microsoft.com/office/drawing/2014/main" id="{183E1CEC-6EF2-2118-A6BD-8A8BB9AABEF5}"/>
+              </a:ext>
+            </a:extLst>
+          </p:cNvPr>
+          <p:cNvSpPr txBox="1"/>
+          <p:nvPr/>
+        </p:nvSpPr>
+        <p:spPr>
+          <a:xfrm>
+            <a:off x="8643762" y="1235909"/>
+            <a:ext cx="3211175" cy="307777"/>
+          </a:xfrm>
+          <a:prstGeom prst="rect">
+            <a:avLst/>
+          </a:prstGeom>
+          <a:noFill/>
+        </p:spPr>
+        <p:txBody>
+          <a:bodyPr wrap="square" rtlCol="0">
+            <a:spAutoFit/>
+          </a:bodyPr>
+          <a:lstStyle/>
+          <a:p>
+            <a:r>
+              <a:rPr lang="en-US" sz="1400" b="1" dirty="0"/>
+              <a:t>LEVEL2-Monitoring &amp; Supervising</a:t>
+            </a:r>
+            <a:endParaRPr lang="en-SG" sz="1400" b="1" dirty="0"/>
+          </a:p>
+        </p:txBody>
+      </p:sp>
+      <p:sp>
+        <p:nvSpPr>
+          <p:cNvPr id="181" name="TextBox 180">
+            <a:extLst>
+              <a:ext uri="{FF2B5EF4-FFF2-40B4-BE49-F238E27FC236}">
+                <a16:creationId xmlns:a16="http://schemas.microsoft.com/office/drawing/2014/main" id="{6832DE67-645D-10F3-7277-C215577A5EE7}"/>
+              </a:ext>
+            </a:extLst>
+          </p:cNvPr>
+          <p:cNvSpPr txBox="1"/>
+          <p:nvPr/>
+        </p:nvSpPr>
+        <p:spPr>
+          <a:xfrm>
+            <a:off x="8704261" y="1897490"/>
+            <a:ext cx="1567960" cy="276999"/>
+          </a:xfrm>
+          <a:prstGeom prst="rect">
+            <a:avLst/>
+          </a:prstGeom>
+          <a:noFill/>
+        </p:spPr>
+        <p:txBody>
+          <a:bodyPr wrap="square" rtlCol="0">
+            <a:spAutoFit/>
+          </a:bodyPr>
+          <a:lstStyle/>
+          <a:p>
+            <a:r>
+              <a:rPr lang="en-US" sz="1200" b="1" dirty="0"/>
+              <a:t>Periodic message</a:t>
+            </a:r>
+            <a:endParaRPr lang="en-SG" sz="1200" b="1" dirty="0"/>
+          </a:p>
+        </p:txBody>
+      </p:sp>
+      <p:sp>
+        <p:nvSpPr>
+          <p:cNvPr id="51" name="Rectangle 50">
+            <a:extLst>
+              <a:ext uri="{FF2B5EF4-FFF2-40B4-BE49-F238E27FC236}">
+                <a16:creationId xmlns:a16="http://schemas.microsoft.com/office/drawing/2014/main" id="{09D46688-1AC1-5E09-9EFA-0FC4357EDAC5}"/>
+              </a:ext>
+            </a:extLst>
+          </p:cNvPr>
+          <p:cNvSpPr/>
+          <p:nvPr/>
+        </p:nvSpPr>
+        <p:spPr>
+          <a:xfrm>
+            <a:off x="3273701" y="5338455"/>
+            <a:ext cx="1613725" cy="429658"/>
+          </a:xfrm>
+          <a:prstGeom prst="rect">
+            <a:avLst/>
+          </a:prstGeom>
+          <a:solidFill>
+            <a:schemeClr val="accent2"/>
+          </a:solidFill>
+        </p:spPr>
+        <p:style>
+          <a:lnRef idx="2">
+            <a:schemeClr val="accent1">
+              <a:shade val="50000"/>
+            </a:schemeClr>
+          </a:lnRef>
+          <a:fillRef idx="1">
+            <a:schemeClr val="accent1"/>
+          </a:fillRef>
+          <a:effectRef idx="0">
+            <a:schemeClr val="accent1"/>
+          </a:effectRef>
+          <a:fontRef idx="minor">
+            <a:schemeClr val="lt1"/>
+          </a:fontRef>
+        </p:style>
+        <p:txBody>
+          <a:bodyPr rtlCol="0" anchor="ctr"/>
+          <a:lstStyle/>
+          <a:p>
+            <a:r>
+              <a:rPr lang="en-US" sz="1050" b="1" dirty="0"/>
+              <a:t>UDP Simulated Motor </a:t>
+            </a:r>
+            <a:r>
+              <a:rPr lang="en-US" sz="1050" b="1" dirty="0" err="1"/>
+              <a:t>Siganl</a:t>
+            </a:r>
+            <a:r>
+              <a:rPr lang="en-US" sz="1050" b="1" dirty="0"/>
+              <a:t> to PLC output </a:t>
+            </a:r>
+            <a:endParaRPr lang="en-SG" sz="1050" b="1" dirty="0"/>
+          </a:p>
+        </p:txBody>
+      </p:sp>
+      <p:cxnSp>
+        <p:nvCxnSpPr>
+          <p:cNvPr id="36" name="Connector: Elbow 35">
+            <a:extLst>
+              <a:ext uri="{FF2B5EF4-FFF2-40B4-BE49-F238E27FC236}">
+                <a16:creationId xmlns:a16="http://schemas.microsoft.com/office/drawing/2014/main" id="{D76956C8-6322-DBA6-E532-757D510E700C}"/>
+              </a:ext>
+            </a:extLst>
+          </p:cNvPr>
+          <p:cNvCxnSpPr>
+            <a:cxnSpLocks/>
+          </p:cNvCxnSpPr>
+          <p:nvPr/>
+        </p:nvCxnSpPr>
+        <p:spPr>
+          <a:xfrm rot="5400000">
+            <a:off x="4129184" y="3164829"/>
+            <a:ext cx="1628741" cy="456830"/>
+          </a:xfrm>
+          <a:prstGeom prst="bentConnector3">
+            <a:avLst>
+              <a:gd name="adj1" fmla="val 595"/>
+            </a:avLst>
+          </a:prstGeom>
+          <a:ln>
+            <a:solidFill>
+              <a:schemeClr val="accent6">
+                <a:lumMod val="75000"/>
+              </a:schemeClr>
+            </a:solidFill>
+          </a:ln>
+        </p:spPr>
+        <p:style>
+          <a:lnRef idx="2">
+            <a:schemeClr val="accent1"/>
+          </a:lnRef>
+          <a:fillRef idx="0">
+            <a:schemeClr val="accent1"/>
+          </a:fillRef>
+          <a:effectRef idx="1">
+            <a:schemeClr val="accent1"/>
+          </a:effectRef>
+          <a:fontRef idx="minor">
+            <a:schemeClr val="tx1"/>
+          </a:fontRef>
+        </p:style>
+      </p:cxnSp>
+      <p:cxnSp>
+        <p:nvCxnSpPr>
+          <p:cNvPr id="44" name="Straight Connector 43">
+            <a:extLst>
+              <a:ext uri="{FF2B5EF4-FFF2-40B4-BE49-F238E27FC236}">
+                <a16:creationId xmlns:a16="http://schemas.microsoft.com/office/drawing/2014/main" id="{F17314ED-A24B-78BD-6DF1-870EFC18D658}"/>
+              </a:ext>
+            </a:extLst>
+          </p:cNvPr>
+          <p:cNvCxnSpPr>
+            <a:cxnSpLocks/>
+          </p:cNvCxnSpPr>
+          <p:nvPr/>
+        </p:nvCxnSpPr>
+        <p:spPr>
+          <a:xfrm>
+            <a:off x="4734414" y="3232558"/>
+            <a:ext cx="463636" cy="0"/>
+          </a:xfrm>
+          <a:prstGeom prst="line">
+            <a:avLst/>
+          </a:prstGeom>
+          <a:ln>
+            <a:solidFill>
+              <a:schemeClr val="accent6">
+                <a:lumMod val="75000"/>
+              </a:schemeClr>
+            </a:solidFill>
+          </a:ln>
+        </p:spPr>
+        <p:style>
+          <a:lnRef idx="2">
+            <a:schemeClr val="dk1"/>
+          </a:lnRef>
+          <a:fillRef idx="0">
+            <a:schemeClr val="dk1"/>
+          </a:fillRef>
+          <a:effectRef idx="1">
+            <a:schemeClr val="dk1"/>
+          </a:effectRef>
+          <a:fontRef idx="minor">
+            <a:schemeClr val="tx1"/>
+          </a:fontRef>
+        </p:style>
+      </p:cxnSp>
+      <p:cxnSp>
+        <p:nvCxnSpPr>
+          <p:cNvPr id="47" name="Straight Connector 46">
+            <a:extLst>
+              <a:ext uri="{FF2B5EF4-FFF2-40B4-BE49-F238E27FC236}">
+                <a16:creationId xmlns:a16="http://schemas.microsoft.com/office/drawing/2014/main" id="{2D903CA6-DCDF-67E0-D26F-25C61F5DA2F5}"/>
+              </a:ext>
+            </a:extLst>
+          </p:cNvPr>
+          <p:cNvCxnSpPr>
+            <a:cxnSpLocks/>
+          </p:cNvCxnSpPr>
+          <p:nvPr/>
+        </p:nvCxnSpPr>
+        <p:spPr>
+          <a:xfrm>
+            <a:off x="4708332" y="3796292"/>
+            <a:ext cx="463636" cy="0"/>
+          </a:xfrm>
+          <a:prstGeom prst="line">
+            <a:avLst/>
+          </a:prstGeom>
+          <a:ln>
+            <a:solidFill>
+              <a:schemeClr val="accent6">
+                <a:lumMod val="75000"/>
+              </a:schemeClr>
+            </a:solidFill>
+          </a:ln>
+        </p:spPr>
+        <p:style>
+          <a:lnRef idx="2">
+            <a:schemeClr val="dk1"/>
+          </a:lnRef>
+          <a:fillRef idx="0">
+            <a:schemeClr val="dk1"/>
+          </a:fillRef>
+          <a:effectRef idx="1">
+            <a:schemeClr val="dk1"/>
+          </a:effectRef>
+          <a:fontRef idx="minor">
+            <a:schemeClr val="tx1"/>
+          </a:fontRef>
+        </p:style>
+      </p:cxnSp>
+      <p:cxnSp>
+        <p:nvCxnSpPr>
+          <p:cNvPr id="52" name="Straight Arrow Connector 51">
+            <a:extLst>
+              <a:ext uri="{FF2B5EF4-FFF2-40B4-BE49-F238E27FC236}">
+                <a16:creationId xmlns:a16="http://schemas.microsoft.com/office/drawing/2014/main" id="{70DEAD90-080D-4005-C58F-8A69A8681897}"/>
+              </a:ext>
+            </a:extLst>
+          </p:cNvPr>
+          <p:cNvCxnSpPr>
+            <a:cxnSpLocks/>
+            <a:stCxn id="60" idx="2"/>
+          </p:cNvCxnSpPr>
+          <p:nvPr/>
+        </p:nvCxnSpPr>
+        <p:spPr>
+          <a:xfrm flipH="1">
+            <a:off x="5574730" y="2744725"/>
+            <a:ext cx="1" cy="1474654"/>
+          </a:xfrm>
+          <a:prstGeom prst="straightConnector1">
+            <a:avLst/>
+          </a:prstGeom>
+          <a:ln>
+            <a:prstDash val="sysDash"/>
+            <a:tailEnd type="triangle"/>
+          </a:ln>
+        </p:spPr>
+        <p:style>
+          <a:lnRef idx="2">
+            <a:schemeClr val="dk1"/>
+          </a:lnRef>
+          <a:fillRef idx="0">
+            <a:schemeClr val="dk1"/>
+          </a:fillRef>
+          <a:effectRef idx="1">
+            <a:schemeClr val="dk1"/>
+          </a:effectRef>
+          <a:fontRef idx="minor">
+            <a:schemeClr val="tx1"/>
+          </a:fontRef>
+        </p:style>
+      </p:cxnSp>
+      <p:sp>
+        <p:nvSpPr>
+          <p:cNvPr id="61" name="Rectangle 60">
+            <a:extLst>
+              <a:ext uri="{FF2B5EF4-FFF2-40B4-BE49-F238E27FC236}">
+                <a16:creationId xmlns:a16="http://schemas.microsoft.com/office/drawing/2014/main" id="{5219C6DC-E430-B27D-ED11-6AB2DA7DEA0C}"/>
+              </a:ext>
+            </a:extLst>
+          </p:cNvPr>
+          <p:cNvSpPr/>
+          <p:nvPr/>
+        </p:nvSpPr>
+        <p:spPr>
+          <a:xfrm>
+            <a:off x="5171968" y="3054220"/>
+            <a:ext cx="800111" cy="295727"/>
+          </a:xfrm>
+          <a:prstGeom prst="rect">
+            <a:avLst/>
+          </a:prstGeom>
+          <a:solidFill>
+            <a:schemeClr val="accent6">
+              <a:lumMod val="75000"/>
+            </a:schemeClr>
+          </a:solidFill>
+          <a:ln>
+            <a:solidFill>
+              <a:schemeClr val="tx1"/>
+            </a:solidFill>
+          </a:ln>
+        </p:spPr>
+        <p:style>
+          <a:lnRef idx="2">
+            <a:schemeClr val="accent1">
+              <a:shade val="50000"/>
+            </a:schemeClr>
+          </a:lnRef>
+          <a:fillRef idx="1">
+            <a:schemeClr val="accent1"/>
+          </a:fillRef>
+          <a:effectRef idx="0">
+            <a:schemeClr val="accent1"/>
+          </a:effectRef>
+          <a:fontRef idx="minor">
+            <a:schemeClr val="lt1"/>
+          </a:fontRef>
+        </p:style>
+        <p:txBody>
+          <a:bodyPr rtlCol="0" anchor="ctr"/>
+          <a:lstStyle/>
+          <a:p>
+            <a:pPr algn="ctr"/>
+            <a:r>
+              <a:rPr lang="en-US" sz="1050" b="1" dirty="0"/>
+              <a:t>V</a:t>
+            </a:r>
+            <a:r>
+              <a:rPr lang="en-SG" sz="1050" b="1" dirty="0" err="1"/>
+              <a:t>ar_Float</a:t>
+            </a:r>
+            <a:endParaRPr lang="en-SG" sz="1050" b="1" dirty="0"/>
+          </a:p>
+        </p:txBody>
+      </p:sp>
+      <p:sp>
+        <p:nvSpPr>
+          <p:cNvPr id="75" name="Rectangle 74">
+            <a:extLst>
+              <a:ext uri="{FF2B5EF4-FFF2-40B4-BE49-F238E27FC236}">
+                <a16:creationId xmlns:a16="http://schemas.microsoft.com/office/drawing/2014/main" id="{0509DE3B-F28B-FCA3-D312-3F785FAAF02C}"/>
+              </a:ext>
+            </a:extLst>
+          </p:cNvPr>
+          <p:cNvSpPr/>
+          <p:nvPr/>
+        </p:nvSpPr>
+        <p:spPr>
+          <a:xfrm>
+            <a:off x="5171968" y="3675278"/>
+            <a:ext cx="800111" cy="295727"/>
+          </a:xfrm>
+          <a:prstGeom prst="rect">
+            <a:avLst/>
+          </a:prstGeom>
+          <a:solidFill>
+            <a:schemeClr val="accent6">
+              <a:lumMod val="75000"/>
+            </a:schemeClr>
+          </a:solidFill>
+          <a:ln>
+            <a:solidFill>
+              <a:schemeClr val="tx1"/>
+            </a:solidFill>
+          </a:ln>
+        </p:spPr>
+        <p:style>
+          <a:lnRef idx="2">
+            <a:schemeClr val="accent1">
+              <a:shade val="50000"/>
+            </a:schemeClr>
+          </a:lnRef>
+          <a:fillRef idx="1">
+            <a:schemeClr val="accent1"/>
+          </a:fillRef>
+          <a:effectRef idx="0">
+            <a:schemeClr val="accent1"/>
+          </a:effectRef>
+          <a:fontRef idx="minor">
+            <a:schemeClr val="lt1"/>
+          </a:fontRef>
+        </p:style>
+        <p:txBody>
+          <a:bodyPr rtlCol="0" anchor="ctr"/>
+          <a:lstStyle/>
+          <a:p>
+            <a:pPr algn="ctr"/>
+            <a:r>
+              <a:rPr lang="en-US" sz="1050" b="1" dirty="0"/>
+              <a:t>V</a:t>
+            </a:r>
+            <a:r>
+              <a:rPr lang="en-SG" sz="1050" b="1" dirty="0" err="1"/>
+              <a:t>ar_Bool</a:t>
+            </a:r>
+            <a:endParaRPr lang="en-SG" sz="1050" b="1" dirty="0"/>
+          </a:p>
+        </p:txBody>
+      </p:sp>
+      <p:pic>
+        <p:nvPicPr>
+          <p:cNvPr id="53" name="Picture 52">
+            <a:extLst>
+              <a:ext uri="{FF2B5EF4-FFF2-40B4-BE49-F238E27FC236}">
+                <a16:creationId xmlns:a16="http://schemas.microsoft.com/office/drawing/2014/main" id="{0C33FDE4-EC23-3B71-1F53-0228AF9DA5C0}"/>
+              </a:ext>
+            </a:extLst>
+          </p:cNvPr>
+          <p:cNvPicPr>
+            <a:picLocks noChangeAspect="1"/>
+          </p:cNvPicPr>
+          <p:nvPr/>
+        </p:nvPicPr>
+        <p:blipFill>
+          <a:blip r:embed="rId3"/>
+          <a:stretch>
+            <a:fillRect/>
+          </a:stretch>
+        </p:blipFill>
+        <p:spPr>
+          <a:xfrm>
+            <a:off x="5198050" y="4245740"/>
+            <a:ext cx="762864" cy="663898"/>
+          </a:xfrm>
+          <a:prstGeom prst="rect">
+            <a:avLst/>
+          </a:prstGeom>
+          <a:ln w="19050">
+            <a:solidFill>
+              <a:schemeClr val="tx1"/>
+            </a:solidFill>
+          </a:ln>
+        </p:spPr>
+      </p:pic>
+      <p:sp>
+        <p:nvSpPr>
+          <p:cNvPr id="64" name="Rectangle 63">
+            <a:extLst>
+              <a:ext uri="{FF2B5EF4-FFF2-40B4-BE49-F238E27FC236}">
+                <a16:creationId xmlns:a16="http://schemas.microsoft.com/office/drawing/2014/main" id="{D4382C0D-5A0E-3734-305E-F4A8DA872770}"/>
+              </a:ext>
+            </a:extLst>
+          </p:cNvPr>
+          <p:cNvSpPr/>
+          <p:nvPr/>
+        </p:nvSpPr>
+        <p:spPr>
+          <a:xfrm>
+            <a:off x="5182919" y="5451761"/>
+            <a:ext cx="800111" cy="295727"/>
+          </a:xfrm>
+          <a:prstGeom prst="rect">
+            <a:avLst/>
+          </a:prstGeom>
+          <a:solidFill>
+            <a:schemeClr val="accent6">
+              <a:lumMod val="75000"/>
+            </a:schemeClr>
+          </a:solidFill>
+          <a:ln>
+            <a:solidFill>
+              <a:schemeClr val="tx1"/>
+            </a:solidFill>
+          </a:ln>
+        </p:spPr>
+        <p:style>
+          <a:lnRef idx="2">
+            <a:schemeClr val="accent1">
+              <a:shade val="50000"/>
+            </a:schemeClr>
+          </a:lnRef>
+          <a:fillRef idx="1">
+            <a:schemeClr val="accent1"/>
+          </a:fillRef>
+          <a:effectRef idx="0">
+            <a:schemeClr val="accent1"/>
+          </a:effectRef>
+          <a:fontRef idx="minor">
+            <a:schemeClr val="lt1"/>
+          </a:fontRef>
+        </p:style>
+        <p:txBody>
+          <a:bodyPr rtlCol="0" anchor="ctr"/>
+          <a:lstStyle/>
+          <a:p>
+            <a:pPr algn="ctr"/>
+            <a:r>
+              <a:rPr lang="en-US" sz="1050" b="1" dirty="0"/>
+              <a:t>V</a:t>
+            </a:r>
+            <a:r>
+              <a:rPr lang="en-SG" sz="1050" b="1" dirty="0" err="1"/>
+              <a:t>ar_Float</a:t>
+            </a:r>
+            <a:endParaRPr lang="en-SG" sz="1050" b="1" dirty="0"/>
+          </a:p>
+        </p:txBody>
+      </p:sp>
+      <p:cxnSp>
+        <p:nvCxnSpPr>
+          <p:cNvPr id="65" name="Straight Arrow Connector 64">
+            <a:extLst>
+              <a:ext uri="{FF2B5EF4-FFF2-40B4-BE49-F238E27FC236}">
+                <a16:creationId xmlns:a16="http://schemas.microsoft.com/office/drawing/2014/main" id="{408BC73F-EDA6-7485-AA00-2696C036303D}"/>
+              </a:ext>
+            </a:extLst>
+          </p:cNvPr>
+          <p:cNvCxnSpPr>
+            <a:cxnSpLocks/>
+          </p:cNvCxnSpPr>
+          <p:nvPr/>
+        </p:nvCxnSpPr>
+        <p:spPr>
+          <a:xfrm>
+            <a:off x="5576083" y="4936461"/>
+            <a:ext cx="0" cy="486705"/>
+          </a:xfrm>
+          <a:prstGeom prst="straightConnector1">
+            <a:avLst/>
+          </a:prstGeom>
+          <a:ln>
+            <a:prstDash val="sysDash"/>
+            <a:tailEnd type="triangle"/>
+          </a:ln>
+        </p:spPr>
+        <p:style>
+          <a:lnRef idx="2">
+            <a:schemeClr val="dk1"/>
+          </a:lnRef>
+          <a:fillRef idx="0">
+            <a:schemeClr val="dk1"/>
+          </a:fillRef>
+          <a:effectRef idx="1">
+            <a:schemeClr val="dk1"/>
+          </a:effectRef>
+          <a:fontRef idx="minor">
+            <a:schemeClr val="tx1"/>
+          </a:fontRef>
+        </p:style>
+      </p:cxnSp>
+      <p:sp>
+        <p:nvSpPr>
+          <p:cNvPr id="82" name="TextBox 81">
+            <a:extLst>
+              <a:ext uri="{FF2B5EF4-FFF2-40B4-BE49-F238E27FC236}">
+                <a16:creationId xmlns:a16="http://schemas.microsoft.com/office/drawing/2014/main" id="{1432798B-CADC-3199-B451-6D8F1746DCA4}"/>
+              </a:ext>
+            </a:extLst>
+          </p:cNvPr>
+          <p:cNvSpPr txBox="1"/>
+          <p:nvPr/>
+        </p:nvSpPr>
+        <p:spPr>
+          <a:xfrm>
+            <a:off x="4533113" y="5980212"/>
+            <a:ext cx="1738957" cy="276999"/>
+          </a:xfrm>
+          <a:prstGeom prst="rect">
+            <a:avLst/>
+          </a:prstGeom>
+          <a:noFill/>
+        </p:spPr>
+        <p:txBody>
+          <a:bodyPr wrap="square" rtlCol="0">
+            <a:spAutoFit/>
+          </a:bodyPr>
+          <a:lstStyle/>
+          <a:p>
+            <a:r>
+              <a:rPr lang="en-US" sz="1200" b="1" dirty="0"/>
+              <a:t>PLC output variables</a:t>
+            </a:r>
+            <a:endParaRPr lang="en-SG" sz="1200" b="1" dirty="0"/>
+          </a:p>
+        </p:txBody>
+      </p:sp>
+      <p:sp>
+        <p:nvSpPr>
+          <p:cNvPr id="83" name="TextBox 82">
+            <a:extLst>
+              <a:ext uri="{FF2B5EF4-FFF2-40B4-BE49-F238E27FC236}">
+                <a16:creationId xmlns:a16="http://schemas.microsoft.com/office/drawing/2014/main" id="{E7F56E9E-54E0-748A-065D-3A8C30252DC5}"/>
+              </a:ext>
+            </a:extLst>
+          </p:cNvPr>
+          <p:cNvSpPr txBox="1"/>
+          <p:nvPr/>
+        </p:nvSpPr>
+        <p:spPr>
+          <a:xfrm>
+            <a:off x="4544774" y="4897602"/>
+            <a:ext cx="1221390" cy="276999"/>
+          </a:xfrm>
+          <a:prstGeom prst="rect">
+            <a:avLst/>
+          </a:prstGeom>
+          <a:noFill/>
+        </p:spPr>
+        <p:txBody>
+          <a:bodyPr wrap="square" rtlCol="0">
+            <a:spAutoFit/>
+          </a:bodyPr>
+          <a:lstStyle/>
+          <a:p>
+            <a:r>
+              <a:rPr lang="en-US" sz="1200" b="1" dirty="0"/>
+              <a:t>Ladder Logic</a:t>
+            </a:r>
+            <a:endParaRPr lang="en-SG" sz="1200" b="1" dirty="0"/>
+          </a:p>
+        </p:txBody>
+      </p:sp>
+      <p:sp>
+        <p:nvSpPr>
+          <p:cNvPr id="91" name="Rectangle 90">
+            <a:extLst>
+              <a:ext uri="{FF2B5EF4-FFF2-40B4-BE49-F238E27FC236}">
+                <a16:creationId xmlns:a16="http://schemas.microsoft.com/office/drawing/2014/main" id="{54EA485A-2499-EECA-EC2F-672E4CE197B4}"/>
+              </a:ext>
+            </a:extLst>
+          </p:cNvPr>
+          <p:cNvSpPr/>
+          <p:nvPr/>
+        </p:nvSpPr>
+        <p:spPr>
+          <a:xfrm>
+            <a:off x="6676218" y="3673114"/>
+            <a:ext cx="828772" cy="292311"/>
+          </a:xfrm>
+          <a:prstGeom prst="rect">
+            <a:avLst/>
+          </a:prstGeom>
+          <a:solidFill>
+            <a:schemeClr val="accent6">
+              <a:lumMod val="50000"/>
+            </a:schemeClr>
+          </a:solidFill>
+          <a:ln>
+            <a:solidFill>
+              <a:schemeClr val="tx1"/>
+            </a:solidFill>
+          </a:ln>
+        </p:spPr>
+        <p:style>
+          <a:lnRef idx="2">
+            <a:schemeClr val="accent1">
+              <a:shade val="50000"/>
+            </a:schemeClr>
+          </a:lnRef>
+          <a:fillRef idx="1">
+            <a:schemeClr val="accent1"/>
+          </a:fillRef>
+          <a:effectRef idx="0">
+            <a:schemeClr val="accent1"/>
+          </a:effectRef>
+          <a:fontRef idx="minor">
+            <a:schemeClr val="lt1"/>
+          </a:fontRef>
+        </p:style>
+        <p:txBody>
+          <a:bodyPr rtlCol="0" anchor="ctr"/>
+          <a:lstStyle/>
+          <a:p>
+            <a:r>
+              <a:rPr lang="en-US" sz="1050" b="1" dirty="0"/>
+              <a:t>UA-Object</a:t>
+            </a:r>
+            <a:endParaRPr lang="en-SG" sz="1050" b="1" dirty="0"/>
+          </a:p>
+        </p:txBody>
+      </p:sp>
+      <p:cxnSp>
+        <p:nvCxnSpPr>
+          <p:cNvPr id="98" name="Connector: Elbow 97">
+            <a:extLst>
+              <a:ext uri="{FF2B5EF4-FFF2-40B4-BE49-F238E27FC236}">
+                <a16:creationId xmlns:a16="http://schemas.microsoft.com/office/drawing/2014/main" id="{60E99037-4CB7-001B-4073-9328A9D72650}"/>
+              </a:ext>
+            </a:extLst>
+          </p:cNvPr>
+          <p:cNvCxnSpPr>
+            <a:cxnSpLocks/>
+          </p:cNvCxnSpPr>
+          <p:nvPr/>
+        </p:nvCxnSpPr>
+        <p:spPr>
+          <a:xfrm rot="10800000">
+            <a:off x="6570204" y="3520481"/>
+            <a:ext cx="87164" cy="298789"/>
+          </a:xfrm>
+          <a:prstGeom prst="bentConnector2">
+            <a:avLst/>
+          </a:prstGeom>
+          <a:ln>
+            <a:solidFill>
+              <a:schemeClr val="accent6">
+                <a:lumMod val="75000"/>
+              </a:schemeClr>
+            </a:solidFill>
+          </a:ln>
+        </p:spPr>
+        <p:style>
+          <a:lnRef idx="2">
+            <a:schemeClr val="accent1"/>
+          </a:lnRef>
+          <a:fillRef idx="0">
+            <a:schemeClr val="accent1"/>
+          </a:fillRef>
+          <a:effectRef idx="1">
+            <a:schemeClr val="accent1"/>
+          </a:effectRef>
+          <a:fontRef idx="minor">
+            <a:schemeClr val="tx1"/>
+          </a:fontRef>
+        </p:style>
+      </p:cxnSp>
+      <p:cxnSp>
+        <p:nvCxnSpPr>
+          <p:cNvPr id="127" name="Straight Connector 126">
+            <a:extLst>
+              <a:ext uri="{FF2B5EF4-FFF2-40B4-BE49-F238E27FC236}">
+                <a16:creationId xmlns:a16="http://schemas.microsoft.com/office/drawing/2014/main" id="{C5BB47A3-EA29-EE6A-82C2-B2AA8E4FC2D3}"/>
+              </a:ext>
+            </a:extLst>
+          </p:cNvPr>
+          <p:cNvCxnSpPr>
+            <a:cxnSpLocks/>
+          </p:cNvCxnSpPr>
+          <p:nvPr/>
+        </p:nvCxnSpPr>
+        <p:spPr>
+          <a:xfrm flipH="1">
+            <a:off x="6719358" y="3993500"/>
+            <a:ext cx="4628" cy="1699124"/>
+          </a:xfrm>
+          <a:prstGeom prst="line">
+            <a:avLst/>
+          </a:prstGeom>
+          <a:ln>
+            <a:solidFill>
+              <a:schemeClr val="accent6">
+                <a:lumMod val="75000"/>
+              </a:schemeClr>
+            </a:solidFill>
+          </a:ln>
+        </p:spPr>
+        <p:style>
+          <a:lnRef idx="2">
+            <a:schemeClr val="accent1"/>
+          </a:lnRef>
+          <a:fillRef idx="0">
+            <a:schemeClr val="accent1"/>
+          </a:fillRef>
+          <a:effectRef idx="1">
+            <a:schemeClr val="accent1"/>
+          </a:effectRef>
+          <a:fontRef idx="minor">
+            <a:schemeClr val="tx1"/>
+          </a:fontRef>
+        </p:style>
+      </p:cxnSp>
+      <p:sp>
+        <p:nvSpPr>
+          <p:cNvPr id="138" name="Rectangle 137">
+            <a:extLst>
+              <a:ext uri="{FF2B5EF4-FFF2-40B4-BE49-F238E27FC236}">
+                <a16:creationId xmlns:a16="http://schemas.microsoft.com/office/drawing/2014/main" id="{E94B6F9B-C05F-5310-77F4-28FCB9D9AC83}"/>
+              </a:ext>
+            </a:extLst>
+          </p:cNvPr>
+          <p:cNvSpPr/>
+          <p:nvPr/>
+        </p:nvSpPr>
+        <p:spPr>
+          <a:xfrm>
+            <a:off x="6950680" y="4285270"/>
+            <a:ext cx="716596" cy="292311"/>
+          </a:xfrm>
+          <a:prstGeom prst="rect">
+            <a:avLst/>
+          </a:prstGeom>
+          <a:solidFill>
+            <a:schemeClr val="accent6">
+              <a:lumMod val="50000"/>
+            </a:schemeClr>
+          </a:solidFill>
+          <a:ln>
+            <a:solidFill>
+              <a:schemeClr val="tx1"/>
+            </a:solidFill>
+          </a:ln>
+        </p:spPr>
+        <p:style>
+          <a:lnRef idx="2">
+            <a:schemeClr val="accent1">
+              <a:shade val="50000"/>
+            </a:schemeClr>
+          </a:lnRef>
+          <a:fillRef idx="1">
+            <a:schemeClr val="accent1"/>
+          </a:fillRef>
+          <a:effectRef idx="0">
+            <a:schemeClr val="accent1"/>
+          </a:effectRef>
+          <a:fontRef idx="minor">
+            <a:schemeClr val="lt1"/>
+          </a:fontRef>
+        </p:style>
+        <p:txBody>
+          <a:bodyPr rtlCol="0" anchor="ctr"/>
+          <a:lstStyle/>
+          <a:p>
+            <a:r>
+              <a:rPr lang="en-US" sz="1050" b="1" dirty="0"/>
+              <a:t>UA-int16</a:t>
+            </a:r>
+            <a:endParaRPr lang="en-SG" sz="1050" b="1" dirty="0"/>
+          </a:p>
+        </p:txBody>
+      </p:sp>
+      <p:sp>
+        <p:nvSpPr>
+          <p:cNvPr id="139" name="Rectangle 138">
+            <a:extLst>
+              <a:ext uri="{FF2B5EF4-FFF2-40B4-BE49-F238E27FC236}">
+                <a16:creationId xmlns:a16="http://schemas.microsoft.com/office/drawing/2014/main" id="{794455B8-F8A1-1CEF-DDA5-D27631E4C40A}"/>
+              </a:ext>
+            </a:extLst>
+          </p:cNvPr>
+          <p:cNvSpPr/>
+          <p:nvPr/>
+        </p:nvSpPr>
+        <p:spPr>
+          <a:xfrm>
+            <a:off x="6987428" y="4901807"/>
+            <a:ext cx="716596" cy="292311"/>
+          </a:xfrm>
+          <a:prstGeom prst="rect">
+            <a:avLst/>
+          </a:prstGeom>
+          <a:solidFill>
+            <a:schemeClr val="accent6">
+              <a:lumMod val="50000"/>
+            </a:schemeClr>
+          </a:solidFill>
+          <a:ln>
+            <a:solidFill>
+              <a:schemeClr val="tx1"/>
+            </a:solidFill>
+          </a:ln>
+        </p:spPr>
+        <p:style>
+          <a:lnRef idx="2">
+            <a:schemeClr val="accent1">
+              <a:shade val="50000"/>
+            </a:schemeClr>
+          </a:lnRef>
+          <a:fillRef idx="1">
+            <a:schemeClr val="accent1"/>
+          </a:fillRef>
+          <a:effectRef idx="0">
+            <a:schemeClr val="accent1"/>
+          </a:effectRef>
+          <a:fontRef idx="minor">
+            <a:schemeClr val="lt1"/>
+          </a:fontRef>
+        </p:style>
+        <p:txBody>
+          <a:bodyPr rtlCol="0" anchor="ctr"/>
+          <a:lstStyle/>
+          <a:p>
+            <a:r>
+              <a:rPr lang="en-US" sz="1050" b="1" dirty="0"/>
+              <a:t>UA-float</a:t>
+            </a:r>
+            <a:endParaRPr lang="en-SG" sz="1050" b="1" dirty="0"/>
+          </a:p>
+        </p:txBody>
+      </p:sp>
+      <p:sp>
+        <p:nvSpPr>
+          <p:cNvPr id="141" name="Rectangle 140">
+            <a:extLst>
+              <a:ext uri="{FF2B5EF4-FFF2-40B4-BE49-F238E27FC236}">
+                <a16:creationId xmlns:a16="http://schemas.microsoft.com/office/drawing/2014/main" id="{4DE9E7FE-8B31-9E1A-B618-7E7853FA2784}"/>
+              </a:ext>
+            </a:extLst>
+          </p:cNvPr>
+          <p:cNvSpPr/>
+          <p:nvPr/>
+        </p:nvSpPr>
+        <p:spPr>
+          <a:xfrm>
+            <a:off x="6989592" y="5659082"/>
+            <a:ext cx="677684" cy="292311"/>
+          </a:xfrm>
+          <a:prstGeom prst="rect">
+            <a:avLst/>
+          </a:prstGeom>
+          <a:solidFill>
+            <a:schemeClr val="accent6">
+              <a:lumMod val="50000"/>
+            </a:schemeClr>
+          </a:solidFill>
+          <a:ln>
+            <a:solidFill>
+              <a:schemeClr val="tx1"/>
+            </a:solidFill>
+          </a:ln>
+        </p:spPr>
+        <p:style>
+          <a:lnRef idx="2">
+            <a:schemeClr val="accent1">
+              <a:shade val="50000"/>
+            </a:schemeClr>
+          </a:lnRef>
+          <a:fillRef idx="1">
+            <a:schemeClr val="accent1"/>
+          </a:fillRef>
+          <a:effectRef idx="0">
+            <a:schemeClr val="accent1"/>
+          </a:effectRef>
+          <a:fontRef idx="minor">
+            <a:schemeClr val="lt1"/>
+          </a:fontRef>
+        </p:style>
+        <p:txBody>
+          <a:bodyPr rtlCol="0" anchor="ctr"/>
+          <a:lstStyle/>
+          <a:p>
+            <a:r>
+              <a:rPr lang="en-US" sz="1050" b="1" dirty="0"/>
+              <a:t>UA-bool</a:t>
+            </a:r>
+            <a:endParaRPr lang="en-SG" sz="1050" b="1" dirty="0"/>
+          </a:p>
+        </p:txBody>
+      </p:sp>
+      <p:cxnSp>
+        <p:nvCxnSpPr>
+          <p:cNvPr id="143" name="Straight Connector 142">
+            <a:extLst>
+              <a:ext uri="{FF2B5EF4-FFF2-40B4-BE49-F238E27FC236}">
+                <a16:creationId xmlns:a16="http://schemas.microsoft.com/office/drawing/2014/main" id="{C8359F1D-E211-65C5-39F1-44C9EEB5ABAA}"/>
+              </a:ext>
+            </a:extLst>
+          </p:cNvPr>
+          <p:cNvCxnSpPr>
+            <a:cxnSpLocks/>
+          </p:cNvCxnSpPr>
+          <p:nvPr/>
+        </p:nvCxnSpPr>
+        <p:spPr>
+          <a:xfrm flipV="1">
+            <a:off x="6730556" y="4318753"/>
+            <a:ext cx="227462" cy="1285"/>
+          </a:xfrm>
+          <a:prstGeom prst="line">
+            <a:avLst/>
+          </a:prstGeom>
+          <a:ln>
+            <a:solidFill>
+              <a:schemeClr val="accent6">
+                <a:lumMod val="75000"/>
+              </a:schemeClr>
+            </a:solidFill>
+          </a:ln>
+        </p:spPr>
+        <p:style>
+          <a:lnRef idx="2">
+            <a:schemeClr val="dk1"/>
+          </a:lnRef>
+          <a:fillRef idx="0">
+            <a:schemeClr val="dk1"/>
+          </a:fillRef>
+          <a:effectRef idx="1">
+            <a:schemeClr val="dk1"/>
+          </a:effectRef>
+          <a:fontRef idx="minor">
+            <a:schemeClr val="tx1"/>
+          </a:fontRef>
+        </p:style>
+      </p:cxnSp>
+      <p:cxnSp>
+        <p:nvCxnSpPr>
+          <p:cNvPr id="144" name="Straight Connector 143">
+            <a:extLst>
+              <a:ext uri="{FF2B5EF4-FFF2-40B4-BE49-F238E27FC236}">
+                <a16:creationId xmlns:a16="http://schemas.microsoft.com/office/drawing/2014/main" id="{755B939D-BB10-A9AD-8905-782AAD4749F4}"/>
+              </a:ext>
+            </a:extLst>
+          </p:cNvPr>
+          <p:cNvCxnSpPr>
+            <a:cxnSpLocks/>
+          </p:cNvCxnSpPr>
+          <p:nvPr/>
+        </p:nvCxnSpPr>
+        <p:spPr>
+          <a:xfrm>
+            <a:off x="6732298" y="4973646"/>
+            <a:ext cx="243052" cy="0"/>
+          </a:xfrm>
+          <a:prstGeom prst="line">
+            <a:avLst/>
+          </a:prstGeom>
+          <a:ln>
+            <a:solidFill>
+              <a:schemeClr val="accent6">
+                <a:lumMod val="75000"/>
+              </a:schemeClr>
+            </a:solidFill>
+          </a:ln>
+        </p:spPr>
+        <p:style>
+          <a:lnRef idx="2">
+            <a:schemeClr val="dk1"/>
+          </a:lnRef>
+          <a:fillRef idx="0">
+            <a:schemeClr val="dk1"/>
+          </a:fillRef>
+          <a:effectRef idx="1">
+            <a:schemeClr val="dk1"/>
+          </a:effectRef>
+          <a:fontRef idx="minor">
+            <a:schemeClr val="tx1"/>
+          </a:fontRef>
+        </p:style>
+      </p:cxnSp>
+      <p:cxnSp>
+        <p:nvCxnSpPr>
+          <p:cNvPr id="149" name="Straight Connector 148">
+            <a:extLst>
+              <a:ext uri="{FF2B5EF4-FFF2-40B4-BE49-F238E27FC236}">
+                <a16:creationId xmlns:a16="http://schemas.microsoft.com/office/drawing/2014/main" id="{6985B0B4-E456-20D2-8AC1-C6E4032ACAC1}"/>
+              </a:ext>
+            </a:extLst>
+          </p:cNvPr>
+          <p:cNvCxnSpPr>
+            <a:cxnSpLocks/>
+          </p:cNvCxnSpPr>
+          <p:nvPr/>
+        </p:nvCxnSpPr>
+        <p:spPr>
+          <a:xfrm>
+            <a:off x="6731970" y="5692624"/>
+            <a:ext cx="257099" cy="0"/>
+          </a:xfrm>
+          <a:prstGeom prst="line">
+            <a:avLst/>
+          </a:prstGeom>
+          <a:ln>
+            <a:solidFill>
+              <a:schemeClr val="accent6">
+                <a:lumMod val="75000"/>
+              </a:schemeClr>
+            </a:solidFill>
+          </a:ln>
+        </p:spPr>
+        <p:style>
+          <a:lnRef idx="2">
+            <a:schemeClr val="dk1"/>
+          </a:lnRef>
+          <a:fillRef idx="0">
+            <a:schemeClr val="dk1"/>
+          </a:fillRef>
+          <a:effectRef idx="1">
+            <a:schemeClr val="dk1"/>
+          </a:effectRef>
+          <a:fontRef idx="minor">
+            <a:schemeClr val="tx1"/>
+          </a:fontRef>
+        </p:style>
+      </p:cxnSp>
+      <p:cxnSp>
+        <p:nvCxnSpPr>
+          <p:cNvPr id="159" name="Straight Connector 158">
+            <a:extLst>
+              <a:ext uri="{FF2B5EF4-FFF2-40B4-BE49-F238E27FC236}">
+                <a16:creationId xmlns:a16="http://schemas.microsoft.com/office/drawing/2014/main" id="{98AF2848-8EBA-6653-4AE8-E7890A31EA81}"/>
+              </a:ext>
+            </a:extLst>
+          </p:cNvPr>
+          <p:cNvCxnSpPr>
+            <a:cxnSpLocks/>
+            <a:stCxn id="60" idx="3"/>
+          </p:cNvCxnSpPr>
+          <p:nvPr/>
+        </p:nvCxnSpPr>
+        <p:spPr>
+          <a:xfrm flipV="1">
+            <a:off x="5974786" y="2588050"/>
+            <a:ext cx="287246" cy="0"/>
+          </a:xfrm>
+          <a:prstGeom prst="line">
+            <a:avLst/>
+          </a:prstGeom>
+          <a:ln>
+            <a:prstDash val="sysDash"/>
+          </a:ln>
+        </p:spPr>
+        <p:style>
+          <a:lnRef idx="2">
+            <a:schemeClr val="accent1"/>
+          </a:lnRef>
+          <a:fillRef idx="0">
+            <a:schemeClr val="accent1"/>
+          </a:fillRef>
+          <a:effectRef idx="1">
+            <a:schemeClr val="accent1"/>
+          </a:effectRef>
+          <a:fontRef idx="minor">
+            <a:schemeClr val="tx1"/>
+          </a:fontRef>
+        </p:style>
+      </p:cxnSp>
+      <p:cxnSp>
+        <p:nvCxnSpPr>
+          <p:cNvPr id="174" name="Straight Connector 173">
+            <a:extLst>
+              <a:ext uri="{FF2B5EF4-FFF2-40B4-BE49-F238E27FC236}">
+                <a16:creationId xmlns:a16="http://schemas.microsoft.com/office/drawing/2014/main" id="{11777A80-DDC1-B43C-F8D5-AA87FACED535}"/>
+              </a:ext>
+            </a:extLst>
+          </p:cNvPr>
+          <p:cNvCxnSpPr>
+            <a:cxnSpLocks/>
+          </p:cNvCxnSpPr>
+          <p:nvPr/>
+        </p:nvCxnSpPr>
+        <p:spPr>
+          <a:xfrm flipV="1">
+            <a:off x="5984824" y="3202083"/>
+            <a:ext cx="287246" cy="0"/>
+          </a:xfrm>
+          <a:prstGeom prst="line">
+            <a:avLst/>
+          </a:prstGeom>
+          <a:ln>
+            <a:prstDash val="sysDash"/>
+          </a:ln>
+        </p:spPr>
+        <p:style>
+          <a:lnRef idx="2">
+            <a:schemeClr val="accent1"/>
+          </a:lnRef>
+          <a:fillRef idx="0">
+            <a:schemeClr val="accent1"/>
+          </a:fillRef>
+          <a:effectRef idx="1">
+            <a:schemeClr val="accent1"/>
+          </a:effectRef>
+          <a:fontRef idx="minor">
+            <a:schemeClr val="tx1"/>
+          </a:fontRef>
+        </p:style>
+      </p:cxnSp>
+      <p:cxnSp>
+        <p:nvCxnSpPr>
+          <p:cNvPr id="178" name="Straight Connector 177">
+            <a:extLst>
+              <a:ext uri="{FF2B5EF4-FFF2-40B4-BE49-F238E27FC236}">
+                <a16:creationId xmlns:a16="http://schemas.microsoft.com/office/drawing/2014/main" id="{437B8FA1-AEAF-41F4-670D-CCD486D9338B}"/>
+              </a:ext>
+            </a:extLst>
+          </p:cNvPr>
+          <p:cNvCxnSpPr>
+            <a:cxnSpLocks/>
+          </p:cNvCxnSpPr>
+          <p:nvPr/>
+        </p:nvCxnSpPr>
+        <p:spPr>
+          <a:xfrm flipV="1">
+            <a:off x="5994519" y="3791243"/>
+            <a:ext cx="287246" cy="0"/>
+          </a:xfrm>
+          <a:prstGeom prst="line">
+            <a:avLst/>
+          </a:prstGeom>
+          <a:ln>
+            <a:prstDash val="sysDash"/>
+          </a:ln>
+        </p:spPr>
+        <p:style>
+          <a:lnRef idx="2">
+            <a:schemeClr val="accent1"/>
+          </a:lnRef>
+          <a:fillRef idx="0">
+            <a:schemeClr val="accent1"/>
+          </a:fillRef>
+          <a:effectRef idx="1">
+            <a:schemeClr val="accent1"/>
+          </a:effectRef>
+          <a:fontRef idx="minor">
+            <a:schemeClr val="tx1"/>
+          </a:fontRef>
+        </p:style>
+      </p:cxnSp>
+      <p:cxnSp>
+        <p:nvCxnSpPr>
+          <p:cNvPr id="187" name="Straight Connector 186">
+            <a:extLst>
+              <a:ext uri="{FF2B5EF4-FFF2-40B4-BE49-F238E27FC236}">
+                <a16:creationId xmlns:a16="http://schemas.microsoft.com/office/drawing/2014/main" id="{AEB9B173-83E2-4EF7-6216-C0220EBEB8F7}"/>
+              </a:ext>
+            </a:extLst>
+          </p:cNvPr>
+          <p:cNvCxnSpPr>
+            <a:cxnSpLocks/>
+          </p:cNvCxnSpPr>
+          <p:nvPr/>
+        </p:nvCxnSpPr>
+        <p:spPr>
+          <a:xfrm flipV="1">
+            <a:off x="5984824" y="5592692"/>
+            <a:ext cx="287246" cy="0"/>
+          </a:xfrm>
+          <a:prstGeom prst="line">
+            <a:avLst/>
+          </a:prstGeom>
+          <a:ln>
+            <a:prstDash val="sysDash"/>
+          </a:ln>
+        </p:spPr>
+        <p:style>
+          <a:lnRef idx="2">
+            <a:schemeClr val="accent1"/>
+          </a:lnRef>
+          <a:fillRef idx="0">
+            <a:schemeClr val="accent1"/>
+          </a:fillRef>
+          <a:effectRef idx="1">
+            <a:schemeClr val="accent1"/>
+          </a:effectRef>
+          <a:fontRef idx="minor">
+            <a:schemeClr val="tx1"/>
+          </a:fontRef>
+        </p:style>
+      </p:cxnSp>
+      <p:sp>
+        <p:nvSpPr>
+          <p:cNvPr id="192" name="TextBox 191">
+            <a:extLst>
+              <a:ext uri="{FF2B5EF4-FFF2-40B4-BE49-F238E27FC236}">
+                <a16:creationId xmlns:a16="http://schemas.microsoft.com/office/drawing/2014/main" id="{6FF26618-206F-F9B9-7307-0C8B78FF7E11}"/>
+              </a:ext>
+            </a:extLst>
+          </p:cNvPr>
+          <p:cNvSpPr txBox="1"/>
+          <p:nvPr/>
+        </p:nvSpPr>
+        <p:spPr>
+          <a:xfrm>
+            <a:off x="6366597" y="2931151"/>
+            <a:ext cx="1496681" cy="276999"/>
+          </a:xfrm>
+          <a:prstGeom prst="rect">
+            <a:avLst/>
+          </a:prstGeom>
+          <a:noFill/>
+        </p:spPr>
+        <p:txBody>
+          <a:bodyPr wrap="square" rtlCol="0">
+            <a:spAutoFit/>
+          </a:bodyPr>
+          <a:lstStyle/>
+          <a:p>
+            <a:r>
+              <a:rPr lang="en-US" sz="1200" b="1" dirty="0"/>
+              <a:t>UA Data Structure</a:t>
+            </a:r>
+            <a:endParaRPr lang="en-SG" sz="1200" b="1" dirty="0"/>
+          </a:p>
+        </p:txBody>
+      </p:sp>
+      <p:cxnSp>
+        <p:nvCxnSpPr>
+          <p:cNvPr id="194" name="Straight Connector 193">
+            <a:extLst>
+              <a:ext uri="{FF2B5EF4-FFF2-40B4-BE49-F238E27FC236}">
+                <a16:creationId xmlns:a16="http://schemas.microsoft.com/office/drawing/2014/main" id="{1424E51D-9621-B78C-862F-D3DFF5CB4E31}"/>
+              </a:ext>
+            </a:extLst>
+          </p:cNvPr>
+          <p:cNvCxnSpPr>
+            <a:cxnSpLocks/>
+          </p:cNvCxnSpPr>
+          <p:nvPr/>
+        </p:nvCxnSpPr>
+        <p:spPr>
+          <a:xfrm flipV="1">
+            <a:off x="6284729" y="4498161"/>
+            <a:ext cx="647621" cy="8176"/>
+          </a:xfrm>
+          <a:prstGeom prst="line">
+            <a:avLst/>
+          </a:prstGeom>
+          <a:ln>
+            <a:prstDash val="sysDash"/>
+          </a:ln>
+        </p:spPr>
+        <p:style>
+          <a:lnRef idx="2">
+            <a:schemeClr val="accent1"/>
+          </a:lnRef>
+          <a:fillRef idx="0">
+            <a:schemeClr val="accent1"/>
+          </a:fillRef>
+          <a:effectRef idx="1">
+            <a:schemeClr val="accent1"/>
+          </a:effectRef>
+          <a:fontRef idx="minor">
+            <a:schemeClr val="tx1"/>
+          </a:fontRef>
+        </p:style>
+      </p:cxnSp>
+      <p:cxnSp>
+        <p:nvCxnSpPr>
+          <p:cNvPr id="198" name="Straight Connector 197">
+            <a:extLst>
+              <a:ext uri="{FF2B5EF4-FFF2-40B4-BE49-F238E27FC236}">
+                <a16:creationId xmlns:a16="http://schemas.microsoft.com/office/drawing/2014/main" id="{89F3DA13-5E0C-97F4-464E-A11C8483736F}"/>
+              </a:ext>
+            </a:extLst>
+          </p:cNvPr>
+          <p:cNvCxnSpPr>
+            <a:cxnSpLocks/>
+          </p:cNvCxnSpPr>
+          <p:nvPr/>
+        </p:nvCxnSpPr>
+        <p:spPr>
+          <a:xfrm flipV="1">
+            <a:off x="6276569" y="5130259"/>
+            <a:ext cx="710859" cy="0"/>
+          </a:xfrm>
+          <a:prstGeom prst="line">
+            <a:avLst/>
+          </a:prstGeom>
+          <a:ln>
+            <a:prstDash val="sysDash"/>
+          </a:ln>
+        </p:spPr>
+        <p:style>
+          <a:lnRef idx="2">
+            <a:schemeClr val="accent1"/>
+          </a:lnRef>
+          <a:fillRef idx="0">
+            <a:schemeClr val="accent1"/>
+          </a:fillRef>
+          <a:effectRef idx="1">
+            <a:schemeClr val="accent1"/>
+          </a:effectRef>
+          <a:fontRef idx="minor">
+            <a:schemeClr val="tx1"/>
+          </a:fontRef>
+        </p:style>
+      </p:cxnSp>
+      <p:cxnSp>
+        <p:nvCxnSpPr>
+          <p:cNvPr id="199" name="Straight Connector 198">
+            <a:extLst>
+              <a:ext uri="{FF2B5EF4-FFF2-40B4-BE49-F238E27FC236}">
+                <a16:creationId xmlns:a16="http://schemas.microsoft.com/office/drawing/2014/main" id="{28EDEB0B-C7F3-C7E5-B3F1-F6AA3731E5B8}"/>
+              </a:ext>
+            </a:extLst>
+          </p:cNvPr>
+          <p:cNvCxnSpPr>
+            <a:cxnSpLocks/>
+          </p:cNvCxnSpPr>
+          <p:nvPr/>
+        </p:nvCxnSpPr>
+        <p:spPr>
+          <a:xfrm flipV="1">
+            <a:off x="6245937" y="5866178"/>
+            <a:ext cx="741491" cy="0"/>
+          </a:xfrm>
+          <a:prstGeom prst="line">
+            <a:avLst/>
+          </a:prstGeom>
+          <a:ln>
+            <a:prstDash val="sysDash"/>
+          </a:ln>
+        </p:spPr>
+        <p:style>
+          <a:lnRef idx="2">
+            <a:schemeClr val="accent1"/>
+          </a:lnRef>
+          <a:fillRef idx="0">
+            <a:schemeClr val="accent1"/>
+          </a:fillRef>
+          <a:effectRef idx="1">
+            <a:schemeClr val="accent1"/>
+          </a:effectRef>
+          <a:fontRef idx="minor">
+            <a:schemeClr val="tx1"/>
+          </a:fontRef>
+        </p:style>
+      </p:cxnSp>
+      <p:cxnSp>
+        <p:nvCxnSpPr>
+          <p:cNvPr id="206" name="Straight Connector 205">
+            <a:extLst>
+              <a:ext uri="{FF2B5EF4-FFF2-40B4-BE49-F238E27FC236}">
+                <a16:creationId xmlns:a16="http://schemas.microsoft.com/office/drawing/2014/main" id="{95DF373D-6217-2B47-BE54-01602BA0ED5D}"/>
+              </a:ext>
+            </a:extLst>
+          </p:cNvPr>
+          <p:cNvCxnSpPr>
+            <a:cxnSpLocks/>
+          </p:cNvCxnSpPr>
+          <p:nvPr/>
+        </p:nvCxnSpPr>
+        <p:spPr>
+          <a:xfrm>
+            <a:off x="7860772" y="2609108"/>
+            <a:ext cx="0" cy="3224338"/>
+          </a:xfrm>
+          <a:prstGeom prst="line">
+            <a:avLst/>
+          </a:prstGeom>
+          <a:ln>
+            <a:solidFill>
+              <a:schemeClr val="tx1"/>
+            </a:solidFill>
+            <a:prstDash val="sysDash"/>
+          </a:ln>
+        </p:spPr>
+        <p:style>
+          <a:lnRef idx="2">
+            <a:schemeClr val="accent1"/>
+          </a:lnRef>
+          <a:fillRef idx="0">
+            <a:schemeClr val="accent1"/>
+          </a:fillRef>
+          <a:effectRef idx="1">
+            <a:schemeClr val="accent1"/>
+          </a:effectRef>
+          <a:fontRef idx="minor">
+            <a:schemeClr val="tx1"/>
+          </a:fontRef>
+        </p:style>
+      </p:cxnSp>
+      <p:cxnSp>
+        <p:nvCxnSpPr>
+          <p:cNvPr id="209" name="Straight Connector 208">
+            <a:extLst>
+              <a:ext uri="{FF2B5EF4-FFF2-40B4-BE49-F238E27FC236}">
+                <a16:creationId xmlns:a16="http://schemas.microsoft.com/office/drawing/2014/main" id="{F2A6A185-4D75-4898-D7D9-86804AA33662}"/>
+              </a:ext>
+            </a:extLst>
+          </p:cNvPr>
+          <p:cNvCxnSpPr>
+            <a:cxnSpLocks/>
+          </p:cNvCxnSpPr>
+          <p:nvPr/>
+        </p:nvCxnSpPr>
+        <p:spPr>
+          <a:xfrm>
+            <a:off x="7677915" y="4431425"/>
+            <a:ext cx="185363" cy="0"/>
+          </a:xfrm>
+          <a:prstGeom prst="line">
+            <a:avLst/>
+          </a:prstGeom>
+          <a:ln>
+            <a:solidFill>
+              <a:schemeClr val="tx1"/>
+            </a:solidFill>
+            <a:prstDash val="sysDash"/>
+          </a:ln>
+        </p:spPr>
+        <p:style>
+          <a:lnRef idx="2">
+            <a:schemeClr val="accent1"/>
+          </a:lnRef>
+          <a:fillRef idx="0">
+            <a:schemeClr val="accent1"/>
+          </a:fillRef>
+          <a:effectRef idx="1">
+            <a:schemeClr val="accent1"/>
+          </a:effectRef>
+          <a:fontRef idx="minor">
+            <a:schemeClr val="tx1"/>
+          </a:fontRef>
+        </p:style>
+      </p:cxnSp>
+      <p:cxnSp>
+        <p:nvCxnSpPr>
+          <p:cNvPr id="212" name="Straight Connector 211">
+            <a:extLst>
+              <a:ext uri="{FF2B5EF4-FFF2-40B4-BE49-F238E27FC236}">
+                <a16:creationId xmlns:a16="http://schemas.microsoft.com/office/drawing/2014/main" id="{63D867D1-FF5C-00DF-0569-DA047F1B0F52}"/>
+              </a:ext>
+            </a:extLst>
+          </p:cNvPr>
+          <p:cNvCxnSpPr>
+            <a:cxnSpLocks/>
+          </p:cNvCxnSpPr>
+          <p:nvPr/>
+        </p:nvCxnSpPr>
+        <p:spPr>
+          <a:xfrm>
+            <a:off x="7700385" y="5027080"/>
+            <a:ext cx="162893" cy="0"/>
+          </a:xfrm>
+          <a:prstGeom prst="line">
+            <a:avLst/>
+          </a:prstGeom>
+          <a:ln>
+            <a:solidFill>
+              <a:schemeClr val="tx1"/>
+            </a:solidFill>
+            <a:prstDash val="sysDash"/>
+          </a:ln>
+        </p:spPr>
+        <p:style>
+          <a:lnRef idx="2">
+            <a:schemeClr val="accent1"/>
+          </a:lnRef>
+          <a:fillRef idx="0">
+            <a:schemeClr val="accent1"/>
+          </a:fillRef>
+          <a:effectRef idx="1">
+            <a:schemeClr val="accent1"/>
+          </a:effectRef>
+          <a:fontRef idx="minor">
+            <a:schemeClr val="tx1"/>
+          </a:fontRef>
+        </p:style>
+      </p:cxnSp>
+      <p:cxnSp>
+        <p:nvCxnSpPr>
+          <p:cNvPr id="214" name="Straight Connector 213">
+            <a:extLst>
+              <a:ext uri="{FF2B5EF4-FFF2-40B4-BE49-F238E27FC236}">
+                <a16:creationId xmlns:a16="http://schemas.microsoft.com/office/drawing/2014/main" id="{EC7EB736-3D32-B1D3-10A5-D9B00C90F927}"/>
+              </a:ext>
+            </a:extLst>
+          </p:cNvPr>
+          <p:cNvCxnSpPr>
+            <a:cxnSpLocks/>
+          </p:cNvCxnSpPr>
+          <p:nvPr/>
+        </p:nvCxnSpPr>
+        <p:spPr>
+          <a:xfrm>
+            <a:off x="7667276" y="5833446"/>
+            <a:ext cx="193496" cy="0"/>
+          </a:xfrm>
+          <a:prstGeom prst="line">
+            <a:avLst/>
+          </a:prstGeom>
+          <a:ln>
+            <a:solidFill>
+              <a:schemeClr val="tx1"/>
+            </a:solidFill>
+            <a:prstDash val="sysDash"/>
+          </a:ln>
+        </p:spPr>
+        <p:style>
+          <a:lnRef idx="2">
+            <a:schemeClr val="accent1"/>
+          </a:lnRef>
+          <a:fillRef idx="0">
+            <a:schemeClr val="accent1"/>
+          </a:fillRef>
+          <a:effectRef idx="1">
+            <a:schemeClr val="accent1"/>
+          </a:effectRef>
+          <a:fontRef idx="minor">
+            <a:schemeClr val="tx1"/>
+          </a:fontRef>
+        </p:style>
+      </p:cxnSp>
+      <p:cxnSp>
+        <p:nvCxnSpPr>
+          <p:cNvPr id="220" name="Straight Arrow Connector 219">
+            <a:extLst>
+              <a:ext uri="{FF2B5EF4-FFF2-40B4-BE49-F238E27FC236}">
+                <a16:creationId xmlns:a16="http://schemas.microsoft.com/office/drawing/2014/main" id="{A2CAD7A5-C028-C3EB-9FE0-FCA3A050E419}"/>
+              </a:ext>
+            </a:extLst>
+          </p:cNvPr>
+          <p:cNvCxnSpPr>
+            <a:cxnSpLocks/>
+          </p:cNvCxnSpPr>
+          <p:nvPr/>
+        </p:nvCxnSpPr>
+        <p:spPr>
+          <a:xfrm flipV="1">
+            <a:off x="8297362" y="2369746"/>
+            <a:ext cx="586865" cy="0"/>
+          </a:xfrm>
+          <a:prstGeom prst="straightConnector1">
+            <a:avLst/>
+          </a:prstGeom>
+          <a:ln>
+            <a:headEnd type="triangle"/>
+            <a:tailEnd type="triangle"/>
+          </a:ln>
+        </p:spPr>
+        <p:style>
+          <a:lnRef idx="2">
+            <a:schemeClr val="accent1"/>
+          </a:lnRef>
+          <a:fillRef idx="0">
+            <a:schemeClr val="accent1"/>
+          </a:fillRef>
+          <a:effectRef idx="1">
+            <a:schemeClr val="accent1"/>
+          </a:effectRef>
+          <a:fontRef idx="minor">
+            <a:schemeClr val="tx1"/>
+          </a:fontRef>
+        </p:style>
+      </p:cxnSp>
+      <p:cxnSp>
+        <p:nvCxnSpPr>
+          <p:cNvPr id="241" name="Straight Arrow Connector 240">
+            <a:extLst>
+              <a:ext uri="{FF2B5EF4-FFF2-40B4-BE49-F238E27FC236}">
+                <a16:creationId xmlns:a16="http://schemas.microsoft.com/office/drawing/2014/main" id="{6A6D96EF-619A-D6E8-6199-8D50118DC53F}"/>
+              </a:ext>
+            </a:extLst>
+          </p:cNvPr>
+          <p:cNvCxnSpPr>
+            <a:cxnSpLocks/>
+            <a:stCxn id="173" idx="3"/>
+          </p:cNvCxnSpPr>
+          <p:nvPr/>
+        </p:nvCxnSpPr>
+        <p:spPr>
+          <a:xfrm>
+            <a:off x="10009941" y="2382363"/>
+            <a:ext cx="360849" cy="0"/>
+          </a:xfrm>
+          <a:prstGeom prst="straightConnector1">
+            <a:avLst/>
+          </a:prstGeom>
+          <a:ln>
+            <a:tailEnd type="triangle"/>
+          </a:ln>
+        </p:spPr>
+        <p:style>
+          <a:lnRef idx="2">
+            <a:schemeClr val="accent1"/>
+          </a:lnRef>
+          <a:fillRef idx="0">
+            <a:schemeClr val="accent1"/>
+          </a:fillRef>
+          <a:effectRef idx="1">
+            <a:schemeClr val="accent1"/>
+          </a:effectRef>
+          <a:fontRef idx="minor">
+            <a:schemeClr val="tx1"/>
+          </a:fontRef>
+        </p:style>
+      </p:cxnSp>
+      <p:cxnSp>
+        <p:nvCxnSpPr>
+          <p:cNvPr id="242" name="Straight Arrow Connector 241">
+            <a:extLst>
+              <a:ext uri="{FF2B5EF4-FFF2-40B4-BE49-F238E27FC236}">
+                <a16:creationId xmlns:a16="http://schemas.microsoft.com/office/drawing/2014/main" id="{9223E44D-AFE8-550B-45C5-A09C60FCF73F}"/>
+              </a:ext>
+            </a:extLst>
+          </p:cNvPr>
+          <p:cNvCxnSpPr>
+            <a:cxnSpLocks/>
+          </p:cNvCxnSpPr>
+          <p:nvPr/>
+        </p:nvCxnSpPr>
+        <p:spPr>
+          <a:xfrm>
+            <a:off x="9355071" y="2572014"/>
+            <a:ext cx="0" cy="337263"/>
+          </a:xfrm>
+          <a:prstGeom prst="straightConnector1">
+            <a:avLst/>
+          </a:prstGeom>
+          <a:ln>
+            <a:tailEnd type="triangle"/>
+          </a:ln>
+        </p:spPr>
+        <p:style>
+          <a:lnRef idx="2">
+            <a:schemeClr val="accent1"/>
+          </a:lnRef>
+          <a:fillRef idx="0">
+            <a:schemeClr val="accent1"/>
+          </a:fillRef>
+          <a:effectRef idx="1">
+            <a:schemeClr val="accent1"/>
+          </a:effectRef>
+          <a:fontRef idx="minor">
+            <a:schemeClr val="tx1"/>
+          </a:fontRef>
+        </p:style>
+      </p:cxnSp>
+      <p:pic>
+        <p:nvPicPr>
+          <p:cNvPr id="3" name="Picture 2">
+            <a:extLst>
+              <a:ext uri="{FF2B5EF4-FFF2-40B4-BE49-F238E27FC236}">
+                <a16:creationId xmlns:a16="http://schemas.microsoft.com/office/drawing/2014/main" id="{C3ADB8F2-F3AA-3A49-0CA6-7CDB8F57A6B0}"/>
+              </a:ext>
+            </a:extLst>
+          </p:cNvPr>
+          <p:cNvPicPr>
+            <a:picLocks noChangeAspect="1"/>
+          </p:cNvPicPr>
+          <p:nvPr/>
+        </p:nvPicPr>
+        <p:blipFill>
+          <a:blip r:embed="rId4"/>
+          <a:stretch>
+            <a:fillRect/>
+          </a:stretch>
+        </p:blipFill>
+        <p:spPr>
+          <a:xfrm>
+            <a:off x="518113" y="1897490"/>
+            <a:ext cx="3071311" cy="2144797"/>
+          </a:xfrm>
+          <a:prstGeom prst="rect">
+            <a:avLst/>
+          </a:prstGeom>
+          <a:ln w="19050">
+            <a:solidFill>
+              <a:schemeClr val="accent6">
+                <a:lumMod val="75000"/>
+              </a:schemeClr>
+            </a:solidFill>
+          </a:ln>
+        </p:spPr>
+      </p:pic>
+      <p:cxnSp>
+        <p:nvCxnSpPr>
+          <p:cNvPr id="17" name="Connector: Elbow 16">
+            <a:extLst>
+              <a:ext uri="{FF2B5EF4-FFF2-40B4-BE49-F238E27FC236}">
+                <a16:creationId xmlns:a16="http://schemas.microsoft.com/office/drawing/2014/main" id="{FBC571B0-9059-2A79-AD4A-4A317218326E}"/>
+              </a:ext>
+            </a:extLst>
+          </p:cNvPr>
+          <p:cNvCxnSpPr>
+            <a:cxnSpLocks/>
+            <a:endCxn id="18" idx="3"/>
+          </p:cNvCxnSpPr>
+          <p:nvPr/>
+        </p:nvCxnSpPr>
+        <p:spPr>
+          <a:xfrm rot="10800000" flipV="1">
+            <a:off x="3046813" y="4649037"/>
+            <a:ext cx="438267" cy="359756"/>
+          </a:xfrm>
+          <a:prstGeom prst="bentConnector3">
+            <a:avLst>
+              <a:gd name="adj1" fmla="val -2160"/>
+            </a:avLst>
+          </a:prstGeom>
+          <a:ln>
+            <a:prstDash val="sysDash"/>
+          </a:ln>
+        </p:spPr>
+        <p:style>
+          <a:lnRef idx="2">
+            <a:schemeClr val="dk1"/>
+          </a:lnRef>
+          <a:fillRef idx="0">
+            <a:schemeClr val="dk1"/>
+          </a:fillRef>
+          <a:effectRef idx="1">
+            <a:schemeClr val="dk1"/>
+          </a:effectRef>
+          <a:fontRef idx="minor">
+            <a:schemeClr val="tx1"/>
+          </a:fontRef>
+        </p:style>
+      </p:cxnSp>
+      <p:sp>
+        <p:nvSpPr>
+          <p:cNvPr id="30" name="Rectangle 29">
+            <a:extLst>
+              <a:ext uri="{FF2B5EF4-FFF2-40B4-BE49-F238E27FC236}">
+                <a16:creationId xmlns:a16="http://schemas.microsoft.com/office/drawing/2014/main" id="{AC20CB28-E72D-7582-7CFB-6B273CE71909}"/>
+              </a:ext>
+            </a:extLst>
+          </p:cNvPr>
+          <p:cNvSpPr/>
+          <p:nvPr/>
+        </p:nvSpPr>
+        <p:spPr>
+          <a:xfrm>
+            <a:off x="596528" y="5535382"/>
+            <a:ext cx="2076196" cy="509903"/>
+          </a:xfrm>
+          <a:prstGeom prst="rect">
+            <a:avLst/>
+          </a:prstGeom>
+          <a:solidFill>
+            <a:schemeClr val="tx2">
+              <a:lumMod val="75000"/>
+              <a:lumOff val="25000"/>
+            </a:schemeClr>
+          </a:solidFill>
+          <a:ln>
+            <a:solidFill>
+              <a:schemeClr val="tx1"/>
+            </a:solidFill>
+          </a:ln>
+        </p:spPr>
+        <p:style>
+          <a:lnRef idx="2">
+            <a:schemeClr val="accent1">
+              <a:shade val="50000"/>
+            </a:schemeClr>
+          </a:lnRef>
+          <a:fillRef idx="1">
+            <a:schemeClr val="accent1"/>
+          </a:fillRef>
+          <a:effectRef idx="0">
+            <a:schemeClr val="accent1"/>
+          </a:effectRef>
+          <a:fontRef idx="minor">
+            <a:schemeClr val="lt1"/>
+          </a:fontRef>
+        </p:style>
+        <p:txBody>
+          <a:bodyPr rtlCol="0" anchor="ctr"/>
+          <a:lstStyle/>
+          <a:p>
+            <a:r>
+              <a:rPr lang="en-US" sz="1050" b="1" dirty="0"/>
+              <a:t>Robot Servo Motor Signal : base, Shoulder, Elbow, Wrist, Gripper Rotation and Opening.</a:t>
+            </a:r>
+            <a:endParaRPr lang="en-SG" sz="1050" b="1" dirty="0"/>
+          </a:p>
+        </p:txBody>
+      </p:sp>
+      <p:cxnSp>
+        <p:nvCxnSpPr>
+          <p:cNvPr id="33" name="Connector: Elbow 32">
+            <a:extLst>
+              <a:ext uri="{FF2B5EF4-FFF2-40B4-BE49-F238E27FC236}">
+                <a16:creationId xmlns:a16="http://schemas.microsoft.com/office/drawing/2014/main" id="{EDA2BAD7-47E4-D8F1-04F8-5060F37AAE49}"/>
+              </a:ext>
+            </a:extLst>
+          </p:cNvPr>
+          <p:cNvCxnSpPr>
+            <a:cxnSpLocks/>
+            <a:stCxn id="51" idx="1"/>
+            <a:endCxn id="30" idx="3"/>
+          </p:cNvCxnSpPr>
+          <p:nvPr/>
+        </p:nvCxnSpPr>
+        <p:spPr>
+          <a:xfrm rot="10800000" flipV="1">
+            <a:off x="2672725" y="5553284"/>
+            <a:ext cx="600977" cy="237050"/>
+          </a:xfrm>
+          <a:prstGeom prst="bentConnector3">
+            <a:avLst>
+              <a:gd name="adj1" fmla="val 50000"/>
+            </a:avLst>
+          </a:prstGeom>
+          <a:ln>
+            <a:prstDash val="sysDash"/>
+          </a:ln>
+        </p:spPr>
+        <p:style>
+          <a:lnRef idx="2">
+            <a:schemeClr val="dk1"/>
+          </a:lnRef>
+          <a:fillRef idx="0">
+            <a:schemeClr val="dk1"/>
+          </a:fillRef>
+          <a:effectRef idx="1">
+            <a:schemeClr val="dk1"/>
+          </a:effectRef>
+          <a:fontRef idx="minor">
+            <a:schemeClr val="tx1"/>
+          </a:fontRef>
+        </p:style>
+      </p:cxnSp>
+      <p:cxnSp>
+        <p:nvCxnSpPr>
+          <p:cNvPr id="37" name="Straight Connector 36">
+            <a:extLst>
+              <a:ext uri="{FF2B5EF4-FFF2-40B4-BE49-F238E27FC236}">
+                <a16:creationId xmlns:a16="http://schemas.microsoft.com/office/drawing/2014/main" id="{24661042-1D30-A38B-F7B4-EED8ADB947B9}"/>
+              </a:ext>
+            </a:extLst>
+          </p:cNvPr>
+          <p:cNvCxnSpPr>
+            <a:cxnSpLocks/>
+            <a:stCxn id="14" idx="3"/>
+            <a:endCxn id="7" idx="1"/>
+          </p:cNvCxnSpPr>
+          <p:nvPr/>
+        </p:nvCxnSpPr>
+        <p:spPr>
+          <a:xfrm>
+            <a:off x="2976599" y="4434208"/>
+            <a:ext cx="273004" cy="0"/>
+          </a:xfrm>
+          <a:prstGeom prst="line">
+            <a:avLst/>
+          </a:prstGeom>
+          <a:ln>
+            <a:prstDash val="sysDash"/>
+          </a:ln>
+        </p:spPr>
+        <p:style>
+          <a:lnRef idx="2">
+            <a:schemeClr val="dk1"/>
+          </a:lnRef>
+          <a:fillRef idx="0">
+            <a:schemeClr val="dk1"/>
+          </a:fillRef>
+          <a:effectRef idx="1">
+            <a:schemeClr val="dk1"/>
+          </a:effectRef>
+          <a:fontRef idx="minor">
+            <a:schemeClr val="tx1"/>
+          </a:fontRef>
+        </p:style>
+      </p:cxnSp>
+      <p:cxnSp>
+        <p:nvCxnSpPr>
+          <p:cNvPr id="40" name="Straight Connector 39">
+            <a:extLst>
+              <a:ext uri="{FF2B5EF4-FFF2-40B4-BE49-F238E27FC236}">
+                <a16:creationId xmlns:a16="http://schemas.microsoft.com/office/drawing/2014/main" id="{998D84AA-DC0E-69C3-687C-76F93B29365F}"/>
+              </a:ext>
+            </a:extLst>
+          </p:cNvPr>
+          <p:cNvCxnSpPr>
+            <a:cxnSpLocks/>
+          </p:cNvCxnSpPr>
+          <p:nvPr/>
+        </p:nvCxnSpPr>
+        <p:spPr>
+          <a:xfrm>
+            <a:off x="641673" y="4048950"/>
+            <a:ext cx="0" cy="1504334"/>
+          </a:xfrm>
+          <a:prstGeom prst="line">
+            <a:avLst/>
+          </a:prstGeom>
+        </p:spPr>
+        <p:style>
+          <a:lnRef idx="2">
+            <a:schemeClr val="dk1"/>
+          </a:lnRef>
+          <a:fillRef idx="0">
+            <a:schemeClr val="dk1"/>
+          </a:fillRef>
+          <a:effectRef idx="1">
+            <a:schemeClr val="dk1"/>
+          </a:effectRef>
+          <a:fontRef idx="minor">
+            <a:schemeClr val="tx1"/>
+          </a:fontRef>
+        </p:style>
+      </p:cxnSp>
+      <p:cxnSp>
+        <p:nvCxnSpPr>
+          <p:cNvPr id="43" name="Connector: Elbow 42">
+            <a:extLst>
+              <a:ext uri="{FF2B5EF4-FFF2-40B4-BE49-F238E27FC236}">
+                <a16:creationId xmlns:a16="http://schemas.microsoft.com/office/drawing/2014/main" id="{A91C5588-315E-5568-E238-0D136A086A6C}"/>
+              </a:ext>
+            </a:extLst>
+          </p:cNvPr>
+          <p:cNvCxnSpPr>
+            <a:endCxn id="18" idx="1"/>
+          </p:cNvCxnSpPr>
+          <p:nvPr/>
+        </p:nvCxnSpPr>
+        <p:spPr>
+          <a:xfrm rot="16200000" flipH="1">
+            <a:off x="398579" y="4436755"/>
+            <a:ext cx="959843" cy="184232"/>
+          </a:xfrm>
+          <a:prstGeom prst="bentConnector2">
+            <a:avLst/>
+          </a:prstGeom>
+        </p:spPr>
+        <p:style>
+          <a:lnRef idx="2">
+            <a:schemeClr val="dk1"/>
+          </a:lnRef>
+          <a:fillRef idx="0">
+            <a:schemeClr val="dk1"/>
+          </a:fillRef>
+          <a:effectRef idx="1">
+            <a:schemeClr val="dk1"/>
+          </a:effectRef>
+          <a:fontRef idx="minor">
+            <a:schemeClr val="tx1"/>
+          </a:fontRef>
+        </p:style>
+      </p:cxnSp>
+      <p:cxnSp>
+        <p:nvCxnSpPr>
+          <p:cNvPr id="49" name="Straight Connector 48">
+            <a:extLst>
+              <a:ext uri="{FF2B5EF4-FFF2-40B4-BE49-F238E27FC236}">
+                <a16:creationId xmlns:a16="http://schemas.microsoft.com/office/drawing/2014/main" id="{963889CC-A358-FAC1-6A4B-E85889CBCDB4}"/>
+              </a:ext>
+            </a:extLst>
+          </p:cNvPr>
+          <p:cNvCxnSpPr>
+            <a:cxnSpLocks/>
+          </p:cNvCxnSpPr>
+          <p:nvPr/>
+        </p:nvCxnSpPr>
+        <p:spPr>
+          <a:xfrm>
+            <a:off x="795528" y="4453640"/>
+            <a:ext cx="175088" cy="0"/>
+          </a:xfrm>
+          <a:prstGeom prst="line">
+            <a:avLst/>
+          </a:prstGeom>
+        </p:spPr>
+        <p:style>
+          <a:lnRef idx="2">
+            <a:schemeClr val="dk1"/>
+          </a:lnRef>
+          <a:fillRef idx="0">
+            <a:schemeClr val="dk1"/>
+          </a:fillRef>
+          <a:effectRef idx="1">
+            <a:schemeClr val="dk1"/>
+          </a:effectRef>
+          <a:fontRef idx="minor">
+            <a:schemeClr val="tx1"/>
+          </a:fontRef>
+        </p:style>
+      </p:cxnSp>
+      <p:cxnSp>
+        <p:nvCxnSpPr>
+          <p:cNvPr id="74" name="Straight Connector 73">
+            <a:extLst>
+              <a:ext uri="{FF2B5EF4-FFF2-40B4-BE49-F238E27FC236}">
+                <a16:creationId xmlns:a16="http://schemas.microsoft.com/office/drawing/2014/main" id="{1DF01892-1593-E010-93DB-9B2D018DF8B6}"/>
+              </a:ext>
+            </a:extLst>
+          </p:cNvPr>
+          <p:cNvCxnSpPr>
+            <a:cxnSpLocks/>
+            <a:endCxn id="64" idx="1"/>
+          </p:cNvCxnSpPr>
+          <p:nvPr/>
+        </p:nvCxnSpPr>
+        <p:spPr>
+          <a:xfrm flipV="1">
+            <a:off x="4901074" y="5599625"/>
+            <a:ext cx="281845" cy="0"/>
+          </a:xfrm>
+          <a:prstGeom prst="line">
+            <a:avLst/>
+          </a:prstGeom>
+          <a:ln>
+            <a:solidFill>
+              <a:schemeClr val="accent6">
+                <a:lumMod val="75000"/>
+              </a:schemeClr>
+            </a:solidFill>
+          </a:ln>
+        </p:spPr>
+        <p:style>
+          <a:lnRef idx="2">
+            <a:schemeClr val="dk1"/>
+          </a:lnRef>
+          <a:fillRef idx="0">
+            <a:schemeClr val="dk1"/>
+          </a:fillRef>
+          <a:effectRef idx="1">
+            <a:schemeClr val="dk1"/>
+          </a:effectRef>
+          <a:fontRef idx="minor">
+            <a:schemeClr val="tx1"/>
+          </a:fontRef>
+        </p:style>
+      </p:cxnSp>
+      <p:sp>
+        <p:nvSpPr>
+          <p:cNvPr id="102" name="TextBox 101">
+            <a:extLst>
+              <a:ext uri="{FF2B5EF4-FFF2-40B4-BE49-F238E27FC236}">
+                <a16:creationId xmlns:a16="http://schemas.microsoft.com/office/drawing/2014/main" id="{31777592-7BD1-08EC-676C-E1C10D9DC061}"/>
+              </a:ext>
+            </a:extLst>
+          </p:cNvPr>
+          <p:cNvSpPr txBox="1"/>
+          <p:nvPr/>
+        </p:nvSpPr>
+        <p:spPr>
+          <a:xfrm>
+            <a:off x="6686269" y="4598433"/>
+            <a:ext cx="1193597" cy="261610"/>
+          </a:xfrm>
+          <a:prstGeom prst="rect">
+            <a:avLst/>
+          </a:prstGeom>
+          <a:noFill/>
+        </p:spPr>
+        <p:txBody>
+          <a:bodyPr wrap="square" rtlCol="0">
+            <a:spAutoFit/>
+          </a:bodyPr>
+          <a:lstStyle/>
+          <a:p>
+            <a:r>
+              <a:rPr lang="en-US" sz="1100" dirty="0"/>
+              <a:t>Coordinate Val</a:t>
+            </a:r>
+            <a:endParaRPr lang="en-SG" sz="1100" dirty="0"/>
+          </a:p>
+        </p:txBody>
+      </p:sp>
+      <p:sp>
+        <p:nvSpPr>
+          <p:cNvPr id="103" name="TextBox 102">
+            <a:extLst>
+              <a:ext uri="{FF2B5EF4-FFF2-40B4-BE49-F238E27FC236}">
+                <a16:creationId xmlns:a16="http://schemas.microsoft.com/office/drawing/2014/main" id="{1AF676FA-188E-C51C-077D-DDD4F2F2FFC7}"/>
+              </a:ext>
+            </a:extLst>
+          </p:cNvPr>
+          <p:cNvSpPr txBox="1"/>
+          <p:nvPr/>
+        </p:nvSpPr>
+        <p:spPr>
+          <a:xfrm>
+            <a:off x="6719358" y="5236609"/>
+            <a:ext cx="930482" cy="261610"/>
+          </a:xfrm>
+          <a:prstGeom prst="rect">
+            <a:avLst/>
+          </a:prstGeom>
+          <a:noFill/>
+        </p:spPr>
+        <p:txBody>
+          <a:bodyPr wrap="square" rtlCol="0">
+            <a:spAutoFit/>
+          </a:bodyPr>
+          <a:lstStyle/>
+          <a:p>
+            <a:r>
+              <a:rPr lang="en-US" sz="1100" dirty="0"/>
+              <a:t>Angle Val</a:t>
+            </a:r>
+            <a:endParaRPr lang="en-SG" sz="1100" dirty="0"/>
+          </a:p>
+        </p:txBody>
+      </p:sp>
+      <p:sp>
+        <p:nvSpPr>
+          <p:cNvPr id="104" name="TextBox 103">
+            <a:extLst>
+              <a:ext uri="{FF2B5EF4-FFF2-40B4-BE49-F238E27FC236}">
+                <a16:creationId xmlns:a16="http://schemas.microsoft.com/office/drawing/2014/main" id="{654E2A91-2601-04B0-DBE2-4BDEA97132D3}"/>
+              </a:ext>
+            </a:extLst>
+          </p:cNvPr>
+          <p:cNvSpPr txBox="1"/>
+          <p:nvPr/>
+        </p:nvSpPr>
+        <p:spPr>
+          <a:xfrm>
+            <a:off x="6683394" y="5975343"/>
+            <a:ext cx="930482" cy="261610"/>
+          </a:xfrm>
+          <a:prstGeom prst="rect">
+            <a:avLst/>
+          </a:prstGeom>
+          <a:noFill/>
+        </p:spPr>
+        <p:txBody>
+          <a:bodyPr wrap="square" rtlCol="0">
+            <a:spAutoFit/>
+          </a:bodyPr>
+          <a:lstStyle/>
+          <a:p>
+            <a:r>
+              <a:rPr lang="en-US" sz="1100" dirty="0"/>
+              <a:t>State Val</a:t>
+            </a:r>
+            <a:endParaRPr lang="en-SG" sz="1100" dirty="0"/>
+          </a:p>
+        </p:txBody>
+      </p:sp>
+      <p:sp>
+        <p:nvSpPr>
+          <p:cNvPr id="105" name="TextBox 104">
+            <a:extLst>
+              <a:ext uri="{FF2B5EF4-FFF2-40B4-BE49-F238E27FC236}">
+                <a16:creationId xmlns:a16="http://schemas.microsoft.com/office/drawing/2014/main" id="{0A9A5921-80D8-9F59-7114-122FB50ED170}"/>
+              </a:ext>
+            </a:extLst>
+          </p:cNvPr>
+          <p:cNvSpPr txBox="1"/>
+          <p:nvPr/>
+        </p:nvSpPr>
+        <p:spPr>
+          <a:xfrm>
+            <a:off x="4923133" y="5768113"/>
+            <a:ext cx="1279165" cy="261610"/>
+          </a:xfrm>
+          <a:prstGeom prst="rect">
+            <a:avLst/>
+          </a:prstGeom>
+          <a:noFill/>
+        </p:spPr>
+        <p:txBody>
+          <a:bodyPr wrap="square" rtlCol="0">
+            <a:spAutoFit/>
+          </a:bodyPr>
+          <a:lstStyle/>
+          <a:p>
+            <a:r>
+              <a:rPr lang="en-US" sz="1100" dirty="0"/>
+              <a:t>Servo Motor Angle </a:t>
+            </a:r>
+            <a:endParaRPr lang="en-SG" sz="1100" dirty="0"/>
+          </a:p>
+        </p:txBody>
+      </p:sp>
+      <p:sp>
+        <p:nvSpPr>
+          <p:cNvPr id="106" name="TextBox 105">
+            <a:extLst>
+              <a:ext uri="{FF2B5EF4-FFF2-40B4-BE49-F238E27FC236}">
+                <a16:creationId xmlns:a16="http://schemas.microsoft.com/office/drawing/2014/main" id="{D330049F-ACB6-1F1C-8201-49D9E01A081D}"/>
+              </a:ext>
+            </a:extLst>
+          </p:cNvPr>
+          <p:cNvSpPr txBox="1"/>
+          <p:nvPr/>
+        </p:nvSpPr>
+        <p:spPr>
+          <a:xfrm>
+            <a:off x="4752162" y="3919463"/>
+            <a:ext cx="1557818" cy="261610"/>
+          </a:xfrm>
+          <a:prstGeom prst="rect">
+            <a:avLst/>
+          </a:prstGeom>
+          <a:noFill/>
+        </p:spPr>
+        <p:txBody>
+          <a:bodyPr wrap="square" rtlCol="0">
+            <a:spAutoFit/>
+          </a:bodyPr>
+          <a:lstStyle/>
+          <a:p>
+            <a:r>
+              <a:rPr lang="en-US" sz="1100" dirty="0"/>
+              <a:t>Gripper Sensor State</a:t>
+            </a:r>
+            <a:endParaRPr lang="en-SG" sz="1100" dirty="0"/>
+          </a:p>
+        </p:txBody>
+      </p:sp>
+      <p:sp>
+        <p:nvSpPr>
+          <p:cNvPr id="107" name="TextBox 106">
+            <a:extLst>
+              <a:ext uri="{FF2B5EF4-FFF2-40B4-BE49-F238E27FC236}">
+                <a16:creationId xmlns:a16="http://schemas.microsoft.com/office/drawing/2014/main" id="{FAE190EE-CEBC-5FA1-7E50-F6E86E9B46E2}"/>
+              </a:ext>
+            </a:extLst>
+          </p:cNvPr>
+          <p:cNvSpPr txBox="1"/>
+          <p:nvPr/>
+        </p:nvSpPr>
+        <p:spPr>
+          <a:xfrm>
+            <a:off x="4759248" y="3358468"/>
+            <a:ext cx="919972" cy="261610"/>
+          </a:xfrm>
+          <a:prstGeom prst="rect">
+            <a:avLst/>
+          </a:prstGeom>
+          <a:noFill/>
+        </p:spPr>
+        <p:txBody>
+          <a:bodyPr wrap="square" rtlCol="0">
+            <a:spAutoFit/>
+          </a:bodyPr>
+          <a:lstStyle/>
+          <a:p>
+            <a:r>
+              <a:rPr lang="en-US" sz="1100" dirty="0"/>
+              <a:t>Joint Angle </a:t>
+            </a:r>
+            <a:endParaRPr lang="en-SG" sz="1100" dirty="0"/>
+          </a:p>
+        </p:txBody>
+      </p:sp>
+      <p:sp>
+        <p:nvSpPr>
+          <p:cNvPr id="108" name="TextBox 107">
+            <a:extLst>
+              <a:ext uri="{FF2B5EF4-FFF2-40B4-BE49-F238E27FC236}">
+                <a16:creationId xmlns:a16="http://schemas.microsoft.com/office/drawing/2014/main" id="{730BABDF-9F6F-3FA7-EC64-57F514FC3A5C}"/>
+              </a:ext>
+            </a:extLst>
+          </p:cNvPr>
+          <p:cNvSpPr txBox="1"/>
+          <p:nvPr/>
+        </p:nvSpPr>
+        <p:spPr>
+          <a:xfrm>
+            <a:off x="4781035" y="2764015"/>
+            <a:ext cx="1354445" cy="261610"/>
+          </a:xfrm>
+          <a:prstGeom prst="rect">
+            <a:avLst/>
+          </a:prstGeom>
+          <a:noFill/>
+        </p:spPr>
+        <p:txBody>
+          <a:bodyPr wrap="square" rtlCol="0">
+            <a:spAutoFit/>
+          </a:bodyPr>
+          <a:lstStyle/>
+          <a:p>
+            <a:r>
+              <a:rPr lang="en-US" sz="1100" dirty="0"/>
+              <a:t>Cube Position </a:t>
+            </a:r>
+            <a:endParaRPr lang="en-SG" sz="1100" dirty="0"/>
+          </a:p>
+        </p:txBody>
+      </p:sp>
+      <p:pic>
+        <p:nvPicPr>
+          <p:cNvPr id="109" name="Picture 108">
+            <a:extLst>
+              <a:ext uri="{FF2B5EF4-FFF2-40B4-BE49-F238E27FC236}">
+                <a16:creationId xmlns:a16="http://schemas.microsoft.com/office/drawing/2014/main" id="{2E83DBEA-9CA6-EB29-A7EB-B88BB8CF7955}"/>
+              </a:ext>
+            </a:extLst>
+          </p:cNvPr>
+          <p:cNvPicPr>
+            <a:picLocks noChangeAspect="1"/>
+          </p:cNvPicPr>
+          <p:nvPr/>
+        </p:nvPicPr>
+        <p:blipFill>
+          <a:blip r:embed="rId5"/>
+          <a:stretch>
+            <a:fillRect/>
+          </a:stretch>
+        </p:blipFill>
+        <p:spPr>
+          <a:xfrm>
+            <a:off x="8815070" y="3725331"/>
+            <a:ext cx="2963720" cy="1652059"/>
+          </a:xfrm>
+          <a:prstGeom prst="rect">
+            <a:avLst/>
+          </a:prstGeom>
+          <a:ln w="12700">
+            <a:solidFill>
+              <a:schemeClr val="tx1"/>
+            </a:solidFill>
+          </a:ln>
+        </p:spPr>
+      </p:pic>
+      <p:sp>
+        <p:nvSpPr>
+          <p:cNvPr id="112" name="Rectangle 111">
+            <a:extLst>
+              <a:ext uri="{FF2B5EF4-FFF2-40B4-BE49-F238E27FC236}">
+                <a16:creationId xmlns:a16="http://schemas.microsoft.com/office/drawing/2014/main" id="{72AD645A-BBBD-602C-65A0-120BA5593ED5}"/>
+              </a:ext>
+            </a:extLst>
+          </p:cNvPr>
+          <p:cNvSpPr/>
+          <p:nvPr/>
+        </p:nvSpPr>
+        <p:spPr>
+          <a:xfrm>
+            <a:off x="8856528" y="2909277"/>
+            <a:ext cx="1252960" cy="389361"/>
+          </a:xfrm>
+          <a:prstGeom prst="rect">
+            <a:avLst/>
+          </a:prstGeom>
+          <a:solidFill>
+            <a:schemeClr val="tx2">
+              <a:lumMod val="75000"/>
+              <a:lumOff val="25000"/>
+            </a:schemeClr>
+          </a:solidFill>
+          <a:ln>
+            <a:solidFill>
+              <a:schemeClr val="tx1"/>
+            </a:solidFill>
+          </a:ln>
+        </p:spPr>
+        <p:style>
+          <a:lnRef idx="2">
+            <a:schemeClr val="accent1">
+              <a:shade val="50000"/>
+            </a:schemeClr>
+          </a:lnRef>
+          <a:fillRef idx="1">
+            <a:schemeClr val="accent1"/>
+          </a:fillRef>
+          <a:effectRef idx="0">
+            <a:schemeClr val="accent1"/>
+          </a:effectRef>
+          <a:fontRef idx="minor">
+            <a:schemeClr val="lt1"/>
+          </a:fontRef>
+        </p:style>
+        <p:txBody>
+          <a:bodyPr rtlCol="0" anchor="ctr"/>
+          <a:lstStyle/>
+          <a:p>
+            <a:r>
+              <a:rPr lang="en-US" sz="1050" b="1" dirty="0"/>
+              <a:t>Cube Position Display Manager </a:t>
+            </a:r>
+            <a:endParaRPr lang="en-SG" sz="1050" b="1" dirty="0"/>
+          </a:p>
+        </p:txBody>
+      </p:sp>
+      <p:cxnSp>
+        <p:nvCxnSpPr>
+          <p:cNvPr id="125" name="Straight Arrow Connector 124">
+            <a:extLst>
+              <a:ext uri="{FF2B5EF4-FFF2-40B4-BE49-F238E27FC236}">
+                <a16:creationId xmlns:a16="http://schemas.microsoft.com/office/drawing/2014/main" id="{E754EBAF-E46B-E84F-FB28-23C1131C59C5}"/>
+              </a:ext>
+            </a:extLst>
+          </p:cNvPr>
+          <p:cNvCxnSpPr>
+            <a:cxnSpLocks/>
+          </p:cNvCxnSpPr>
+          <p:nvPr/>
+        </p:nvCxnSpPr>
+        <p:spPr>
+          <a:xfrm>
+            <a:off x="9352782" y="3298638"/>
+            <a:ext cx="0" cy="404203"/>
+          </a:xfrm>
+          <a:prstGeom prst="straightConnector1">
+            <a:avLst/>
+          </a:prstGeom>
+          <a:ln>
+            <a:tailEnd type="triangle"/>
+          </a:ln>
+        </p:spPr>
+        <p:style>
+          <a:lnRef idx="2">
+            <a:schemeClr val="accent1"/>
+          </a:lnRef>
+          <a:fillRef idx="0">
+            <a:schemeClr val="accent1"/>
+          </a:fillRef>
+          <a:effectRef idx="1">
+            <a:schemeClr val="accent1"/>
+          </a:effectRef>
+          <a:fontRef idx="minor">
+            <a:schemeClr val="tx1"/>
+          </a:fontRef>
+        </p:style>
+      </p:cxnSp>
+      <p:sp>
+        <p:nvSpPr>
+          <p:cNvPr id="129" name="Rectangle 128">
+            <a:extLst>
+              <a:ext uri="{FF2B5EF4-FFF2-40B4-BE49-F238E27FC236}">
+                <a16:creationId xmlns:a16="http://schemas.microsoft.com/office/drawing/2014/main" id="{E4AACF2D-9890-897F-A86F-3348652CDCF8}"/>
+              </a:ext>
+            </a:extLst>
+          </p:cNvPr>
+          <p:cNvSpPr/>
+          <p:nvPr/>
+        </p:nvSpPr>
+        <p:spPr>
+          <a:xfrm>
+            <a:off x="10370790" y="2169011"/>
+            <a:ext cx="1352271" cy="389361"/>
+          </a:xfrm>
+          <a:prstGeom prst="rect">
+            <a:avLst/>
+          </a:prstGeom>
+          <a:solidFill>
+            <a:schemeClr val="tx2">
+              <a:lumMod val="75000"/>
+              <a:lumOff val="25000"/>
+            </a:schemeClr>
+          </a:solidFill>
+          <a:ln>
+            <a:solidFill>
+              <a:schemeClr val="tx1"/>
+            </a:solidFill>
+          </a:ln>
+        </p:spPr>
+        <p:style>
+          <a:lnRef idx="2">
+            <a:schemeClr val="accent1">
+              <a:shade val="50000"/>
+            </a:schemeClr>
+          </a:lnRef>
+          <a:fillRef idx="1">
+            <a:schemeClr val="accent1"/>
+          </a:fillRef>
+          <a:effectRef idx="0">
+            <a:schemeClr val="accent1"/>
+          </a:effectRef>
+          <a:fontRef idx="minor">
+            <a:schemeClr val="lt1"/>
+          </a:fontRef>
+        </p:style>
+        <p:txBody>
+          <a:bodyPr rtlCol="0" anchor="ctr"/>
+          <a:lstStyle/>
+          <a:p>
+            <a:r>
+              <a:rPr lang="en-US" sz="1050" b="1" dirty="0"/>
+              <a:t>Joint Current Angle Display manager</a:t>
+            </a:r>
+            <a:endParaRPr lang="en-SG" sz="1050" b="1" dirty="0"/>
+          </a:p>
+        </p:txBody>
+      </p:sp>
+      <p:sp>
+        <p:nvSpPr>
+          <p:cNvPr id="132" name="Rectangle 131">
+            <a:extLst>
+              <a:ext uri="{FF2B5EF4-FFF2-40B4-BE49-F238E27FC236}">
+                <a16:creationId xmlns:a16="http://schemas.microsoft.com/office/drawing/2014/main" id="{E19BF14B-BE25-4FFE-8CDF-099C612A1510}"/>
+              </a:ext>
+            </a:extLst>
+          </p:cNvPr>
+          <p:cNvSpPr/>
+          <p:nvPr/>
+        </p:nvSpPr>
+        <p:spPr>
+          <a:xfrm>
+            <a:off x="10434482" y="2931151"/>
+            <a:ext cx="948874" cy="389361"/>
+          </a:xfrm>
+          <a:prstGeom prst="rect">
+            <a:avLst/>
+          </a:prstGeom>
+          <a:solidFill>
+            <a:schemeClr val="tx2">
+              <a:lumMod val="75000"/>
+              <a:lumOff val="25000"/>
+            </a:schemeClr>
+          </a:solidFill>
+          <a:ln>
+            <a:solidFill>
+              <a:schemeClr val="tx1"/>
+            </a:solidFill>
+          </a:ln>
+        </p:spPr>
+        <p:style>
+          <a:lnRef idx="2">
+            <a:schemeClr val="accent1">
+              <a:shade val="50000"/>
+            </a:schemeClr>
+          </a:lnRef>
+          <a:fillRef idx="1">
+            <a:schemeClr val="accent1"/>
+          </a:fillRef>
+          <a:effectRef idx="0">
+            <a:schemeClr val="accent1"/>
+          </a:effectRef>
+          <a:fontRef idx="minor">
+            <a:schemeClr val="lt1"/>
+          </a:fontRef>
+        </p:style>
+        <p:txBody>
+          <a:bodyPr rtlCol="0" anchor="ctr"/>
+          <a:lstStyle/>
+          <a:p>
+            <a:r>
+              <a:rPr lang="en-US" sz="1050" b="1" dirty="0"/>
+              <a:t>Motor Angle</a:t>
+            </a:r>
+          </a:p>
+          <a:p>
+            <a:r>
+              <a:rPr lang="en-US" sz="1050" b="1" dirty="0"/>
+              <a:t>Controller </a:t>
+            </a:r>
+            <a:endParaRPr lang="en-SG" sz="1050" b="1" dirty="0"/>
+          </a:p>
+        </p:txBody>
+      </p:sp>
+      <p:cxnSp>
+        <p:nvCxnSpPr>
+          <p:cNvPr id="133" name="Straight Arrow Connector 132">
+            <a:extLst>
+              <a:ext uri="{FF2B5EF4-FFF2-40B4-BE49-F238E27FC236}">
+                <a16:creationId xmlns:a16="http://schemas.microsoft.com/office/drawing/2014/main" id="{2D3ACB9B-48F8-EFB5-3D12-276EA1EC351A}"/>
+              </a:ext>
+            </a:extLst>
+          </p:cNvPr>
+          <p:cNvCxnSpPr>
+            <a:cxnSpLocks/>
+          </p:cNvCxnSpPr>
+          <p:nvPr/>
+        </p:nvCxnSpPr>
+        <p:spPr>
+          <a:xfrm>
+            <a:off x="11576304" y="2572014"/>
+            <a:ext cx="0" cy="1130827"/>
+          </a:xfrm>
+          <a:prstGeom prst="straightConnector1">
+            <a:avLst/>
+          </a:prstGeom>
+          <a:ln>
+            <a:tailEnd type="triangle"/>
+          </a:ln>
+        </p:spPr>
+        <p:style>
+          <a:lnRef idx="2">
+            <a:schemeClr val="accent1"/>
+          </a:lnRef>
+          <a:fillRef idx="0">
+            <a:schemeClr val="accent1"/>
+          </a:fillRef>
+          <a:effectRef idx="1">
+            <a:schemeClr val="accent1"/>
+          </a:effectRef>
+          <a:fontRef idx="minor">
+            <a:schemeClr val="tx1"/>
+          </a:fontRef>
+        </p:style>
+      </p:cxnSp>
+      <p:cxnSp>
+        <p:nvCxnSpPr>
+          <p:cNvPr id="137" name="Straight Arrow Connector 136">
+            <a:extLst>
+              <a:ext uri="{FF2B5EF4-FFF2-40B4-BE49-F238E27FC236}">
+                <a16:creationId xmlns:a16="http://schemas.microsoft.com/office/drawing/2014/main" id="{2D1A3422-E362-A532-D2D2-11C078364632}"/>
+              </a:ext>
+            </a:extLst>
+          </p:cNvPr>
+          <p:cNvCxnSpPr>
+            <a:cxnSpLocks/>
+          </p:cNvCxnSpPr>
+          <p:nvPr/>
+        </p:nvCxnSpPr>
+        <p:spPr>
+          <a:xfrm flipV="1">
+            <a:off x="10867638" y="3335989"/>
+            <a:ext cx="0" cy="389342"/>
+          </a:xfrm>
+          <a:prstGeom prst="straightConnector1">
+            <a:avLst/>
+          </a:prstGeom>
+          <a:ln>
+            <a:tailEnd type="triangle"/>
+          </a:ln>
+        </p:spPr>
+        <p:style>
+          <a:lnRef idx="2">
+            <a:schemeClr val="accent1"/>
+          </a:lnRef>
+          <a:fillRef idx="0">
+            <a:schemeClr val="accent1"/>
+          </a:fillRef>
+          <a:effectRef idx="1">
+            <a:schemeClr val="accent1"/>
+          </a:effectRef>
+          <a:fontRef idx="minor">
+            <a:schemeClr val="tx1"/>
+          </a:fontRef>
+        </p:style>
+      </p:cxnSp>
+      <p:cxnSp>
+        <p:nvCxnSpPr>
+          <p:cNvPr id="151" name="Connector: Elbow 150">
+            <a:extLst>
+              <a:ext uri="{FF2B5EF4-FFF2-40B4-BE49-F238E27FC236}">
+                <a16:creationId xmlns:a16="http://schemas.microsoft.com/office/drawing/2014/main" id="{FFD1D4F5-2D0E-F8F0-9D60-9F6E24B9B099}"/>
+              </a:ext>
+            </a:extLst>
+          </p:cNvPr>
+          <p:cNvCxnSpPr>
+            <a:cxnSpLocks/>
+            <a:stCxn id="132" idx="0"/>
+            <a:endCxn id="173" idx="2"/>
+          </p:cNvCxnSpPr>
+          <p:nvPr/>
+        </p:nvCxnSpPr>
+        <p:spPr>
+          <a:xfrm rot="16200000" flipV="1">
+            <a:off x="9993576" y="2015807"/>
+            <a:ext cx="359137" cy="1471551"/>
+          </a:xfrm>
+          <a:prstGeom prst="bentConnector3">
+            <a:avLst>
+              <a:gd name="adj1" fmla="val 50000"/>
+            </a:avLst>
+          </a:prstGeom>
+          <a:ln>
+            <a:tailEnd type="triangle"/>
+          </a:ln>
+        </p:spPr>
+        <p:style>
+          <a:lnRef idx="2">
+            <a:schemeClr val="accent1"/>
+          </a:lnRef>
+          <a:fillRef idx="0">
+            <a:schemeClr val="accent1"/>
+          </a:fillRef>
+          <a:effectRef idx="1">
+            <a:schemeClr val="accent1"/>
+          </a:effectRef>
+          <a:fontRef idx="minor">
+            <a:schemeClr val="tx1"/>
+          </a:fontRef>
+        </p:style>
+      </p:cxnSp>
+      <p:sp>
+        <p:nvSpPr>
+          <p:cNvPr id="153" name="TextBox 152">
+            <a:extLst>
+              <a:ext uri="{FF2B5EF4-FFF2-40B4-BE49-F238E27FC236}">
+                <a16:creationId xmlns:a16="http://schemas.microsoft.com/office/drawing/2014/main" id="{DB00403C-9F44-FD3F-29FB-D28D3999B890}"/>
+              </a:ext>
+            </a:extLst>
+          </p:cNvPr>
+          <p:cNvSpPr txBox="1"/>
+          <p:nvPr/>
+        </p:nvSpPr>
+        <p:spPr>
+          <a:xfrm>
+            <a:off x="8838782" y="3406687"/>
+            <a:ext cx="1745835" cy="276999"/>
+          </a:xfrm>
+          <a:prstGeom prst="rect">
+            <a:avLst/>
+          </a:prstGeom>
+          <a:noFill/>
+        </p:spPr>
+        <p:txBody>
+          <a:bodyPr wrap="square" rtlCol="0">
+            <a:spAutoFit/>
+          </a:bodyPr>
+          <a:lstStyle/>
+          <a:p>
+            <a:r>
+              <a:rPr lang="en-US" sz="1200" b="1" dirty="0"/>
+              <a:t>Robot Arm Controller</a:t>
+            </a:r>
+            <a:endParaRPr lang="en-SG" sz="1200" b="1" dirty="0"/>
+          </a:p>
+        </p:txBody>
+      </p:sp>
+      <p:cxnSp>
+        <p:nvCxnSpPr>
+          <p:cNvPr id="154" name="Straight Arrow Connector 153">
+            <a:extLst>
+              <a:ext uri="{FF2B5EF4-FFF2-40B4-BE49-F238E27FC236}">
+                <a16:creationId xmlns:a16="http://schemas.microsoft.com/office/drawing/2014/main" id="{4FDEF069-0F8E-9646-56D3-3597B4228F6E}"/>
+              </a:ext>
+            </a:extLst>
+          </p:cNvPr>
+          <p:cNvCxnSpPr>
+            <a:cxnSpLocks/>
+          </p:cNvCxnSpPr>
+          <p:nvPr/>
+        </p:nvCxnSpPr>
+        <p:spPr>
+          <a:xfrm flipV="1">
+            <a:off x="10578533" y="5427421"/>
+            <a:ext cx="0" cy="389342"/>
+          </a:xfrm>
+          <a:prstGeom prst="straightConnector1">
+            <a:avLst/>
+          </a:prstGeom>
+          <a:ln>
+            <a:tailEnd type="triangle"/>
+          </a:ln>
+        </p:spPr>
+        <p:style>
+          <a:lnRef idx="2">
+            <a:schemeClr val="accent1"/>
+          </a:lnRef>
+          <a:fillRef idx="0">
+            <a:schemeClr val="accent1"/>
+          </a:fillRef>
+          <a:effectRef idx="1">
+            <a:schemeClr val="accent1"/>
+          </a:effectRef>
+          <a:fontRef idx="minor">
+            <a:schemeClr val="tx1"/>
+          </a:fontRef>
+        </p:style>
+      </p:cxnSp>
+      <p:pic>
+        <p:nvPicPr>
+          <p:cNvPr id="156" name="Graphic 155" descr="Construction worker male with solid fill">
+            <a:extLst>
+              <a:ext uri="{FF2B5EF4-FFF2-40B4-BE49-F238E27FC236}">
+                <a16:creationId xmlns:a16="http://schemas.microsoft.com/office/drawing/2014/main" id="{890F1678-2E19-4A59-25FA-DBD0810BE3CC}"/>
+              </a:ext>
+            </a:extLst>
+          </p:cNvPr>
+          <p:cNvPicPr>
+            <a:picLocks noChangeAspect="1"/>
+          </p:cNvPicPr>
+          <p:nvPr/>
+        </p:nvPicPr>
+        <p:blipFill>
+          <a:blip r:embed="rId6">
+            <a:extLst>
+              <a:ext uri="{96DAC541-7B7A-43D3-8B79-37D633B846F1}">
+                <asvg:svgBlip xmlns:asvg="http://schemas.microsoft.com/office/drawing/2016/SVG/main" r:embed="rId7"/>
+              </a:ext>
+            </a:extLst>
+          </a:blip>
+          <a:stretch>
+            <a:fillRect/>
+          </a:stretch>
+        </p:blipFill>
+        <p:spPr>
+          <a:xfrm>
+            <a:off x="10294931" y="5773420"/>
+            <a:ext cx="579846" cy="579846"/>
+          </a:xfrm>
+          <a:prstGeom prst="rect">
+            <a:avLst/>
+          </a:prstGeom>
+        </p:spPr>
+      </p:pic>
+      <p:sp>
+        <p:nvSpPr>
+          <p:cNvPr id="160" name="TextBox 159">
+            <a:extLst>
+              <a:ext uri="{FF2B5EF4-FFF2-40B4-BE49-F238E27FC236}">
+                <a16:creationId xmlns:a16="http://schemas.microsoft.com/office/drawing/2014/main" id="{44D08AD0-C2F5-2555-571D-1D972CCD7D48}"/>
+              </a:ext>
+            </a:extLst>
+          </p:cNvPr>
+          <p:cNvSpPr txBox="1"/>
+          <p:nvPr/>
+        </p:nvSpPr>
+        <p:spPr>
+          <a:xfrm>
+            <a:off x="10795526" y="5747488"/>
+            <a:ext cx="1104994" cy="646331"/>
+          </a:xfrm>
+          <a:prstGeom prst="rect">
+            <a:avLst/>
+          </a:prstGeom>
+          <a:noFill/>
+        </p:spPr>
+        <p:txBody>
+          <a:bodyPr wrap="square" rtlCol="0">
+            <a:spAutoFit/>
+          </a:bodyPr>
+          <a:lstStyle/>
+          <a:p>
+            <a:r>
+              <a:rPr lang="en-US" sz="1200" b="1" dirty="0"/>
+              <a:t>Robot Arm User Manual Control</a:t>
+            </a:r>
+            <a:endParaRPr lang="en-SG" sz="1200" b="1" dirty="0"/>
+          </a:p>
+        </p:txBody>
+      </p:sp>
+      <p:cxnSp>
+        <p:nvCxnSpPr>
+          <p:cNvPr id="161" name="Straight Arrow Connector 160">
+            <a:extLst>
+              <a:ext uri="{FF2B5EF4-FFF2-40B4-BE49-F238E27FC236}">
+                <a16:creationId xmlns:a16="http://schemas.microsoft.com/office/drawing/2014/main" id="{29E73E5D-58DF-7515-BF3C-8D84DDD2F5C9}"/>
+              </a:ext>
+            </a:extLst>
+          </p:cNvPr>
+          <p:cNvCxnSpPr>
+            <a:cxnSpLocks/>
+          </p:cNvCxnSpPr>
+          <p:nvPr/>
+        </p:nvCxnSpPr>
+        <p:spPr>
+          <a:xfrm flipV="1">
+            <a:off x="9021005" y="5427421"/>
+            <a:ext cx="0" cy="389342"/>
+          </a:xfrm>
+          <a:prstGeom prst="straightConnector1">
+            <a:avLst/>
+          </a:prstGeom>
+          <a:ln>
+            <a:tailEnd type="triangle"/>
+          </a:ln>
+        </p:spPr>
+        <p:style>
+          <a:lnRef idx="2">
+            <a:schemeClr val="accent1"/>
+          </a:lnRef>
+          <a:fillRef idx="0">
+            <a:schemeClr val="accent1"/>
+          </a:fillRef>
+          <a:effectRef idx="1">
+            <a:schemeClr val="accent1"/>
+          </a:effectRef>
+          <a:fontRef idx="minor">
+            <a:schemeClr val="tx1"/>
+          </a:fontRef>
+        </p:style>
+      </p:cxnSp>
+      <p:pic>
+        <p:nvPicPr>
+          <p:cNvPr id="165" name="Picture 164">
+            <a:extLst>
+              <a:ext uri="{FF2B5EF4-FFF2-40B4-BE49-F238E27FC236}">
+                <a16:creationId xmlns:a16="http://schemas.microsoft.com/office/drawing/2014/main" id="{9A08C303-5220-9A10-01FA-D74A8379F3C2}"/>
+              </a:ext>
+            </a:extLst>
+          </p:cNvPr>
+          <p:cNvPicPr>
+            <a:picLocks noChangeAspect="1"/>
+          </p:cNvPicPr>
+          <p:nvPr/>
+        </p:nvPicPr>
+        <p:blipFill>
+          <a:blip r:embed="rId8"/>
+          <a:stretch>
+            <a:fillRect/>
+          </a:stretch>
+        </p:blipFill>
+        <p:spPr>
+          <a:xfrm>
+            <a:off x="8796773" y="5790333"/>
+            <a:ext cx="440722" cy="539443"/>
+          </a:xfrm>
+          <a:prstGeom prst="rect">
+            <a:avLst/>
+          </a:prstGeom>
+        </p:spPr>
+      </p:pic>
+      <p:sp>
+        <p:nvSpPr>
+          <p:cNvPr id="169" name="TextBox 168">
+            <a:extLst>
+              <a:ext uri="{FF2B5EF4-FFF2-40B4-BE49-F238E27FC236}">
+                <a16:creationId xmlns:a16="http://schemas.microsoft.com/office/drawing/2014/main" id="{8E4ED56C-3EB8-3503-9F7C-8174CF992477}"/>
+              </a:ext>
+            </a:extLst>
+          </p:cNvPr>
+          <p:cNvSpPr txBox="1"/>
+          <p:nvPr/>
+        </p:nvSpPr>
+        <p:spPr>
+          <a:xfrm>
+            <a:off x="9183410" y="5747488"/>
+            <a:ext cx="1284315" cy="646331"/>
+          </a:xfrm>
+          <a:prstGeom prst="rect">
+            <a:avLst/>
+          </a:prstGeom>
+          <a:noFill/>
+        </p:spPr>
+        <p:txBody>
+          <a:bodyPr wrap="square" rtlCol="0">
+            <a:spAutoFit/>
+          </a:bodyPr>
+          <a:lstStyle/>
+          <a:p>
+            <a:r>
+              <a:rPr lang="en-US" sz="1200" b="1" dirty="0"/>
+              <a:t>Pre-load Auto Control Action config file </a:t>
+            </a:r>
+            <a:endParaRPr lang="en-SG" sz="1200" b="1" dirty="0"/>
+          </a:p>
+        </p:txBody>
+      </p:sp>
+    </p:spTree>
+    <p:extLst>
+      <p:ext uri="{BB962C8B-B14F-4D97-AF65-F5344CB8AC3E}">
+        <p14:creationId xmlns:p14="http://schemas.microsoft.com/office/powerpoint/2010/main" val="1314084503"/>
       </p:ext>
     </p:extLst>
   </p:cSld>

</xml_diff>

<commit_message>
Update the section 3 of the the readme file.
</commit_message>
<xml_diff>
--- a/doc/designDoc.pptx
+++ b/doc/designDoc.pptx
@@ -5,11 +5,12 @@
     <p:sldMasterId id="2147483648" r:id="rId1"/>
   </p:sldMasterIdLst>
   <p:notesMasterIdLst>
-    <p:notesMasterId r:id="rId4"/>
+    <p:notesMasterId r:id="rId5"/>
   </p:notesMasterIdLst>
   <p:sldIdLst>
     <p:sldId id="256" r:id="rId2"/>
     <p:sldId id="268" r:id="rId3"/>
+    <p:sldId id="269" r:id="rId4"/>
   </p:sldIdLst>
   <p:sldSz cx="12192000" cy="6858000"/>
   <p:notesSz cx="6858000" cy="9144000"/>
@@ -12564,6 +12565,2699 @@
 </p:sld>
 </file>
 
+<file path=ppt/slides/slide3.xml><?xml version="1.0" encoding="utf-8"?>
+<p:sld xmlns:a="http://schemas.openxmlformats.org/drawingml/2006/main" xmlns:r="http://schemas.openxmlformats.org/officeDocument/2006/relationships" xmlns:p="http://schemas.openxmlformats.org/presentationml/2006/main">
+  <p:cSld>
+    <p:spTree>
+      <p:nvGrpSpPr>
+        <p:cNvPr id="1" name=""/>
+        <p:cNvGrpSpPr/>
+        <p:nvPr/>
+      </p:nvGrpSpPr>
+      <p:grpSpPr>
+        <a:xfrm>
+          <a:off x="0" y="0"/>
+          <a:ext cx="0" cy="0"/>
+          <a:chOff x="0" y="0"/>
+          <a:chExt cx="0" cy="0"/>
+        </a:xfrm>
+      </p:grpSpPr>
+      <p:pic>
+        <p:nvPicPr>
+          <p:cNvPr id="5" name="Picture 4">
+            <a:extLst>
+              <a:ext uri="{FF2B5EF4-FFF2-40B4-BE49-F238E27FC236}">
+                <a16:creationId xmlns:a16="http://schemas.microsoft.com/office/drawing/2014/main" id="{7099570E-6814-D85B-C8BD-0B3FAA163FCC}"/>
+              </a:ext>
+            </a:extLst>
+          </p:cNvPr>
+          <p:cNvPicPr>
+            <a:picLocks noChangeAspect="1"/>
+          </p:cNvPicPr>
+          <p:nvPr/>
+        </p:nvPicPr>
+        <p:blipFill>
+          <a:blip r:embed="rId2"/>
+          <a:stretch>
+            <a:fillRect/>
+          </a:stretch>
+        </p:blipFill>
+        <p:spPr>
+          <a:xfrm>
+            <a:off x="1204260" y="292978"/>
+            <a:ext cx="7223160" cy="6272044"/>
+          </a:xfrm>
+          <a:prstGeom prst="rect">
+            <a:avLst/>
+          </a:prstGeom>
+        </p:spPr>
+      </p:pic>
+      <p:sp>
+        <p:nvSpPr>
+          <p:cNvPr id="10" name="TextBox 9">
+            <a:extLst>
+              <a:ext uri="{FF2B5EF4-FFF2-40B4-BE49-F238E27FC236}">
+                <a16:creationId xmlns:a16="http://schemas.microsoft.com/office/drawing/2014/main" id="{5751F5CF-5467-2242-C9A4-076A6E026325}"/>
+              </a:ext>
+            </a:extLst>
+          </p:cNvPr>
+          <p:cNvSpPr txBox="1"/>
+          <p:nvPr/>
+        </p:nvSpPr>
+        <p:spPr>
+          <a:xfrm>
+            <a:off x="1204260" y="710292"/>
+            <a:ext cx="1284315" cy="461665"/>
+          </a:xfrm>
+          <a:prstGeom prst="rect">
+            <a:avLst/>
+          </a:prstGeom>
+          <a:noFill/>
+        </p:spPr>
+        <p:txBody>
+          <a:bodyPr wrap="square" rtlCol="0">
+            <a:spAutoFit/>
+          </a:bodyPr>
+          <a:lstStyle/>
+          <a:p>
+            <a:r>
+              <a:rPr lang="en-US" sz="1200" b="1" dirty="0">
+                <a:solidFill>
+                  <a:schemeClr val="bg1"/>
+                </a:solidFill>
+              </a:rPr>
+              <a:t>OpenGL Robot Arm Canvas</a:t>
+            </a:r>
+            <a:endParaRPr lang="en-SG" sz="1200" b="1" dirty="0">
+              <a:solidFill>
+                <a:schemeClr val="bg1"/>
+              </a:solidFill>
+            </a:endParaRPr>
+          </a:p>
+        </p:txBody>
+      </p:sp>
+      <p:cxnSp>
+        <p:nvCxnSpPr>
+          <p:cNvPr id="12" name="Straight Arrow Connector 11">
+            <a:extLst>
+              <a:ext uri="{FF2B5EF4-FFF2-40B4-BE49-F238E27FC236}">
+                <a16:creationId xmlns:a16="http://schemas.microsoft.com/office/drawing/2014/main" id="{1E106771-CB49-250E-7445-900BE58ADC98}"/>
+              </a:ext>
+            </a:extLst>
+          </p:cNvPr>
+          <p:cNvCxnSpPr>
+            <a:cxnSpLocks/>
+          </p:cNvCxnSpPr>
+          <p:nvPr/>
+        </p:nvCxnSpPr>
+        <p:spPr>
+          <a:xfrm flipH="1">
+            <a:off x="8427420" y="710292"/>
+            <a:ext cx="548047" cy="0"/>
+          </a:xfrm>
+          <a:prstGeom prst="straightConnector1">
+            <a:avLst/>
+          </a:prstGeom>
+          <a:ln>
+            <a:solidFill>
+              <a:srgbClr val="C00000"/>
+            </a:solidFill>
+            <a:tailEnd type="triangle"/>
+          </a:ln>
+        </p:spPr>
+        <p:style>
+          <a:lnRef idx="2">
+            <a:schemeClr val="accent1"/>
+          </a:lnRef>
+          <a:fillRef idx="0">
+            <a:schemeClr val="accent1"/>
+          </a:fillRef>
+          <a:effectRef idx="1">
+            <a:schemeClr val="accent1"/>
+          </a:effectRef>
+          <a:fontRef idx="minor">
+            <a:schemeClr val="tx1"/>
+          </a:fontRef>
+        </p:style>
+      </p:cxnSp>
+      <p:sp>
+        <p:nvSpPr>
+          <p:cNvPr id="15" name="TextBox 14">
+            <a:extLst>
+              <a:ext uri="{FF2B5EF4-FFF2-40B4-BE49-F238E27FC236}">
+                <a16:creationId xmlns:a16="http://schemas.microsoft.com/office/drawing/2014/main" id="{CF99DA8B-AA34-37AD-6D4E-B354CD4002FE}"/>
+              </a:ext>
+            </a:extLst>
+          </p:cNvPr>
+          <p:cNvSpPr txBox="1"/>
+          <p:nvPr/>
+        </p:nvSpPr>
+        <p:spPr>
+          <a:xfrm>
+            <a:off x="8975467" y="546477"/>
+            <a:ext cx="1704725" cy="276999"/>
+          </a:xfrm>
+          <a:prstGeom prst="rect">
+            <a:avLst/>
+          </a:prstGeom>
+          <a:noFill/>
+        </p:spPr>
+        <p:txBody>
+          <a:bodyPr wrap="square" rtlCol="0">
+            <a:spAutoFit/>
+          </a:bodyPr>
+          <a:lstStyle/>
+          <a:p>
+            <a:r>
+              <a:rPr lang="en-US" sz="1200" b="1" dirty="0"/>
+              <a:t>Local Control Panel</a:t>
+            </a:r>
+            <a:endParaRPr lang="en-SG" sz="1200" b="1" dirty="0"/>
+          </a:p>
+        </p:txBody>
+      </p:sp>
+      <p:cxnSp>
+        <p:nvCxnSpPr>
+          <p:cNvPr id="18" name="Straight Arrow Connector 17">
+            <a:extLst>
+              <a:ext uri="{FF2B5EF4-FFF2-40B4-BE49-F238E27FC236}">
+                <a16:creationId xmlns:a16="http://schemas.microsoft.com/office/drawing/2014/main" id="{23FB65B0-D7D7-85A9-E55A-5EC7F603C000}"/>
+              </a:ext>
+            </a:extLst>
+          </p:cNvPr>
+          <p:cNvCxnSpPr>
+            <a:cxnSpLocks/>
+          </p:cNvCxnSpPr>
+          <p:nvPr/>
+        </p:nvCxnSpPr>
+        <p:spPr>
+          <a:xfrm flipV="1">
+            <a:off x="5495088" y="4044977"/>
+            <a:ext cx="0" cy="514987"/>
+          </a:xfrm>
+          <a:prstGeom prst="straightConnector1">
+            <a:avLst/>
+          </a:prstGeom>
+          <a:ln>
+            <a:solidFill>
+              <a:schemeClr val="bg1"/>
+            </a:solidFill>
+            <a:prstDash val="sysDash"/>
+            <a:tailEnd type="triangle"/>
+          </a:ln>
+        </p:spPr>
+        <p:style>
+          <a:lnRef idx="2">
+            <a:schemeClr val="accent1"/>
+          </a:lnRef>
+          <a:fillRef idx="0">
+            <a:schemeClr val="accent1"/>
+          </a:fillRef>
+          <a:effectRef idx="1">
+            <a:schemeClr val="accent1"/>
+          </a:effectRef>
+          <a:fontRef idx="minor">
+            <a:schemeClr val="tx1"/>
+          </a:fontRef>
+        </p:style>
+      </p:cxnSp>
+      <p:sp>
+        <p:nvSpPr>
+          <p:cNvPr id="20" name="TextBox 19">
+            <a:extLst>
+              <a:ext uri="{FF2B5EF4-FFF2-40B4-BE49-F238E27FC236}">
+                <a16:creationId xmlns:a16="http://schemas.microsoft.com/office/drawing/2014/main" id="{B6D50DA8-6377-1EB3-4A07-191ABE82EF4F}"/>
+              </a:ext>
+            </a:extLst>
+          </p:cNvPr>
+          <p:cNvSpPr txBox="1"/>
+          <p:nvPr/>
+        </p:nvSpPr>
+        <p:spPr>
+          <a:xfrm>
+            <a:off x="4815840" y="4621970"/>
+            <a:ext cx="1284315" cy="276999"/>
+          </a:xfrm>
+          <a:prstGeom prst="rect">
+            <a:avLst/>
+          </a:prstGeom>
+          <a:noFill/>
+        </p:spPr>
+        <p:txBody>
+          <a:bodyPr wrap="square" rtlCol="0">
+            <a:spAutoFit/>
+          </a:bodyPr>
+          <a:lstStyle/>
+          <a:p>
+            <a:r>
+              <a:rPr lang="en-US" sz="1200" b="1" dirty="0">
+                <a:solidFill>
+                  <a:schemeClr val="bg1"/>
+                </a:solidFill>
+              </a:rPr>
+              <a:t>Cube Object</a:t>
+            </a:r>
+            <a:endParaRPr lang="en-SG" sz="1200" b="1" dirty="0">
+              <a:solidFill>
+                <a:schemeClr val="bg1"/>
+              </a:solidFill>
+            </a:endParaRPr>
+          </a:p>
+        </p:txBody>
+      </p:sp>
+      <p:cxnSp>
+        <p:nvCxnSpPr>
+          <p:cNvPr id="22" name="Straight Connector 21">
+            <a:extLst>
+              <a:ext uri="{FF2B5EF4-FFF2-40B4-BE49-F238E27FC236}">
+                <a16:creationId xmlns:a16="http://schemas.microsoft.com/office/drawing/2014/main" id="{8AA2FDBF-4896-9054-C049-43F9D4EAE85A}"/>
+              </a:ext>
+            </a:extLst>
+          </p:cNvPr>
+          <p:cNvCxnSpPr/>
+          <p:nvPr/>
+        </p:nvCxnSpPr>
+        <p:spPr>
+          <a:xfrm>
+            <a:off x="4142232" y="3529584"/>
+            <a:ext cx="1075051" cy="91440"/>
+          </a:xfrm>
+          <a:prstGeom prst="line">
+            <a:avLst/>
+          </a:prstGeom>
+          <a:ln>
+            <a:solidFill>
+              <a:schemeClr val="bg1"/>
+            </a:solidFill>
+            <a:prstDash val="sysDash"/>
+          </a:ln>
+        </p:spPr>
+        <p:style>
+          <a:lnRef idx="2">
+            <a:schemeClr val="accent1"/>
+          </a:lnRef>
+          <a:fillRef idx="0">
+            <a:schemeClr val="accent1"/>
+          </a:fillRef>
+          <a:effectRef idx="1">
+            <a:schemeClr val="accent1"/>
+          </a:effectRef>
+          <a:fontRef idx="minor">
+            <a:schemeClr val="tx1"/>
+          </a:fontRef>
+        </p:style>
+      </p:cxnSp>
+      <p:cxnSp>
+        <p:nvCxnSpPr>
+          <p:cNvPr id="24" name="Connector: Curved 23">
+            <a:extLst>
+              <a:ext uri="{FF2B5EF4-FFF2-40B4-BE49-F238E27FC236}">
+                <a16:creationId xmlns:a16="http://schemas.microsoft.com/office/drawing/2014/main" id="{276FF5DB-4E95-A955-B7BA-A32EA0331EB3}"/>
+              </a:ext>
+            </a:extLst>
+          </p:cNvPr>
+          <p:cNvCxnSpPr/>
+          <p:nvPr/>
+        </p:nvCxnSpPr>
+        <p:spPr>
+          <a:xfrm rot="5400000">
+            <a:off x="4610639" y="3690143"/>
+            <a:ext cx="274320" cy="136083"/>
+          </a:xfrm>
+          <a:prstGeom prst="curvedConnector3">
+            <a:avLst>
+              <a:gd name="adj1" fmla="val 80000"/>
+            </a:avLst>
+          </a:prstGeom>
+          <a:ln>
+            <a:solidFill>
+              <a:schemeClr val="bg1"/>
+            </a:solidFill>
+            <a:prstDash val="sysDash"/>
+            <a:headEnd type="triangle"/>
+            <a:tailEnd type="triangle"/>
+          </a:ln>
+        </p:spPr>
+        <p:style>
+          <a:lnRef idx="2">
+            <a:schemeClr val="accent1"/>
+          </a:lnRef>
+          <a:fillRef idx="0">
+            <a:schemeClr val="accent1"/>
+          </a:fillRef>
+          <a:effectRef idx="1">
+            <a:schemeClr val="accent1"/>
+          </a:effectRef>
+          <a:fontRef idx="minor">
+            <a:schemeClr val="tx1"/>
+          </a:fontRef>
+        </p:style>
+      </p:cxnSp>
+      <p:sp>
+        <p:nvSpPr>
+          <p:cNvPr id="31" name="TextBox 30">
+            <a:extLst>
+              <a:ext uri="{FF2B5EF4-FFF2-40B4-BE49-F238E27FC236}">
+                <a16:creationId xmlns:a16="http://schemas.microsoft.com/office/drawing/2014/main" id="{A870F757-9159-A731-33AB-5CE8DAA0A2D3}"/>
+              </a:ext>
+            </a:extLst>
+          </p:cNvPr>
+          <p:cNvSpPr txBox="1"/>
+          <p:nvPr/>
+        </p:nvSpPr>
+        <p:spPr>
+          <a:xfrm>
+            <a:off x="1204260" y="3913633"/>
+            <a:ext cx="1069840" cy="646331"/>
+          </a:xfrm>
+          <a:prstGeom prst="rect">
+            <a:avLst/>
+          </a:prstGeom>
+          <a:noFill/>
+        </p:spPr>
+        <p:txBody>
+          <a:bodyPr wrap="square" rtlCol="0">
+            <a:spAutoFit/>
+          </a:bodyPr>
+          <a:lstStyle/>
+          <a:p>
+            <a:r>
+              <a:rPr lang="en-US" sz="1200" b="1" dirty="0">
+                <a:solidFill>
+                  <a:schemeClr val="bg1"/>
+                </a:solidFill>
+              </a:rPr>
+              <a:t>Max range robot arm can reach </a:t>
+            </a:r>
+            <a:endParaRPr lang="en-SG" sz="1200" b="1" dirty="0">
+              <a:solidFill>
+                <a:schemeClr val="bg1"/>
+              </a:solidFill>
+            </a:endParaRPr>
+          </a:p>
+        </p:txBody>
+      </p:sp>
+      <p:sp>
+        <p:nvSpPr>
+          <p:cNvPr id="36" name="TextBox 35">
+            <a:extLst>
+              <a:ext uri="{FF2B5EF4-FFF2-40B4-BE49-F238E27FC236}">
+                <a16:creationId xmlns:a16="http://schemas.microsoft.com/office/drawing/2014/main" id="{BAD17F86-0699-89D1-AE48-33E3ADA9F7EF}"/>
+              </a:ext>
+            </a:extLst>
+          </p:cNvPr>
+          <p:cNvSpPr txBox="1"/>
+          <p:nvPr/>
+        </p:nvSpPr>
+        <p:spPr>
+          <a:xfrm>
+            <a:off x="2249256" y="4821390"/>
+            <a:ext cx="2078906" cy="276999"/>
+          </a:xfrm>
+          <a:prstGeom prst="rect">
+            <a:avLst/>
+          </a:prstGeom>
+          <a:noFill/>
+        </p:spPr>
+        <p:txBody>
+          <a:bodyPr wrap="square" rtlCol="0">
+            <a:spAutoFit/>
+          </a:bodyPr>
+          <a:lstStyle/>
+          <a:p>
+            <a:r>
+              <a:rPr lang="en-US" sz="1200" b="1" dirty="0">
+                <a:solidFill>
+                  <a:schemeClr val="bg1"/>
+                </a:solidFill>
+              </a:rPr>
+              <a:t>Axis-0: Base Rotation Angle</a:t>
+            </a:r>
+            <a:endParaRPr lang="en-SG" sz="1200" b="1" dirty="0">
+              <a:solidFill>
+                <a:schemeClr val="bg1"/>
+              </a:solidFill>
+            </a:endParaRPr>
+          </a:p>
+        </p:txBody>
+      </p:sp>
+      <p:cxnSp>
+        <p:nvCxnSpPr>
+          <p:cNvPr id="54" name="Straight Arrow Connector 53">
+            <a:extLst>
+              <a:ext uri="{FF2B5EF4-FFF2-40B4-BE49-F238E27FC236}">
+                <a16:creationId xmlns:a16="http://schemas.microsoft.com/office/drawing/2014/main" id="{6EE04049-1B48-DC4E-E25C-618B4F480C68}"/>
+              </a:ext>
+            </a:extLst>
+          </p:cNvPr>
+          <p:cNvCxnSpPr>
+            <a:cxnSpLocks/>
+          </p:cNvCxnSpPr>
+          <p:nvPr/>
+        </p:nvCxnSpPr>
+        <p:spPr>
+          <a:xfrm flipV="1">
+            <a:off x="4142232" y="2532888"/>
+            <a:ext cx="438912" cy="322110"/>
+          </a:xfrm>
+          <a:prstGeom prst="straightConnector1">
+            <a:avLst/>
+          </a:prstGeom>
+          <a:ln>
+            <a:solidFill>
+              <a:schemeClr val="bg1"/>
+            </a:solidFill>
+            <a:prstDash val="sysDash"/>
+            <a:headEnd type="triangle"/>
+            <a:tailEnd type="triangle"/>
+          </a:ln>
+        </p:spPr>
+        <p:style>
+          <a:lnRef idx="2">
+            <a:schemeClr val="accent1"/>
+          </a:lnRef>
+          <a:fillRef idx="0">
+            <a:schemeClr val="accent1"/>
+          </a:fillRef>
+          <a:effectRef idx="1">
+            <a:schemeClr val="accent1"/>
+          </a:effectRef>
+          <a:fontRef idx="minor">
+            <a:schemeClr val="tx1"/>
+          </a:fontRef>
+        </p:style>
+      </p:cxnSp>
+      <p:cxnSp>
+        <p:nvCxnSpPr>
+          <p:cNvPr id="55" name="Straight Arrow Connector 54">
+            <a:extLst>
+              <a:ext uri="{FF2B5EF4-FFF2-40B4-BE49-F238E27FC236}">
+                <a16:creationId xmlns:a16="http://schemas.microsoft.com/office/drawing/2014/main" id="{53DABAB1-0B45-F6A2-C3F1-090DF910DBE9}"/>
+              </a:ext>
+            </a:extLst>
+          </p:cNvPr>
+          <p:cNvCxnSpPr>
+            <a:cxnSpLocks/>
+          </p:cNvCxnSpPr>
+          <p:nvPr/>
+        </p:nvCxnSpPr>
+        <p:spPr>
+          <a:xfrm flipV="1">
+            <a:off x="3035808" y="2653830"/>
+            <a:ext cx="1280160" cy="0"/>
+          </a:xfrm>
+          <a:prstGeom prst="straightConnector1">
+            <a:avLst/>
+          </a:prstGeom>
+          <a:ln>
+            <a:solidFill>
+              <a:schemeClr val="bg1"/>
+            </a:solidFill>
+            <a:prstDash val="sysDash"/>
+            <a:tailEnd type="triangle"/>
+          </a:ln>
+        </p:spPr>
+        <p:style>
+          <a:lnRef idx="2">
+            <a:schemeClr val="accent1"/>
+          </a:lnRef>
+          <a:fillRef idx="0">
+            <a:schemeClr val="accent1"/>
+          </a:fillRef>
+          <a:effectRef idx="1">
+            <a:schemeClr val="accent1"/>
+          </a:effectRef>
+          <a:fontRef idx="minor">
+            <a:schemeClr val="tx1"/>
+          </a:fontRef>
+        </p:style>
+      </p:cxnSp>
+      <p:sp>
+        <p:nvSpPr>
+          <p:cNvPr id="58" name="TextBox 57">
+            <a:extLst>
+              <a:ext uri="{FF2B5EF4-FFF2-40B4-BE49-F238E27FC236}">
+                <a16:creationId xmlns:a16="http://schemas.microsoft.com/office/drawing/2014/main" id="{57EB660F-6E2D-3137-ED96-5EF5A333BE96}"/>
+              </a:ext>
+            </a:extLst>
+          </p:cNvPr>
+          <p:cNvSpPr txBox="1"/>
+          <p:nvPr/>
+        </p:nvSpPr>
+        <p:spPr>
+          <a:xfrm>
+            <a:off x="1739180" y="2473545"/>
+            <a:ext cx="1665112" cy="461665"/>
+          </a:xfrm>
+          <a:prstGeom prst="rect">
+            <a:avLst/>
+          </a:prstGeom>
+          <a:noFill/>
+        </p:spPr>
+        <p:txBody>
+          <a:bodyPr wrap="square" rtlCol="0">
+            <a:spAutoFit/>
+          </a:bodyPr>
+          <a:lstStyle/>
+          <a:p>
+            <a:r>
+              <a:rPr lang="en-US" sz="1200" b="1" dirty="0">
+                <a:solidFill>
+                  <a:schemeClr val="bg1"/>
+                </a:solidFill>
+              </a:rPr>
+              <a:t>Axis-1: Shoulder Rotation Angle</a:t>
+            </a:r>
+            <a:endParaRPr lang="en-SG" sz="1200" b="1" dirty="0">
+              <a:solidFill>
+                <a:schemeClr val="bg1"/>
+              </a:solidFill>
+            </a:endParaRPr>
+          </a:p>
+        </p:txBody>
+      </p:sp>
+      <p:cxnSp>
+        <p:nvCxnSpPr>
+          <p:cNvPr id="60" name="Straight Arrow Connector 59">
+            <a:extLst>
+              <a:ext uri="{FF2B5EF4-FFF2-40B4-BE49-F238E27FC236}">
+                <a16:creationId xmlns:a16="http://schemas.microsoft.com/office/drawing/2014/main" id="{F3748DCC-15C4-113E-B1A6-CFA168295D04}"/>
+              </a:ext>
+            </a:extLst>
+          </p:cNvPr>
+          <p:cNvCxnSpPr>
+            <a:cxnSpLocks/>
+          </p:cNvCxnSpPr>
+          <p:nvPr/>
+        </p:nvCxnSpPr>
+        <p:spPr>
+          <a:xfrm>
+            <a:off x="2026912" y="4236798"/>
+            <a:ext cx="615704" cy="0"/>
+          </a:xfrm>
+          <a:prstGeom prst="straightConnector1">
+            <a:avLst/>
+          </a:prstGeom>
+          <a:ln>
+            <a:solidFill>
+              <a:schemeClr val="bg1"/>
+            </a:solidFill>
+            <a:prstDash val="sysDash"/>
+            <a:tailEnd type="triangle"/>
+          </a:ln>
+        </p:spPr>
+        <p:style>
+          <a:lnRef idx="2">
+            <a:schemeClr val="accent1"/>
+          </a:lnRef>
+          <a:fillRef idx="0">
+            <a:schemeClr val="accent1"/>
+          </a:fillRef>
+          <a:effectRef idx="1">
+            <a:schemeClr val="accent1"/>
+          </a:effectRef>
+          <a:fontRef idx="minor">
+            <a:schemeClr val="tx1"/>
+          </a:fontRef>
+        </p:style>
+      </p:cxnSp>
+      <p:cxnSp>
+        <p:nvCxnSpPr>
+          <p:cNvPr id="72" name="Straight Arrow Connector 71">
+            <a:extLst>
+              <a:ext uri="{FF2B5EF4-FFF2-40B4-BE49-F238E27FC236}">
+                <a16:creationId xmlns:a16="http://schemas.microsoft.com/office/drawing/2014/main" id="{A0AE0D97-F1BD-3C49-C9AD-E8B33CB5711C}"/>
+              </a:ext>
+            </a:extLst>
+          </p:cNvPr>
+          <p:cNvCxnSpPr>
+            <a:cxnSpLocks/>
+          </p:cNvCxnSpPr>
+          <p:nvPr/>
+        </p:nvCxnSpPr>
+        <p:spPr>
+          <a:xfrm>
+            <a:off x="5050538" y="2465039"/>
+            <a:ext cx="271270" cy="186632"/>
+          </a:xfrm>
+          <a:prstGeom prst="straightConnector1">
+            <a:avLst/>
+          </a:prstGeom>
+          <a:ln>
+            <a:solidFill>
+              <a:schemeClr val="bg1"/>
+            </a:solidFill>
+            <a:prstDash val="sysDash"/>
+            <a:tailEnd type="triangle"/>
+          </a:ln>
+        </p:spPr>
+        <p:style>
+          <a:lnRef idx="2">
+            <a:schemeClr val="accent1"/>
+          </a:lnRef>
+          <a:fillRef idx="0">
+            <a:schemeClr val="accent1"/>
+          </a:fillRef>
+          <a:effectRef idx="1">
+            <a:schemeClr val="accent1"/>
+          </a:effectRef>
+          <a:fontRef idx="minor">
+            <a:schemeClr val="tx1"/>
+          </a:fontRef>
+        </p:style>
+      </p:cxnSp>
+      <p:cxnSp>
+        <p:nvCxnSpPr>
+          <p:cNvPr id="75" name="Straight Arrow Connector 74">
+            <a:extLst>
+              <a:ext uri="{FF2B5EF4-FFF2-40B4-BE49-F238E27FC236}">
+                <a16:creationId xmlns:a16="http://schemas.microsoft.com/office/drawing/2014/main" id="{96FA8271-0236-E794-0A53-27AFFAB42B7D}"/>
+              </a:ext>
+            </a:extLst>
+          </p:cNvPr>
+          <p:cNvCxnSpPr>
+            <a:cxnSpLocks/>
+          </p:cNvCxnSpPr>
+          <p:nvPr/>
+        </p:nvCxnSpPr>
+        <p:spPr>
+          <a:xfrm flipH="1">
+            <a:off x="4815840" y="2465039"/>
+            <a:ext cx="234698" cy="186632"/>
+          </a:xfrm>
+          <a:prstGeom prst="straightConnector1">
+            <a:avLst/>
+          </a:prstGeom>
+          <a:ln>
+            <a:solidFill>
+              <a:schemeClr val="bg1"/>
+            </a:solidFill>
+            <a:prstDash val="sysDash"/>
+            <a:tailEnd type="triangle"/>
+          </a:ln>
+        </p:spPr>
+        <p:style>
+          <a:lnRef idx="2">
+            <a:schemeClr val="accent1"/>
+          </a:lnRef>
+          <a:fillRef idx="0">
+            <a:schemeClr val="accent1"/>
+          </a:fillRef>
+          <a:effectRef idx="1">
+            <a:schemeClr val="accent1"/>
+          </a:effectRef>
+          <a:fontRef idx="minor">
+            <a:schemeClr val="tx1"/>
+          </a:fontRef>
+        </p:style>
+      </p:cxnSp>
+      <p:sp>
+        <p:nvSpPr>
+          <p:cNvPr id="81" name="TextBox 80">
+            <a:extLst>
+              <a:ext uri="{FF2B5EF4-FFF2-40B4-BE49-F238E27FC236}">
+                <a16:creationId xmlns:a16="http://schemas.microsoft.com/office/drawing/2014/main" id="{7E642145-46BF-A862-8674-266BE8326E44}"/>
+              </a:ext>
+            </a:extLst>
+          </p:cNvPr>
+          <p:cNvSpPr txBox="1"/>
+          <p:nvPr/>
+        </p:nvSpPr>
+        <p:spPr>
+          <a:xfrm>
+            <a:off x="1810060" y="1417505"/>
+            <a:ext cx="1284315" cy="461665"/>
+          </a:xfrm>
+          <a:prstGeom prst="rect">
+            <a:avLst/>
+          </a:prstGeom>
+          <a:noFill/>
+        </p:spPr>
+        <p:txBody>
+          <a:bodyPr wrap="square" rtlCol="0">
+            <a:spAutoFit/>
+          </a:bodyPr>
+          <a:lstStyle/>
+          <a:p>
+            <a:r>
+              <a:rPr lang="en-US" sz="1200" b="1" dirty="0">
+                <a:solidFill>
+                  <a:schemeClr val="bg1"/>
+                </a:solidFill>
+              </a:rPr>
+              <a:t>Axis-2: Elbow Rotation Angle </a:t>
+            </a:r>
+            <a:endParaRPr lang="en-SG" sz="1200" b="1" dirty="0">
+              <a:solidFill>
+                <a:schemeClr val="bg1"/>
+              </a:solidFill>
+            </a:endParaRPr>
+          </a:p>
+        </p:txBody>
+      </p:sp>
+      <p:cxnSp>
+        <p:nvCxnSpPr>
+          <p:cNvPr id="83" name="Connector: Elbow 82">
+            <a:extLst>
+              <a:ext uri="{FF2B5EF4-FFF2-40B4-BE49-F238E27FC236}">
+                <a16:creationId xmlns:a16="http://schemas.microsoft.com/office/drawing/2014/main" id="{2EFBC6BA-6F41-F718-BD49-98FFE744CFE5}"/>
+              </a:ext>
+            </a:extLst>
+          </p:cNvPr>
+          <p:cNvCxnSpPr>
+            <a:cxnSpLocks/>
+          </p:cNvCxnSpPr>
+          <p:nvPr/>
+        </p:nvCxnSpPr>
+        <p:spPr>
+          <a:xfrm>
+            <a:off x="3035808" y="1648337"/>
+            <a:ext cx="2014730" cy="824683"/>
+          </a:xfrm>
+          <a:prstGeom prst="bentConnector3">
+            <a:avLst>
+              <a:gd name="adj1" fmla="val 99924"/>
+            </a:avLst>
+          </a:prstGeom>
+          <a:ln>
+            <a:solidFill>
+              <a:schemeClr val="bg1"/>
+            </a:solidFill>
+            <a:prstDash val="sysDash"/>
+            <a:tailEnd type="triangle"/>
+          </a:ln>
+        </p:spPr>
+        <p:style>
+          <a:lnRef idx="2">
+            <a:schemeClr val="accent1"/>
+          </a:lnRef>
+          <a:fillRef idx="0">
+            <a:schemeClr val="accent1"/>
+          </a:fillRef>
+          <a:effectRef idx="1">
+            <a:schemeClr val="accent1"/>
+          </a:effectRef>
+          <a:fontRef idx="minor">
+            <a:schemeClr val="tx1"/>
+          </a:fontRef>
+        </p:style>
+      </p:cxnSp>
+      <p:cxnSp>
+        <p:nvCxnSpPr>
+          <p:cNvPr id="87" name="Connector: Elbow 86">
+            <a:extLst>
+              <a:ext uri="{FF2B5EF4-FFF2-40B4-BE49-F238E27FC236}">
+                <a16:creationId xmlns:a16="http://schemas.microsoft.com/office/drawing/2014/main" id="{795BFA1A-8185-FA7E-241E-FAFC7D31E7F4}"/>
+              </a:ext>
+            </a:extLst>
+          </p:cNvPr>
+          <p:cNvCxnSpPr>
+            <a:cxnSpLocks/>
+          </p:cNvCxnSpPr>
+          <p:nvPr/>
+        </p:nvCxnSpPr>
+        <p:spPr>
+          <a:xfrm flipV="1">
+            <a:off x="2916936" y="3758184"/>
+            <a:ext cx="1821031" cy="1059658"/>
+          </a:xfrm>
+          <a:prstGeom prst="bentConnector3">
+            <a:avLst>
+              <a:gd name="adj1" fmla="val 1293"/>
+            </a:avLst>
+          </a:prstGeom>
+          <a:ln>
+            <a:solidFill>
+              <a:schemeClr val="bg1"/>
+            </a:solidFill>
+            <a:prstDash val="sysDash"/>
+            <a:tailEnd type="triangle"/>
+          </a:ln>
+        </p:spPr>
+        <p:style>
+          <a:lnRef idx="2">
+            <a:schemeClr val="accent1"/>
+          </a:lnRef>
+          <a:fillRef idx="0">
+            <a:schemeClr val="accent1"/>
+          </a:fillRef>
+          <a:effectRef idx="1">
+            <a:schemeClr val="accent1"/>
+          </a:effectRef>
+          <a:fontRef idx="minor">
+            <a:schemeClr val="tx1"/>
+          </a:fontRef>
+        </p:style>
+      </p:cxnSp>
+      <p:cxnSp>
+        <p:nvCxnSpPr>
+          <p:cNvPr id="91" name="Straight Arrow Connector 90">
+            <a:extLst>
+              <a:ext uri="{FF2B5EF4-FFF2-40B4-BE49-F238E27FC236}">
+                <a16:creationId xmlns:a16="http://schemas.microsoft.com/office/drawing/2014/main" id="{54B2709C-5BC2-5E0F-19A5-071DF0753C68}"/>
+              </a:ext>
+            </a:extLst>
+          </p:cNvPr>
+          <p:cNvCxnSpPr>
+            <a:cxnSpLocks/>
+          </p:cNvCxnSpPr>
+          <p:nvPr/>
+        </p:nvCxnSpPr>
+        <p:spPr>
+          <a:xfrm flipV="1">
+            <a:off x="5662872" y="2773555"/>
+            <a:ext cx="207576" cy="131976"/>
+          </a:xfrm>
+          <a:prstGeom prst="straightConnector1">
+            <a:avLst/>
+          </a:prstGeom>
+          <a:ln>
+            <a:solidFill>
+              <a:schemeClr val="bg1"/>
+            </a:solidFill>
+            <a:prstDash val="sysDash"/>
+            <a:tailEnd type="triangle"/>
+          </a:ln>
+        </p:spPr>
+        <p:style>
+          <a:lnRef idx="2">
+            <a:schemeClr val="accent1"/>
+          </a:lnRef>
+          <a:fillRef idx="0">
+            <a:schemeClr val="accent1"/>
+          </a:fillRef>
+          <a:effectRef idx="1">
+            <a:schemeClr val="accent1"/>
+          </a:effectRef>
+          <a:fontRef idx="minor">
+            <a:schemeClr val="tx1"/>
+          </a:fontRef>
+        </p:style>
+      </p:cxnSp>
+      <p:cxnSp>
+        <p:nvCxnSpPr>
+          <p:cNvPr id="92" name="Straight Arrow Connector 91">
+            <a:extLst>
+              <a:ext uri="{FF2B5EF4-FFF2-40B4-BE49-F238E27FC236}">
+                <a16:creationId xmlns:a16="http://schemas.microsoft.com/office/drawing/2014/main" id="{16DC5B24-E669-8D6A-AC8F-4C56D5275903}"/>
+              </a:ext>
+            </a:extLst>
+          </p:cNvPr>
+          <p:cNvCxnSpPr>
+            <a:cxnSpLocks/>
+          </p:cNvCxnSpPr>
+          <p:nvPr/>
+        </p:nvCxnSpPr>
+        <p:spPr>
+          <a:xfrm flipH="1" flipV="1">
+            <a:off x="5321808" y="2854998"/>
+            <a:ext cx="341064" cy="50533"/>
+          </a:xfrm>
+          <a:prstGeom prst="straightConnector1">
+            <a:avLst/>
+          </a:prstGeom>
+          <a:ln>
+            <a:solidFill>
+              <a:schemeClr val="bg1"/>
+            </a:solidFill>
+            <a:prstDash val="sysDash"/>
+            <a:tailEnd type="triangle"/>
+          </a:ln>
+        </p:spPr>
+        <p:style>
+          <a:lnRef idx="2">
+            <a:schemeClr val="accent1"/>
+          </a:lnRef>
+          <a:fillRef idx="0">
+            <a:schemeClr val="accent1"/>
+          </a:fillRef>
+          <a:effectRef idx="1">
+            <a:schemeClr val="accent1"/>
+          </a:effectRef>
+          <a:fontRef idx="minor">
+            <a:schemeClr val="tx1"/>
+          </a:fontRef>
+        </p:style>
+      </p:cxnSp>
+      <p:sp>
+        <p:nvSpPr>
+          <p:cNvPr id="97" name="TextBox 96">
+            <a:extLst>
+              <a:ext uri="{FF2B5EF4-FFF2-40B4-BE49-F238E27FC236}">
+                <a16:creationId xmlns:a16="http://schemas.microsoft.com/office/drawing/2014/main" id="{7C8B39CB-27D3-C53B-372E-1477DA4E9F72}"/>
+              </a:ext>
+            </a:extLst>
+          </p:cNvPr>
+          <p:cNvSpPr txBox="1"/>
+          <p:nvPr/>
+        </p:nvSpPr>
+        <p:spPr>
+          <a:xfrm>
+            <a:off x="4246733" y="1076975"/>
+            <a:ext cx="2254865" cy="276999"/>
+          </a:xfrm>
+          <a:prstGeom prst="rect">
+            <a:avLst/>
+          </a:prstGeom>
+          <a:noFill/>
+        </p:spPr>
+        <p:txBody>
+          <a:bodyPr wrap="square" rtlCol="0">
+            <a:spAutoFit/>
+          </a:bodyPr>
+          <a:lstStyle/>
+          <a:p>
+            <a:r>
+              <a:rPr lang="en-US" sz="1200" b="1" dirty="0">
+                <a:solidFill>
+                  <a:schemeClr val="bg1"/>
+                </a:solidFill>
+              </a:rPr>
+              <a:t>Axis-3: Wrist Rotation Angle </a:t>
+            </a:r>
+            <a:endParaRPr lang="en-SG" sz="1200" b="1" dirty="0">
+              <a:solidFill>
+                <a:schemeClr val="bg1"/>
+              </a:solidFill>
+            </a:endParaRPr>
+          </a:p>
+        </p:txBody>
+      </p:sp>
+      <p:cxnSp>
+        <p:nvCxnSpPr>
+          <p:cNvPr id="98" name="Straight Arrow Connector 97">
+            <a:extLst>
+              <a:ext uri="{FF2B5EF4-FFF2-40B4-BE49-F238E27FC236}">
+                <a16:creationId xmlns:a16="http://schemas.microsoft.com/office/drawing/2014/main" id="{EE8F0D49-9C28-B47B-8114-8395CBBD6721}"/>
+              </a:ext>
+            </a:extLst>
+          </p:cNvPr>
+          <p:cNvCxnSpPr>
+            <a:cxnSpLocks/>
+          </p:cNvCxnSpPr>
+          <p:nvPr/>
+        </p:nvCxnSpPr>
+        <p:spPr>
+          <a:xfrm flipH="1">
+            <a:off x="6263640" y="2156539"/>
+            <a:ext cx="5559" cy="376349"/>
+          </a:xfrm>
+          <a:prstGeom prst="straightConnector1">
+            <a:avLst/>
+          </a:prstGeom>
+          <a:ln>
+            <a:solidFill>
+              <a:schemeClr val="bg1"/>
+            </a:solidFill>
+            <a:prstDash val="sysDash"/>
+            <a:tailEnd type="triangle"/>
+          </a:ln>
+        </p:spPr>
+        <p:style>
+          <a:lnRef idx="2">
+            <a:schemeClr val="accent1"/>
+          </a:lnRef>
+          <a:fillRef idx="0">
+            <a:schemeClr val="accent1"/>
+          </a:fillRef>
+          <a:effectRef idx="1">
+            <a:schemeClr val="accent1"/>
+          </a:effectRef>
+          <a:fontRef idx="minor">
+            <a:schemeClr val="tx1"/>
+          </a:fontRef>
+        </p:style>
+      </p:cxnSp>
+      <p:sp>
+        <p:nvSpPr>
+          <p:cNvPr id="106" name="TextBox 105">
+            <a:extLst>
+              <a:ext uri="{FF2B5EF4-FFF2-40B4-BE49-F238E27FC236}">
+                <a16:creationId xmlns:a16="http://schemas.microsoft.com/office/drawing/2014/main" id="{44153339-3167-A110-5119-F106F01B0E98}"/>
+              </a:ext>
+            </a:extLst>
+          </p:cNvPr>
+          <p:cNvSpPr txBox="1"/>
+          <p:nvPr/>
+        </p:nvSpPr>
+        <p:spPr>
+          <a:xfrm>
+            <a:off x="5719415" y="1694874"/>
+            <a:ext cx="1273198" cy="461665"/>
+          </a:xfrm>
+          <a:prstGeom prst="rect">
+            <a:avLst/>
+          </a:prstGeom>
+          <a:noFill/>
+        </p:spPr>
+        <p:txBody>
+          <a:bodyPr wrap="square" rtlCol="0">
+            <a:spAutoFit/>
+          </a:bodyPr>
+          <a:lstStyle/>
+          <a:p>
+            <a:r>
+              <a:rPr lang="en-US" sz="1200" b="1" dirty="0">
+                <a:solidFill>
+                  <a:schemeClr val="bg1"/>
+                </a:solidFill>
+              </a:rPr>
+              <a:t>Axis-4: Gripper Rotation Angle </a:t>
+            </a:r>
+            <a:endParaRPr lang="en-SG" sz="1200" b="1" dirty="0">
+              <a:solidFill>
+                <a:schemeClr val="bg1"/>
+              </a:solidFill>
+            </a:endParaRPr>
+          </a:p>
+        </p:txBody>
+      </p:sp>
+      <p:cxnSp>
+        <p:nvCxnSpPr>
+          <p:cNvPr id="107" name="Straight Arrow Connector 106">
+            <a:extLst>
+              <a:ext uri="{FF2B5EF4-FFF2-40B4-BE49-F238E27FC236}">
+                <a16:creationId xmlns:a16="http://schemas.microsoft.com/office/drawing/2014/main" id="{56AE5A49-BB0E-7DD6-D1BD-4ADA0613BC5E}"/>
+              </a:ext>
+            </a:extLst>
+          </p:cNvPr>
+          <p:cNvCxnSpPr>
+            <a:cxnSpLocks/>
+          </p:cNvCxnSpPr>
+          <p:nvPr/>
+        </p:nvCxnSpPr>
+        <p:spPr>
+          <a:xfrm flipH="1">
+            <a:off x="5627763" y="1324318"/>
+            <a:ext cx="3196" cy="1485569"/>
+          </a:xfrm>
+          <a:prstGeom prst="straightConnector1">
+            <a:avLst/>
+          </a:prstGeom>
+          <a:ln>
+            <a:solidFill>
+              <a:schemeClr val="bg1"/>
+            </a:solidFill>
+            <a:prstDash val="sysDash"/>
+            <a:tailEnd type="triangle"/>
+          </a:ln>
+        </p:spPr>
+        <p:style>
+          <a:lnRef idx="2">
+            <a:schemeClr val="accent1"/>
+          </a:lnRef>
+          <a:fillRef idx="0">
+            <a:schemeClr val="accent1"/>
+          </a:fillRef>
+          <a:effectRef idx="1">
+            <a:schemeClr val="accent1"/>
+          </a:effectRef>
+          <a:fontRef idx="minor">
+            <a:schemeClr val="tx1"/>
+          </a:fontRef>
+        </p:style>
+      </p:cxnSp>
+      <p:sp>
+        <p:nvSpPr>
+          <p:cNvPr id="109" name="Arrow: Curved Left 108">
+            <a:extLst>
+              <a:ext uri="{FF2B5EF4-FFF2-40B4-BE49-F238E27FC236}">
+                <a16:creationId xmlns:a16="http://schemas.microsoft.com/office/drawing/2014/main" id="{460C7030-A94B-A07D-9EDD-AB873C97B882}"/>
+              </a:ext>
+            </a:extLst>
+          </p:cNvPr>
+          <p:cNvSpPr/>
+          <p:nvPr/>
+        </p:nvSpPr>
+        <p:spPr>
+          <a:xfrm>
+            <a:off x="6211380" y="2608726"/>
+            <a:ext cx="321266" cy="402322"/>
+          </a:xfrm>
+          <a:prstGeom prst="curvedLeftArrow">
+            <a:avLst/>
+          </a:prstGeom>
+          <a:solidFill>
+            <a:schemeClr val="bg1"/>
+          </a:solidFill>
+        </p:spPr>
+        <p:style>
+          <a:lnRef idx="2">
+            <a:schemeClr val="accent1">
+              <a:shade val="15000"/>
+            </a:schemeClr>
+          </a:lnRef>
+          <a:fillRef idx="1">
+            <a:schemeClr val="accent1"/>
+          </a:fillRef>
+          <a:effectRef idx="0">
+            <a:schemeClr val="accent1"/>
+          </a:effectRef>
+          <a:fontRef idx="minor">
+            <a:schemeClr val="lt1"/>
+          </a:fontRef>
+        </p:style>
+        <p:txBody>
+          <a:bodyPr rtlCol="0" anchor="ctr"/>
+          <a:lstStyle/>
+          <a:p>
+            <a:pPr algn="ctr"/>
+            <a:endParaRPr lang="en-SG">
+              <a:solidFill>
+                <a:schemeClr val="tx1"/>
+              </a:solidFill>
+            </a:endParaRPr>
+          </a:p>
+        </p:txBody>
+      </p:sp>
+      <p:cxnSp>
+        <p:nvCxnSpPr>
+          <p:cNvPr id="111" name="Straight Arrow Connector 110">
+            <a:extLst>
+              <a:ext uri="{FF2B5EF4-FFF2-40B4-BE49-F238E27FC236}">
+                <a16:creationId xmlns:a16="http://schemas.microsoft.com/office/drawing/2014/main" id="{D0F274D0-50BA-FCF5-F4CC-5A56DED35B16}"/>
+              </a:ext>
+            </a:extLst>
+          </p:cNvPr>
+          <p:cNvCxnSpPr>
+            <a:cxnSpLocks/>
+          </p:cNvCxnSpPr>
+          <p:nvPr/>
+        </p:nvCxnSpPr>
+        <p:spPr>
+          <a:xfrm flipV="1">
+            <a:off x="5989320" y="3070413"/>
+            <a:ext cx="0" cy="2215556"/>
+          </a:xfrm>
+          <a:prstGeom prst="straightConnector1">
+            <a:avLst/>
+          </a:prstGeom>
+          <a:ln>
+            <a:solidFill>
+              <a:schemeClr val="bg1"/>
+            </a:solidFill>
+            <a:prstDash val="sysDash"/>
+            <a:tailEnd type="triangle"/>
+          </a:ln>
+        </p:spPr>
+        <p:style>
+          <a:lnRef idx="2">
+            <a:schemeClr val="accent1"/>
+          </a:lnRef>
+          <a:fillRef idx="0">
+            <a:schemeClr val="accent1"/>
+          </a:fillRef>
+          <a:effectRef idx="1">
+            <a:schemeClr val="accent1"/>
+          </a:effectRef>
+          <a:fontRef idx="minor">
+            <a:schemeClr val="tx1"/>
+          </a:fontRef>
+        </p:style>
+      </p:cxnSp>
+      <p:sp>
+        <p:nvSpPr>
+          <p:cNvPr id="115" name="TextBox 114">
+            <a:extLst>
+              <a:ext uri="{FF2B5EF4-FFF2-40B4-BE49-F238E27FC236}">
+                <a16:creationId xmlns:a16="http://schemas.microsoft.com/office/drawing/2014/main" id="{7516C641-E72B-B683-9772-6C704516ED92}"/>
+              </a:ext>
+            </a:extLst>
+          </p:cNvPr>
+          <p:cNvSpPr txBox="1"/>
+          <p:nvPr/>
+        </p:nvSpPr>
+        <p:spPr>
+          <a:xfrm>
+            <a:off x="5098815" y="5550929"/>
+            <a:ext cx="1273198" cy="461665"/>
+          </a:xfrm>
+          <a:prstGeom prst="rect">
+            <a:avLst/>
+          </a:prstGeom>
+          <a:noFill/>
+        </p:spPr>
+        <p:txBody>
+          <a:bodyPr wrap="square" rtlCol="0">
+            <a:spAutoFit/>
+          </a:bodyPr>
+          <a:lstStyle/>
+          <a:p>
+            <a:r>
+              <a:rPr lang="en-US" sz="1200" b="1" dirty="0">
+                <a:solidFill>
+                  <a:schemeClr val="bg1"/>
+                </a:solidFill>
+              </a:rPr>
+              <a:t>Axis-5: Gripper Opening Angle </a:t>
+            </a:r>
+            <a:endParaRPr lang="en-SG" sz="1200" b="1" dirty="0">
+              <a:solidFill>
+                <a:schemeClr val="bg1"/>
+              </a:solidFill>
+            </a:endParaRPr>
+          </a:p>
+        </p:txBody>
+      </p:sp>
+      <p:cxnSp>
+        <p:nvCxnSpPr>
+          <p:cNvPr id="116" name="Straight Arrow Connector 115">
+            <a:extLst>
+              <a:ext uri="{FF2B5EF4-FFF2-40B4-BE49-F238E27FC236}">
+                <a16:creationId xmlns:a16="http://schemas.microsoft.com/office/drawing/2014/main" id="{FDBACA0D-BBC5-6B1A-57CF-B4964856E44A}"/>
+              </a:ext>
+            </a:extLst>
+          </p:cNvPr>
+          <p:cNvCxnSpPr>
+            <a:cxnSpLocks/>
+          </p:cNvCxnSpPr>
+          <p:nvPr/>
+        </p:nvCxnSpPr>
+        <p:spPr>
+          <a:xfrm flipH="1">
+            <a:off x="8119272" y="1076975"/>
+            <a:ext cx="856195" cy="0"/>
+          </a:xfrm>
+          <a:prstGeom prst="straightConnector1">
+            <a:avLst/>
+          </a:prstGeom>
+          <a:ln>
+            <a:solidFill>
+              <a:srgbClr val="C00000"/>
+            </a:solidFill>
+            <a:tailEnd type="triangle"/>
+          </a:ln>
+        </p:spPr>
+        <p:style>
+          <a:lnRef idx="2">
+            <a:schemeClr val="accent1"/>
+          </a:lnRef>
+          <a:fillRef idx="0">
+            <a:schemeClr val="accent1"/>
+          </a:fillRef>
+          <a:effectRef idx="1">
+            <a:schemeClr val="accent1"/>
+          </a:effectRef>
+          <a:fontRef idx="minor">
+            <a:schemeClr val="tx1"/>
+          </a:fontRef>
+        </p:style>
+      </p:cxnSp>
+      <p:sp>
+        <p:nvSpPr>
+          <p:cNvPr id="118" name="TextBox 117">
+            <a:extLst>
+              <a:ext uri="{FF2B5EF4-FFF2-40B4-BE49-F238E27FC236}">
+                <a16:creationId xmlns:a16="http://schemas.microsoft.com/office/drawing/2014/main" id="{98F5AF89-D1E1-5681-56CF-538394D3A330}"/>
+              </a:ext>
+            </a:extLst>
+          </p:cNvPr>
+          <p:cNvSpPr txBox="1"/>
+          <p:nvPr/>
+        </p:nvSpPr>
+        <p:spPr>
+          <a:xfrm>
+            <a:off x="9009105" y="865348"/>
+            <a:ext cx="2383574" cy="461665"/>
+          </a:xfrm>
+          <a:prstGeom prst="rect">
+            <a:avLst/>
+          </a:prstGeom>
+          <a:noFill/>
+        </p:spPr>
+        <p:txBody>
+          <a:bodyPr wrap="square" rtlCol="0">
+            <a:spAutoFit/>
+          </a:bodyPr>
+          <a:lstStyle/>
+          <a:p>
+            <a:r>
+              <a:rPr lang="en-US" sz="1200" b="1" dirty="0"/>
+              <a:t>Local Control Enable/Disable Checkbox</a:t>
+            </a:r>
+            <a:endParaRPr lang="en-SG" sz="1200" b="1" dirty="0"/>
+          </a:p>
+        </p:txBody>
+      </p:sp>
+      <p:cxnSp>
+        <p:nvCxnSpPr>
+          <p:cNvPr id="119" name="Straight Arrow Connector 118">
+            <a:extLst>
+              <a:ext uri="{FF2B5EF4-FFF2-40B4-BE49-F238E27FC236}">
+                <a16:creationId xmlns:a16="http://schemas.microsoft.com/office/drawing/2014/main" id="{9FDC49AD-2ADF-E641-8398-0658B59D5023}"/>
+              </a:ext>
+            </a:extLst>
+          </p:cNvPr>
+          <p:cNvCxnSpPr>
+            <a:cxnSpLocks/>
+          </p:cNvCxnSpPr>
+          <p:nvPr/>
+        </p:nvCxnSpPr>
+        <p:spPr>
+          <a:xfrm flipH="1">
+            <a:off x="8351220" y="1521060"/>
+            <a:ext cx="548047" cy="0"/>
+          </a:xfrm>
+          <a:prstGeom prst="straightConnector1">
+            <a:avLst/>
+          </a:prstGeom>
+          <a:ln>
+            <a:solidFill>
+              <a:srgbClr val="C00000"/>
+            </a:solidFill>
+            <a:tailEnd type="triangle"/>
+          </a:ln>
+        </p:spPr>
+        <p:style>
+          <a:lnRef idx="2">
+            <a:schemeClr val="accent1"/>
+          </a:lnRef>
+          <a:fillRef idx="0">
+            <a:schemeClr val="accent1"/>
+          </a:fillRef>
+          <a:effectRef idx="1">
+            <a:schemeClr val="accent1"/>
+          </a:effectRef>
+          <a:fontRef idx="minor">
+            <a:schemeClr val="tx1"/>
+          </a:fontRef>
+        </p:style>
+      </p:cxnSp>
+      <p:sp>
+        <p:nvSpPr>
+          <p:cNvPr id="120" name="TextBox 119">
+            <a:extLst>
+              <a:ext uri="{FF2B5EF4-FFF2-40B4-BE49-F238E27FC236}">
+                <a16:creationId xmlns:a16="http://schemas.microsoft.com/office/drawing/2014/main" id="{F1C08387-2E8D-7102-FF6C-7DBFD18759FE}"/>
+              </a:ext>
+            </a:extLst>
+          </p:cNvPr>
+          <p:cNvSpPr txBox="1"/>
+          <p:nvPr/>
+        </p:nvSpPr>
+        <p:spPr>
+          <a:xfrm>
+            <a:off x="8975467" y="1369808"/>
+            <a:ext cx="2383574" cy="276999"/>
+          </a:xfrm>
+          <a:prstGeom prst="rect">
+            <a:avLst/>
+          </a:prstGeom>
+          <a:noFill/>
+        </p:spPr>
+        <p:txBody>
+          <a:bodyPr wrap="square" rtlCol="0">
+            <a:spAutoFit/>
+          </a:bodyPr>
+          <a:lstStyle/>
+          <a:p>
+            <a:r>
+              <a:rPr lang="en-US" sz="1200" b="1" dirty="0"/>
+              <a:t>Base Servo Motor Control Slider</a:t>
+            </a:r>
+            <a:endParaRPr lang="en-SG" sz="1200" b="1" dirty="0"/>
+          </a:p>
+        </p:txBody>
+      </p:sp>
+      <p:sp>
+        <p:nvSpPr>
+          <p:cNvPr id="121" name="TextBox 120">
+            <a:extLst>
+              <a:ext uri="{FF2B5EF4-FFF2-40B4-BE49-F238E27FC236}">
+                <a16:creationId xmlns:a16="http://schemas.microsoft.com/office/drawing/2014/main" id="{9B9CCB07-6508-84DB-E5AC-4FAF9F349A6A}"/>
+              </a:ext>
+            </a:extLst>
+          </p:cNvPr>
+          <p:cNvSpPr txBox="1"/>
+          <p:nvPr/>
+        </p:nvSpPr>
+        <p:spPr>
+          <a:xfrm>
+            <a:off x="1304091" y="5980930"/>
+            <a:ext cx="1890329" cy="276999"/>
+          </a:xfrm>
+          <a:prstGeom prst="rect">
+            <a:avLst/>
+          </a:prstGeom>
+          <a:noFill/>
+        </p:spPr>
+        <p:txBody>
+          <a:bodyPr wrap="square" rtlCol="0">
+            <a:spAutoFit/>
+          </a:bodyPr>
+          <a:lstStyle/>
+          <a:p>
+            <a:r>
+              <a:rPr lang="en-US" sz="1200" b="1" dirty="0">
+                <a:solidFill>
+                  <a:schemeClr val="bg1"/>
+                </a:solidFill>
+              </a:rPr>
+              <a:t>Cube Grond Sensor Grid </a:t>
+            </a:r>
+            <a:endParaRPr lang="en-SG" sz="1200" b="1" dirty="0">
+              <a:solidFill>
+                <a:schemeClr val="bg1"/>
+              </a:solidFill>
+            </a:endParaRPr>
+          </a:p>
+        </p:txBody>
+      </p:sp>
+      <p:cxnSp>
+        <p:nvCxnSpPr>
+          <p:cNvPr id="122" name="Straight Arrow Connector 121">
+            <a:extLst>
+              <a:ext uri="{FF2B5EF4-FFF2-40B4-BE49-F238E27FC236}">
+                <a16:creationId xmlns:a16="http://schemas.microsoft.com/office/drawing/2014/main" id="{F70AAC8A-C2F1-2BA9-8826-230808BBDF19}"/>
+              </a:ext>
+            </a:extLst>
+          </p:cNvPr>
+          <p:cNvCxnSpPr>
+            <a:cxnSpLocks/>
+          </p:cNvCxnSpPr>
+          <p:nvPr/>
+        </p:nvCxnSpPr>
+        <p:spPr>
+          <a:xfrm flipH="1">
+            <a:off x="8351219" y="1925706"/>
+            <a:ext cx="548047" cy="0"/>
+          </a:xfrm>
+          <a:prstGeom prst="straightConnector1">
+            <a:avLst/>
+          </a:prstGeom>
+          <a:ln>
+            <a:solidFill>
+              <a:srgbClr val="C00000"/>
+            </a:solidFill>
+            <a:tailEnd type="triangle"/>
+          </a:ln>
+        </p:spPr>
+        <p:style>
+          <a:lnRef idx="2">
+            <a:schemeClr val="accent1"/>
+          </a:lnRef>
+          <a:fillRef idx="0">
+            <a:schemeClr val="accent1"/>
+          </a:fillRef>
+          <a:effectRef idx="1">
+            <a:schemeClr val="accent1"/>
+          </a:effectRef>
+          <a:fontRef idx="minor">
+            <a:schemeClr val="tx1"/>
+          </a:fontRef>
+        </p:style>
+      </p:cxnSp>
+      <p:sp>
+        <p:nvSpPr>
+          <p:cNvPr id="123" name="TextBox 122">
+            <a:extLst>
+              <a:ext uri="{FF2B5EF4-FFF2-40B4-BE49-F238E27FC236}">
+                <a16:creationId xmlns:a16="http://schemas.microsoft.com/office/drawing/2014/main" id="{2340A837-9DCA-5871-02FD-CA8B6462C4CE}"/>
+              </a:ext>
+            </a:extLst>
+          </p:cNvPr>
+          <p:cNvSpPr txBox="1"/>
+          <p:nvPr/>
+        </p:nvSpPr>
+        <p:spPr>
+          <a:xfrm>
+            <a:off x="8975466" y="1773914"/>
+            <a:ext cx="2600837" cy="276999"/>
+          </a:xfrm>
+          <a:prstGeom prst="rect">
+            <a:avLst/>
+          </a:prstGeom>
+          <a:noFill/>
+        </p:spPr>
+        <p:txBody>
+          <a:bodyPr wrap="square" rtlCol="0">
+            <a:spAutoFit/>
+          </a:bodyPr>
+          <a:lstStyle/>
+          <a:p>
+            <a:r>
+              <a:rPr lang="en-US" sz="1200" b="1" dirty="0"/>
+              <a:t>Should Servo Motor Control Slider</a:t>
+            </a:r>
+            <a:endParaRPr lang="en-SG" sz="1200" b="1" dirty="0"/>
+          </a:p>
+        </p:txBody>
+      </p:sp>
+      <p:cxnSp>
+        <p:nvCxnSpPr>
+          <p:cNvPr id="124" name="Straight Arrow Connector 123">
+            <a:extLst>
+              <a:ext uri="{FF2B5EF4-FFF2-40B4-BE49-F238E27FC236}">
+                <a16:creationId xmlns:a16="http://schemas.microsoft.com/office/drawing/2014/main" id="{7BB2DCB2-B2B0-889E-C0CA-62B31696954A}"/>
+              </a:ext>
+            </a:extLst>
+          </p:cNvPr>
+          <p:cNvCxnSpPr>
+            <a:cxnSpLocks/>
+          </p:cNvCxnSpPr>
+          <p:nvPr/>
+        </p:nvCxnSpPr>
+        <p:spPr>
+          <a:xfrm flipH="1">
+            <a:off x="8351219" y="2465039"/>
+            <a:ext cx="548047" cy="0"/>
+          </a:xfrm>
+          <a:prstGeom prst="straightConnector1">
+            <a:avLst/>
+          </a:prstGeom>
+          <a:ln>
+            <a:solidFill>
+              <a:srgbClr val="C00000"/>
+            </a:solidFill>
+            <a:tailEnd type="triangle"/>
+          </a:ln>
+        </p:spPr>
+        <p:style>
+          <a:lnRef idx="2">
+            <a:schemeClr val="accent1"/>
+          </a:lnRef>
+          <a:fillRef idx="0">
+            <a:schemeClr val="accent1"/>
+          </a:fillRef>
+          <a:effectRef idx="1">
+            <a:schemeClr val="accent1"/>
+          </a:effectRef>
+          <a:fontRef idx="minor">
+            <a:schemeClr val="tx1"/>
+          </a:fontRef>
+        </p:style>
+      </p:cxnSp>
+      <p:sp>
+        <p:nvSpPr>
+          <p:cNvPr id="125" name="TextBox 124">
+            <a:extLst>
+              <a:ext uri="{FF2B5EF4-FFF2-40B4-BE49-F238E27FC236}">
+                <a16:creationId xmlns:a16="http://schemas.microsoft.com/office/drawing/2014/main" id="{8CF562B7-10C7-7A2E-52F6-379943CAAAA1}"/>
+              </a:ext>
+            </a:extLst>
+          </p:cNvPr>
+          <p:cNvSpPr txBox="1"/>
+          <p:nvPr/>
+        </p:nvSpPr>
+        <p:spPr>
+          <a:xfrm>
+            <a:off x="8971645" y="2349211"/>
+            <a:ext cx="2600837" cy="276999"/>
+          </a:xfrm>
+          <a:prstGeom prst="rect">
+            <a:avLst/>
+          </a:prstGeom>
+          <a:noFill/>
+        </p:spPr>
+        <p:txBody>
+          <a:bodyPr wrap="square" rtlCol="0">
+            <a:spAutoFit/>
+          </a:bodyPr>
+          <a:lstStyle/>
+          <a:p>
+            <a:r>
+              <a:rPr lang="en-US" sz="1200" b="1" dirty="0"/>
+              <a:t>Elbow Servo Motor Control Slider</a:t>
+            </a:r>
+            <a:endParaRPr lang="en-SG" sz="1200" b="1" dirty="0"/>
+          </a:p>
+        </p:txBody>
+      </p:sp>
+      <p:cxnSp>
+        <p:nvCxnSpPr>
+          <p:cNvPr id="126" name="Straight Arrow Connector 125">
+            <a:extLst>
+              <a:ext uri="{FF2B5EF4-FFF2-40B4-BE49-F238E27FC236}">
+                <a16:creationId xmlns:a16="http://schemas.microsoft.com/office/drawing/2014/main" id="{B85A20D0-E226-022B-D218-72485F93A9F7}"/>
+              </a:ext>
+            </a:extLst>
+          </p:cNvPr>
+          <p:cNvCxnSpPr>
+            <a:cxnSpLocks/>
+          </p:cNvCxnSpPr>
+          <p:nvPr/>
+        </p:nvCxnSpPr>
+        <p:spPr>
+          <a:xfrm flipH="1">
+            <a:off x="8351219" y="2905531"/>
+            <a:ext cx="548047" cy="0"/>
+          </a:xfrm>
+          <a:prstGeom prst="straightConnector1">
+            <a:avLst/>
+          </a:prstGeom>
+          <a:ln>
+            <a:solidFill>
+              <a:srgbClr val="C00000"/>
+            </a:solidFill>
+            <a:tailEnd type="triangle"/>
+          </a:ln>
+        </p:spPr>
+        <p:style>
+          <a:lnRef idx="2">
+            <a:schemeClr val="accent1"/>
+          </a:lnRef>
+          <a:fillRef idx="0">
+            <a:schemeClr val="accent1"/>
+          </a:fillRef>
+          <a:effectRef idx="1">
+            <a:schemeClr val="accent1"/>
+          </a:effectRef>
+          <a:fontRef idx="minor">
+            <a:schemeClr val="tx1"/>
+          </a:fontRef>
+        </p:style>
+      </p:cxnSp>
+      <p:sp>
+        <p:nvSpPr>
+          <p:cNvPr id="127" name="TextBox 126">
+            <a:extLst>
+              <a:ext uri="{FF2B5EF4-FFF2-40B4-BE49-F238E27FC236}">
+                <a16:creationId xmlns:a16="http://schemas.microsoft.com/office/drawing/2014/main" id="{ED6D543E-112C-42AC-22C5-E95FC2E0B428}"/>
+              </a:ext>
+            </a:extLst>
+          </p:cNvPr>
+          <p:cNvSpPr txBox="1"/>
+          <p:nvPr/>
+        </p:nvSpPr>
+        <p:spPr>
+          <a:xfrm>
+            <a:off x="8971645" y="2767031"/>
+            <a:ext cx="2600837" cy="276999"/>
+          </a:xfrm>
+          <a:prstGeom prst="rect">
+            <a:avLst/>
+          </a:prstGeom>
+          <a:noFill/>
+        </p:spPr>
+        <p:txBody>
+          <a:bodyPr wrap="square" rtlCol="0">
+            <a:spAutoFit/>
+          </a:bodyPr>
+          <a:lstStyle/>
+          <a:p>
+            <a:r>
+              <a:rPr lang="en-US" sz="1200" b="1" dirty="0"/>
+              <a:t>Wrist Servo Motor Control Slider</a:t>
+            </a:r>
+            <a:endParaRPr lang="en-SG" sz="1200" b="1" dirty="0"/>
+          </a:p>
+        </p:txBody>
+      </p:sp>
+      <p:cxnSp>
+        <p:nvCxnSpPr>
+          <p:cNvPr id="128" name="Straight Arrow Connector 127">
+            <a:extLst>
+              <a:ext uri="{FF2B5EF4-FFF2-40B4-BE49-F238E27FC236}">
+                <a16:creationId xmlns:a16="http://schemas.microsoft.com/office/drawing/2014/main" id="{F6C9C31C-5910-32B5-A28B-3C21F1D2A21A}"/>
+              </a:ext>
+            </a:extLst>
+          </p:cNvPr>
+          <p:cNvCxnSpPr>
+            <a:cxnSpLocks/>
+          </p:cNvCxnSpPr>
+          <p:nvPr/>
+        </p:nvCxnSpPr>
+        <p:spPr>
+          <a:xfrm flipH="1">
+            <a:off x="8351218" y="3387115"/>
+            <a:ext cx="548047" cy="0"/>
+          </a:xfrm>
+          <a:prstGeom prst="straightConnector1">
+            <a:avLst/>
+          </a:prstGeom>
+          <a:ln>
+            <a:solidFill>
+              <a:srgbClr val="C00000"/>
+            </a:solidFill>
+            <a:tailEnd type="triangle"/>
+          </a:ln>
+        </p:spPr>
+        <p:style>
+          <a:lnRef idx="2">
+            <a:schemeClr val="accent1"/>
+          </a:lnRef>
+          <a:fillRef idx="0">
+            <a:schemeClr val="accent1"/>
+          </a:fillRef>
+          <a:effectRef idx="1">
+            <a:schemeClr val="accent1"/>
+          </a:effectRef>
+          <a:fontRef idx="minor">
+            <a:schemeClr val="tx1"/>
+          </a:fontRef>
+        </p:style>
+      </p:cxnSp>
+      <p:sp>
+        <p:nvSpPr>
+          <p:cNvPr id="129" name="TextBox 128">
+            <a:extLst>
+              <a:ext uri="{FF2B5EF4-FFF2-40B4-BE49-F238E27FC236}">
+                <a16:creationId xmlns:a16="http://schemas.microsoft.com/office/drawing/2014/main" id="{B978AF0C-7274-A588-98CC-81EC9A1A0248}"/>
+              </a:ext>
+            </a:extLst>
+          </p:cNvPr>
+          <p:cNvSpPr txBox="1"/>
+          <p:nvPr/>
+        </p:nvSpPr>
+        <p:spPr>
+          <a:xfrm>
+            <a:off x="8971645" y="3248615"/>
+            <a:ext cx="2600837" cy="461665"/>
+          </a:xfrm>
+          <a:prstGeom prst="rect">
+            <a:avLst/>
+          </a:prstGeom>
+          <a:noFill/>
+        </p:spPr>
+        <p:txBody>
+          <a:bodyPr wrap="square" rtlCol="0">
+            <a:spAutoFit/>
+          </a:bodyPr>
+          <a:lstStyle/>
+          <a:p>
+            <a:r>
+              <a:rPr lang="en-US" sz="1200" b="1" dirty="0"/>
+              <a:t>Gripper Rotation Servo Motor Control Slider</a:t>
+            </a:r>
+            <a:endParaRPr lang="en-SG" sz="1200" b="1" dirty="0"/>
+          </a:p>
+        </p:txBody>
+      </p:sp>
+      <p:cxnSp>
+        <p:nvCxnSpPr>
+          <p:cNvPr id="130" name="Straight Arrow Connector 129">
+            <a:extLst>
+              <a:ext uri="{FF2B5EF4-FFF2-40B4-BE49-F238E27FC236}">
+                <a16:creationId xmlns:a16="http://schemas.microsoft.com/office/drawing/2014/main" id="{2D67A70B-6BEC-B641-CEEB-362270870824}"/>
+              </a:ext>
+            </a:extLst>
+          </p:cNvPr>
+          <p:cNvCxnSpPr>
+            <a:cxnSpLocks/>
+          </p:cNvCxnSpPr>
+          <p:nvPr/>
+        </p:nvCxnSpPr>
+        <p:spPr>
+          <a:xfrm flipH="1">
+            <a:off x="8345899" y="3895345"/>
+            <a:ext cx="548047" cy="0"/>
+          </a:xfrm>
+          <a:prstGeom prst="straightConnector1">
+            <a:avLst/>
+          </a:prstGeom>
+          <a:ln>
+            <a:solidFill>
+              <a:srgbClr val="C00000"/>
+            </a:solidFill>
+            <a:tailEnd type="triangle"/>
+          </a:ln>
+        </p:spPr>
+        <p:style>
+          <a:lnRef idx="2">
+            <a:schemeClr val="accent1"/>
+          </a:lnRef>
+          <a:fillRef idx="0">
+            <a:schemeClr val="accent1"/>
+          </a:fillRef>
+          <a:effectRef idx="1">
+            <a:schemeClr val="accent1"/>
+          </a:effectRef>
+          <a:fontRef idx="minor">
+            <a:schemeClr val="tx1"/>
+          </a:fontRef>
+        </p:style>
+      </p:cxnSp>
+      <p:sp>
+        <p:nvSpPr>
+          <p:cNvPr id="131" name="TextBox 130">
+            <a:extLst>
+              <a:ext uri="{FF2B5EF4-FFF2-40B4-BE49-F238E27FC236}">
+                <a16:creationId xmlns:a16="http://schemas.microsoft.com/office/drawing/2014/main" id="{A033617B-0D4E-2D60-39C5-CAB63F56F767}"/>
+              </a:ext>
+            </a:extLst>
+          </p:cNvPr>
+          <p:cNvSpPr txBox="1"/>
+          <p:nvPr/>
+        </p:nvSpPr>
+        <p:spPr>
+          <a:xfrm>
+            <a:off x="8964945" y="3710280"/>
+            <a:ext cx="2600837" cy="461665"/>
+          </a:xfrm>
+          <a:prstGeom prst="rect">
+            <a:avLst/>
+          </a:prstGeom>
+          <a:noFill/>
+        </p:spPr>
+        <p:txBody>
+          <a:bodyPr wrap="square" rtlCol="0">
+            <a:spAutoFit/>
+          </a:bodyPr>
+          <a:lstStyle/>
+          <a:p>
+            <a:r>
+              <a:rPr lang="en-US" sz="1200" b="1" dirty="0"/>
+              <a:t>Gripper Opening Servo Motor Control Slider</a:t>
+            </a:r>
+            <a:endParaRPr lang="en-SG" sz="1200" b="1" dirty="0"/>
+          </a:p>
+        </p:txBody>
+      </p:sp>
+      <p:cxnSp>
+        <p:nvCxnSpPr>
+          <p:cNvPr id="132" name="Straight Arrow Connector 131">
+            <a:extLst>
+              <a:ext uri="{FF2B5EF4-FFF2-40B4-BE49-F238E27FC236}">
+                <a16:creationId xmlns:a16="http://schemas.microsoft.com/office/drawing/2014/main" id="{AF361111-058C-EACC-D6E5-1794B27353A8}"/>
+              </a:ext>
+            </a:extLst>
+          </p:cNvPr>
+          <p:cNvCxnSpPr>
+            <a:cxnSpLocks/>
+          </p:cNvCxnSpPr>
+          <p:nvPr/>
+        </p:nvCxnSpPr>
+        <p:spPr>
+          <a:xfrm flipH="1">
+            <a:off x="8345899" y="4302470"/>
+            <a:ext cx="548047" cy="0"/>
+          </a:xfrm>
+          <a:prstGeom prst="straightConnector1">
+            <a:avLst/>
+          </a:prstGeom>
+          <a:ln>
+            <a:solidFill>
+              <a:srgbClr val="C00000"/>
+            </a:solidFill>
+            <a:tailEnd type="triangle"/>
+          </a:ln>
+        </p:spPr>
+        <p:style>
+          <a:lnRef idx="2">
+            <a:schemeClr val="accent1"/>
+          </a:lnRef>
+          <a:fillRef idx="0">
+            <a:schemeClr val="accent1"/>
+          </a:fillRef>
+          <a:effectRef idx="1">
+            <a:schemeClr val="accent1"/>
+          </a:effectRef>
+          <a:fontRef idx="minor">
+            <a:schemeClr val="tx1"/>
+          </a:fontRef>
+        </p:style>
+      </p:cxnSp>
+      <p:sp>
+        <p:nvSpPr>
+          <p:cNvPr id="133" name="TextBox 132">
+            <a:extLst>
+              <a:ext uri="{FF2B5EF4-FFF2-40B4-BE49-F238E27FC236}">
+                <a16:creationId xmlns:a16="http://schemas.microsoft.com/office/drawing/2014/main" id="{8324B2F8-EA5E-AD90-4815-9D38184A3966}"/>
+              </a:ext>
+            </a:extLst>
+          </p:cNvPr>
+          <p:cNvSpPr txBox="1"/>
+          <p:nvPr/>
+        </p:nvSpPr>
+        <p:spPr>
+          <a:xfrm>
+            <a:off x="8964944" y="4206545"/>
+            <a:ext cx="2600837" cy="461665"/>
+          </a:xfrm>
+          <a:prstGeom prst="rect">
+            <a:avLst/>
+          </a:prstGeom>
+          <a:noFill/>
+        </p:spPr>
+        <p:txBody>
+          <a:bodyPr wrap="square" rtlCol="0">
+            <a:spAutoFit/>
+          </a:bodyPr>
+          <a:lstStyle/>
+          <a:p>
+            <a:r>
+              <a:rPr lang="en-US" sz="1200" b="1" dirty="0"/>
+              <a:t>Cube Grab and Release  Control Button</a:t>
+            </a:r>
+            <a:endParaRPr lang="en-SG" sz="1200" b="1" dirty="0"/>
+          </a:p>
+        </p:txBody>
+      </p:sp>
+      <p:cxnSp>
+        <p:nvCxnSpPr>
+          <p:cNvPr id="134" name="Straight Arrow Connector 133">
+            <a:extLst>
+              <a:ext uri="{FF2B5EF4-FFF2-40B4-BE49-F238E27FC236}">
+                <a16:creationId xmlns:a16="http://schemas.microsoft.com/office/drawing/2014/main" id="{583A9FC1-E184-DFD2-DDA5-459B5B40FF95}"/>
+              </a:ext>
+            </a:extLst>
+          </p:cNvPr>
+          <p:cNvCxnSpPr>
+            <a:cxnSpLocks/>
+          </p:cNvCxnSpPr>
+          <p:nvPr/>
+        </p:nvCxnSpPr>
+        <p:spPr>
+          <a:xfrm flipH="1" flipV="1">
+            <a:off x="7999322" y="4943343"/>
+            <a:ext cx="894624" cy="0"/>
+          </a:xfrm>
+          <a:prstGeom prst="straightConnector1">
+            <a:avLst/>
+          </a:prstGeom>
+          <a:ln>
+            <a:solidFill>
+              <a:srgbClr val="C00000"/>
+            </a:solidFill>
+            <a:tailEnd type="triangle"/>
+          </a:ln>
+        </p:spPr>
+        <p:style>
+          <a:lnRef idx="2">
+            <a:schemeClr val="accent1"/>
+          </a:lnRef>
+          <a:fillRef idx="0">
+            <a:schemeClr val="accent1"/>
+          </a:fillRef>
+          <a:effectRef idx="1">
+            <a:schemeClr val="accent1"/>
+          </a:effectRef>
+          <a:fontRef idx="minor">
+            <a:schemeClr val="tx1"/>
+          </a:fontRef>
+        </p:style>
+      </p:cxnSp>
+      <p:sp>
+        <p:nvSpPr>
+          <p:cNvPr id="136" name="TextBox 135">
+            <a:extLst>
+              <a:ext uri="{FF2B5EF4-FFF2-40B4-BE49-F238E27FC236}">
+                <a16:creationId xmlns:a16="http://schemas.microsoft.com/office/drawing/2014/main" id="{BE19CF7A-4EFB-D04A-33C5-807C7438C2D0}"/>
+              </a:ext>
+            </a:extLst>
+          </p:cNvPr>
+          <p:cNvSpPr txBox="1"/>
+          <p:nvPr/>
+        </p:nvSpPr>
+        <p:spPr>
+          <a:xfrm>
+            <a:off x="9002154" y="4807088"/>
+            <a:ext cx="2600837" cy="461665"/>
+          </a:xfrm>
+          <a:prstGeom prst="rect">
+            <a:avLst/>
+          </a:prstGeom>
+          <a:noFill/>
+        </p:spPr>
+        <p:txBody>
+          <a:bodyPr wrap="square" rtlCol="0">
+            <a:spAutoFit/>
+          </a:bodyPr>
+          <a:lstStyle/>
+          <a:p>
+            <a:r>
+              <a:rPr lang="en-US" sz="1200" b="1" dirty="0"/>
+              <a:t>Calculated Gripper Position Coordinate </a:t>
+            </a:r>
+            <a:endParaRPr lang="en-SG" sz="1200" b="1" dirty="0"/>
+          </a:p>
+        </p:txBody>
+      </p:sp>
+      <p:cxnSp>
+        <p:nvCxnSpPr>
+          <p:cNvPr id="137" name="Straight Arrow Connector 136">
+            <a:extLst>
+              <a:ext uri="{FF2B5EF4-FFF2-40B4-BE49-F238E27FC236}">
+                <a16:creationId xmlns:a16="http://schemas.microsoft.com/office/drawing/2014/main" id="{EBA1201B-B2AB-3624-58BB-4EF2324218FE}"/>
+              </a:ext>
+            </a:extLst>
+          </p:cNvPr>
+          <p:cNvCxnSpPr>
+            <a:cxnSpLocks/>
+          </p:cNvCxnSpPr>
+          <p:nvPr/>
+        </p:nvCxnSpPr>
+        <p:spPr>
+          <a:xfrm flipH="1" flipV="1">
+            <a:off x="8070320" y="5544320"/>
+            <a:ext cx="894624" cy="0"/>
+          </a:xfrm>
+          <a:prstGeom prst="straightConnector1">
+            <a:avLst/>
+          </a:prstGeom>
+          <a:ln>
+            <a:solidFill>
+              <a:srgbClr val="C00000"/>
+            </a:solidFill>
+            <a:tailEnd type="triangle"/>
+          </a:ln>
+        </p:spPr>
+        <p:style>
+          <a:lnRef idx="2">
+            <a:schemeClr val="accent1"/>
+          </a:lnRef>
+          <a:fillRef idx="0">
+            <a:schemeClr val="accent1"/>
+          </a:fillRef>
+          <a:effectRef idx="1">
+            <a:schemeClr val="accent1"/>
+          </a:effectRef>
+          <a:fontRef idx="minor">
+            <a:schemeClr val="tx1"/>
+          </a:fontRef>
+        </p:style>
+      </p:cxnSp>
+      <p:sp>
+        <p:nvSpPr>
+          <p:cNvPr id="138" name="TextBox 137">
+            <a:extLst>
+              <a:ext uri="{FF2B5EF4-FFF2-40B4-BE49-F238E27FC236}">
+                <a16:creationId xmlns:a16="http://schemas.microsoft.com/office/drawing/2014/main" id="{AE577A70-79DF-08FA-A3C2-B7AA4D8EA721}"/>
+              </a:ext>
+            </a:extLst>
+          </p:cNvPr>
+          <p:cNvSpPr txBox="1"/>
+          <p:nvPr/>
+        </p:nvSpPr>
+        <p:spPr>
+          <a:xfrm>
+            <a:off x="9009105" y="5412429"/>
+            <a:ext cx="2600837" cy="276999"/>
+          </a:xfrm>
+          <a:prstGeom prst="rect">
+            <a:avLst/>
+          </a:prstGeom>
+          <a:noFill/>
+        </p:spPr>
+        <p:txBody>
+          <a:bodyPr wrap="square" rtlCol="0">
+            <a:spAutoFit/>
+          </a:bodyPr>
+          <a:lstStyle/>
+          <a:p>
+            <a:r>
+              <a:rPr lang="en-US" sz="1200" b="1" dirty="0"/>
+              <a:t>Cube Position Coordinate Display</a:t>
+            </a:r>
+            <a:endParaRPr lang="en-SG" sz="1200" b="1" dirty="0"/>
+          </a:p>
+        </p:txBody>
+      </p:sp>
+      <p:cxnSp>
+        <p:nvCxnSpPr>
+          <p:cNvPr id="139" name="Straight Arrow Connector 138">
+            <a:extLst>
+              <a:ext uri="{FF2B5EF4-FFF2-40B4-BE49-F238E27FC236}">
+                <a16:creationId xmlns:a16="http://schemas.microsoft.com/office/drawing/2014/main" id="{59DB897F-CD62-7594-399E-F5C0B0F0E8BB}"/>
+              </a:ext>
+            </a:extLst>
+          </p:cNvPr>
+          <p:cNvCxnSpPr>
+            <a:cxnSpLocks/>
+          </p:cNvCxnSpPr>
+          <p:nvPr/>
+        </p:nvCxnSpPr>
+        <p:spPr>
+          <a:xfrm flipH="1">
+            <a:off x="7600328" y="5861312"/>
+            <a:ext cx="1401826" cy="0"/>
+          </a:xfrm>
+          <a:prstGeom prst="straightConnector1">
+            <a:avLst/>
+          </a:prstGeom>
+          <a:ln>
+            <a:solidFill>
+              <a:srgbClr val="C00000"/>
+            </a:solidFill>
+            <a:tailEnd type="triangle"/>
+          </a:ln>
+        </p:spPr>
+        <p:style>
+          <a:lnRef idx="2">
+            <a:schemeClr val="accent1"/>
+          </a:lnRef>
+          <a:fillRef idx="0">
+            <a:schemeClr val="accent1"/>
+          </a:fillRef>
+          <a:effectRef idx="1">
+            <a:schemeClr val="accent1"/>
+          </a:effectRef>
+          <a:fontRef idx="minor">
+            <a:schemeClr val="tx1"/>
+          </a:fontRef>
+        </p:style>
+      </p:cxnSp>
+      <p:sp>
+        <p:nvSpPr>
+          <p:cNvPr id="141" name="TextBox 140">
+            <a:extLst>
+              <a:ext uri="{FF2B5EF4-FFF2-40B4-BE49-F238E27FC236}">
+                <a16:creationId xmlns:a16="http://schemas.microsoft.com/office/drawing/2014/main" id="{20F66EE1-9D77-8672-6EB9-3609BBA7AA3D}"/>
+              </a:ext>
+            </a:extLst>
+          </p:cNvPr>
+          <p:cNvSpPr txBox="1"/>
+          <p:nvPr/>
+        </p:nvSpPr>
+        <p:spPr>
+          <a:xfrm>
+            <a:off x="9031396" y="5750244"/>
+            <a:ext cx="2600837" cy="276999"/>
+          </a:xfrm>
+          <a:prstGeom prst="rect">
+            <a:avLst/>
+          </a:prstGeom>
+          <a:noFill/>
+        </p:spPr>
+        <p:txBody>
+          <a:bodyPr wrap="square" rtlCol="0">
+            <a:spAutoFit/>
+          </a:bodyPr>
+          <a:lstStyle/>
+          <a:p>
+            <a:r>
+              <a:rPr lang="en-US" sz="1200" b="1" dirty="0"/>
+              <a:t>Current Operational State</a:t>
+            </a:r>
+            <a:endParaRPr lang="en-SG" sz="1200" b="1" dirty="0"/>
+          </a:p>
+        </p:txBody>
+      </p:sp>
+      <p:cxnSp>
+        <p:nvCxnSpPr>
+          <p:cNvPr id="142" name="Straight Arrow Connector 141">
+            <a:extLst>
+              <a:ext uri="{FF2B5EF4-FFF2-40B4-BE49-F238E27FC236}">
+                <a16:creationId xmlns:a16="http://schemas.microsoft.com/office/drawing/2014/main" id="{542A7154-F04C-B6E7-2472-7C13E7B14390}"/>
+              </a:ext>
+            </a:extLst>
+          </p:cNvPr>
+          <p:cNvCxnSpPr>
+            <a:cxnSpLocks/>
+          </p:cNvCxnSpPr>
+          <p:nvPr/>
+        </p:nvCxnSpPr>
+        <p:spPr>
+          <a:xfrm flipH="1">
+            <a:off x="8345899" y="6146861"/>
+            <a:ext cx="656255" cy="0"/>
+          </a:xfrm>
+          <a:prstGeom prst="straightConnector1">
+            <a:avLst/>
+          </a:prstGeom>
+          <a:ln>
+            <a:solidFill>
+              <a:srgbClr val="C00000"/>
+            </a:solidFill>
+            <a:tailEnd type="triangle"/>
+          </a:ln>
+        </p:spPr>
+        <p:style>
+          <a:lnRef idx="2">
+            <a:schemeClr val="accent1"/>
+          </a:lnRef>
+          <a:fillRef idx="0">
+            <a:schemeClr val="accent1"/>
+          </a:fillRef>
+          <a:effectRef idx="1">
+            <a:schemeClr val="accent1"/>
+          </a:effectRef>
+          <a:fontRef idx="minor">
+            <a:schemeClr val="tx1"/>
+          </a:fontRef>
+        </p:style>
+      </p:cxnSp>
+      <p:sp>
+        <p:nvSpPr>
+          <p:cNvPr id="144" name="TextBox 143">
+            <a:extLst>
+              <a:ext uri="{FF2B5EF4-FFF2-40B4-BE49-F238E27FC236}">
+                <a16:creationId xmlns:a16="http://schemas.microsoft.com/office/drawing/2014/main" id="{9708D50F-9902-A09C-D3CC-8EA3D256FD14}"/>
+              </a:ext>
+            </a:extLst>
+          </p:cNvPr>
+          <p:cNvSpPr txBox="1"/>
+          <p:nvPr/>
+        </p:nvSpPr>
+        <p:spPr>
+          <a:xfrm>
+            <a:off x="9031396" y="6048964"/>
+            <a:ext cx="1704725" cy="276999"/>
+          </a:xfrm>
+          <a:prstGeom prst="rect">
+            <a:avLst/>
+          </a:prstGeom>
+          <a:noFill/>
+        </p:spPr>
+        <p:txBody>
+          <a:bodyPr wrap="square" rtlCol="0">
+            <a:spAutoFit/>
+          </a:bodyPr>
+          <a:lstStyle/>
+          <a:p>
+            <a:r>
+              <a:rPr lang="en-US" sz="1200" b="1" dirty="0"/>
+              <a:t>Reset Button</a:t>
+            </a:r>
+            <a:endParaRPr lang="en-SG" sz="1200" b="1" dirty="0"/>
+          </a:p>
+        </p:txBody>
+      </p:sp>
+      <p:sp>
+        <p:nvSpPr>
+          <p:cNvPr id="145" name="Arrow: Curved Left 144">
+            <a:extLst>
+              <a:ext uri="{FF2B5EF4-FFF2-40B4-BE49-F238E27FC236}">
+                <a16:creationId xmlns:a16="http://schemas.microsoft.com/office/drawing/2014/main" id="{E80F4CCD-8BF3-BBA7-6F21-A76741349EA8}"/>
+              </a:ext>
+            </a:extLst>
+          </p:cNvPr>
+          <p:cNvSpPr/>
+          <p:nvPr/>
+        </p:nvSpPr>
+        <p:spPr>
+          <a:xfrm>
+            <a:off x="4246733" y="3009418"/>
+            <a:ext cx="321266" cy="402322"/>
+          </a:xfrm>
+          <a:prstGeom prst="curvedLeftArrow">
+            <a:avLst>
+              <a:gd name="adj1" fmla="val 25000"/>
+              <a:gd name="adj2" fmla="val 61476"/>
+              <a:gd name="adj3" fmla="val 25000"/>
+            </a:avLst>
+          </a:prstGeom>
+          <a:solidFill>
+            <a:schemeClr val="bg1"/>
+          </a:solidFill>
+        </p:spPr>
+        <p:style>
+          <a:lnRef idx="2">
+            <a:schemeClr val="accent1">
+              <a:shade val="15000"/>
+            </a:schemeClr>
+          </a:lnRef>
+          <a:fillRef idx="1">
+            <a:schemeClr val="accent1"/>
+          </a:fillRef>
+          <a:effectRef idx="0">
+            <a:schemeClr val="accent1"/>
+          </a:effectRef>
+          <a:fontRef idx="minor">
+            <a:schemeClr val="lt1"/>
+          </a:fontRef>
+        </p:style>
+        <p:txBody>
+          <a:bodyPr rtlCol="0" anchor="ctr"/>
+          <a:lstStyle/>
+          <a:p>
+            <a:pPr algn="ctr"/>
+            <a:endParaRPr lang="en-SG">
+              <a:solidFill>
+                <a:schemeClr val="tx1"/>
+              </a:solidFill>
+            </a:endParaRPr>
+          </a:p>
+        </p:txBody>
+      </p:sp>
+      <p:cxnSp>
+        <p:nvCxnSpPr>
+          <p:cNvPr id="146" name="Straight Arrow Connector 145">
+            <a:extLst>
+              <a:ext uri="{FF2B5EF4-FFF2-40B4-BE49-F238E27FC236}">
+                <a16:creationId xmlns:a16="http://schemas.microsoft.com/office/drawing/2014/main" id="{63DC6623-13D9-6656-308A-24C456F70B4E}"/>
+              </a:ext>
+            </a:extLst>
+          </p:cNvPr>
+          <p:cNvCxnSpPr>
+            <a:cxnSpLocks/>
+          </p:cNvCxnSpPr>
+          <p:nvPr/>
+        </p:nvCxnSpPr>
+        <p:spPr>
+          <a:xfrm>
+            <a:off x="3331140" y="3210579"/>
+            <a:ext cx="627888" cy="0"/>
+          </a:xfrm>
+          <a:prstGeom prst="straightConnector1">
+            <a:avLst/>
+          </a:prstGeom>
+          <a:ln>
+            <a:solidFill>
+              <a:srgbClr val="FF0000"/>
+            </a:solidFill>
+            <a:prstDash val="sysDash"/>
+            <a:tailEnd type="triangle"/>
+          </a:ln>
+        </p:spPr>
+        <p:style>
+          <a:lnRef idx="2">
+            <a:schemeClr val="accent1"/>
+          </a:lnRef>
+          <a:fillRef idx="0">
+            <a:schemeClr val="accent1"/>
+          </a:fillRef>
+          <a:effectRef idx="1">
+            <a:schemeClr val="accent1"/>
+          </a:effectRef>
+          <a:fontRef idx="minor">
+            <a:schemeClr val="tx1"/>
+          </a:fontRef>
+        </p:style>
+      </p:cxnSp>
+      <p:sp>
+        <p:nvSpPr>
+          <p:cNvPr id="148" name="TextBox 147">
+            <a:extLst>
+              <a:ext uri="{FF2B5EF4-FFF2-40B4-BE49-F238E27FC236}">
+                <a16:creationId xmlns:a16="http://schemas.microsoft.com/office/drawing/2014/main" id="{18D8C705-F9E6-0459-1C21-2544ACBC3AE6}"/>
+              </a:ext>
+            </a:extLst>
+          </p:cNvPr>
+          <p:cNvSpPr txBox="1"/>
+          <p:nvPr/>
+        </p:nvSpPr>
+        <p:spPr>
+          <a:xfrm>
+            <a:off x="2780992" y="3075084"/>
+            <a:ext cx="623300" cy="276999"/>
+          </a:xfrm>
+          <a:prstGeom prst="rect">
+            <a:avLst/>
+          </a:prstGeom>
+          <a:noFill/>
+        </p:spPr>
+        <p:txBody>
+          <a:bodyPr wrap="square" rtlCol="0">
+            <a:spAutoFit/>
+          </a:bodyPr>
+          <a:lstStyle/>
+          <a:p>
+            <a:r>
+              <a:rPr lang="en-US" sz="1200" b="1" dirty="0">
+                <a:solidFill>
+                  <a:srgbClr val="FF0000"/>
+                </a:solidFill>
+              </a:rPr>
+              <a:t>Link-0</a:t>
+            </a:r>
+            <a:endParaRPr lang="en-SG" sz="1200" b="1" dirty="0">
+              <a:solidFill>
+                <a:srgbClr val="FF0000"/>
+              </a:solidFill>
+            </a:endParaRPr>
+          </a:p>
+        </p:txBody>
+      </p:sp>
+      <p:cxnSp>
+        <p:nvCxnSpPr>
+          <p:cNvPr id="149" name="Straight Arrow Connector 148">
+            <a:extLst>
+              <a:ext uri="{FF2B5EF4-FFF2-40B4-BE49-F238E27FC236}">
+                <a16:creationId xmlns:a16="http://schemas.microsoft.com/office/drawing/2014/main" id="{E9BB800D-6292-F8B7-1C7A-0BBF89C1A221}"/>
+              </a:ext>
+            </a:extLst>
+          </p:cNvPr>
+          <p:cNvCxnSpPr>
+            <a:cxnSpLocks/>
+          </p:cNvCxnSpPr>
+          <p:nvPr/>
+        </p:nvCxnSpPr>
+        <p:spPr>
+          <a:xfrm>
+            <a:off x="4540567" y="2156539"/>
+            <a:ext cx="0" cy="298298"/>
+          </a:xfrm>
+          <a:prstGeom prst="straightConnector1">
+            <a:avLst/>
+          </a:prstGeom>
+          <a:ln>
+            <a:solidFill>
+              <a:srgbClr val="00FF00"/>
+            </a:solidFill>
+            <a:prstDash val="sysDash"/>
+            <a:tailEnd type="triangle"/>
+          </a:ln>
+        </p:spPr>
+        <p:style>
+          <a:lnRef idx="2">
+            <a:schemeClr val="accent1"/>
+          </a:lnRef>
+          <a:fillRef idx="0">
+            <a:schemeClr val="accent1"/>
+          </a:fillRef>
+          <a:effectRef idx="1">
+            <a:schemeClr val="accent1"/>
+          </a:effectRef>
+          <a:fontRef idx="minor">
+            <a:schemeClr val="tx1"/>
+          </a:fontRef>
+        </p:style>
+      </p:cxnSp>
+      <p:sp>
+        <p:nvSpPr>
+          <p:cNvPr id="153" name="TextBox 152">
+            <a:extLst>
+              <a:ext uri="{FF2B5EF4-FFF2-40B4-BE49-F238E27FC236}">
+                <a16:creationId xmlns:a16="http://schemas.microsoft.com/office/drawing/2014/main" id="{327A0CDA-6B79-4028-5D6C-272CFEC84516}"/>
+              </a:ext>
+            </a:extLst>
+          </p:cNvPr>
+          <p:cNvSpPr txBox="1"/>
+          <p:nvPr/>
+        </p:nvSpPr>
+        <p:spPr>
+          <a:xfrm>
+            <a:off x="4251223" y="1912413"/>
+            <a:ext cx="623300" cy="276999"/>
+          </a:xfrm>
+          <a:prstGeom prst="rect">
+            <a:avLst/>
+          </a:prstGeom>
+          <a:noFill/>
+        </p:spPr>
+        <p:txBody>
+          <a:bodyPr wrap="square" rtlCol="0">
+            <a:spAutoFit/>
+          </a:bodyPr>
+          <a:lstStyle/>
+          <a:p>
+            <a:r>
+              <a:rPr lang="en-US" sz="1200" b="1" dirty="0">
+                <a:solidFill>
+                  <a:srgbClr val="00FF00"/>
+                </a:solidFill>
+              </a:rPr>
+              <a:t>Link-1</a:t>
+            </a:r>
+            <a:endParaRPr lang="en-SG" sz="1200" b="1" dirty="0">
+              <a:solidFill>
+                <a:srgbClr val="00FF00"/>
+              </a:solidFill>
+            </a:endParaRPr>
+          </a:p>
+        </p:txBody>
+      </p:sp>
+      <p:cxnSp>
+        <p:nvCxnSpPr>
+          <p:cNvPr id="154" name="Straight Arrow Connector 153">
+            <a:extLst>
+              <a:ext uri="{FF2B5EF4-FFF2-40B4-BE49-F238E27FC236}">
+                <a16:creationId xmlns:a16="http://schemas.microsoft.com/office/drawing/2014/main" id="{C4638F15-B5D7-5A36-AD42-18DBD0260106}"/>
+              </a:ext>
+            </a:extLst>
+          </p:cNvPr>
+          <p:cNvCxnSpPr>
+            <a:cxnSpLocks/>
+          </p:cNvCxnSpPr>
+          <p:nvPr/>
+        </p:nvCxnSpPr>
+        <p:spPr>
+          <a:xfrm flipV="1">
+            <a:off x="5235571" y="2839543"/>
+            <a:ext cx="0" cy="360420"/>
+          </a:xfrm>
+          <a:prstGeom prst="straightConnector1">
+            <a:avLst/>
+          </a:prstGeom>
+          <a:ln>
+            <a:solidFill>
+              <a:schemeClr val="accent1">
+                <a:lumMod val="60000"/>
+                <a:lumOff val="40000"/>
+              </a:schemeClr>
+            </a:solidFill>
+            <a:prstDash val="sysDash"/>
+            <a:tailEnd type="triangle"/>
+          </a:ln>
+        </p:spPr>
+        <p:style>
+          <a:lnRef idx="2">
+            <a:schemeClr val="accent1"/>
+          </a:lnRef>
+          <a:fillRef idx="0">
+            <a:schemeClr val="accent1"/>
+          </a:fillRef>
+          <a:effectRef idx="1">
+            <a:schemeClr val="accent1"/>
+          </a:effectRef>
+          <a:fontRef idx="minor">
+            <a:schemeClr val="tx1"/>
+          </a:fontRef>
+        </p:style>
+      </p:cxnSp>
+      <p:sp>
+        <p:nvSpPr>
+          <p:cNvPr id="156" name="TextBox 155">
+            <a:extLst>
+              <a:ext uri="{FF2B5EF4-FFF2-40B4-BE49-F238E27FC236}">
+                <a16:creationId xmlns:a16="http://schemas.microsoft.com/office/drawing/2014/main" id="{5C3661D0-795B-EDCD-9411-4F4749B5498F}"/>
+              </a:ext>
+            </a:extLst>
+          </p:cNvPr>
+          <p:cNvSpPr txBox="1"/>
+          <p:nvPr/>
+        </p:nvSpPr>
+        <p:spPr>
+          <a:xfrm>
+            <a:off x="5090561" y="3188126"/>
+            <a:ext cx="623300" cy="276999"/>
+          </a:xfrm>
+          <a:prstGeom prst="rect">
+            <a:avLst/>
+          </a:prstGeom>
+          <a:noFill/>
+        </p:spPr>
+        <p:txBody>
+          <a:bodyPr wrap="square" rtlCol="0">
+            <a:spAutoFit/>
+          </a:bodyPr>
+          <a:lstStyle/>
+          <a:p>
+            <a:r>
+              <a:rPr lang="en-US" sz="1200" b="1" dirty="0">
+                <a:solidFill>
+                  <a:schemeClr val="accent1">
+                    <a:lumMod val="60000"/>
+                    <a:lumOff val="40000"/>
+                  </a:schemeClr>
+                </a:solidFill>
+              </a:rPr>
+              <a:t>Link-2</a:t>
+            </a:r>
+            <a:endParaRPr lang="en-SG" sz="1200" b="1" dirty="0">
+              <a:solidFill>
+                <a:schemeClr val="accent1">
+                  <a:lumMod val="60000"/>
+                  <a:lumOff val="40000"/>
+                </a:schemeClr>
+              </a:solidFill>
+            </a:endParaRPr>
+          </a:p>
+        </p:txBody>
+      </p:sp>
+      <p:cxnSp>
+        <p:nvCxnSpPr>
+          <p:cNvPr id="157" name="Straight Arrow Connector 156">
+            <a:extLst>
+              <a:ext uri="{FF2B5EF4-FFF2-40B4-BE49-F238E27FC236}">
+                <a16:creationId xmlns:a16="http://schemas.microsoft.com/office/drawing/2014/main" id="{6F846574-C17B-EA35-0FCD-F9B1A05A87D9}"/>
+              </a:ext>
+            </a:extLst>
+          </p:cNvPr>
+          <p:cNvCxnSpPr>
+            <a:cxnSpLocks/>
+          </p:cNvCxnSpPr>
+          <p:nvPr/>
+        </p:nvCxnSpPr>
+        <p:spPr>
+          <a:xfrm flipH="1" flipV="1">
+            <a:off x="6168369" y="2900937"/>
+            <a:ext cx="8134" cy="510480"/>
+          </a:xfrm>
+          <a:prstGeom prst="straightConnector1">
+            <a:avLst/>
+          </a:prstGeom>
+          <a:ln>
+            <a:solidFill>
+              <a:srgbClr val="FFFF00"/>
+            </a:solidFill>
+            <a:prstDash val="sysDash"/>
+            <a:tailEnd type="triangle"/>
+          </a:ln>
+        </p:spPr>
+        <p:style>
+          <a:lnRef idx="2">
+            <a:schemeClr val="accent1"/>
+          </a:lnRef>
+          <a:fillRef idx="0">
+            <a:schemeClr val="accent1"/>
+          </a:fillRef>
+          <a:effectRef idx="1">
+            <a:schemeClr val="accent1"/>
+          </a:effectRef>
+          <a:fontRef idx="minor">
+            <a:schemeClr val="tx1"/>
+          </a:fontRef>
+        </p:style>
+      </p:cxnSp>
+      <p:sp>
+        <p:nvSpPr>
+          <p:cNvPr id="161" name="TextBox 160">
+            <a:extLst>
+              <a:ext uri="{FF2B5EF4-FFF2-40B4-BE49-F238E27FC236}">
+                <a16:creationId xmlns:a16="http://schemas.microsoft.com/office/drawing/2014/main" id="{30301E21-C179-989F-890E-CF80F4758C99}"/>
+              </a:ext>
+            </a:extLst>
+          </p:cNvPr>
+          <p:cNvSpPr txBox="1"/>
+          <p:nvPr/>
+        </p:nvSpPr>
+        <p:spPr>
+          <a:xfrm>
+            <a:off x="6019170" y="3386009"/>
+            <a:ext cx="623300" cy="276999"/>
+          </a:xfrm>
+          <a:prstGeom prst="rect">
+            <a:avLst/>
+          </a:prstGeom>
+          <a:noFill/>
+        </p:spPr>
+        <p:txBody>
+          <a:bodyPr wrap="square" rtlCol="0">
+            <a:spAutoFit/>
+          </a:bodyPr>
+          <a:lstStyle/>
+          <a:p>
+            <a:r>
+              <a:rPr lang="en-US" sz="1200" b="1" dirty="0">
+                <a:solidFill>
+                  <a:srgbClr val="FFFF00"/>
+                </a:solidFill>
+              </a:rPr>
+              <a:t>Link-3</a:t>
+            </a:r>
+            <a:endParaRPr lang="en-SG" sz="1200" b="1" dirty="0">
+              <a:solidFill>
+                <a:srgbClr val="FFFF00"/>
+              </a:solidFill>
+            </a:endParaRPr>
+          </a:p>
+        </p:txBody>
+      </p:sp>
+    </p:spTree>
+    <p:extLst>
+      <p:ext uri="{BB962C8B-B14F-4D97-AF65-F5344CB8AC3E}">
+        <p14:creationId xmlns:p14="http://schemas.microsoft.com/office/powerpoint/2010/main" val="3558820858"/>
+      </p:ext>
+    </p:extLst>
+  </p:cSld>
+  <p:clrMapOvr>
+    <a:masterClrMapping/>
+  </p:clrMapOvr>
+</p:sld>
+</file>
+
 <file path=ppt/theme/theme1.xml><?xml version="1.0" encoding="utf-8"?>
 <a:theme xmlns:a="http://schemas.openxmlformats.org/drawingml/2006/main" name="Office Theme">
   <a:themeElements>

</xml_diff>

<commit_message>
Added the auto grab cube joint calculation module.
</commit_message>
<xml_diff>
--- a/doc/designDoc.pptx
+++ b/doc/designDoc.pptx
@@ -5,12 +5,15 @@
     <p:sldMasterId id="2147483648" r:id="rId1"/>
   </p:sldMasterIdLst>
   <p:notesMasterIdLst>
-    <p:notesMasterId r:id="rId5"/>
+    <p:notesMasterId r:id="rId8"/>
   </p:notesMasterIdLst>
   <p:sldIdLst>
     <p:sldId id="256" r:id="rId2"/>
     <p:sldId id="268" r:id="rId3"/>
     <p:sldId id="269" r:id="rId4"/>
+    <p:sldId id="270" r:id="rId5"/>
+    <p:sldId id="271" r:id="rId6"/>
+    <p:sldId id="272" r:id="rId7"/>
   </p:sldIdLst>
   <p:sldSz cx="12192000" cy="6858000"/>
   <p:notesSz cx="6858000" cy="9144000"/>
@@ -2953,7 +2956,7 @@
           <a:p>
             <a:fld id="{7600FCCF-5CF4-404D-AD1B-36BEF022C4C2}" type="datetimeFigureOut">
               <a:rPr lang="en-SG" smtClean="0"/>
-              <a:t>25/2/2026</a:t>
+              <a:t>26/2/2026</a:t>
             </a:fld>
             <a:endParaRPr lang="en-SG"/>
           </a:p>
@@ -3538,7 +3541,7 @@
           <a:p>
             <a:fld id="{24E8A18A-5CE4-40C1-8227-52475E3DF71E}" type="datetimeFigureOut">
               <a:rPr lang="en-SG" smtClean="0"/>
-              <a:t>25/2/2026</a:t>
+              <a:t>26/2/2026</a:t>
             </a:fld>
             <a:endParaRPr lang="en-SG"/>
           </a:p>
@@ -3738,7 +3741,7 @@
           <a:p>
             <a:fld id="{24E8A18A-5CE4-40C1-8227-52475E3DF71E}" type="datetimeFigureOut">
               <a:rPr lang="en-SG" smtClean="0"/>
-              <a:t>25/2/2026</a:t>
+              <a:t>26/2/2026</a:t>
             </a:fld>
             <a:endParaRPr lang="en-SG"/>
           </a:p>
@@ -3948,7 +3951,7 @@
           <a:p>
             <a:fld id="{24E8A18A-5CE4-40C1-8227-52475E3DF71E}" type="datetimeFigureOut">
               <a:rPr lang="en-SG" smtClean="0"/>
-              <a:t>25/2/2026</a:t>
+              <a:t>26/2/2026</a:t>
             </a:fld>
             <a:endParaRPr lang="en-SG"/>
           </a:p>
@@ -4148,7 +4151,7 @@
           <a:p>
             <a:fld id="{24E8A18A-5CE4-40C1-8227-52475E3DF71E}" type="datetimeFigureOut">
               <a:rPr lang="en-SG" smtClean="0"/>
-              <a:t>25/2/2026</a:t>
+              <a:t>26/2/2026</a:t>
             </a:fld>
             <a:endParaRPr lang="en-SG"/>
           </a:p>
@@ -4424,7 +4427,7 @@
           <a:p>
             <a:fld id="{24E8A18A-5CE4-40C1-8227-52475E3DF71E}" type="datetimeFigureOut">
               <a:rPr lang="en-SG" smtClean="0"/>
-              <a:t>25/2/2026</a:t>
+              <a:t>26/2/2026</a:t>
             </a:fld>
             <a:endParaRPr lang="en-SG"/>
           </a:p>
@@ -4692,7 +4695,7 @@
           <a:p>
             <a:fld id="{24E8A18A-5CE4-40C1-8227-52475E3DF71E}" type="datetimeFigureOut">
               <a:rPr lang="en-SG" smtClean="0"/>
-              <a:t>25/2/2026</a:t>
+              <a:t>26/2/2026</a:t>
             </a:fld>
             <a:endParaRPr lang="en-SG"/>
           </a:p>
@@ -5107,7 +5110,7 @@
           <a:p>
             <a:fld id="{24E8A18A-5CE4-40C1-8227-52475E3DF71E}" type="datetimeFigureOut">
               <a:rPr lang="en-SG" smtClean="0"/>
-              <a:t>25/2/2026</a:t>
+              <a:t>26/2/2026</a:t>
             </a:fld>
             <a:endParaRPr lang="en-SG"/>
           </a:p>
@@ -5249,7 +5252,7 @@
           <a:p>
             <a:fld id="{24E8A18A-5CE4-40C1-8227-52475E3DF71E}" type="datetimeFigureOut">
               <a:rPr lang="en-SG" smtClean="0"/>
-              <a:t>25/2/2026</a:t>
+              <a:t>26/2/2026</a:t>
             </a:fld>
             <a:endParaRPr lang="en-SG"/>
           </a:p>
@@ -5362,7 +5365,7 @@
           <a:p>
             <a:fld id="{24E8A18A-5CE4-40C1-8227-52475E3DF71E}" type="datetimeFigureOut">
               <a:rPr lang="en-SG" smtClean="0"/>
-              <a:t>25/2/2026</a:t>
+              <a:t>26/2/2026</a:t>
             </a:fld>
             <a:endParaRPr lang="en-SG"/>
           </a:p>
@@ -5675,7 +5678,7 @@
           <a:p>
             <a:fld id="{24E8A18A-5CE4-40C1-8227-52475E3DF71E}" type="datetimeFigureOut">
               <a:rPr lang="en-SG" smtClean="0"/>
-              <a:t>25/2/2026</a:t>
+              <a:t>26/2/2026</a:t>
             </a:fld>
             <a:endParaRPr lang="en-SG"/>
           </a:p>
@@ -5964,7 +5967,7 @@
           <a:p>
             <a:fld id="{24E8A18A-5CE4-40C1-8227-52475E3DF71E}" type="datetimeFigureOut">
               <a:rPr lang="en-SG" smtClean="0"/>
-              <a:t>25/2/2026</a:t>
+              <a:t>26/2/2026</a:t>
             </a:fld>
             <a:endParaRPr lang="en-SG"/>
           </a:p>
@@ -6207,7 +6210,7 @@
           <a:p>
             <a:fld id="{24E8A18A-5CE4-40C1-8227-52475E3DF71E}" type="datetimeFigureOut">
               <a:rPr lang="en-SG" smtClean="0"/>
-              <a:t>25/2/2026</a:t>
+              <a:t>26/2/2026</a:t>
             </a:fld>
             <a:endParaRPr lang="en-SG"/>
           </a:p>
@@ -15249,6 +15252,2937 @@
     <p:extLst>
       <p:ext uri="{BB962C8B-B14F-4D97-AF65-F5344CB8AC3E}">
         <p14:creationId xmlns:p14="http://schemas.microsoft.com/office/powerpoint/2010/main" val="3558820858"/>
+      </p:ext>
+    </p:extLst>
+  </p:cSld>
+  <p:clrMapOvr>
+    <a:masterClrMapping/>
+  </p:clrMapOvr>
+</p:sld>
+</file>
+
+<file path=ppt/slides/slide4.xml><?xml version="1.0" encoding="utf-8"?>
+<p:sld xmlns:a="http://schemas.openxmlformats.org/drawingml/2006/main" xmlns:r="http://schemas.openxmlformats.org/officeDocument/2006/relationships" xmlns:p="http://schemas.openxmlformats.org/presentationml/2006/main">
+  <p:cSld>
+    <p:spTree>
+      <p:nvGrpSpPr>
+        <p:cNvPr id="1" name=""/>
+        <p:cNvGrpSpPr/>
+        <p:nvPr/>
+      </p:nvGrpSpPr>
+      <p:grpSpPr>
+        <a:xfrm>
+          <a:off x="0" y="0"/>
+          <a:ext cx="0" cy="0"/>
+          <a:chOff x="0" y="0"/>
+          <a:chExt cx="0" cy="0"/>
+        </a:xfrm>
+      </p:grpSpPr>
+      <p:pic>
+        <p:nvPicPr>
+          <p:cNvPr id="5" name="Picture 4">
+            <a:extLst>
+              <a:ext uri="{FF2B5EF4-FFF2-40B4-BE49-F238E27FC236}">
+                <a16:creationId xmlns:a16="http://schemas.microsoft.com/office/drawing/2014/main" id="{9AEF860B-89A1-6B3A-95C6-5F4BEA68C5FC}"/>
+              </a:ext>
+            </a:extLst>
+          </p:cNvPr>
+          <p:cNvPicPr>
+            <a:picLocks noChangeAspect="1"/>
+          </p:cNvPicPr>
+          <p:nvPr/>
+        </p:nvPicPr>
+        <p:blipFill>
+          <a:blip r:embed="rId2"/>
+          <a:stretch>
+            <a:fillRect/>
+          </a:stretch>
+        </p:blipFill>
+        <p:spPr>
+          <a:xfrm>
+            <a:off x="1306032" y="787160"/>
+            <a:ext cx="9400954" cy="5240348"/>
+          </a:xfrm>
+          <a:prstGeom prst="rect">
+            <a:avLst/>
+          </a:prstGeom>
+        </p:spPr>
+      </p:pic>
+      <p:cxnSp>
+        <p:nvCxnSpPr>
+          <p:cNvPr id="6" name="Straight Arrow Connector 5">
+            <a:extLst>
+              <a:ext uri="{FF2B5EF4-FFF2-40B4-BE49-F238E27FC236}">
+                <a16:creationId xmlns:a16="http://schemas.microsoft.com/office/drawing/2014/main" id="{23EA8787-EB1E-9346-BF2C-93310596E088}"/>
+              </a:ext>
+            </a:extLst>
+          </p:cNvPr>
+          <p:cNvCxnSpPr>
+            <a:cxnSpLocks/>
+          </p:cNvCxnSpPr>
+          <p:nvPr/>
+        </p:nvCxnSpPr>
+        <p:spPr>
+          <a:xfrm>
+            <a:off x="1755648" y="658368"/>
+            <a:ext cx="0" cy="383530"/>
+          </a:xfrm>
+          <a:prstGeom prst="straightConnector1">
+            <a:avLst/>
+          </a:prstGeom>
+          <a:ln>
+            <a:solidFill>
+              <a:srgbClr val="C00000"/>
+            </a:solidFill>
+            <a:prstDash val="sysDash"/>
+            <a:tailEnd type="triangle"/>
+          </a:ln>
+        </p:spPr>
+        <p:style>
+          <a:lnRef idx="2">
+            <a:schemeClr val="accent1"/>
+          </a:lnRef>
+          <a:fillRef idx="0">
+            <a:schemeClr val="accent1"/>
+          </a:fillRef>
+          <a:effectRef idx="1">
+            <a:schemeClr val="accent1"/>
+          </a:effectRef>
+          <a:fontRef idx="minor">
+            <a:schemeClr val="tx1"/>
+          </a:fontRef>
+        </p:style>
+      </p:cxnSp>
+      <p:sp>
+        <p:nvSpPr>
+          <p:cNvPr id="7" name="TextBox 6">
+            <a:extLst>
+              <a:ext uri="{FF2B5EF4-FFF2-40B4-BE49-F238E27FC236}">
+                <a16:creationId xmlns:a16="http://schemas.microsoft.com/office/drawing/2014/main" id="{42B6E66E-7652-F43E-1976-D5EBD338050C}"/>
+              </a:ext>
+            </a:extLst>
+          </p:cNvPr>
+          <p:cNvSpPr txBox="1"/>
+          <p:nvPr/>
+        </p:nvSpPr>
+        <p:spPr>
+          <a:xfrm>
+            <a:off x="1203534" y="261099"/>
+            <a:ext cx="1503090" cy="461665"/>
+          </a:xfrm>
+          <a:prstGeom prst="rect">
+            <a:avLst/>
+          </a:prstGeom>
+          <a:noFill/>
+        </p:spPr>
+        <p:txBody>
+          <a:bodyPr wrap="square" rtlCol="0">
+            <a:spAutoFit/>
+          </a:bodyPr>
+          <a:lstStyle/>
+          <a:p>
+            <a:r>
+              <a:rPr lang="en-US" sz="1200" b="1" dirty="0">
+                <a:solidFill>
+                  <a:srgbClr val="C00000"/>
+                </a:solidFill>
+              </a:rPr>
+              <a:t> PLC Connection Protocol Selection</a:t>
+            </a:r>
+            <a:endParaRPr lang="en-SG" sz="1200" b="1" dirty="0">
+              <a:solidFill>
+                <a:srgbClr val="C00000"/>
+              </a:solidFill>
+            </a:endParaRPr>
+          </a:p>
+        </p:txBody>
+      </p:sp>
+      <p:sp>
+        <p:nvSpPr>
+          <p:cNvPr id="10" name="TextBox 9">
+            <a:extLst>
+              <a:ext uri="{FF2B5EF4-FFF2-40B4-BE49-F238E27FC236}">
+                <a16:creationId xmlns:a16="http://schemas.microsoft.com/office/drawing/2014/main" id="{C5F6C0DF-B8BA-99B5-FA05-1F024EDBA19B}"/>
+              </a:ext>
+            </a:extLst>
+          </p:cNvPr>
+          <p:cNvSpPr txBox="1"/>
+          <p:nvPr/>
+        </p:nvSpPr>
+        <p:spPr>
+          <a:xfrm>
+            <a:off x="2782398" y="254458"/>
+            <a:ext cx="1606722" cy="461665"/>
+          </a:xfrm>
+          <a:prstGeom prst="rect">
+            <a:avLst/>
+          </a:prstGeom>
+          <a:noFill/>
+        </p:spPr>
+        <p:txBody>
+          <a:bodyPr wrap="square" rtlCol="0">
+            <a:spAutoFit/>
+          </a:bodyPr>
+          <a:lstStyle/>
+          <a:p>
+            <a:r>
+              <a:rPr lang="en-US" sz="1200" b="1" dirty="0">
+                <a:solidFill>
+                  <a:srgbClr val="C00000"/>
+                </a:solidFill>
+              </a:rPr>
+              <a:t>Current PLC Connection State</a:t>
+            </a:r>
+            <a:endParaRPr lang="en-SG" sz="1200" b="1" dirty="0">
+              <a:solidFill>
+                <a:srgbClr val="C00000"/>
+              </a:solidFill>
+            </a:endParaRPr>
+          </a:p>
+        </p:txBody>
+      </p:sp>
+      <p:cxnSp>
+        <p:nvCxnSpPr>
+          <p:cNvPr id="11" name="Straight Arrow Connector 10">
+            <a:extLst>
+              <a:ext uri="{FF2B5EF4-FFF2-40B4-BE49-F238E27FC236}">
+                <a16:creationId xmlns:a16="http://schemas.microsoft.com/office/drawing/2014/main" id="{6338BA28-41EC-A6E4-94A4-B7AE218E3C44}"/>
+              </a:ext>
+            </a:extLst>
+          </p:cNvPr>
+          <p:cNvCxnSpPr>
+            <a:cxnSpLocks/>
+          </p:cNvCxnSpPr>
+          <p:nvPr/>
+        </p:nvCxnSpPr>
+        <p:spPr>
+          <a:xfrm>
+            <a:off x="2959608" y="655061"/>
+            <a:ext cx="0" cy="383530"/>
+          </a:xfrm>
+          <a:prstGeom prst="straightConnector1">
+            <a:avLst/>
+          </a:prstGeom>
+          <a:ln>
+            <a:solidFill>
+              <a:srgbClr val="C00000"/>
+            </a:solidFill>
+            <a:prstDash val="sysDash"/>
+            <a:tailEnd type="triangle"/>
+          </a:ln>
+        </p:spPr>
+        <p:style>
+          <a:lnRef idx="2">
+            <a:schemeClr val="accent1"/>
+          </a:lnRef>
+          <a:fillRef idx="0">
+            <a:schemeClr val="accent1"/>
+          </a:fillRef>
+          <a:effectRef idx="1">
+            <a:schemeClr val="accent1"/>
+          </a:effectRef>
+          <a:fontRef idx="minor">
+            <a:schemeClr val="tx1"/>
+          </a:fontRef>
+        </p:style>
+      </p:cxnSp>
+      <p:cxnSp>
+        <p:nvCxnSpPr>
+          <p:cNvPr id="12" name="Straight Arrow Connector 11">
+            <a:extLst>
+              <a:ext uri="{FF2B5EF4-FFF2-40B4-BE49-F238E27FC236}">
+                <a16:creationId xmlns:a16="http://schemas.microsoft.com/office/drawing/2014/main" id="{8F94A51A-9919-BBE5-FF3C-9A392D776300}"/>
+              </a:ext>
+            </a:extLst>
+          </p:cNvPr>
+          <p:cNvCxnSpPr>
+            <a:cxnSpLocks/>
+          </p:cNvCxnSpPr>
+          <p:nvPr/>
+        </p:nvCxnSpPr>
+        <p:spPr>
+          <a:xfrm>
+            <a:off x="5041392" y="655061"/>
+            <a:ext cx="0" cy="670819"/>
+          </a:xfrm>
+          <a:prstGeom prst="straightConnector1">
+            <a:avLst/>
+          </a:prstGeom>
+          <a:ln>
+            <a:solidFill>
+              <a:srgbClr val="C00000"/>
+            </a:solidFill>
+            <a:prstDash val="sysDash"/>
+            <a:tailEnd type="triangle"/>
+          </a:ln>
+        </p:spPr>
+        <p:style>
+          <a:lnRef idx="2">
+            <a:schemeClr val="accent1"/>
+          </a:lnRef>
+          <a:fillRef idx="0">
+            <a:schemeClr val="accent1"/>
+          </a:fillRef>
+          <a:effectRef idx="1">
+            <a:schemeClr val="accent1"/>
+          </a:effectRef>
+          <a:fontRef idx="minor">
+            <a:schemeClr val="tx1"/>
+          </a:fontRef>
+        </p:style>
+      </p:cxnSp>
+      <p:sp>
+        <p:nvSpPr>
+          <p:cNvPr id="14" name="TextBox 13">
+            <a:extLst>
+              <a:ext uri="{FF2B5EF4-FFF2-40B4-BE49-F238E27FC236}">
+                <a16:creationId xmlns:a16="http://schemas.microsoft.com/office/drawing/2014/main" id="{26C4FA61-C2B9-C028-0074-EBF95C9005DB}"/>
+              </a:ext>
+            </a:extLst>
+          </p:cNvPr>
+          <p:cNvSpPr txBox="1"/>
+          <p:nvPr/>
+        </p:nvSpPr>
+        <p:spPr>
+          <a:xfrm>
+            <a:off x="4626650" y="233899"/>
+            <a:ext cx="1606722" cy="461665"/>
+          </a:xfrm>
+          <a:prstGeom prst="rect">
+            <a:avLst/>
+          </a:prstGeom>
+          <a:noFill/>
+        </p:spPr>
+        <p:txBody>
+          <a:bodyPr wrap="square" rtlCol="0">
+            <a:spAutoFit/>
+          </a:bodyPr>
+          <a:lstStyle/>
+          <a:p>
+            <a:r>
+              <a:rPr lang="en-US" sz="1200" b="1" dirty="0">
+                <a:solidFill>
+                  <a:srgbClr val="C00000"/>
+                </a:solidFill>
+              </a:rPr>
+              <a:t>Cube Position X-Y Projection display</a:t>
+            </a:r>
+            <a:endParaRPr lang="en-SG" sz="1200" b="1" dirty="0">
+              <a:solidFill>
+                <a:srgbClr val="C00000"/>
+              </a:solidFill>
+            </a:endParaRPr>
+          </a:p>
+        </p:txBody>
+      </p:sp>
+      <p:sp>
+        <p:nvSpPr>
+          <p:cNvPr id="15" name="TextBox 14">
+            <a:extLst>
+              <a:ext uri="{FF2B5EF4-FFF2-40B4-BE49-F238E27FC236}">
+                <a16:creationId xmlns:a16="http://schemas.microsoft.com/office/drawing/2014/main" id="{32520E3E-1C6B-26B3-453D-E37C576B95DE}"/>
+              </a:ext>
+            </a:extLst>
+          </p:cNvPr>
+          <p:cNvSpPr txBox="1"/>
+          <p:nvPr/>
+        </p:nvSpPr>
+        <p:spPr>
+          <a:xfrm>
+            <a:off x="6973573" y="233897"/>
+            <a:ext cx="1793999" cy="461665"/>
+          </a:xfrm>
+          <a:prstGeom prst="rect">
+            <a:avLst/>
+          </a:prstGeom>
+          <a:noFill/>
+        </p:spPr>
+        <p:txBody>
+          <a:bodyPr wrap="square" rtlCol="0">
+            <a:spAutoFit/>
+          </a:bodyPr>
+          <a:lstStyle/>
+          <a:p>
+            <a:r>
+              <a:rPr lang="en-US" sz="1200" b="1" dirty="0">
+                <a:solidFill>
+                  <a:srgbClr val="C00000"/>
+                </a:solidFill>
+              </a:rPr>
+              <a:t>Joint sensor and motor angle display panel </a:t>
+            </a:r>
+            <a:endParaRPr lang="en-SG" sz="1200" b="1" dirty="0">
+              <a:solidFill>
+                <a:srgbClr val="C00000"/>
+              </a:solidFill>
+            </a:endParaRPr>
+          </a:p>
+        </p:txBody>
+      </p:sp>
+      <p:cxnSp>
+        <p:nvCxnSpPr>
+          <p:cNvPr id="16" name="Straight Arrow Connector 15">
+            <a:extLst>
+              <a:ext uri="{FF2B5EF4-FFF2-40B4-BE49-F238E27FC236}">
+                <a16:creationId xmlns:a16="http://schemas.microsoft.com/office/drawing/2014/main" id="{72A730D6-BF3D-E1B2-E0B6-B28E5D794949}"/>
+              </a:ext>
+            </a:extLst>
+          </p:cNvPr>
+          <p:cNvCxnSpPr>
+            <a:cxnSpLocks/>
+          </p:cNvCxnSpPr>
+          <p:nvPr/>
+        </p:nvCxnSpPr>
+        <p:spPr>
+          <a:xfrm>
+            <a:off x="7607808" y="703181"/>
+            <a:ext cx="0" cy="670819"/>
+          </a:xfrm>
+          <a:prstGeom prst="straightConnector1">
+            <a:avLst/>
+          </a:prstGeom>
+          <a:ln>
+            <a:solidFill>
+              <a:srgbClr val="C00000"/>
+            </a:solidFill>
+            <a:prstDash val="sysDash"/>
+            <a:tailEnd type="triangle"/>
+          </a:ln>
+        </p:spPr>
+        <p:style>
+          <a:lnRef idx="2">
+            <a:schemeClr val="accent1"/>
+          </a:lnRef>
+          <a:fillRef idx="0">
+            <a:schemeClr val="accent1"/>
+          </a:fillRef>
+          <a:effectRef idx="1">
+            <a:schemeClr val="accent1"/>
+          </a:effectRef>
+          <a:fontRef idx="minor">
+            <a:schemeClr val="tx1"/>
+          </a:fontRef>
+        </p:style>
+      </p:cxnSp>
+      <p:cxnSp>
+        <p:nvCxnSpPr>
+          <p:cNvPr id="17" name="Straight Arrow Connector 16">
+            <a:extLst>
+              <a:ext uri="{FF2B5EF4-FFF2-40B4-BE49-F238E27FC236}">
+                <a16:creationId xmlns:a16="http://schemas.microsoft.com/office/drawing/2014/main" id="{AB2A9E5F-D0E9-B8B1-7C69-F4F681925A44}"/>
+              </a:ext>
+            </a:extLst>
+          </p:cNvPr>
+          <p:cNvCxnSpPr>
+            <a:cxnSpLocks/>
+          </p:cNvCxnSpPr>
+          <p:nvPr/>
+        </p:nvCxnSpPr>
+        <p:spPr>
+          <a:xfrm>
+            <a:off x="9927336" y="655060"/>
+            <a:ext cx="0" cy="2463044"/>
+          </a:xfrm>
+          <a:prstGeom prst="straightConnector1">
+            <a:avLst/>
+          </a:prstGeom>
+          <a:ln>
+            <a:solidFill>
+              <a:srgbClr val="C00000"/>
+            </a:solidFill>
+            <a:prstDash val="sysDash"/>
+            <a:tailEnd type="triangle"/>
+          </a:ln>
+        </p:spPr>
+        <p:style>
+          <a:lnRef idx="2">
+            <a:schemeClr val="accent1"/>
+          </a:lnRef>
+          <a:fillRef idx="0">
+            <a:schemeClr val="accent1"/>
+          </a:fillRef>
+          <a:effectRef idx="1">
+            <a:schemeClr val="accent1"/>
+          </a:effectRef>
+          <a:fontRef idx="minor">
+            <a:schemeClr val="tx1"/>
+          </a:fontRef>
+        </p:style>
+      </p:cxnSp>
+      <p:sp>
+        <p:nvSpPr>
+          <p:cNvPr id="19" name="TextBox 18">
+            <a:extLst>
+              <a:ext uri="{FF2B5EF4-FFF2-40B4-BE49-F238E27FC236}">
+                <a16:creationId xmlns:a16="http://schemas.microsoft.com/office/drawing/2014/main" id="{BB80A5A1-0C75-AA3B-0FC7-C5BD22C0CFE1}"/>
+              </a:ext>
+            </a:extLst>
+          </p:cNvPr>
+          <p:cNvSpPr txBox="1"/>
+          <p:nvPr/>
+        </p:nvSpPr>
+        <p:spPr>
+          <a:xfrm>
+            <a:off x="9200830" y="233898"/>
+            <a:ext cx="1453012" cy="461665"/>
+          </a:xfrm>
+          <a:prstGeom prst="rect">
+            <a:avLst/>
+          </a:prstGeom>
+          <a:noFill/>
+        </p:spPr>
+        <p:txBody>
+          <a:bodyPr wrap="square" rtlCol="0">
+            <a:spAutoFit/>
+          </a:bodyPr>
+          <a:lstStyle/>
+          <a:p>
+            <a:r>
+              <a:rPr lang="en-US" sz="1200" b="1" dirty="0">
+                <a:solidFill>
+                  <a:srgbClr val="C00000"/>
+                </a:solidFill>
+              </a:rPr>
+              <a:t>Servo motor control slider </a:t>
+            </a:r>
+            <a:endParaRPr lang="en-SG" sz="1200" b="1" dirty="0">
+              <a:solidFill>
+                <a:srgbClr val="C00000"/>
+              </a:solidFill>
+            </a:endParaRPr>
+          </a:p>
+        </p:txBody>
+      </p:sp>
+      <p:cxnSp>
+        <p:nvCxnSpPr>
+          <p:cNvPr id="20" name="Straight Arrow Connector 19">
+            <a:extLst>
+              <a:ext uri="{FF2B5EF4-FFF2-40B4-BE49-F238E27FC236}">
+                <a16:creationId xmlns:a16="http://schemas.microsoft.com/office/drawing/2014/main" id="{376DA94B-F54B-60DC-C108-9A81481A976C}"/>
+              </a:ext>
+            </a:extLst>
+          </p:cNvPr>
+          <p:cNvCxnSpPr>
+            <a:cxnSpLocks/>
+          </p:cNvCxnSpPr>
+          <p:nvPr/>
+        </p:nvCxnSpPr>
+        <p:spPr>
+          <a:xfrm flipV="1">
+            <a:off x="6452616" y="4769602"/>
+            <a:ext cx="0" cy="1439174"/>
+          </a:xfrm>
+          <a:prstGeom prst="straightConnector1">
+            <a:avLst/>
+          </a:prstGeom>
+          <a:ln>
+            <a:solidFill>
+              <a:srgbClr val="C00000"/>
+            </a:solidFill>
+            <a:prstDash val="sysDash"/>
+            <a:tailEnd type="triangle"/>
+          </a:ln>
+        </p:spPr>
+        <p:style>
+          <a:lnRef idx="2">
+            <a:schemeClr val="accent1"/>
+          </a:lnRef>
+          <a:fillRef idx="0">
+            <a:schemeClr val="accent1"/>
+          </a:fillRef>
+          <a:effectRef idx="1">
+            <a:schemeClr val="accent1"/>
+          </a:effectRef>
+          <a:fontRef idx="minor">
+            <a:schemeClr val="tx1"/>
+          </a:fontRef>
+        </p:style>
+      </p:cxnSp>
+      <p:sp>
+        <p:nvSpPr>
+          <p:cNvPr id="22" name="TextBox 21">
+            <a:extLst>
+              <a:ext uri="{FF2B5EF4-FFF2-40B4-BE49-F238E27FC236}">
+                <a16:creationId xmlns:a16="http://schemas.microsoft.com/office/drawing/2014/main" id="{6C130B1E-C056-1CD9-839C-D07A2444AB60}"/>
+              </a:ext>
+            </a:extLst>
+          </p:cNvPr>
+          <p:cNvSpPr txBox="1"/>
+          <p:nvPr/>
+        </p:nvSpPr>
+        <p:spPr>
+          <a:xfrm>
+            <a:off x="6138440" y="6163056"/>
+            <a:ext cx="1935712" cy="461665"/>
+          </a:xfrm>
+          <a:prstGeom prst="rect">
+            <a:avLst/>
+          </a:prstGeom>
+          <a:noFill/>
+        </p:spPr>
+        <p:txBody>
+          <a:bodyPr wrap="square" rtlCol="0">
+            <a:spAutoFit/>
+          </a:bodyPr>
+          <a:lstStyle/>
+          <a:p>
+            <a:r>
+              <a:rPr lang="en-US" sz="1200" b="1" dirty="0">
+                <a:solidFill>
+                  <a:srgbClr val="C00000"/>
+                </a:solidFill>
+              </a:rPr>
+              <a:t>Current PLC Sensor Angle data [Green]</a:t>
+            </a:r>
+            <a:endParaRPr lang="en-SG" sz="1200" b="1" dirty="0">
+              <a:solidFill>
+                <a:srgbClr val="C00000"/>
+              </a:solidFill>
+            </a:endParaRPr>
+          </a:p>
+        </p:txBody>
+      </p:sp>
+      <p:cxnSp>
+        <p:nvCxnSpPr>
+          <p:cNvPr id="24" name="Straight Arrow Connector 23">
+            <a:extLst>
+              <a:ext uri="{FF2B5EF4-FFF2-40B4-BE49-F238E27FC236}">
+                <a16:creationId xmlns:a16="http://schemas.microsoft.com/office/drawing/2014/main" id="{8D9F6816-D589-3A02-4608-3FF893C3F413}"/>
+              </a:ext>
+            </a:extLst>
+          </p:cNvPr>
+          <p:cNvCxnSpPr>
+            <a:cxnSpLocks/>
+          </p:cNvCxnSpPr>
+          <p:nvPr/>
+        </p:nvCxnSpPr>
+        <p:spPr>
+          <a:xfrm flipV="1">
+            <a:off x="10003536" y="4588334"/>
+            <a:ext cx="0" cy="1574722"/>
+          </a:xfrm>
+          <a:prstGeom prst="straightConnector1">
+            <a:avLst/>
+          </a:prstGeom>
+          <a:ln>
+            <a:solidFill>
+              <a:srgbClr val="C00000"/>
+            </a:solidFill>
+            <a:prstDash val="sysDash"/>
+            <a:tailEnd type="triangle"/>
+          </a:ln>
+        </p:spPr>
+        <p:style>
+          <a:lnRef idx="2">
+            <a:schemeClr val="accent1"/>
+          </a:lnRef>
+          <a:fillRef idx="0">
+            <a:schemeClr val="accent1"/>
+          </a:fillRef>
+          <a:effectRef idx="1">
+            <a:schemeClr val="accent1"/>
+          </a:effectRef>
+          <a:fontRef idx="minor">
+            <a:schemeClr val="tx1"/>
+          </a:fontRef>
+        </p:style>
+      </p:cxnSp>
+      <p:sp>
+        <p:nvSpPr>
+          <p:cNvPr id="26" name="TextBox 25">
+            <a:extLst>
+              <a:ext uri="{FF2B5EF4-FFF2-40B4-BE49-F238E27FC236}">
+                <a16:creationId xmlns:a16="http://schemas.microsoft.com/office/drawing/2014/main" id="{59878D25-0514-D9BF-3659-F559022734A3}"/>
+              </a:ext>
+            </a:extLst>
+          </p:cNvPr>
+          <p:cNvSpPr txBox="1"/>
+          <p:nvPr/>
+        </p:nvSpPr>
+        <p:spPr>
+          <a:xfrm>
+            <a:off x="8388328" y="6163056"/>
+            <a:ext cx="2179088" cy="461665"/>
+          </a:xfrm>
+          <a:prstGeom prst="rect">
+            <a:avLst/>
+          </a:prstGeom>
+          <a:noFill/>
+        </p:spPr>
+        <p:txBody>
+          <a:bodyPr wrap="square" rtlCol="0">
+            <a:spAutoFit/>
+          </a:bodyPr>
+          <a:lstStyle/>
+          <a:p>
+            <a:r>
+              <a:rPr lang="en-US" sz="1200" b="1" dirty="0">
+                <a:solidFill>
+                  <a:srgbClr val="C00000"/>
+                </a:solidFill>
+              </a:rPr>
+              <a:t>Current PLC  Motor Target Angle data [Yellow ]</a:t>
+            </a:r>
+            <a:endParaRPr lang="en-SG" sz="1200" b="1" dirty="0">
+              <a:solidFill>
+                <a:srgbClr val="C00000"/>
+              </a:solidFill>
+            </a:endParaRPr>
+          </a:p>
+        </p:txBody>
+      </p:sp>
+      <p:cxnSp>
+        <p:nvCxnSpPr>
+          <p:cNvPr id="27" name="Straight Arrow Connector 26">
+            <a:extLst>
+              <a:ext uri="{FF2B5EF4-FFF2-40B4-BE49-F238E27FC236}">
+                <a16:creationId xmlns:a16="http://schemas.microsoft.com/office/drawing/2014/main" id="{84D50007-6A78-72B4-2078-4B5C41F037D5}"/>
+              </a:ext>
+            </a:extLst>
+          </p:cNvPr>
+          <p:cNvCxnSpPr>
+            <a:cxnSpLocks/>
+          </p:cNvCxnSpPr>
+          <p:nvPr/>
+        </p:nvCxnSpPr>
+        <p:spPr>
+          <a:xfrm>
+            <a:off x="3678936" y="3118104"/>
+            <a:ext cx="0" cy="806684"/>
+          </a:xfrm>
+          <a:prstGeom prst="straightConnector1">
+            <a:avLst/>
+          </a:prstGeom>
+          <a:ln>
+            <a:solidFill>
+              <a:srgbClr val="C00000"/>
+            </a:solidFill>
+            <a:prstDash val="sysDash"/>
+            <a:tailEnd type="triangle"/>
+          </a:ln>
+        </p:spPr>
+        <p:style>
+          <a:lnRef idx="2">
+            <a:schemeClr val="accent1"/>
+          </a:lnRef>
+          <a:fillRef idx="0">
+            <a:schemeClr val="accent1"/>
+          </a:fillRef>
+          <a:effectRef idx="1">
+            <a:schemeClr val="accent1"/>
+          </a:effectRef>
+          <a:fontRef idx="minor">
+            <a:schemeClr val="tx1"/>
+          </a:fontRef>
+        </p:style>
+      </p:cxnSp>
+      <p:sp>
+        <p:nvSpPr>
+          <p:cNvPr id="31" name="TextBox 30">
+            <a:extLst>
+              <a:ext uri="{FF2B5EF4-FFF2-40B4-BE49-F238E27FC236}">
+                <a16:creationId xmlns:a16="http://schemas.microsoft.com/office/drawing/2014/main" id="{E22C8725-CB38-59DF-19E7-43937435ED05}"/>
+              </a:ext>
+            </a:extLst>
+          </p:cNvPr>
+          <p:cNvSpPr txBox="1"/>
+          <p:nvPr/>
+        </p:nvSpPr>
+        <p:spPr>
+          <a:xfrm>
+            <a:off x="3540039" y="2841105"/>
+            <a:ext cx="1606722" cy="276999"/>
+          </a:xfrm>
+          <a:prstGeom prst="rect">
+            <a:avLst/>
+          </a:prstGeom>
+          <a:noFill/>
+        </p:spPr>
+        <p:txBody>
+          <a:bodyPr wrap="square" rtlCol="0">
+            <a:spAutoFit/>
+          </a:bodyPr>
+          <a:lstStyle/>
+          <a:p>
+            <a:r>
+              <a:rPr lang="en-US" sz="1200" b="1" dirty="0">
+                <a:solidFill>
+                  <a:srgbClr val="C00000"/>
+                </a:solidFill>
+              </a:rPr>
+              <a:t>Cube Position</a:t>
+            </a:r>
+            <a:endParaRPr lang="en-SG" sz="1200" b="1" dirty="0">
+              <a:solidFill>
+                <a:srgbClr val="C00000"/>
+              </a:solidFill>
+            </a:endParaRPr>
+          </a:p>
+        </p:txBody>
+      </p:sp>
+      <p:cxnSp>
+        <p:nvCxnSpPr>
+          <p:cNvPr id="32" name="Straight Arrow Connector 31">
+            <a:extLst>
+              <a:ext uri="{FF2B5EF4-FFF2-40B4-BE49-F238E27FC236}">
+                <a16:creationId xmlns:a16="http://schemas.microsoft.com/office/drawing/2014/main" id="{7CEC2439-B5A1-0741-5743-C912D1590CD6}"/>
+              </a:ext>
+            </a:extLst>
+          </p:cNvPr>
+          <p:cNvCxnSpPr>
+            <a:cxnSpLocks/>
+          </p:cNvCxnSpPr>
+          <p:nvPr/>
+        </p:nvCxnSpPr>
+        <p:spPr>
+          <a:xfrm flipV="1">
+            <a:off x="1755648" y="5735906"/>
+            <a:ext cx="0" cy="427150"/>
+          </a:xfrm>
+          <a:prstGeom prst="straightConnector1">
+            <a:avLst/>
+          </a:prstGeom>
+          <a:ln>
+            <a:solidFill>
+              <a:srgbClr val="C00000"/>
+            </a:solidFill>
+            <a:prstDash val="sysDash"/>
+            <a:tailEnd type="triangle"/>
+          </a:ln>
+        </p:spPr>
+        <p:style>
+          <a:lnRef idx="2">
+            <a:schemeClr val="accent1"/>
+          </a:lnRef>
+          <a:fillRef idx="0">
+            <a:schemeClr val="accent1"/>
+          </a:fillRef>
+          <a:effectRef idx="1">
+            <a:schemeClr val="accent1"/>
+          </a:effectRef>
+          <a:fontRef idx="minor">
+            <a:schemeClr val="tx1"/>
+          </a:fontRef>
+        </p:style>
+      </p:cxnSp>
+      <p:sp>
+        <p:nvSpPr>
+          <p:cNvPr id="34" name="TextBox 33">
+            <a:extLst>
+              <a:ext uri="{FF2B5EF4-FFF2-40B4-BE49-F238E27FC236}">
+                <a16:creationId xmlns:a16="http://schemas.microsoft.com/office/drawing/2014/main" id="{C8F5F257-527F-0893-3C04-F8A4047DA3B2}"/>
+              </a:ext>
+            </a:extLst>
+          </p:cNvPr>
+          <p:cNvSpPr txBox="1"/>
+          <p:nvPr/>
+        </p:nvSpPr>
+        <p:spPr>
+          <a:xfrm>
+            <a:off x="1203534" y="6199632"/>
+            <a:ext cx="1091608" cy="276999"/>
+          </a:xfrm>
+          <a:prstGeom prst="rect">
+            <a:avLst/>
+          </a:prstGeom>
+          <a:noFill/>
+        </p:spPr>
+        <p:txBody>
+          <a:bodyPr wrap="square" rtlCol="0">
+            <a:spAutoFit/>
+          </a:bodyPr>
+          <a:lstStyle/>
+          <a:p>
+            <a:r>
+              <a:rPr lang="en-US" sz="1200" b="1" dirty="0">
+                <a:solidFill>
+                  <a:srgbClr val="C00000"/>
+                </a:solidFill>
+              </a:rPr>
+              <a:t>Reset Button</a:t>
+            </a:r>
+            <a:endParaRPr lang="en-SG" sz="1200" b="1" dirty="0">
+              <a:solidFill>
+                <a:srgbClr val="C00000"/>
+              </a:solidFill>
+            </a:endParaRPr>
+          </a:p>
+        </p:txBody>
+      </p:sp>
+      <p:cxnSp>
+        <p:nvCxnSpPr>
+          <p:cNvPr id="35" name="Straight Arrow Connector 34">
+            <a:extLst>
+              <a:ext uri="{FF2B5EF4-FFF2-40B4-BE49-F238E27FC236}">
+                <a16:creationId xmlns:a16="http://schemas.microsoft.com/office/drawing/2014/main" id="{1CA1021A-F1A9-3C8E-2FFC-DB46EEA82D23}"/>
+              </a:ext>
+            </a:extLst>
+          </p:cNvPr>
+          <p:cNvCxnSpPr>
+            <a:cxnSpLocks/>
+          </p:cNvCxnSpPr>
+          <p:nvPr/>
+        </p:nvCxnSpPr>
+        <p:spPr>
+          <a:xfrm flipV="1">
+            <a:off x="2959608" y="5734470"/>
+            <a:ext cx="0" cy="427150"/>
+          </a:xfrm>
+          <a:prstGeom prst="straightConnector1">
+            <a:avLst/>
+          </a:prstGeom>
+          <a:ln>
+            <a:solidFill>
+              <a:srgbClr val="C00000"/>
+            </a:solidFill>
+            <a:prstDash val="sysDash"/>
+            <a:tailEnd type="triangle"/>
+          </a:ln>
+        </p:spPr>
+        <p:style>
+          <a:lnRef idx="2">
+            <a:schemeClr val="accent1"/>
+          </a:lnRef>
+          <a:fillRef idx="0">
+            <a:schemeClr val="accent1"/>
+          </a:fillRef>
+          <a:effectRef idx="1">
+            <a:schemeClr val="accent1"/>
+          </a:effectRef>
+          <a:fontRef idx="minor">
+            <a:schemeClr val="tx1"/>
+          </a:fontRef>
+        </p:style>
+      </p:cxnSp>
+      <p:sp>
+        <p:nvSpPr>
+          <p:cNvPr id="36" name="TextBox 35">
+            <a:extLst>
+              <a:ext uri="{FF2B5EF4-FFF2-40B4-BE49-F238E27FC236}">
+                <a16:creationId xmlns:a16="http://schemas.microsoft.com/office/drawing/2014/main" id="{78B0FE01-33AC-8CC3-A695-09A90EE73C78}"/>
+              </a:ext>
+            </a:extLst>
+          </p:cNvPr>
+          <p:cNvSpPr txBox="1"/>
+          <p:nvPr/>
+        </p:nvSpPr>
+        <p:spPr>
+          <a:xfrm>
+            <a:off x="2706624" y="6199632"/>
+            <a:ext cx="2505456" cy="461665"/>
+          </a:xfrm>
+          <a:prstGeom prst="rect">
+            <a:avLst/>
+          </a:prstGeom>
+          <a:noFill/>
+        </p:spPr>
+        <p:txBody>
+          <a:bodyPr wrap="square" rtlCol="0">
+            <a:spAutoFit/>
+          </a:bodyPr>
+          <a:lstStyle/>
+          <a:p>
+            <a:r>
+              <a:rPr lang="en-US" sz="1200" b="1" dirty="0">
+                <a:solidFill>
+                  <a:srgbClr val="C00000"/>
+                </a:solidFill>
+              </a:rPr>
+              <a:t>Robot Arm Action Sequence load and execution control </a:t>
+            </a:r>
+            <a:endParaRPr lang="en-SG" sz="1200" b="1" dirty="0">
+              <a:solidFill>
+                <a:srgbClr val="C00000"/>
+              </a:solidFill>
+            </a:endParaRPr>
+          </a:p>
+        </p:txBody>
+      </p:sp>
+      <p:cxnSp>
+        <p:nvCxnSpPr>
+          <p:cNvPr id="37" name="Straight Arrow Connector 36">
+            <a:extLst>
+              <a:ext uri="{FF2B5EF4-FFF2-40B4-BE49-F238E27FC236}">
+                <a16:creationId xmlns:a16="http://schemas.microsoft.com/office/drawing/2014/main" id="{5909ACEA-35B4-9CE1-6345-920153FF9D36}"/>
+              </a:ext>
+            </a:extLst>
+          </p:cNvPr>
+          <p:cNvCxnSpPr>
+            <a:cxnSpLocks/>
+          </p:cNvCxnSpPr>
+          <p:nvPr/>
+        </p:nvCxnSpPr>
+        <p:spPr>
+          <a:xfrm flipV="1">
+            <a:off x="3678936" y="5734470"/>
+            <a:ext cx="0" cy="427150"/>
+          </a:xfrm>
+          <a:prstGeom prst="straightConnector1">
+            <a:avLst/>
+          </a:prstGeom>
+          <a:ln>
+            <a:solidFill>
+              <a:srgbClr val="C00000"/>
+            </a:solidFill>
+            <a:prstDash val="sysDash"/>
+            <a:tailEnd type="triangle"/>
+          </a:ln>
+        </p:spPr>
+        <p:style>
+          <a:lnRef idx="2">
+            <a:schemeClr val="accent1"/>
+          </a:lnRef>
+          <a:fillRef idx="0">
+            <a:schemeClr val="accent1"/>
+          </a:fillRef>
+          <a:effectRef idx="1">
+            <a:schemeClr val="accent1"/>
+          </a:effectRef>
+          <a:fontRef idx="minor">
+            <a:schemeClr val="tx1"/>
+          </a:fontRef>
+        </p:style>
+      </p:cxnSp>
+    </p:spTree>
+    <p:extLst>
+      <p:ext uri="{BB962C8B-B14F-4D97-AF65-F5344CB8AC3E}">
+        <p14:creationId xmlns:p14="http://schemas.microsoft.com/office/powerpoint/2010/main" val="1644317790"/>
+      </p:ext>
+    </p:extLst>
+  </p:cSld>
+  <p:clrMapOvr>
+    <a:masterClrMapping/>
+  </p:clrMapOvr>
+</p:sld>
+</file>
+
+<file path=ppt/slides/slide5.xml><?xml version="1.0" encoding="utf-8"?>
+<p:sld xmlns:a="http://schemas.openxmlformats.org/drawingml/2006/main" xmlns:r="http://schemas.openxmlformats.org/officeDocument/2006/relationships" xmlns:p="http://schemas.openxmlformats.org/presentationml/2006/main">
+  <p:cSld>
+    <p:spTree>
+      <p:nvGrpSpPr>
+        <p:cNvPr id="1" name=""/>
+        <p:cNvGrpSpPr/>
+        <p:nvPr/>
+      </p:nvGrpSpPr>
+      <p:grpSpPr>
+        <a:xfrm>
+          <a:off x="0" y="0"/>
+          <a:ext cx="0" cy="0"/>
+          <a:chOff x="0" y="0"/>
+          <a:chExt cx="0" cy="0"/>
+        </a:xfrm>
+      </p:grpSpPr>
+      <p:pic>
+        <p:nvPicPr>
+          <p:cNvPr id="5" name="Picture 4">
+            <a:extLst>
+              <a:ext uri="{FF2B5EF4-FFF2-40B4-BE49-F238E27FC236}">
+                <a16:creationId xmlns:a16="http://schemas.microsoft.com/office/drawing/2014/main" id="{C8B0A14D-4E0D-83AE-C2CF-46217B3EA4E8}"/>
+              </a:ext>
+            </a:extLst>
+          </p:cNvPr>
+          <p:cNvPicPr>
+            <a:picLocks noChangeAspect="1"/>
+          </p:cNvPicPr>
+          <p:nvPr/>
+        </p:nvPicPr>
+        <p:blipFill>
+          <a:blip r:embed="rId2"/>
+          <a:srcRect l="28337" t="31418"/>
+          <a:stretch>
+            <a:fillRect/>
+          </a:stretch>
+        </p:blipFill>
+        <p:spPr>
+          <a:xfrm>
+            <a:off x="329183" y="1600200"/>
+            <a:ext cx="3000207" cy="2600882"/>
+          </a:xfrm>
+          <a:prstGeom prst="rect">
+            <a:avLst/>
+          </a:prstGeom>
+        </p:spPr>
+      </p:pic>
+      <p:pic>
+        <p:nvPicPr>
+          <p:cNvPr id="6" name="Picture 5">
+            <a:extLst>
+              <a:ext uri="{FF2B5EF4-FFF2-40B4-BE49-F238E27FC236}">
+                <a16:creationId xmlns:a16="http://schemas.microsoft.com/office/drawing/2014/main" id="{E5191A2D-0C98-4889-1339-317EF33307BF}"/>
+              </a:ext>
+            </a:extLst>
+          </p:cNvPr>
+          <p:cNvPicPr>
+            <a:picLocks noChangeAspect="1"/>
+          </p:cNvPicPr>
+          <p:nvPr/>
+        </p:nvPicPr>
+        <p:blipFill>
+          <a:blip r:embed="rId3"/>
+          <a:srcRect r="56454"/>
+          <a:stretch>
+            <a:fillRect/>
+          </a:stretch>
+        </p:blipFill>
+        <p:spPr>
+          <a:xfrm>
+            <a:off x="3796569" y="396080"/>
+            <a:ext cx="4035989" cy="5166420"/>
+          </a:xfrm>
+          <a:prstGeom prst="rect">
+            <a:avLst/>
+          </a:prstGeom>
+          <a:ln>
+            <a:solidFill>
+              <a:srgbClr val="C00000"/>
+            </a:solidFill>
+          </a:ln>
+        </p:spPr>
+      </p:pic>
+      <p:sp>
+        <p:nvSpPr>
+          <p:cNvPr id="7" name="Rectangle 6">
+            <a:extLst>
+              <a:ext uri="{FF2B5EF4-FFF2-40B4-BE49-F238E27FC236}">
+                <a16:creationId xmlns:a16="http://schemas.microsoft.com/office/drawing/2014/main" id="{219488DE-8A65-B166-9BDA-36B1AD7DBDD0}"/>
+              </a:ext>
+            </a:extLst>
+          </p:cNvPr>
+          <p:cNvSpPr/>
+          <p:nvPr/>
+        </p:nvSpPr>
+        <p:spPr>
+          <a:xfrm>
+            <a:off x="1697300" y="3078401"/>
+            <a:ext cx="548640" cy="640080"/>
+          </a:xfrm>
+          <a:prstGeom prst="rect">
+            <a:avLst/>
+          </a:prstGeom>
+          <a:noFill/>
+          <a:ln w="28575">
+            <a:solidFill>
+              <a:srgbClr val="C00000"/>
+            </a:solidFill>
+            <a:prstDash val="sysDash"/>
+          </a:ln>
+        </p:spPr>
+        <p:style>
+          <a:lnRef idx="2">
+            <a:schemeClr val="accent1">
+              <a:shade val="15000"/>
+            </a:schemeClr>
+          </a:lnRef>
+          <a:fillRef idx="1">
+            <a:schemeClr val="accent1"/>
+          </a:fillRef>
+          <a:effectRef idx="0">
+            <a:schemeClr val="accent1"/>
+          </a:effectRef>
+          <a:fontRef idx="minor">
+            <a:schemeClr val="lt1"/>
+          </a:fontRef>
+        </p:style>
+        <p:txBody>
+          <a:bodyPr rtlCol="0" anchor="ctr"/>
+          <a:lstStyle/>
+          <a:p>
+            <a:pPr algn="ctr"/>
+            <a:endParaRPr lang="en-SG" dirty="0"/>
+          </a:p>
+        </p:txBody>
+      </p:sp>
+      <p:cxnSp>
+        <p:nvCxnSpPr>
+          <p:cNvPr id="9" name="Connector: Elbow 8">
+            <a:extLst>
+              <a:ext uri="{FF2B5EF4-FFF2-40B4-BE49-F238E27FC236}">
+                <a16:creationId xmlns:a16="http://schemas.microsoft.com/office/drawing/2014/main" id="{E5B9C546-94FD-0C53-E6B2-896276E3517B}"/>
+              </a:ext>
+            </a:extLst>
+          </p:cNvPr>
+          <p:cNvCxnSpPr>
+            <a:cxnSpLocks/>
+            <a:stCxn id="7" idx="2"/>
+            <a:endCxn id="10" idx="2"/>
+          </p:cNvCxnSpPr>
+          <p:nvPr/>
+        </p:nvCxnSpPr>
+        <p:spPr>
+          <a:xfrm rot="16200000" flipH="1">
+            <a:off x="3983223" y="1706877"/>
+            <a:ext cx="158575" cy="4181781"/>
+          </a:xfrm>
+          <a:prstGeom prst="bentConnector3">
+            <a:avLst>
+              <a:gd name="adj1" fmla="val 440215"/>
+            </a:avLst>
+          </a:prstGeom>
+          <a:ln w="28575">
+            <a:solidFill>
+              <a:srgbClr val="C00000"/>
+            </a:solidFill>
+            <a:prstDash val="sysDash"/>
+            <a:tailEnd type="triangle"/>
+          </a:ln>
+        </p:spPr>
+        <p:style>
+          <a:lnRef idx="2">
+            <a:schemeClr val="accent1"/>
+          </a:lnRef>
+          <a:fillRef idx="0">
+            <a:schemeClr val="accent1"/>
+          </a:fillRef>
+          <a:effectRef idx="1">
+            <a:schemeClr val="accent1"/>
+          </a:effectRef>
+          <a:fontRef idx="minor">
+            <a:schemeClr val="tx1"/>
+          </a:fontRef>
+        </p:style>
+      </p:cxnSp>
+      <p:sp>
+        <p:nvSpPr>
+          <p:cNvPr id="10" name="Rectangle 9">
+            <a:extLst>
+              <a:ext uri="{FF2B5EF4-FFF2-40B4-BE49-F238E27FC236}">
+                <a16:creationId xmlns:a16="http://schemas.microsoft.com/office/drawing/2014/main" id="{A1A75864-4B78-0CF7-05CD-9961548F039B}"/>
+              </a:ext>
+            </a:extLst>
+          </p:cNvPr>
+          <p:cNvSpPr/>
+          <p:nvPr/>
+        </p:nvSpPr>
+        <p:spPr>
+          <a:xfrm>
+            <a:off x="5943599" y="3374134"/>
+            <a:ext cx="419603" cy="502922"/>
+          </a:xfrm>
+          <a:prstGeom prst="rect">
+            <a:avLst/>
+          </a:prstGeom>
+          <a:noFill/>
+          <a:ln w="28575">
+            <a:solidFill>
+              <a:srgbClr val="C00000"/>
+            </a:solidFill>
+            <a:prstDash val="sysDash"/>
+          </a:ln>
+        </p:spPr>
+        <p:style>
+          <a:lnRef idx="2">
+            <a:schemeClr val="accent1">
+              <a:shade val="15000"/>
+            </a:schemeClr>
+          </a:lnRef>
+          <a:fillRef idx="1">
+            <a:schemeClr val="accent1"/>
+          </a:fillRef>
+          <a:effectRef idx="0">
+            <a:schemeClr val="accent1"/>
+          </a:effectRef>
+          <a:fontRef idx="minor">
+            <a:schemeClr val="lt1"/>
+          </a:fontRef>
+        </p:style>
+        <p:txBody>
+          <a:bodyPr rtlCol="0" anchor="ctr"/>
+          <a:lstStyle/>
+          <a:p>
+            <a:pPr algn="ctr"/>
+            <a:endParaRPr lang="en-SG" dirty="0"/>
+          </a:p>
+        </p:txBody>
+      </p:sp>
+      <p:cxnSp>
+        <p:nvCxnSpPr>
+          <p:cNvPr id="14" name="Straight Connector 13">
+            <a:extLst>
+              <a:ext uri="{FF2B5EF4-FFF2-40B4-BE49-F238E27FC236}">
+                <a16:creationId xmlns:a16="http://schemas.microsoft.com/office/drawing/2014/main" id="{23BDB773-E392-E758-42C9-FE5CA3AF3CE0}"/>
+              </a:ext>
+            </a:extLst>
+          </p:cNvPr>
+          <p:cNvCxnSpPr/>
+          <p:nvPr/>
+        </p:nvCxnSpPr>
+        <p:spPr>
+          <a:xfrm>
+            <a:off x="5733288" y="2962656"/>
+            <a:ext cx="0" cy="1453896"/>
+          </a:xfrm>
+          <a:prstGeom prst="line">
+            <a:avLst/>
+          </a:prstGeom>
+          <a:ln>
+            <a:solidFill>
+              <a:schemeClr val="bg1"/>
+            </a:solidFill>
+            <a:prstDash val="sysDash"/>
+          </a:ln>
+        </p:spPr>
+        <p:style>
+          <a:lnRef idx="2">
+            <a:schemeClr val="accent1"/>
+          </a:lnRef>
+          <a:fillRef idx="0">
+            <a:schemeClr val="accent1"/>
+          </a:fillRef>
+          <a:effectRef idx="1">
+            <a:schemeClr val="accent1"/>
+          </a:effectRef>
+          <a:fontRef idx="minor">
+            <a:schemeClr val="tx1"/>
+          </a:fontRef>
+        </p:style>
+      </p:cxnSp>
+      <p:cxnSp>
+        <p:nvCxnSpPr>
+          <p:cNvPr id="15" name="Straight Connector 14">
+            <a:extLst>
+              <a:ext uri="{FF2B5EF4-FFF2-40B4-BE49-F238E27FC236}">
+                <a16:creationId xmlns:a16="http://schemas.microsoft.com/office/drawing/2014/main" id="{3C0317F4-227B-6379-F447-D1B784B93D69}"/>
+              </a:ext>
+            </a:extLst>
+          </p:cNvPr>
+          <p:cNvCxnSpPr>
+            <a:cxnSpLocks/>
+          </p:cNvCxnSpPr>
+          <p:nvPr/>
+        </p:nvCxnSpPr>
+        <p:spPr>
+          <a:xfrm>
+            <a:off x="5733288" y="2962656"/>
+            <a:ext cx="320039" cy="585216"/>
+          </a:xfrm>
+          <a:prstGeom prst="line">
+            <a:avLst/>
+          </a:prstGeom>
+          <a:ln>
+            <a:solidFill>
+              <a:schemeClr val="bg1"/>
+            </a:solidFill>
+            <a:prstDash val="sysDash"/>
+          </a:ln>
+        </p:spPr>
+        <p:style>
+          <a:lnRef idx="2">
+            <a:schemeClr val="accent1"/>
+          </a:lnRef>
+          <a:fillRef idx="0">
+            <a:schemeClr val="accent1"/>
+          </a:fillRef>
+          <a:effectRef idx="1">
+            <a:schemeClr val="accent1"/>
+          </a:effectRef>
+          <a:fontRef idx="minor">
+            <a:schemeClr val="tx1"/>
+          </a:fontRef>
+        </p:style>
+      </p:cxnSp>
+      <p:cxnSp>
+        <p:nvCxnSpPr>
+          <p:cNvPr id="22" name="Connector: Curved 21">
+            <a:extLst>
+              <a:ext uri="{FF2B5EF4-FFF2-40B4-BE49-F238E27FC236}">
+                <a16:creationId xmlns:a16="http://schemas.microsoft.com/office/drawing/2014/main" id="{71ABF840-9F4D-310F-B62C-F673631D36A2}"/>
+              </a:ext>
+            </a:extLst>
+          </p:cNvPr>
+          <p:cNvCxnSpPr/>
+          <p:nvPr/>
+        </p:nvCxnSpPr>
+        <p:spPr>
+          <a:xfrm rot="5400000">
+            <a:off x="5701283" y="3397535"/>
+            <a:ext cx="274320" cy="136083"/>
+          </a:xfrm>
+          <a:prstGeom prst="curvedConnector3">
+            <a:avLst>
+              <a:gd name="adj1" fmla="val 80000"/>
+            </a:avLst>
+          </a:prstGeom>
+          <a:ln>
+            <a:solidFill>
+              <a:schemeClr val="bg1"/>
+            </a:solidFill>
+            <a:prstDash val="sysDash"/>
+            <a:headEnd type="triangle"/>
+            <a:tailEnd type="triangle"/>
+          </a:ln>
+        </p:spPr>
+        <p:style>
+          <a:lnRef idx="2">
+            <a:schemeClr val="accent1"/>
+          </a:lnRef>
+          <a:fillRef idx="0">
+            <a:schemeClr val="accent1"/>
+          </a:fillRef>
+          <a:effectRef idx="1">
+            <a:schemeClr val="accent1"/>
+          </a:effectRef>
+          <a:fontRef idx="minor">
+            <a:schemeClr val="tx1"/>
+          </a:fontRef>
+        </p:style>
+      </p:cxnSp>
+      <p:sp>
+        <p:nvSpPr>
+          <p:cNvPr id="24" name="TextBox 23">
+            <a:extLst>
+              <a:ext uri="{FF2B5EF4-FFF2-40B4-BE49-F238E27FC236}">
+                <a16:creationId xmlns:a16="http://schemas.microsoft.com/office/drawing/2014/main" id="{B6199C28-F69E-2CD8-3C7F-91A1988CF489}"/>
+              </a:ext>
+            </a:extLst>
+          </p:cNvPr>
+          <p:cNvSpPr txBox="1"/>
+          <p:nvPr/>
+        </p:nvSpPr>
+        <p:spPr>
+          <a:xfrm>
+            <a:off x="4164387" y="2866751"/>
+            <a:ext cx="1201083" cy="461665"/>
+          </a:xfrm>
+          <a:prstGeom prst="rect">
+            <a:avLst/>
+          </a:prstGeom>
+          <a:noFill/>
+        </p:spPr>
+        <p:txBody>
+          <a:bodyPr wrap="square" rtlCol="0">
+            <a:spAutoFit/>
+          </a:bodyPr>
+          <a:lstStyle/>
+          <a:p>
+            <a:r>
+              <a:rPr lang="en-US" sz="1200" b="1" dirty="0">
+                <a:solidFill>
+                  <a:schemeClr val="bg1"/>
+                </a:solidFill>
+              </a:rPr>
+              <a:t>Axis-0: Base Rotation Angle</a:t>
+            </a:r>
+            <a:endParaRPr lang="en-SG" sz="1200" b="1" dirty="0">
+              <a:solidFill>
+                <a:schemeClr val="bg1"/>
+              </a:solidFill>
+            </a:endParaRPr>
+          </a:p>
+        </p:txBody>
+      </p:sp>
+      <p:cxnSp>
+        <p:nvCxnSpPr>
+          <p:cNvPr id="25" name="Connector: Elbow 24">
+            <a:extLst>
+              <a:ext uri="{FF2B5EF4-FFF2-40B4-BE49-F238E27FC236}">
+                <a16:creationId xmlns:a16="http://schemas.microsoft.com/office/drawing/2014/main" id="{F60F911F-D169-3F47-57BD-37E9E8F2C8C8}"/>
+              </a:ext>
+            </a:extLst>
+          </p:cNvPr>
+          <p:cNvCxnSpPr>
+            <a:cxnSpLocks/>
+            <a:stCxn id="24" idx="2"/>
+          </p:cNvCxnSpPr>
+          <p:nvPr/>
+        </p:nvCxnSpPr>
+        <p:spPr>
+          <a:xfrm rot="16200000" flipH="1">
+            <a:off x="5262765" y="2830580"/>
+            <a:ext cx="87107" cy="1082778"/>
+          </a:xfrm>
+          <a:prstGeom prst="bentConnector2">
+            <a:avLst/>
+          </a:prstGeom>
+          <a:ln>
+            <a:solidFill>
+              <a:schemeClr val="bg1"/>
+            </a:solidFill>
+            <a:prstDash val="sysDash"/>
+            <a:tailEnd type="triangle"/>
+          </a:ln>
+        </p:spPr>
+        <p:style>
+          <a:lnRef idx="2">
+            <a:schemeClr val="accent1"/>
+          </a:lnRef>
+          <a:fillRef idx="0">
+            <a:schemeClr val="accent1"/>
+          </a:fillRef>
+          <a:effectRef idx="1">
+            <a:schemeClr val="accent1"/>
+          </a:effectRef>
+          <a:fontRef idx="minor">
+            <a:schemeClr val="tx1"/>
+          </a:fontRef>
+        </p:style>
+      </p:cxnSp>
+      <p:sp>
+        <p:nvSpPr>
+          <p:cNvPr id="30" name="TextBox 29">
+            <a:extLst>
+              <a:ext uri="{FF2B5EF4-FFF2-40B4-BE49-F238E27FC236}">
+                <a16:creationId xmlns:a16="http://schemas.microsoft.com/office/drawing/2014/main" id="{5FFEC688-5DCC-812E-9661-D55FBC3B493F}"/>
+              </a:ext>
+            </a:extLst>
+          </p:cNvPr>
+          <p:cNvSpPr txBox="1"/>
+          <p:nvPr/>
+        </p:nvSpPr>
+        <p:spPr>
+          <a:xfrm>
+            <a:off x="5943599" y="2728251"/>
+            <a:ext cx="1201083" cy="276999"/>
+          </a:xfrm>
+          <a:prstGeom prst="rect">
+            <a:avLst/>
+          </a:prstGeom>
+          <a:noFill/>
+        </p:spPr>
+        <p:txBody>
+          <a:bodyPr wrap="square" rtlCol="0">
+            <a:spAutoFit/>
+          </a:bodyPr>
+          <a:lstStyle/>
+          <a:p>
+            <a:r>
+              <a:rPr lang="en-US" sz="1200" b="1" dirty="0">
+                <a:solidFill>
+                  <a:schemeClr val="bg1"/>
+                </a:solidFill>
+              </a:rPr>
+              <a:t>Cube distance </a:t>
+            </a:r>
+            <a:endParaRPr lang="en-SG" sz="1200" b="1" dirty="0">
+              <a:solidFill>
+                <a:schemeClr val="bg1"/>
+              </a:solidFill>
+            </a:endParaRPr>
+          </a:p>
+        </p:txBody>
+      </p:sp>
+      <p:cxnSp>
+        <p:nvCxnSpPr>
+          <p:cNvPr id="31" name="Connector: Elbow 30">
+            <a:extLst>
+              <a:ext uri="{FF2B5EF4-FFF2-40B4-BE49-F238E27FC236}">
+                <a16:creationId xmlns:a16="http://schemas.microsoft.com/office/drawing/2014/main" id="{D909729A-4025-2403-6407-22D9791DC64E}"/>
+              </a:ext>
+            </a:extLst>
+          </p:cNvPr>
+          <p:cNvCxnSpPr>
+            <a:cxnSpLocks/>
+            <a:stCxn id="30" idx="2"/>
+          </p:cNvCxnSpPr>
+          <p:nvPr/>
+        </p:nvCxnSpPr>
+        <p:spPr>
+          <a:xfrm rot="5400000">
+            <a:off x="6141330" y="2748741"/>
+            <a:ext cx="146303" cy="659321"/>
+          </a:xfrm>
+          <a:prstGeom prst="bentConnector2">
+            <a:avLst/>
+          </a:prstGeom>
+          <a:ln>
+            <a:solidFill>
+              <a:schemeClr val="bg1"/>
+            </a:solidFill>
+            <a:prstDash val="sysDash"/>
+            <a:tailEnd type="triangle"/>
+          </a:ln>
+        </p:spPr>
+        <p:style>
+          <a:lnRef idx="2">
+            <a:schemeClr val="accent1"/>
+          </a:lnRef>
+          <a:fillRef idx="0">
+            <a:schemeClr val="accent1"/>
+          </a:fillRef>
+          <a:effectRef idx="1">
+            <a:schemeClr val="accent1"/>
+          </a:effectRef>
+          <a:fontRef idx="minor">
+            <a:schemeClr val="tx1"/>
+          </a:fontRef>
+        </p:style>
+      </p:cxnSp>
+      <p:sp>
+        <p:nvSpPr>
+          <p:cNvPr id="34" name="TextBox 33">
+            <a:extLst>
+              <a:ext uri="{FF2B5EF4-FFF2-40B4-BE49-F238E27FC236}">
+                <a16:creationId xmlns:a16="http://schemas.microsoft.com/office/drawing/2014/main" id="{5660685A-2D2A-A761-ED41-7259F4F97509}"/>
+              </a:ext>
+            </a:extLst>
+          </p:cNvPr>
+          <p:cNvSpPr txBox="1"/>
+          <p:nvPr/>
+        </p:nvSpPr>
+        <p:spPr>
+          <a:xfrm>
+            <a:off x="393498" y="4720639"/>
+            <a:ext cx="3156244" cy="830997"/>
+          </a:xfrm>
+          <a:prstGeom prst="rect">
+            <a:avLst/>
+          </a:prstGeom>
+          <a:noFill/>
+        </p:spPr>
+        <p:txBody>
+          <a:bodyPr wrap="square" rtlCol="0">
+            <a:spAutoFit/>
+          </a:bodyPr>
+          <a:lstStyle/>
+          <a:p>
+            <a:r>
+              <a:rPr lang="en-US" sz="1200" b="1" dirty="0"/>
+              <a:t>Axis-0: Base Rotation Angle =  arctan(y/x),  if x=0 and y &gt;0 : 90, if x=0 y&lt;0: -90.</a:t>
+            </a:r>
+          </a:p>
+          <a:p>
+            <a:endParaRPr lang="en-US" sz="1200" b="1" dirty="0"/>
+          </a:p>
+          <a:p>
+            <a:r>
+              <a:rPr lang="en-US" sz="1200" b="1" dirty="0"/>
+              <a:t>Cube distance =  sqrt(x^2 + y^2)</a:t>
+            </a:r>
+            <a:endParaRPr lang="en-SG" sz="1200" b="1" dirty="0"/>
+          </a:p>
+        </p:txBody>
+      </p:sp>
+      <p:pic>
+        <p:nvPicPr>
+          <p:cNvPr id="38" name="Picture 37">
+            <a:extLst>
+              <a:ext uri="{FF2B5EF4-FFF2-40B4-BE49-F238E27FC236}">
+                <a16:creationId xmlns:a16="http://schemas.microsoft.com/office/drawing/2014/main" id="{C6D16749-90D4-F25E-4942-4864010220AA}"/>
+              </a:ext>
+            </a:extLst>
+          </p:cNvPr>
+          <p:cNvPicPr>
+            <a:picLocks noChangeAspect="1"/>
+          </p:cNvPicPr>
+          <p:nvPr/>
+        </p:nvPicPr>
+        <p:blipFill>
+          <a:blip r:embed="rId4"/>
+          <a:stretch>
+            <a:fillRect/>
+          </a:stretch>
+        </p:blipFill>
+        <p:spPr>
+          <a:xfrm>
+            <a:off x="8236037" y="396080"/>
+            <a:ext cx="3799765" cy="3132468"/>
+          </a:xfrm>
+          <a:prstGeom prst="rect">
+            <a:avLst/>
+          </a:prstGeom>
+        </p:spPr>
+      </p:pic>
+      <p:cxnSp>
+        <p:nvCxnSpPr>
+          <p:cNvPr id="40" name="Connector: Elbow 39">
+            <a:extLst>
+              <a:ext uri="{FF2B5EF4-FFF2-40B4-BE49-F238E27FC236}">
+                <a16:creationId xmlns:a16="http://schemas.microsoft.com/office/drawing/2014/main" id="{2FC6D3D7-BC62-D816-502A-540ABFA40ECD}"/>
+              </a:ext>
+            </a:extLst>
+          </p:cNvPr>
+          <p:cNvCxnSpPr>
+            <a:cxnSpLocks/>
+            <a:stCxn id="30" idx="3"/>
+            <a:endCxn id="41" idx="2"/>
+          </p:cNvCxnSpPr>
+          <p:nvPr/>
+        </p:nvCxnSpPr>
+        <p:spPr>
+          <a:xfrm>
+            <a:off x="7144682" y="2866751"/>
+            <a:ext cx="2760544" cy="451486"/>
+          </a:xfrm>
+          <a:prstGeom prst="bentConnector4">
+            <a:avLst>
+              <a:gd name="adj1" fmla="val 35180"/>
+              <a:gd name="adj2" fmla="val 150633"/>
+            </a:avLst>
+          </a:prstGeom>
+          <a:ln>
+            <a:solidFill>
+              <a:srgbClr val="C00000"/>
+            </a:solidFill>
+            <a:prstDash val="sysDash"/>
+            <a:tailEnd type="triangle"/>
+          </a:ln>
+        </p:spPr>
+        <p:style>
+          <a:lnRef idx="2">
+            <a:schemeClr val="accent1"/>
+          </a:lnRef>
+          <a:fillRef idx="0">
+            <a:schemeClr val="accent1"/>
+          </a:fillRef>
+          <a:effectRef idx="1">
+            <a:schemeClr val="accent1"/>
+          </a:effectRef>
+          <a:fontRef idx="minor">
+            <a:schemeClr val="tx1"/>
+          </a:fontRef>
+        </p:style>
+      </p:cxnSp>
+      <p:sp>
+        <p:nvSpPr>
+          <p:cNvPr id="41" name="Rectangle 40">
+            <a:extLst>
+              <a:ext uri="{FF2B5EF4-FFF2-40B4-BE49-F238E27FC236}">
+                <a16:creationId xmlns:a16="http://schemas.microsoft.com/office/drawing/2014/main" id="{36A26307-241F-511B-A27C-052266017747}"/>
+              </a:ext>
+            </a:extLst>
+          </p:cNvPr>
+          <p:cNvSpPr/>
+          <p:nvPr/>
+        </p:nvSpPr>
+        <p:spPr>
+          <a:xfrm>
+            <a:off x="9087025" y="2994209"/>
+            <a:ext cx="1636401" cy="324028"/>
+          </a:xfrm>
+          <a:prstGeom prst="rect">
+            <a:avLst/>
+          </a:prstGeom>
+          <a:noFill/>
+          <a:ln w="28575">
+            <a:solidFill>
+              <a:srgbClr val="C00000"/>
+            </a:solidFill>
+            <a:prstDash val="sysDash"/>
+          </a:ln>
+        </p:spPr>
+        <p:style>
+          <a:lnRef idx="2">
+            <a:schemeClr val="accent1">
+              <a:shade val="15000"/>
+            </a:schemeClr>
+          </a:lnRef>
+          <a:fillRef idx="1">
+            <a:schemeClr val="accent1"/>
+          </a:fillRef>
+          <a:effectRef idx="0">
+            <a:schemeClr val="accent1"/>
+          </a:effectRef>
+          <a:fontRef idx="minor">
+            <a:schemeClr val="lt1"/>
+          </a:fontRef>
+        </p:style>
+        <p:txBody>
+          <a:bodyPr rtlCol="0" anchor="ctr"/>
+          <a:lstStyle/>
+          <a:p>
+            <a:pPr algn="ctr"/>
+            <a:endParaRPr lang="en-SG" dirty="0"/>
+          </a:p>
+        </p:txBody>
+      </p:sp>
+      <p:sp>
+        <p:nvSpPr>
+          <p:cNvPr id="45" name="TextBox 44">
+            <a:extLst>
+              <a:ext uri="{FF2B5EF4-FFF2-40B4-BE49-F238E27FC236}">
+                <a16:creationId xmlns:a16="http://schemas.microsoft.com/office/drawing/2014/main" id="{E7DDE725-8924-1361-CC4B-C4712802A341}"/>
+              </a:ext>
+            </a:extLst>
+          </p:cNvPr>
+          <p:cNvSpPr txBox="1"/>
+          <p:nvPr/>
+        </p:nvSpPr>
+        <p:spPr>
+          <a:xfrm>
+            <a:off x="8314977" y="3821406"/>
+            <a:ext cx="3156244" cy="1754326"/>
+          </a:xfrm>
+          <a:prstGeom prst="rect">
+            <a:avLst/>
+          </a:prstGeom>
+          <a:noFill/>
+        </p:spPr>
+        <p:txBody>
+          <a:bodyPr wrap="square" rtlCol="0">
+            <a:spAutoFit/>
+          </a:bodyPr>
+          <a:lstStyle/>
+          <a:p>
+            <a:r>
+              <a:rPr lang="en-US" sz="1200" b="1" dirty="0"/>
+              <a:t>theta1</a:t>
+            </a:r>
+            <a:r>
+              <a:rPr lang="en-US" sz="1200" b="1" dirty="0">
+                <a:solidFill>
+                  <a:schemeClr val="bg1"/>
+                </a:solidFill>
+              </a:rPr>
+              <a:t> </a:t>
+            </a:r>
+            <a:r>
+              <a:rPr lang="en-US" sz="1200" b="1" dirty="0"/>
+              <a:t>: Shoulder motor Angle </a:t>
+            </a:r>
+          </a:p>
+          <a:p>
+            <a:r>
+              <a:rPr lang="en-US" sz="1200" b="1" dirty="0"/>
+              <a:t>theta2 : Elbow motor angle</a:t>
+            </a:r>
+          </a:p>
+          <a:p>
+            <a:r>
+              <a:rPr lang="en-US" sz="1200" b="1" dirty="0"/>
+              <a:t>theta3: Wrist</a:t>
+            </a:r>
+            <a:r>
+              <a:rPr lang="en-US" sz="1200" b="1" dirty="0">
+                <a:solidFill>
+                  <a:schemeClr val="bg1"/>
+                </a:solidFill>
+              </a:rPr>
+              <a:t> </a:t>
+            </a:r>
+            <a:r>
+              <a:rPr lang="en-US" sz="1200" b="1" dirty="0"/>
+              <a:t>motor angle</a:t>
+            </a:r>
+          </a:p>
+          <a:p>
+            <a:endParaRPr lang="en-US" sz="1200" b="1" dirty="0">
+              <a:solidFill>
+                <a:schemeClr val="bg1"/>
+              </a:solidFill>
+            </a:endParaRPr>
+          </a:p>
+          <a:p>
+            <a:r>
+              <a:rPr lang="en-US" sz="1200" b="1" dirty="0"/>
+              <a:t>a = sin(90-theta1)*1.5</a:t>
+            </a:r>
+          </a:p>
+          <a:p>
+            <a:r>
+              <a:rPr lang="en-US" sz="1200" b="1" dirty="0"/>
+              <a:t>b = sin(90-theta1-theta2)*1</a:t>
+            </a:r>
+          </a:p>
+          <a:p>
+            <a:r>
+              <a:rPr lang="en-US" sz="1200" b="1" dirty="0"/>
+              <a:t>c = sin(90-theta1-theta2-theta3)*0.5</a:t>
+            </a:r>
+          </a:p>
+          <a:p>
+            <a:endParaRPr lang="en-US" sz="1200" b="1" dirty="0"/>
+          </a:p>
+          <a:p>
+            <a:r>
+              <a:rPr lang="en-US" sz="1200" b="1" dirty="0"/>
+              <a:t>Cube distance =  sqrt(x^2 + y^2) = a +b +c </a:t>
+            </a:r>
+            <a:endParaRPr lang="en-SG" sz="1200" b="1" dirty="0"/>
+          </a:p>
+        </p:txBody>
+      </p:sp>
+      <p:cxnSp>
+        <p:nvCxnSpPr>
+          <p:cNvPr id="47" name="Straight Connector 46">
+            <a:extLst>
+              <a:ext uri="{FF2B5EF4-FFF2-40B4-BE49-F238E27FC236}">
+                <a16:creationId xmlns:a16="http://schemas.microsoft.com/office/drawing/2014/main" id="{ADA107B6-6603-F1CA-30C8-AEE671C62080}"/>
+              </a:ext>
+            </a:extLst>
+          </p:cNvPr>
+          <p:cNvCxnSpPr/>
+          <p:nvPr/>
+        </p:nvCxnSpPr>
+        <p:spPr>
+          <a:xfrm>
+            <a:off x="10081055" y="1984248"/>
+            <a:ext cx="0" cy="1094153"/>
+          </a:xfrm>
+          <a:prstGeom prst="line">
+            <a:avLst/>
+          </a:prstGeom>
+          <a:ln>
+            <a:solidFill>
+              <a:srgbClr val="FF0000"/>
+            </a:solidFill>
+            <a:prstDash val="sysDash"/>
+          </a:ln>
+        </p:spPr>
+        <p:style>
+          <a:lnRef idx="2">
+            <a:schemeClr val="accent1"/>
+          </a:lnRef>
+          <a:fillRef idx="0">
+            <a:schemeClr val="accent1"/>
+          </a:fillRef>
+          <a:effectRef idx="1">
+            <a:schemeClr val="accent1"/>
+          </a:effectRef>
+          <a:fontRef idx="minor">
+            <a:schemeClr val="tx1"/>
+          </a:fontRef>
+        </p:style>
+      </p:cxnSp>
+      <p:cxnSp>
+        <p:nvCxnSpPr>
+          <p:cNvPr id="48" name="Straight Connector 47">
+            <a:extLst>
+              <a:ext uri="{FF2B5EF4-FFF2-40B4-BE49-F238E27FC236}">
+                <a16:creationId xmlns:a16="http://schemas.microsoft.com/office/drawing/2014/main" id="{0B2FB6BF-D5C0-8995-83D6-EFB91CCB955B}"/>
+              </a:ext>
+            </a:extLst>
+          </p:cNvPr>
+          <p:cNvCxnSpPr>
+            <a:cxnSpLocks/>
+          </p:cNvCxnSpPr>
+          <p:nvPr/>
+        </p:nvCxnSpPr>
+        <p:spPr>
+          <a:xfrm>
+            <a:off x="10649712" y="2545417"/>
+            <a:ext cx="0" cy="459833"/>
+          </a:xfrm>
+          <a:prstGeom prst="line">
+            <a:avLst/>
+          </a:prstGeom>
+          <a:ln>
+            <a:solidFill>
+              <a:srgbClr val="FF0000"/>
+            </a:solidFill>
+            <a:prstDash val="sysDash"/>
+          </a:ln>
+        </p:spPr>
+        <p:style>
+          <a:lnRef idx="2">
+            <a:schemeClr val="accent1"/>
+          </a:lnRef>
+          <a:fillRef idx="0">
+            <a:schemeClr val="accent1"/>
+          </a:fillRef>
+          <a:effectRef idx="1">
+            <a:schemeClr val="accent1"/>
+          </a:effectRef>
+          <a:fontRef idx="minor">
+            <a:schemeClr val="tx1"/>
+          </a:fontRef>
+        </p:style>
+      </p:cxnSp>
+      <p:sp>
+        <p:nvSpPr>
+          <p:cNvPr id="50" name="TextBox 49">
+            <a:extLst>
+              <a:ext uri="{FF2B5EF4-FFF2-40B4-BE49-F238E27FC236}">
+                <a16:creationId xmlns:a16="http://schemas.microsoft.com/office/drawing/2014/main" id="{B3934530-9AC0-4232-3ED1-46188033A316}"/>
+              </a:ext>
+            </a:extLst>
+          </p:cNvPr>
+          <p:cNvSpPr txBox="1"/>
+          <p:nvPr/>
+        </p:nvSpPr>
+        <p:spPr>
+          <a:xfrm>
+            <a:off x="9397189" y="2589751"/>
+            <a:ext cx="280388" cy="276999"/>
+          </a:xfrm>
+          <a:prstGeom prst="rect">
+            <a:avLst/>
+          </a:prstGeom>
+          <a:noFill/>
+        </p:spPr>
+        <p:txBody>
+          <a:bodyPr wrap="square" rtlCol="0">
+            <a:spAutoFit/>
+          </a:bodyPr>
+          <a:lstStyle/>
+          <a:p>
+            <a:r>
+              <a:rPr lang="en-US" sz="1200" b="1" dirty="0">
+                <a:solidFill>
+                  <a:schemeClr val="bg1"/>
+                </a:solidFill>
+              </a:rPr>
+              <a:t>a</a:t>
+            </a:r>
+            <a:endParaRPr lang="en-SG" sz="1200" b="1" dirty="0">
+              <a:solidFill>
+                <a:schemeClr val="bg1"/>
+              </a:solidFill>
+            </a:endParaRPr>
+          </a:p>
+        </p:txBody>
+      </p:sp>
+      <p:cxnSp>
+        <p:nvCxnSpPr>
+          <p:cNvPr id="52" name="Straight Arrow Connector 51">
+            <a:extLst>
+              <a:ext uri="{FF2B5EF4-FFF2-40B4-BE49-F238E27FC236}">
+                <a16:creationId xmlns:a16="http://schemas.microsoft.com/office/drawing/2014/main" id="{377A0ED9-0237-4210-3404-1E87FD3AB122}"/>
+              </a:ext>
+            </a:extLst>
+          </p:cNvPr>
+          <p:cNvCxnSpPr>
+            <a:cxnSpLocks/>
+          </p:cNvCxnSpPr>
+          <p:nvPr/>
+        </p:nvCxnSpPr>
+        <p:spPr>
+          <a:xfrm>
+            <a:off x="9105313" y="2851558"/>
+            <a:ext cx="910705" cy="0"/>
+          </a:xfrm>
+          <a:prstGeom prst="straightConnector1">
+            <a:avLst/>
+          </a:prstGeom>
+          <a:ln>
+            <a:solidFill>
+              <a:schemeClr val="bg1"/>
+            </a:solidFill>
+            <a:prstDash val="sysDash"/>
+            <a:headEnd type="triangle"/>
+            <a:tailEnd type="triangle"/>
+          </a:ln>
+        </p:spPr>
+        <p:style>
+          <a:lnRef idx="2">
+            <a:schemeClr val="accent1"/>
+          </a:lnRef>
+          <a:fillRef idx="0">
+            <a:schemeClr val="accent1"/>
+          </a:fillRef>
+          <a:effectRef idx="1">
+            <a:schemeClr val="accent1"/>
+          </a:effectRef>
+          <a:fontRef idx="minor">
+            <a:schemeClr val="tx1"/>
+          </a:fontRef>
+        </p:style>
+      </p:cxnSp>
+      <p:cxnSp>
+        <p:nvCxnSpPr>
+          <p:cNvPr id="57" name="Straight Arrow Connector 56">
+            <a:extLst>
+              <a:ext uri="{FF2B5EF4-FFF2-40B4-BE49-F238E27FC236}">
+                <a16:creationId xmlns:a16="http://schemas.microsoft.com/office/drawing/2014/main" id="{16A9953B-7EA4-4259-932E-7AEDD4BD53C6}"/>
+              </a:ext>
+            </a:extLst>
+          </p:cNvPr>
+          <p:cNvCxnSpPr>
+            <a:cxnSpLocks/>
+          </p:cNvCxnSpPr>
+          <p:nvPr/>
+        </p:nvCxnSpPr>
+        <p:spPr>
+          <a:xfrm>
+            <a:off x="10081055" y="2851558"/>
+            <a:ext cx="517216" cy="0"/>
+          </a:xfrm>
+          <a:prstGeom prst="straightConnector1">
+            <a:avLst/>
+          </a:prstGeom>
+          <a:ln>
+            <a:solidFill>
+              <a:schemeClr val="bg1"/>
+            </a:solidFill>
+            <a:prstDash val="sysDash"/>
+            <a:headEnd type="triangle"/>
+            <a:tailEnd type="triangle"/>
+          </a:ln>
+        </p:spPr>
+        <p:style>
+          <a:lnRef idx="2">
+            <a:schemeClr val="accent1"/>
+          </a:lnRef>
+          <a:fillRef idx="0">
+            <a:schemeClr val="accent1"/>
+          </a:fillRef>
+          <a:effectRef idx="1">
+            <a:schemeClr val="accent1"/>
+          </a:effectRef>
+          <a:fontRef idx="minor">
+            <a:schemeClr val="tx1"/>
+          </a:fontRef>
+        </p:style>
+      </p:cxnSp>
+      <p:sp>
+        <p:nvSpPr>
+          <p:cNvPr id="59" name="TextBox 58">
+            <a:extLst>
+              <a:ext uri="{FF2B5EF4-FFF2-40B4-BE49-F238E27FC236}">
+                <a16:creationId xmlns:a16="http://schemas.microsoft.com/office/drawing/2014/main" id="{34447B7B-1CE6-0C58-A126-D9CCE0B53341}"/>
+              </a:ext>
+            </a:extLst>
+          </p:cNvPr>
+          <p:cNvSpPr txBox="1"/>
+          <p:nvPr/>
+        </p:nvSpPr>
+        <p:spPr>
+          <a:xfrm>
+            <a:off x="10199469" y="2570408"/>
+            <a:ext cx="280388" cy="276999"/>
+          </a:xfrm>
+          <a:prstGeom prst="rect">
+            <a:avLst/>
+          </a:prstGeom>
+          <a:noFill/>
+        </p:spPr>
+        <p:txBody>
+          <a:bodyPr wrap="square" rtlCol="0">
+            <a:spAutoFit/>
+          </a:bodyPr>
+          <a:lstStyle/>
+          <a:p>
+            <a:r>
+              <a:rPr lang="en-US" sz="1200" b="1" dirty="0">
+                <a:solidFill>
+                  <a:schemeClr val="bg1"/>
+                </a:solidFill>
+              </a:rPr>
+              <a:t>b</a:t>
+            </a:r>
+            <a:endParaRPr lang="en-SG" sz="1200" b="1" dirty="0">
+              <a:solidFill>
+                <a:schemeClr val="bg1"/>
+              </a:solidFill>
+            </a:endParaRPr>
+          </a:p>
+        </p:txBody>
+      </p:sp>
+      <p:cxnSp>
+        <p:nvCxnSpPr>
+          <p:cNvPr id="60" name="Straight Arrow Connector 59">
+            <a:extLst>
+              <a:ext uri="{FF2B5EF4-FFF2-40B4-BE49-F238E27FC236}">
+                <a16:creationId xmlns:a16="http://schemas.microsoft.com/office/drawing/2014/main" id="{08CC4177-2F3C-05FD-6574-09CFE9243885}"/>
+              </a:ext>
+            </a:extLst>
+          </p:cNvPr>
+          <p:cNvCxnSpPr>
+            <a:cxnSpLocks/>
+          </p:cNvCxnSpPr>
+          <p:nvPr/>
+        </p:nvCxnSpPr>
+        <p:spPr>
+          <a:xfrm>
+            <a:off x="10723426" y="2900641"/>
+            <a:ext cx="267662" cy="0"/>
+          </a:xfrm>
+          <a:prstGeom prst="straightConnector1">
+            <a:avLst/>
+          </a:prstGeom>
+          <a:ln>
+            <a:solidFill>
+              <a:schemeClr val="bg1"/>
+            </a:solidFill>
+            <a:prstDash val="sysDash"/>
+            <a:headEnd type="triangle"/>
+            <a:tailEnd type="triangle"/>
+          </a:ln>
+        </p:spPr>
+        <p:style>
+          <a:lnRef idx="2">
+            <a:schemeClr val="accent1"/>
+          </a:lnRef>
+          <a:fillRef idx="0">
+            <a:schemeClr val="accent1"/>
+          </a:fillRef>
+          <a:effectRef idx="1">
+            <a:schemeClr val="accent1"/>
+          </a:effectRef>
+          <a:fontRef idx="minor">
+            <a:schemeClr val="tx1"/>
+          </a:fontRef>
+        </p:style>
+      </p:cxnSp>
+      <p:sp>
+        <p:nvSpPr>
+          <p:cNvPr id="62" name="TextBox 61">
+            <a:extLst>
+              <a:ext uri="{FF2B5EF4-FFF2-40B4-BE49-F238E27FC236}">
+                <a16:creationId xmlns:a16="http://schemas.microsoft.com/office/drawing/2014/main" id="{3F4A9C27-8C9A-A7A6-C857-3E713A3BEDE5}"/>
+              </a:ext>
+            </a:extLst>
+          </p:cNvPr>
+          <p:cNvSpPr txBox="1"/>
+          <p:nvPr/>
+        </p:nvSpPr>
+        <p:spPr>
+          <a:xfrm>
+            <a:off x="10768125" y="2555510"/>
+            <a:ext cx="280388" cy="276999"/>
+          </a:xfrm>
+          <a:prstGeom prst="rect">
+            <a:avLst/>
+          </a:prstGeom>
+          <a:noFill/>
+        </p:spPr>
+        <p:txBody>
+          <a:bodyPr wrap="square" rtlCol="0">
+            <a:spAutoFit/>
+          </a:bodyPr>
+          <a:lstStyle/>
+          <a:p>
+            <a:r>
+              <a:rPr lang="en-US" sz="1200" b="1" dirty="0">
+                <a:solidFill>
+                  <a:schemeClr val="bg1"/>
+                </a:solidFill>
+              </a:rPr>
+              <a:t>c</a:t>
+            </a:r>
+            <a:endParaRPr lang="en-SG" sz="1200" b="1" dirty="0">
+              <a:solidFill>
+                <a:schemeClr val="bg1"/>
+              </a:solidFill>
+            </a:endParaRPr>
+          </a:p>
+        </p:txBody>
+      </p:sp>
+    </p:spTree>
+    <p:extLst>
+      <p:ext uri="{BB962C8B-B14F-4D97-AF65-F5344CB8AC3E}">
+        <p14:creationId xmlns:p14="http://schemas.microsoft.com/office/powerpoint/2010/main" val="734467187"/>
+      </p:ext>
+    </p:extLst>
+  </p:cSld>
+  <p:clrMapOvr>
+    <a:masterClrMapping/>
+  </p:clrMapOvr>
+</p:sld>
+</file>
+
+<file path=ppt/slides/slide6.xml><?xml version="1.0" encoding="utf-8"?>
+<p:sld xmlns:a="http://schemas.openxmlformats.org/drawingml/2006/main" xmlns:r="http://schemas.openxmlformats.org/officeDocument/2006/relationships" xmlns:p="http://schemas.openxmlformats.org/presentationml/2006/main">
+  <p:cSld>
+    <p:spTree>
+      <p:nvGrpSpPr>
+        <p:cNvPr id="1" name=""/>
+        <p:cNvGrpSpPr/>
+        <p:nvPr/>
+      </p:nvGrpSpPr>
+      <p:grpSpPr>
+        <a:xfrm>
+          <a:off x="0" y="0"/>
+          <a:ext cx="0" cy="0"/>
+          <a:chOff x="0" y="0"/>
+          <a:chExt cx="0" cy="0"/>
+        </a:xfrm>
+      </p:grpSpPr>
+      <p:pic>
+        <p:nvPicPr>
+          <p:cNvPr id="20" name="Picture 19">
+            <a:extLst>
+              <a:ext uri="{FF2B5EF4-FFF2-40B4-BE49-F238E27FC236}">
+                <a16:creationId xmlns:a16="http://schemas.microsoft.com/office/drawing/2014/main" id="{C7E6B5CA-6FCB-02AF-4C92-9DCF76CD5DF9}"/>
+              </a:ext>
+            </a:extLst>
+          </p:cNvPr>
+          <p:cNvPicPr>
+            <a:picLocks noChangeAspect="1"/>
+          </p:cNvPicPr>
+          <p:nvPr/>
+        </p:nvPicPr>
+        <p:blipFill>
+          <a:blip r:embed="rId2"/>
+          <a:stretch>
+            <a:fillRect/>
+          </a:stretch>
+        </p:blipFill>
+        <p:spPr>
+          <a:xfrm>
+            <a:off x="1955397" y="1231629"/>
+            <a:ext cx="5506107" cy="4431475"/>
+          </a:xfrm>
+          <a:prstGeom prst="rect">
+            <a:avLst/>
+          </a:prstGeom>
+        </p:spPr>
+      </p:pic>
+      <p:cxnSp>
+        <p:nvCxnSpPr>
+          <p:cNvPr id="22" name="Straight Connector 21">
+            <a:extLst>
+              <a:ext uri="{FF2B5EF4-FFF2-40B4-BE49-F238E27FC236}">
+                <a16:creationId xmlns:a16="http://schemas.microsoft.com/office/drawing/2014/main" id="{28966A77-4E6B-C8EC-CF7E-6EE142C92FF2}"/>
+              </a:ext>
+            </a:extLst>
+          </p:cNvPr>
+          <p:cNvCxnSpPr/>
+          <p:nvPr/>
+        </p:nvCxnSpPr>
+        <p:spPr>
+          <a:xfrm>
+            <a:off x="2532888" y="2697480"/>
+            <a:ext cx="2395728" cy="0"/>
+          </a:xfrm>
+          <a:prstGeom prst="line">
+            <a:avLst/>
+          </a:prstGeom>
+          <a:ln>
+            <a:solidFill>
+              <a:schemeClr val="bg1"/>
+            </a:solidFill>
+            <a:prstDash val="sysDash"/>
+          </a:ln>
+        </p:spPr>
+        <p:style>
+          <a:lnRef idx="2">
+            <a:schemeClr val="accent1"/>
+          </a:lnRef>
+          <a:fillRef idx="0">
+            <a:schemeClr val="accent1"/>
+          </a:fillRef>
+          <a:effectRef idx="1">
+            <a:schemeClr val="accent1"/>
+          </a:effectRef>
+          <a:fontRef idx="minor">
+            <a:schemeClr val="tx1"/>
+          </a:fontRef>
+        </p:style>
+      </p:cxnSp>
+      <p:cxnSp>
+        <p:nvCxnSpPr>
+          <p:cNvPr id="23" name="Connector: Curved 22">
+            <a:extLst>
+              <a:ext uri="{FF2B5EF4-FFF2-40B4-BE49-F238E27FC236}">
+                <a16:creationId xmlns:a16="http://schemas.microsoft.com/office/drawing/2014/main" id="{64C10687-2A29-19AC-D5B7-AE588E79C6E1}"/>
+              </a:ext>
+            </a:extLst>
+          </p:cNvPr>
+          <p:cNvCxnSpPr/>
+          <p:nvPr/>
+        </p:nvCxnSpPr>
+        <p:spPr>
+          <a:xfrm rot="5400000">
+            <a:off x="3525550" y="2766598"/>
+            <a:ext cx="274320" cy="136083"/>
+          </a:xfrm>
+          <a:prstGeom prst="curvedConnector3">
+            <a:avLst>
+              <a:gd name="adj1" fmla="val 80000"/>
+            </a:avLst>
+          </a:prstGeom>
+          <a:ln>
+            <a:solidFill>
+              <a:schemeClr val="bg1"/>
+            </a:solidFill>
+            <a:prstDash val="sysDash"/>
+            <a:headEnd type="triangle"/>
+            <a:tailEnd type="triangle"/>
+          </a:ln>
+        </p:spPr>
+        <p:style>
+          <a:lnRef idx="2">
+            <a:schemeClr val="accent1"/>
+          </a:lnRef>
+          <a:fillRef idx="0">
+            <a:schemeClr val="accent1"/>
+          </a:fillRef>
+          <a:effectRef idx="1">
+            <a:schemeClr val="accent1"/>
+          </a:effectRef>
+          <a:fontRef idx="minor">
+            <a:schemeClr val="tx1"/>
+          </a:fontRef>
+        </p:style>
+      </p:cxnSp>
+      <p:cxnSp>
+        <p:nvCxnSpPr>
+          <p:cNvPr id="24" name="Straight Connector 23">
+            <a:extLst>
+              <a:ext uri="{FF2B5EF4-FFF2-40B4-BE49-F238E27FC236}">
+                <a16:creationId xmlns:a16="http://schemas.microsoft.com/office/drawing/2014/main" id="{A7CB3A48-643C-36D4-295B-BD1C11A51ED0}"/>
+              </a:ext>
+            </a:extLst>
+          </p:cNvPr>
+          <p:cNvCxnSpPr>
+            <a:cxnSpLocks/>
+          </p:cNvCxnSpPr>
+          <p:nvPr/>
+        </p:nvCxnSpPr>
+        <p:spPr>
+          <a:xfrm>
+            <a:off x="3054096" y="2084831"/>
+            <a:ext cx="0" cy="1499616"/>
+          </a:xfrm>
+          <a:prstGeom prst="line">
+            <a:avLst/>
+          </a:prstGeom>
+          <a:ln>
+            <a:solidFill>
+              <a:schemeClr val="bg1"/>
+            </a:solidFill>
+            <a:prstDash val="sysDash"/>
+          </a:ln>
+        </p:spPr>
+        <p:style>
+          <a:lnRef idx="2">
+            <a:schemeClr val="accent1"/>
+          </a:lnRef>
+          <a:fillRef idx="0">
+            <a:schemeClr val="accent1"/>
+          </a:fillRef>
+          <a:effectRef idx="1">
+            <a:schemeClr val="accent1"/>
+          </a:effectRef>
+          <a:fontRef idx="minor">
+            <a:schemeClr val="tx1"/>
+          </a:fontRef>
+        </p:style>
+      </p:cxnSp>
+      <p:cxnSp>
+        <p:nvCxnSpPr>
+          <p:cNvPr id="29" name="Straight Connector 28">
+            <a:extLst>
+              <a:ext uri="{FF2B5EF4-FFF2-40B4-BE49-F238E27FC236}">
+                <a16:creationId xmlns:a16="http://schemas.microsoft.com/office/drawing/2014/main" id="{30444556-4F4D-86E0-3BB0-4C7B74ECBC61}"/>
+              </a:ext>
+            </a:extLst>
+          </p:cNvPr>
+          <p:cNvCxnSpPr>
+            <a:cxnSpLocks/>
+          </p:cNvCxnSpPr>
+          <p:nvPr/>
+        </p:nvCxnSpPr>
+        <p:spPr>
+          <a:xfrm>
+            <a:off x="4251960" y="3218688"/>
+            <a:ext cx="1682496" cy="804672"/>
+          </a:xfrm>
+          <a:prstGeom prst="line">
+            <a:avLst/>
+          </a:prstGeom>
+          <a:ln>
+            <a:solidFill>
+              <a:schemeClr val="bg1"/>
+            </a:solidFill>
+            <a:prstDash val="sysDash"/>
+          </a:ln>
+        </p:spPr>
+        <p:style>
+          <a:lnRef idx="2">
+            <a:schemeClr val="accent1"/>
+          </a:lnRef>
+          <a:fillRef idx="0">
+            <a:schemeClr val="accent1"/>
+          </a:fillRef>
+          <a:effectRef idx="1">
+            <a:schemeClr val="accent1"/>
+          </a:effectRef>
+          <a:fontRef idx="minor">
+            <a:schemeClr val="tx1"/>
+          </a:fontRef>
+        </p:style>
+      </p:cxnSp>
+      <p:cxnSp>
+        <p:nvCxnSpPr>
+          <p:cNvPr id="35" name="Straight Connector 34">
+            <a:extLst>
+              <a:ext uri="{FF2B5EF4-FFF2-40B4-BE49-F238E27FC236}">
+                <a16:creationId xmlns:a16="http://schemas.microsoft.com/office/drawing/2014/main" id="{A951D2DE-3B96-2BC2-F9FE-DF2207092A06}"/>
+              </a:ext>
+            </a:extLst>
+          </p:cNvPr>
+          <p:cNvCxnSpPr>
+            <a:cxnSpLocks/>
+          </p:cNvCxnSpPr>
+          <p:nvPr/>
+        </p:nvCxnSpPr>
+        <p:spPr>
+          <a:xfrm flipV="1">
+            <a:off x="4402126" y="2841635"/>
+            <a:ext cx="612648" cy="1211462"/>
+          </a:xfrm>
+          <a:prstGeom prst="line">
+            <a:avLst/>
+          </a:prstGeom>
+          <a:ln>
+            <a:solidFill>
+              <a:schemeClr val="bg1"/>
+            </a:solidFill>
+            <a:prstDash val="sysDash"/>
+          </a:ln>
+        </p:spPr>
+        <p:style>
+          <a:lnRef idx="2">
+            <a:schemeClr val="accent1"/>
+          </a:lnRef>
+          <a:fillRef idx="0">
+            <a:schemeClr val="accent1"/>
+          </a:fillRef>
+          <a:effectRef idx="1">
+            <a:schemeClr val="accent1"/>
+          </a:effectRef>
+          <a:fontRef idx="minor">
+            <a:schemeClr val="tx1"/>
+          </a:fontRef>
+        </p:style>
+      </p:cxnSp>
+      <p:cxnSp>
+        <p:nvCxnSpPr>
+          <p:cNvPr id="38" name="Connector: Curved 37">
+            <a:extLst>
+              <a:ext uri="{FF2B5EF4-FFF2-40B4-BE49-F238E27FC236}">
+                <a16:creationId xmlns:a16="http://schemas.microsoft.com/office/drawing/2014/main" id="{9660476A-C42C-1300-8906-3B1C4D4F44C8}"/>
+              </a:ext>
+            </a:extLst>
+          </p:cNvPr>
+          <p:cNvCxnSpPr/>
+          <p:nvPr/>
+        </p:nvCxnSpPr>
+        <p:spPr>
+          <a:xfrm rot="5400000">
+            <a:off x="5201371" y="3847896"/>
+            <a:ext cx="274320" cy="136083"/>
+          </a:xfrm>
+          <a:prstGeom prst="curvedConnector3">
+            <a:avLst>
+              <a:gd name="adj1" fmla="val 80000"/>
+            </a:avLst>
+          </a:prstGeom>
+          <a:ln>
+            <a:solidFill>
+              <a:schemeClr val="bg1"/>
+            </a:solidFill>
+            <a:prstDash val="sysDash"/>
+            <a:headEnd type="triangle"/>
+            <a:tailEnd type="triangle"/>
+          </a:ln>
+        </p:spPr>
+        <p:style>
+          <a:lnRef idx="2">
+            <a:schemeClr val="accent1"/>
+          </a:lnRef>
+          <a:fillRef idx="0">
+            <a:schemeClr val="accent1"/>
+          </a:fillRef>
+          <a:effectRef idx="1">
+            <a:schemeClr val="accent1"/>
+          </a:effectRef>
+          <a:fontRef idx="minor">
+            <a:schemeClr val="tx1"/>
+          </a:fontRef>
+        </p:style>
+      </p:cxnSp>
+      <p:cxnSp>
+        <p:nvCxnSpPr>
+          <p:cNvPr id="39" name="Straight Connector 38">
+            <a:extLst>
+              <a:ext uri="{FF2B5EF4-FFF2-40B4-BE49-F238E27FC236}">
+                <a16:creationId xmlns:a16="http://schemas.microsoft.com/office/drawing/2014/main" id="{826E3C07-2B82-479A-2F37-BA538EF7E9D8}"/>
+              </a:ext>
+            </a:extLst>
+          </p:cNvPr>
+          <p:cNvCxnSpPr>
+            <a:cxnSpLocks/>
+          </p:cNvCxnSpPr>
+          <p:nvPr/>
+        </p:nvCxnSpPr>
+        <p:spPr>
+          <a:xfrm flipV="1">
+            <a:off x="5014774" y="4023360"/>
+            <a:ext cx="1011122" cy="667512"/>
+          </a:xfrm>
+          <a:prstGeom prst="line">
+            <a:avLst/>
+          </a:prstGeom>
+          <a:ln>
+            <a:solidFill>
+              <a:schemeClr val="bg1"/>
+            </a:solidFill>
+            <a:prstDash val="sysDash"/>
+          </a:ln>
+        </p:spPr>
+        <p:style>
+          <a:lnRef idx="2">
+            <a:schemeClr val="accent1"/>
+          </a:lnRef>
+          <a:fillRef idx="0">
+            <a:schemeClr val="accent1"/>
+          </a:fillRef>
+          <a:effectRef idx="1">
+            <a:schemeClr val="accent1"/>
+          </a:effectRef>
+          <a:fontRef idx="minor">
+            <a:schemeClr val="tx1"/>
+          </a:fontRef>
+        </p:style>
+      </p:cxnSp>
+      <p:cxnSp>
+        <p:nvCxnSpPr>
+          <p:cNvPr id="43" name="Straight Connector 42">
+            <a:extLst>
+              <a:ext uri="{FF2B5EF4-FFF2-40B4-BE49-F238E27FC236}">
+                <a16:creationId xmlns:a16="http://schemas.microsoft.com/office/drawing/2014/main" id="{4AEDEFBD-76B8-6B61-7B37-30A634802BDC}"/>
+              </a:ext>
+            </a:extLst>
+          </p:cNvPr>
+          <p:cNvCxnSpPr>
+            <a:cxnSpLocks/>
+          </p:cNvCxnSpPr>
+          <p:nvPr/>
+        </p:nvCxnSpPr>
+        <p:spPr>
+          <a:xfrm>
+            <a:off x="5255670" y="3915937"/>
+            <a:ext cx="998116" cy="1076687"/>
+          </a:xfrm>
+          <a:prstGeom prst="line">
+            <a:avLst/>
+          </a:prstGeom>
+          <a:ln>
+            <a:solidFill>
+              <a:schemeClr val="bg1"/>
+            </a:solidFill>
+            <a:prstDash val="sysDash"/>
+          </a:ln>
+        </p:spPr>
+        <p:style>
+          <a:lnRef idx="2">
+            <a:schemeClr val="accent1"/>
+          </a:lnRef>
+          <a:fillRef idx="0">
+            <a:schemeClr val="accent1"/>
+          </a:fillRef>
+          <a:effectRef idx="1">
+            <a:schemeClr val="accent1"/>
+          </a:effectRef>
+          <a:fontRef idx="minor">
+            <a:schemeClr val="tx1"/>
+          </a:fontRef>
+        </p:style>
+      </p:cxnSp>
+      <p:cxnSp>
+        <p:nvCxnSpPr>
+          <p:cNvPr id="47" name="Connector: Curved 46">
+            <a:extLst>
+              <a:ext uri="{FF2B5EF4-FFF2-40B4-BE49-F238E27FC236}">
+                <a16:creationId xmlns:a16="http://schemas.microsoft.com/office/drawing/2014/main" id="{C5ED72C9-5CEE-1D54-5523-EAED0FC87A76}"/>
+              </a:ext>
+            </a:extLst>
+          </p:cNvPr>
+          <p:cNvCxnSpPr>
+            <a:cxnSpLocks/>
+          </p:cNvCxnSpPr>
+          <p:nvPr/>
+        </p:nvCxnSpPr>
+        <p:spPr>
+          <a:xfrm rot="5400000">
+            <a:off x="5916743" y="4816010"/>
+            <a:ext cx="194330" cy="158903"/>
+          </a:xfrm>
+          <a:prstGeom prst="curvedConnector3">
+            <a:avLst>
+              <a:gd name="adj1" fmla="val 50000"/>
+            </a:avLst>
+          </a:prstGeom>
+          <a:ln>
+            <a:solidFill>
+              <a:schemeClr val="bg1"/>
+            </a:solidFill>
+            <a:prstDash val="sysDash"/>
+            <a:headEnd type="triangle"/>
+            <a:tailEnd type="triangle"/>
+          </a:ln>
+        </p:spPr>
+        <p:style>
+          <a:lnRef idx="2">
+            <a:schemeClr val="accent1"/>
+          </a:lnRef>
+          <a:fillRef idx="0">
+            <a:schemeClr val="accent1"/>
+          </a:fillRef>
+          <a:effectRef idx="1">
+            <a:schemeClr val="accent1"/>
+          </a:effectRef>
+          <a:fontRef idx="minor">
+            <a:schemeClr val="tx1"/>
+          </a:fontRef>
+        </p:style>
+      </p:cxnSp>
+      <p:sp>
+        <p:nvSpPr>
+          <p:cNvPr id="49" name="TextBox 48">
+            <a:extLst>
+              <a:ext uri="{FF2B5EF4-FFF2-40B4-BE49-F238E27FC236}">
+                <a16:creationId xmlns:a16="http://schemas.microsoft.com/office/drawing/2014/main" id="{D8EA5C38-C5FB-03C6-03E3-629755CA7737}"/>
+              </a:ext>
+            </a:extLst>
+          </p:cNvPr>
+          <p:cNvSpPr txBox="1"/>
+          <p:nvPr/>
+        </p:nvSpPr>
+        <p:spPr>
+          <a:xfrm>
+            <a:off x="3903663" y="1858558"/>
+            <a:ext cx="1502909" cy="461665"/>
+          </a:xfrm>
+          <a:prstGeom prst="rect">
+            <a:avLst/>
+          </a:prstGeom>
+          <a:noFill/>
+        </p:spPr>
+        <p:txBody>
+          <a:bodyPr wrap="square" rtlCol="0">
+            <a:spAutoFit/>
+          </a:bodyPr>
+          <a:lstStyle/>
+          <a:p>
+            <a:r>
+              <a:rPr lang="en-US" sz="1200" b="1" dirty="0">
+                <a:solidFill>
+                  <a:schemeClr val="bg1"/>
+                </a:solidFill>
+              </a:rPr>
+              <a:t>Axis-1: Shoulder motor Angle (x)</a:t>
+            </a:r>
+            <a:endParaRPr lang="en-SG" sz="1200" b="1" dirty="0">
+              <a:solidFill>
+                <a:schemeClr val="bg1"/>
+              </a:solidFill>
+            </a:endParaRPr>
+          </a:p>
+        </p:txBody>
+      </p:sp>
+      <p:cxnSp>
+        <p:nvCxnSpPr>
+          <p:cNvPr id="50" name="Connector: Elbow 49">
+            <a:extLst>
+              <a:ext uri="{FF2B5EF4-FFF2-40B4-BE49-F238E27FC236}">
+                <a16:creationId xmlns:a16="http://schemas.microsoft.com/office/drawing/2014/main" id="{47FC9AD3-876B-2A16-3C50-06DE032AB45A}"/>
+              </a:ext>
+            </a:extLst>
+          </p:cNvPr>
+          <p:cNvCxnSpPr>
+            <a:cxnSpLocks/>
+            <a:stCxn id="49" idx="2"/>
+          </p:cNvCxnSpPr>
+          <p:nvPr/>
+        </p:nvCxnSpPr>
+        <p:spPr>
+          <a:xfrm rot="5400000">
+            <a:off x="3940533" y="2126844"/>
+            <a:ext cx="521207" cy="907965"/>
+          </a:xfrm>
+          <a:prstGeom prst="bentConnector2">
+            <a:avLst/>
+          </a:prstGeom>
+          <a:ln>
+            <a:solidFill>
+              <a:schemeClr val="bg1"/>
+            </a:solidFill>
+            <a:prstDash val="sysDash"/>
+            <a:tailEnd type="triangle"/>
+          </a:ln>
+        </p:spPr>
+        <p:style>
+          <a:lnRef idx="2">
+            <a:schemeClr val="accent1"/>
+          </a:lnRef>
+          <a:fillRef idx="0">
+            <a:schemeClr val="accent1"/>
+          </a:fillRef>
+          <a:effectRef idx="1">
+            <a:schemeClr val="accent1"/>
+          </a:effectRef>
+          <a:fontRef idx="minor">
+            <a:schemeClr val="tx1"/>
+          </a:fontRef>
+        </p:style>
+      </p:cxnSp>
+      <p:cxnSp>
+        <p:nvCxnSpPr>
+          <p:cNvPr id="54" name="Connector: Elbow 53">
+            <a:extLst>
+              <a:ext uri="{FF2B5EF4-FFF2-40B4-BE49-F238E27FC236}">
+                <a16:creationId xmlns:a16="http://schemas.microsoft.com/office/drawing/2014/main" id="{069B4D5A-B652-595B-4E4A-D847A842AFB1}"/>
+              </a:ext>
+            </a:extLst>
+          </p:cNvPr>
+          <p:cNvCxnSpPr>
+            <a:cxnSpLocks/>
+            <a:stCxn id="58" idx="2"/>
+          </p:cNvCxnSpPr>
+          <p:nvPr/>
+        </p:nvCxnSpPr>
+        <p:spPr>
+          <a:xfrm rot="5400000">
+            <a:off x="5416289" y="3285686"/>
+            <a:ext cx="537335" cy="681881"/>
+          </a:xfrm>
+          <a:prstGeom prst="bentConnector2">
+            <a:avLst/>
+          </a:prstGeom>
+          <a:ln>
+            <a:solidFill>
+              <a:schemeClr val="bg1"/>
+            </a:solidFill>
+            <a:prstDash val="sysDash"/>
+            <a:tailEnd type="triangle"/>
+          </a:ln>
+        </p:spPr>
+        <p:style>
+          <a:lnRef idx="2">
+            <a:schemeClr val="accent1"/>
+          </a:lnRef>
+          <a:fillRef idx="0">
+            <a:schemeClr val="accent1"/>
+          </a:fillRef>
+          <a:effectRef idx="1">
+            <a:schemeClr val="accent1"/>
+          </a:effectRef>
+          <a:fontRef idx="minor">
+            <a:schemeClr val="tx1"/>
+          </a:fontRef>
+        </p:style>
+      </p:cxnSp>
+      <p:sp>
+        <p:nvSpPr>
+          <p:cNvPr id="58" name="TextBox 57">
+            <a:extLst>
+              <a:ext uri="{FF2B5EF4-FFF2-40B4-BE49-F238E27FC236}">
+                <a16:creationId xmlns:a16="http://schemas.microsoft.com/office/drawing/2014/main" id="{E3F872E2-D867-0F6D-A6CF-D7956EA7F204}"/>
+              </a:ext>
+            </a:extLst>
+          </p:cNvPr>
+          <p:cNvSpPr txBox="1"/>
+          <p:nvPr/>
+        </p:nvSpPr>
+        <p:spPr>
+          <a:xfrm>
+            <a:off x="5383738" y="2896294"/>
+            <a:ext cx="1284315" cy="461665"/>
+          </a:xfrm>
+          <a:prstGeom prst="rect">
+            <a:avLst/>
+          </a:prstGeom>
+          <a:noFill/>
+        </p:spPr>
+        <p:txBody>
+          <a:bodyPr wrap="square" rtlCol="0">
+            <a:spAutoFit/>
+          </a:bodyPr>
+          <a:lstStyle/>
+          <a:p>
+            <a:r>
+              <a:rPr lang="en-US" sz="1200" b="1" dirty="0">
+                <a:solidFill>
+                  <a:schemeClr val="bg1"/>
+                </a:solidFill>
+              </a:rPr>
+              <a:t>Axis-2: Elbow motor angle (y)</a:t>
+            </a:r>
+            <a:endParaRPr lang="en-SG" sz="1200" b="1" dirty="0">
+              <a:solidFill>
+                <a:schemeClr val="bg1"/>
+              </a:solidFill>
+            </a:endParaRPr>
+          </a:p>
+        </p:txBody>
+      </p:sp>
+      <p:sp>
+        <p:nvSpPr>
+          <p:cNvPr id="60" name="TextBox 59">
+            <a:extLst>
+              <a:ext uri="{FF2B5EF4-FFF2-40B4-BE49-F238E27FC236}">
+                <a16:creationId xmlns:a16="http://schemas.microsoft.com/office/drawing/2014/main" id="{3D614081-73F7-A872-D15C-50DB3B16A81A}"/>
+              </a:ext>
+            </a:extLst>
+          </p:cNvPr>
+          <p:cNvSpPr txBox="1"/>
+          <p:nvPr/>
+        </p:nvSpPr>
+        <p:spPr>
+          <a:xfrm>
+            <a:off x="6127009" y="4126283"/>
+            <a:ext cx="1397097" cy="461665"/>
+          </a:xfrm>
+          <a:prstGeom prst="rect">
+            <a:avLst/>
+          </a:prstGeom>
+          <a:noFill/>
+        </p:spPr>
+        <p:txBody>
+          <a:bodyPr wrap="square" rtlCol="0">
+            <a:spAutoFit/>
+          </a:bodyPr>
+          <a:lstStyle/>
+          <a:p>
+            <a:r>
+              <a:rPr lang="en-US" sz="1200" b="1" dirty="0">
+                <a:solidFill>
+                  <a:schemeClr val="bg1"/>
+                </a:solidFill>
+              </a:rPr>
+              <a:t>Axis-3: motor angle (z)</a:t>
+            </a:r>
+            <a:endParaRPr lang="en-SG" sz="1200" b="1" dirty="0">
+              <a:solidFill>
+                <a:schemeClr val="bg1"/>
+              </a:solidFill>
+            </a:endParaRPr>
+          </a:p>
+        </p:txBody>
+      </p:sp>
+      <p:cxnSp>
+        <p:nvCxnSpPr>
+          <p:cNvPr id="61" name="Connector: Elbow 60">
+            <a:extLst>
+              <a:ext uri="{FF2B5EF4-FFF2-40B4-BE49-F238E27FC236}">
+                <a16:creationId xmlns:a16="http://schemas.microsoft.com/office/drawing/2014/main" id="{FDA4E3D9-1C35-E1E5-6497-624166F9FE8C}"/>
+              </a:ext>
+            </a:extLst>
+          </p:cNvPr>
+          <p:cNvCxnSpPr>
+            <a:cxnSpLocks/>
+            <a:stCxn id="60" idx="2"/>
+          </p:cNvCxnSpPr>
+          <p:nvPr/>
+        </p:nvCxnSpPr>
+        <p:spPr>
+          <a:xfrm rot="5400000">
+            <a:off x="6239812" y="4374034"/>
+            <a:ext cx="371832" cy="799660"/>
+          </a:xfrm>
+          <a:prstGeom prst="bentConnector2">
+            <a:avLst/>
+          </a:prstGeom>
+          <a:ln>
+            <a:solidFill>
+              <a:schemeClr val="bg1"/>
+            </a:solidFill>
+            <a:prstDash val="sysDash"/>
+            <a:tailEnd type="triangle"/>
+          </a:ln>
+        </p:spPr>
+        <p:style>
+          <a:lnRef idx="2">
+            <a:schemeClr val="accent1"/>
+          </a:lnRef>
+          <a:fillRef idx="0">
+            <a:schemeClr val="accent1"/>
+          </a:fillRef>
+          <a:effectRef idx="1">
+            <a:schemeClr val="accent1"/>
+          </a:effectRef>
+          <a:fontRef idx="minor">
+            <a:schemeClr val="tx1"/>
+          </a:fontRef>
+        </p:style>
+      </p:cxnSp>
+    </p:spTree>
+    <p:extLst>
+      <p:ext uri="{BB962C8B-B14F-4D97-AF65-F5344CB8AC3E}">
+        <p14:creationId xmlns:p14="http://schemas.microsoft.com/office/powerpoint/2010/main" val="2431481926"/>
       </p:ext>
     </p:extLst>
   </p:cSld>

</xml_diff>

<commit_message>
Improve the auto grab function
</commit_message>
<xml_diff>
--- a/doc/designDoc.pptx
+++ b/doc/designDoc.pptx
@@ -2956,7 +2956,7 @@
           <a:p>
             <a:fld id="{7600FCCF-5CF4-404D-AD1B-36BEF022C4C2}" type="datetimeFigureOut">
               <a:rPr lang="en-SG" smtClean="0"/>
-              <a:t>26/2/2026</a:t>
+              <a:t>27/2/2026</a:t>
             </a:fld>
             <a:endParaRPr lang="en-SG"/>
           </a:p>
@@ -3392,6 +3392,90 @@
 </p:notes>
 </file>
 
+<file path=ppt/notesSlides/notesSlide3.xml><?xml version="1.0" encoding="utf-8"?>
+<p:notes xmlns:a="http://schemas.openxmlformats.org/drawingml/2006/main" xmlns:r="http://schemas.openxmlformats.org/officeDocument/2006/relationships" xmlns:p="http://schemas.openxmlformats.org/presentationml/2006/main">
+  <p:cSld>
+    <p:spTree>
+      <p:nvGrpSpPr>
+        <p:cNvPr id="1" name=""/>
+        <p:cNvGrpSpPr/>
+        <p:nvPr/>
+      </p:nvGrpSpPr>
+      <p:grpSpPr>
+        <a:xfrm>
+          <a:off x="0" y="0"/>
+          <a:ext cx="0" cy="0"/>
+          <a:chOff x="0" y="0"/>
+          <a:chExt cx="0" cy="0"/>
+        </a:xfrm>
+      </p:grpSpPr>
+      <p:sp>
+        <p:nvSpPr>
+          <p:cNvPr id="2" name="Slide Image Placeholder 1"/>
+          <p:cNvSpPr>
+            <a:spLocks noGrp="1" noRot="1" noChangeAspect="1"/>
+          </p:cNvSpPr>
+          <p:nvPr>
+            <p:ph type="sldImg"/>
+          </p:nvPr>
+        </p:nvSpPr>
+        <p:spPr/>
+      </p:sp>
+      <p:sp>
+        <p:nvSpPr>
+          <p:cNvPr id="3" name="Notes Placeholder 2"/>
+          <p:cNvSpPr>
+            <a:spLocks noGrp="1"/>
+          </p:cNvSpPr>
+          <p:nvPr>
+            <p:ph type="body" idx="1"/>
+          </p:nvPr>
+        </p:nvSpPr>
+        <p:spPr/>
+        <p:txBody>
+          <a:bodyPr/>
+          <a:lstStyle/>
+          <a:p>
+            <a:endParaRPr lang="en-SG" dirty="0"/>
+          </a:p>
+        </p:txBody>
+      </p:sp>
+      <p:sp>
+        <p:nvSpPr>
+          <p:cNvPr id="4" name="Slide Number Placeholder 3"/>
+          <p:cNvSpPr>
+            <a:spLocks noGrp="1"/>
+          </p:cNvSpPr>
+          <p:nvPr>
+            <p:ph type="sldNum" sz="quarter" idx="5"/>
+          </p:nvPr>
+        </p:nvSpPr>
+        <p:spPr/>
+        <p:txBody>
+          <a:bodyPr/>
+          <a:lstStyle/>
+          <a:p>
+            <a:fld id="{F1BC0FA0-4E75-4E8D-BF09-11B6D569D5EA}" type="slidenum">
+              <a:rPr lang="en-SG" smtClean="0"/>
+              <a:t>5</a:t>
+            </a:fld>
+            <a:endParaRPr lang="en-SG"/>
+          </a:p>
+        </p:txBody>
+      </p:sp>
+    </p:spTree>
+    <p:extLst>
+      <p:ext uri="{BB962C8B-B14F-4D97-AF65-F5344CB8AC3E}">
+        <p14:creationId xmlns:p14="http://schemas.microsoft.com/office/powerpoint/2010/main" val="2407495812"/>
+      </p:ext>
+    </p:extLst>
+  </p:cSld>
+  <p:clrMapOvr>
+    <a:masterClrMapping/>
+  </p:clrMapOvr>
+</p:notes>
+</file>
+
 <file path=ppt/slideLayouts/slideLayout1.xml><?xml version="1.0" encoding="utf-8"?>
 <p:sldLayout xmlns:a="http://schemas.openxmlformats.org/drawingml/2006/main" xmlns:r="http://schemas.openxmlformats.org/officeDocument/2006/relationships" xmlns:p="http://schemas.openxmlformats.org/presentationml/2006/main" type="title" preserve="1">
   <p:cSld name="Title Slide">
@@ -3541,7 +3625,7 @@
           <a:p>
             <a:fld id="{24E8A18A-5CE4-40C1-8227-52475E3DF71E}" type="datetimeFigureOut">
               <a:rPr lang="en-SG" smtClean="0"/>
-              <a:t>26/2/2026</a:t>
+              <a:t>27/2/2026</a:t>
             </a:fld>
             <a:endParaRPr lang="en-SG"/>
           </a:p>
@@ -3741,7 +3825,7 @@
           <a:p>
             <a:fld id="{24E8A18A-5CE4-40C1-8227-52475E3DF71E}" type="datetimeFigureOut">
               <a:rPr lang="en-SG" smtClean="0"/>
-              <a:t>26/2/2026</a:t>
+              <a:t>27/2/2026</a:t>
             </a:fld>
             <a:endParaRPr lang="en-SG"/>
           </a:p>
@@ -3951,7 +4035,7 @@
           <a:p>
             <a:fld id="{24E8A18A-5CE4-40C1-8227-52475E3DF71E}" type="datetimeFigureOut">
               <a:rPr lang="en-SG" smtClean="0"/>
-              <a:t>26/2/2026</a:t>
+              <a:t>27/2/2026</a:t>
             </a:fld>
             <a:endParaRPr lang="en-SG"/>
           </a:p>
@@ -4151,7 +4235,7 @@
           <a:p>
             <a:fld id="{24E8A18A-5CE4-40C1-8227-52475E3DF71E}" type="datetimeFigureOut">
               <a:rPr lang="en-SG" smtClean="0"/>
-              <a:t>26/2/2026</a:t>
+              <a:t>27/2/2026</a:t>
             </a:fld>
             <a:endParaRPr lang="en-SG"/>
           </a:p>
@@ -4427,7 +4511,7 @@
           <a:p>
             <a:fld id="{24E8A18A-5CE4-40C1-8227-52475E3DF71E}" type="datetimeFigureOut">
               <a:rPr lang="en-SG" smtClean="0"/>
-              <a:t>26/2/2026</a:t>
+              <a:t>27/2/2026</a:t>
             </a:fld>
             <a:endParaRPr lang="en-SG"/>
           </a:p>
@@ -4695,7 +4779,7 @@
           <a:p>
             <a:fld id="{24E8A18A-5CE4-40C1-8227-52475E3DF71E}" type="datetimeFigureOut">
               <a:rPr lang="en-SG" smtClean="0"/>
-              <a:t>26/2/2026</a:t>
+              <a:t>27/2/2026</a:t>
             </a:fld>
             <a:endParaRPr lang="en-SG"/>
           </a:p>
@@ -5110,7 +5194,7 @@
           <a:p>
             <a:fld id="{24E8A18A-5CE4-40C1-8227-52475E3DF71E}" type="datetimeFigureOut">
               <a:rPr lang="en-SG" smtClean="0"/>
-              <a:t>26/2/2026</a:t>
+              <a:t>27/2/2026</a:t>
             </a:fld>
             <a:endParaRPr lang="en-SG"/>
           </a:p>
@@ -5252,7 +5336,7 @@
           <a:p>
             <a:fld id="{24E8A18A-5CE4-40C1-8227-52475E3DF71E}" type="datetimeFigureOut">
               <a:rPr lang="en-SG" smtClean="0"/>
-              <a:t>26/2/2026</a:t>
+              <a:t>27/2/2026</a:t>
             </a:fld>
             <a:endParaRPr lang="en-SG"/>
           </a:p>
@@ -5365,7 +5449,7 @@
           <a:p>
             <a:fld id="{24E8A18A-5CE4-40C1-8227-52475E3DF71E}" type="datetimeFigureOut">
               <a:rPr lang="en-SG" smtClean="0"/>
-              <a:t>26/2/2026</a:t>
+              <a:t>27/2/2026</a:t>
             </a:fld>
             <a:endParaRPr lang="en-SG"/>
           </a:p>
@@ -5678,7 +5762,7 @@
           <a:p>
             <a:fld id="{24E8A18A-5CE4-40C1-8227-52475E3DF71E}" type="datetimeFigureOut">
               <a:rPr lang="en-SG" smtClean="0"/>
-              <a:t>26/2/2026</a:t>
+              <a:t>27/2/2026</a:t>
             </a:fld>
             <a:endParaRPr lang="en-SG"/>
           </a:p>
@@ -5967,7 +6051,7 @@
           <a:p>
             <a:fld id="{24E8A18A-5CE4-40C1-8227-52475E3DF71E}" type="datetimeFigureOut">
               <a:rPr lang="en-SG" smtClean="0"/>
-              <a:t>26/2/2026</a:t>
+              <a:t>27/2/2026</a:t>
             </a:fld>
             <a:endParaRPr lang="en-SG"/>
           </a:p>
@@ -6210,7 +6294,7 @@
           <a:p>
             <a:fld id="{24E8A18A-5CE4-40C1-8227-52475E3DF71E}" type="datetimeFigureOut">
               <a:rPr lang="en-SG" smtClean="0"/>
-              <a:t>26/2/2026</a:t>
+              <a:t>27/2/2026</a:t>
             </a:fld>
             <a:endParaRPr lang="en-SG"/>
           </a:p>
@@ -16288,7 +16372,7 @@
           <p:nvPr/>
         </p:nvPicPr>
         <p:blipFill>
-          <a:blip r:embed="rId2"/>
+          <a:blip r:embed="rId3"/>
           <a:srcRect l="28337" t="31418"/>
           <a:stretch>
             <a:fillRect/>
@@ -16319,7 +16403,7 @@
           <p:nvPr/>
         </p:nvPicPr>
         <p:blipFill>
-          <a:blip r:embed="rId3"/>
+          <a:blip r:embed="rId4"/>
           <a:srcRect r="56454"/>
           <a:stretch>
             <a:fillRect/>
@@ -16867,14 +16951,14 @@
           <p:nvPr/>
         </p:nvPicPr>
         <p:blipFill>
-          <a:blip r:embed="rId4"/>
+          <a:blip r:embed="rId5"/>
           <a:stretch>
             <a:fillRect/>
           </a:stretch>
         </p:blipFill>
         <p:spPr>
           <a:xfrm>
-            <a:off x="8236037" y="396080"/>
+            <a:off x="8162946" y="267152"/>
             <a:ext cx="3799765" cy="3132468"/>
           </a:xfrm>
           <a:prstGeom prst="rect">
@@ -16906,7 +16990,7 @@
           <a:prstGeom prst="bentConnector4">
             <a:avLst>
               <a:gd name="adj1" fmla="val 35180"/>
-              <a:gd name="adj2" fmla="val 150633"/>
+              <a:gd name="adj2" fmla="val 143588"/>
             </a:avLst>
           </a:prstGeom>
           <a:ln>
@@ -16999,8 +17083,8 @@
         </p:nvSpPr>
         <p:spPr>
           <a:xfrm>
-            <a:off x="8314977" y="3821406"/>
-            <a:ext cx="3156244" cy="1754326"/>
+            <a:off x="8257076" y="3549938"/>
+            <a:ext cx="3517883" cy="2308324"/>
           </a:xfrm>
           <a:prstGeom prst="rect">
             <a:avLst/>
@@ -17015,77 +17099,65 @@
           <a:p>
             <a:r>
               <a:rPr lang="en-US" sz="1200" b="1" dirty="0"/>
-              <a:t>theta1</a:t>
-            </a:r>
-            <a:r>
-              <a:rPr lang="en-US" sz="1200" b="1" dirty="0">
-                <a:solidFill>
-                  <a:schemeClr val="bg1"/>
-                </a:solidFill>
-              </a:rPr>
+              <a:t>a = cos(theta1)*1.5</a:t>
+            </a:r>
+          </a:p>
+          <a:p>
+            <a:r>
+              <a:rPr lang="en-US" sz="1200" b="1" dirty="0"/>
+              <a:t>b = cos(theta1+theta2)*1</a:t>
+            </a:r>
+          </a:p>
+          <a:p>
+            <a:r>
+              <a:rPr lang="en-US" sz="1200" b="1" dirty="0"/>
+              <a:t>c = cos(theta1+theta2+theta3)*0.5</a:t>
+            </a:r>
+          </a:p>
+          <a:p>
+            <a:endParaRPr lang="en-US" sz="1200" b="1" dirty="0"/>
+          </a:p>
+          <a:p>
+            <a:r>
+              <a:rPr lang="en-US" sz="1200" b="1" dirty="0"/>
+              <a:t>X-Axis Cube distance =  sqrt(x^2 + y^2) = a +b +c</a:t>
+            </a:r>
+          </a:p>
+          <a:p>
+            <a:endParaRPr lang="en-US" sz="1200" b="1" dirty="0"/>
+          </a:p>
+          <a:p>
+            <a:r>
+              <a:rPr lang="en-US" sz="1200" b="1" dirty="0"/>
+              <a:t>d = sing(theta1)*1.5</a:t>
+            </a:r>
+          </a:p>
+          <a:p>
+            <a:r>
+              <a:rPr lang="en-US" sz="1200" b="1" dirty="0"/>
+              <a:t>e = sing(theta1+theta2)*1</a:t>
+            </a:r>
+          </a:p>
+          <a:p>
+            <a:r>
+              <a:rPr lang="en-US" sz="1200" b="1" dirty="0"/>
+              <a:t>f = sin(theta1+theta2+theta3)*0.5</a:t>
+            </a:r>
+          </a:p>
+          <a:p>
+            <a:endParaRPr lang="en-US" sz="1200" b="1" dirty="0"/>
+          </a:p>
+          <a:p>
+            <a:r>
+              <a:rPr lang="en-US" sz="1200" b="1" dirty="0"/>
+              <a:t>Z-Axis distance =  2 = d +e +f </a:t>
+            </a:r>
+            <a:endParaRPr lang="en-SG" sz="1200" b="1" dirty="0"/>
+          </a:p>
+          <a:p>
+            <a:r>
+              <a:rPr lang="en-US" sz="1200" b="1" dirty="0"/>
               <a:t> </a:t>
-            </a:r>
-            <a:r>
-              <a:rPr lang="en-US" sz="1200" b="1" dirty="0"/>
-              <a:t>: Shoulder motor Angle </a:t>
-            </a:r>
-          </a:p>
-          <a:p>
-            <a:r>
-              <a:rPr lang="en-US" sz="1200" b="1" dirty="0"/>
-              <a:t>theta2 : Elbow motor angle</a:t>
-            </a:r>
-          </a:p>
-          <a:p>
-            <a:r>
-              <a:rPr lang="en-US" sz="1200" b="1" dirty="0"/>
-              <a:t>theta3: Wrist</a:t>
-            </a:r>
-            <a:r>
-              <a:rPr lang="en-US" sz="1200" b="1" dirty="0">
-                <a:solidFill>
-                  <a:schemeClr val="bg1"/>
-                </a:solidFill>
-              </a:rPr>
-              <a:t> </a:t>
-            </a:r>
-            <a:r>
-              <a:rPr lang="en-US" sz="1200" b="1" dirty="0"/>
-              <a:t>motor angle</a:t>
-            </a:r>
-          </a:p>
-          <a:p>
-            <a:endParaRPr lang="en-US" sz="1200" b="1" dirty="0">
-              <a:solidFill>
-                <a:schemeClr val="bg1"/>
-              </a:solidFill>
-            </a:endParaRPr>
-          </a:p>
-          <a:p>
-            <a:r>
-              <a:rPr lang="en-US" sz="1200" b="1" dirty="0"/>
-              <a:t>a = sin(90-theta1)*1.5</a:t>
-            </a:r>
-          </a:p>
-          <a:p>
-            <a:r>
-              <a:rPr lang="en-US" sz="1200" b="1" dirty="0"/>
-              <a:t>b = sin(90-theta1-theta2)*1</a:t>
-            </a:r>
-          </a:p>
-          <a:p>
-            <a:r>
-              <a:rPr lang="en-US" sz="1200" b="1" dirty="0"/>
-              <a:t>c = sin(90-theta1-theta2-theta3)*0.5</a:t>
-            </a:r>
-          </a:p>
-          <a:p>
-            <a:endParaRPr lang="en-US" sz="1200" b="1" dirty="0"/>
-          </a:p>
-          <a:p>
-            <a:r>
-              <a:rPr lang="en-US" sz="1200" b="1" dirty="0"/>
-              <a:t>Cube distance =  sqrt(x^2 + y^2) = a +b +c </a:t>
             </a:r>
             <a:endParaRPr lang="en-SG" sz="1200" b="1" dirty="0"/>
           </a:p>
@@ -17105,7 +17177,7 @@
         </p:nvCxnSpPr>
         <p:spPr>
           <a:xfrm>
-            <a:off x="10081055" y="1984248"/>
+            <a:off x="10045726" y="1897917"/>
             <a:ext cx="0" cy="1094153"/>
           </a:xfrm>
           <a:prstGeom prst="line">
@@ -17191,7 +17263,7 @@
         </p:nvSpPr>
         <p:spPr>
           <a:xfrm>
-            <a:off x="9397189" y="2589751"/>
+            <a:off x="9375745" y="2493590"/>
             <a:ext cx="280388" cy="276999"/>
           </a:xfrm>
           <a:prstGeom prst="rect">
@@ -17237,7 +17309,7 @@
         </p:nvCxnSpPr>
         <p:spPr>
           <a:xfrm>
-            <a:off x="9105313" y="2851558"/>
+            <a:off x="9045472" y="2851972"/>
             <a:ext cx="910705" cy="0"/>
           </a:xfrm>
           <a:prstGeom prst="straightConnector1">
@@ -17283,7 +17355,7 @@
         </p:nvCxnSpPr>
         <p:spPr>
           <a:xfrm>
-            <a:off x="10081055" y="2851558"/>
+            <a:off x="10045726" y="2854932"/>
             <a:ext cx="517216" cy="0"/>
           </a:xfrm>
           <a:prstGeom prst="straightConnector1">
@@ -17327,7 +17399,7 @@
         </p:nvSpPr>
         <p:spPr>
           <a:xfrm>
-            <a:off x="10199469" y="2570408"/>
+            <a:off x="10110228" y="2538727"/>
             <a:ext cx="280388" cy="276999"/>
           </a:xfrm>
           <a:prstGeom prst="rect">
@@ -17373,7 +17445,7 @@
         </p:nvCxnSpPr>
         <p:spPr>
           <a:xfrm>
-            <a:off x="10723426" y="2900641"/>
+            <a:off x="10723426" y="2832509"/>
             <a:ext cx="267662" cy="0"/>
           </a:xfrm>
           <a:prstGeom prst="straightConnector1">
@@ -17417,7 +17489,7 @@
         </p:nvSpPr>
         <p:spPr>
           <a:xfrm>
-            <a:off x="10768125" y="2555510"/>
+            <a:off x="10736483" y="2497861"/>
             <a:ext cx="280388" cy="276999"/>
           </a:xfrm>
           <a:prstGeom prst="rect">
@@ -17444,6 +17516,519 @@
                 <a:schemeClr val="bg1"/>
               </a:solidFill>
             </a:endParaRPr>
+          </a:p>
+        </p:txBody>
+      </p:sp>
+      <p:cxnSp>
+        <p:nvCxnSpPr>
+          <p:cNvPr id="2" name="Straight Connector 1">
+            <a:extLst>
+              <a:ext uri="{FF2B5EF4-FFF2-40B4-BE49-F238E27FC236}">
+                <a16:creationId xmlns:a16="http://schemas.microsoft.com/office/drawing/2014/main" id="{DA4FB0B2-5966-89DA-3AF4-DED50E12CEFF}"/>
+              </a:ext>
+            </a:extLst>
+          </p:cNvPr>
+          <p:cNvCxnSpPr>
+            <a:cxnSpLocks/>
+          </p:cNvCxnSpPr>
+          <p:nvPr/>
+        </p:nvCxnSpPr>
+        <p:spPr>
+          <a:xfrm flipH="1">
+            <a:off x="8653835" y="1895882"/>
+            <a:ext cx="1406182" cy="0"/>
+          </a:xfrm>
+          <a:prstGeom prst="line">
+            <a:avLst/>
+          </a:prstGeom>
+          <a:ln>
+            <a:solidFill>
+              <a:srgbClr val="00FF00"/>
+            </a:solidFill>
+            <a:prstDash val="sysDash"/>
+          </a:ln>
+        </p:spPr>
+        <p:style>
+          <a:lnRef idx="2">
+            <a:schemeClr val="accent1"/>
+          </a:lnRef>
+          <a:fillRef idx="0">
+            <a:schemeClr val="accent1"/>
+          </a:fillRef>
+          <a:effectRef idx="1">
+            <a:schemeClr val="accent1"/>
+          </a:effectRef>
+          <a:fontRef idx="minor">
+            <a:schemeClr val="tx1"/>
+          </a:fontRef>
+        </p:style>
+      </p:cxnSp>
+      <p:cxnSp>
+        <p:nvCxnSpPr>
+          <p:cNvPr id="8" name="Straight Connector 7">
+            <a:extLst>
+              <a:ext uri="{FF2B5EF4-FFF2-40B4-BE49-F238E27FC236}">
+                <a16:creationId xmlns:a16="http://schemas.microsoft.com/office/drawing/2014/main" id="{0E8931E2-54BB-B641-8663-1230393E5C6A}"/>
+              </a:ext>
+            </a:extLst>
+          </p:cNvPr>
+          <p:cNvCxnSpPr>
+            <a:cxnSpLocks/>
+          </p:cNvCxnSpPr>
+          <p:nvPr/>
+        </p:nvCxnSpPr>
+        <p:spPr>
+          <a:xfrm flipH="1">
+            <a:off x="8627420" y="2428419"/>
+            <a:ext cx="1970851" cy="0"/>
+          </a:xfrm>
+          <a:prstGeom prst="line">
+            <a:avLst/>
+          </a:prstGeom>
+          <a:ln>
+            <a:solidFill>
+              <a:srgbClr val="00FF00"/>
+            </a:solidFill>
+            <a:prstDash val="sysDash"/>
+          </a:ln>
+        </p:spPr>
+        <p:style>
+          <a:lnRef idx="2">
+            <a:schemeClr val="accent1"/>
+          </a:lnRef>
+          <a:fillRef idx="0">
+            <a:schemeClr val="accent1"/>
+          </a:fillRef>
+          <a:effectRef idx="1">
+            <a:schemeClr val="accent1"/>
+          </a:effectRef>
+          <a:fontRef idx="minor">
+            <a:schemeClr val="tx1"/>
+          </a:fontRef>
+        </p:style>
+      </p:cxnSp>
+      <p:cxnSp>
+        <p:nvCxnSpPr>
+          <p:cNvPr id="16" name="Straight Arrow Connector 15">
+            <a:extLst>
+              <a:ext uri="{FF2B5EF4-FFF2-40B4-BE49-F238E27FC236}">
+                <a16:creationId xmlns:a16="http://schemas.microsoft.com/office/drawing/2014/main" id="{8351A099-4444-A739-370D-3890A0F489E2}"/>
+              </a:ext>
+            </a:extLst>
+          </p:cNvPr>
+          <p:cNvCxnSpPr>
+            <a:cxnSpLocks/>
+          </p:cNvCxnSpPr>
+          <p:nvPr/>
+        </p:nvCxnSpPr>
+        <p:spPr>
+          <a:xfrm>
+            <a:off x="8669737" y="1390577"/>
+            <a:ext cx="0" cy="489403"/>
+          </a:xfrm>
+          <a:prstGeom prst="straightConnector1">
+            <a:avLst/>
+          </a:prstGeom>
+          <a:ln>
+            <a:solidFill>
+              <a:schemeClr val="bg1"/>
+            </a:solidFill>
+            <a:prstDash val="sysDash"/>
+            <a:headEnd type="triangle"/>
+            <a:tailEnd type="triangle"/>
+          </a:ln>
+        </p:spPr>
+        <p:style>
+          <a:lnRef idx="2">
+            <a:schemeClr val="accent1"/>
+          </a:lnRef>
+          <a:fillRef idx="0">
+            <a:schemeClr val="accent1"/>
+          </a:fillRef>
+          <a:effectRef idx="1">
+            <a:schemeClr val="accent1"/>
+          </a:effectRef>
+          <a:fontRef idx="minor">
+            <a:schemeClr val="tx1"/>
+          </a:fontRef>
+        </p:style>
+      </p:cxnSp>
+      <p:sp>
+        <p:nvSpPr>
+          <p:cNvPr id="26" name="TextBox 25">
+            <a:extLst>
+              <a:ext uri="{FF2B5EF4-FFF2-40B4-BE49-F238E27FC236}">
+                <a16:creationId xmlns:a16="http://schemas.microsoft.com/office/drawing/2014/main" id="{1E3D2172-86AA-6A3C-4EF0-774798CC37AB}"/>
+              </a:ext>
+            </a:extLst>
+          </p:cNvPr>
+          <p:cNvSpPr txBox="1"/>
+          <p:nvPr/>
+        </p:nvSpPr>
+        <p:spPr>
+          <a:xfrm>
+            <a:off x="8379016" y="1517166"/>
+            <a:ext cx="280388" cy="276999"/>
+          </a:xfrm>
+          <a:prstGeom prst="rect">
+            <a:avLst/>
+          </a:prstGeom>
+          <a:noFill/>
+        </p:spPr>
+        <p:txBody>
+          <a:bodyPr wrap="square" rtlCol="0">
+            <a:spAutoFit/>
+          </a:bodyPr>
+          <a:lstStyle/>
+          <a:p>
+            <a:r>
+              <a:rPr lang="en-US" sz="1200" b="1" dirty="0">
+                <a:solidFill>
+                  <a:schemeClr val="bg1"/>
+                </a:solidFill>
+              </a:rPr>
+              <a:t>d</a:t>
+            </a:r>
+            <a:endParaRPr lang="en-SG" sz="1200" b="1" dirty="0">
+              <a:solidFill>
+                <a:schemeClr val="bg1"/>
+              </a:solidFill>
+            </a:endParaRPr>
+          </a:p>
+        </p:txBody>
+      </p:sp>
+      <p:cxnSp>
+        <p:nvCxnSpPr>
+          <p:cNvPr id="27" name="Straight Arrow Connector 26">
+            <a:extLst>
+              <a:ext uri="{FF2B5EF4-FFF2-40B4-BE49-F238E27FC236}">
+                <a16:creationId xmlns:a16="http://schemas.microsoft.com/office/drawing/2014/main" id="{51FCE43D-D743-93F7-27C6-95EB30DD5E33}"/>
+              </a:ext>
+            </a:extLst>
+          </p:cNvPr>
+          <p:cNvCxnSpPr>
+            <a:cxnSpLocks/>
+          </p:cNvCxnSpPr>
+          <p:nvPr/>
+        </p:nvCxnSpPr>
+        <p:spPr>
+          <a:xfrm>
+            <a:off x="8684149" y="1925488"/>
+            <a:ext cx="0" cy="489403"/>
+          </a:xfrm>
+          <a:prstGeom prst="straightConnector1">
+            <a:avLst/>
+          </a:prstGeom>
+          <a:ln>
+            <a:solidFill>
+              <a:schemeClr val="bg1"/>
+            </a:solidFill>
+            <a:prstDash val="sysDash"/>
+            <a:headEnd type="triangle"/>
+            <a:tailEnd type="triangle"/>
+          </a:ln>
+        </p:spPr>
+        <p:style>
+          <a:lnRef idx="2">
+            <a:schemeClr val="accent1"/>
+          </a:lnRef>
+          <a:fillRef idx="0">
+            <a:schemeClr val="accent1"/>
+          </a:fillRef>
+          <a:effectRef idx="1">
+            <a:schemeClr val="accent1"/>
+          </a:effectRef>
+          <a:fontRef idx="minor">
+            <a:schemeClr val="tx1"/>
+          </a:fontRef>
+        </p:style>
+      </p:cxnSp>
+      <p:sp>
+        <p:nvSpPr>
+          <p:cNvPr id="28" name="TextBox 27">
+            <a:extLst>
+              <a:ext uri="{FF2B5EF4-FFF2-40B4-BE49-F238E27FC236}">
+                <a16:creationId xmlns:a16="http://schemas.microsoft.com/office/drawing/2014/main" id="{FB1786D2-1F4F-2251-8E6C-F0D03CC2A65B}"/>
+              </a:ext>
+            </a:extLst>
+          </p:cNvPr>
+          <p:cNvSpPr txBox="1"/>
+          <p:nvPr/>
+        </p:nvSpPr>
+        <p:spPr>
+          <a:xfrm>
+            <a:off x="8372479" y="2050946"/>
+            <a:ext cx="280388" cy="276999"/>
+          </a:xfrm>
+          <a:prstGeom prst="rect">
+            <a:avLst/>
+          </a:prstGeom>
+          <a:noFill/>
+        </p:spPr>
+        <p:txBody>
+          <a:bodyPr wrap="square" rtlCol="0">
+            <a:spAutoFit/>
+          </a:bodyPr>
+          <a:lstStyle/>
+          <a:p>
+            <a:r>
+              <a:rPr lang="en-US" sz="1200" b="1" dirty="0">
+                <a:solidFill>
+                  <a:schemeClr val="bg1"/>
+                </a:solidFill>
+              </a:rPr>
+              <a:t>e</a:t>
+            </a:r>
+            <a:endParaRPr lang="en-SG" sz="1200" b="1" dirty="0">
+              <a:solidFill>
+                <a:schemeClr val="bg1"/>
+              </a:solidFill>
+            </a:endParaRPr>
+          </a:p>
+        </p:txBody>
+      </p:sp>
+      <p:cxnSp>
+        <p:nvCxnSpPr>
+          <p:cNvPr id="29" name="Straight Arrow Connector 28">
+            <a:extLst>
+              <a:ext uri="{FF2B5EF4-FFF2-40B4-BE49-F238E27FC236}">
+                <a16:creationId xmlns:a16="http://schemas.microsoft.com/office/drawing/2014/main" id="{6A49B8B2-FD85-5778-AFD9-94BFC5B3854A}"/>
+              </a:ext>
+            </a:extLst>
+          </p:cNvPr>
+          <p:cNvCxnSpPr>
+            <a:cxnSpLocks/>
+          </p:cNvCxnSpPr>
+          <p:nvPr/>
+        </p:nvCxnSpPr>
+        <p:spPr>
+          <a:xfrm>
+            <a:off x="8684149" y="2480730"/>
+            <a:ext cx="0" cy="456353"/>
+          </a:xfrm>
+          <a:prstGeom prst="straightConnector1">
+            <a:avLst/>
+          </a:prstGeom>
+          <a:ln>
+            <a:solidFill>
+              <a:schemeClr val="bg1"/>
+            </a:solidFill>
+            <a:prstDash val="sysDash"/>
+            <a:headEnd type="triangle"/>
+            <a:tailEnd type="triangle"/>
+          </a:ln>
+        </p:spPr>
+        <p:style>
+          <a:lnRef idx="2">
+            <a:schemeClr val="accent1"/>
+          </a:lnRef>
+          <a:fillRef idx="0">
+            <a:schemeClr val="accent1"/>
+          </a:fillRef>
+          <a:effectRef idx="1">
+            <a:schemeClr val="accent1"/>
+          </a:effectRef>
+          <a:fontRef idx="minor">
+            <a:schemeClr val="tx1"/>
+          </a:fontRef>
+        </p:style>
+      </p:cxnSp>
+      <p:sp>
+        <p:nvSpPr>
+          <p:cNvPr id="33" name="TextBox 32">
+            <a:extLst>
+              <a:ext uri="{FF2B5EF4-FFF2-40B4-BE49-F238E27FC236}">
+                <a16:creationId xmlns:a16="http://schemas.microsoft.com/office/drawing/2014/main" id="{67977AC6-F5FD-CCC9-9E18-80CCB6CCD221}"/>
+              </a:ext>
+            </a:extLst>
+          </p:cNvPr>
+          <p:cNvSpPr txBox="1"/>
+          <p:nvPr/>
+        </p:nvSpPr>
+        <p:spPr>
+          <a:xfrm>
+            <a:off x="8433883" y="2577933"/>
+            <a:ext cx="280388" cy="276999"/>
+          </a:xfrm>
+          <a:prstGeom prst="rect">
+            <a:avLst/>
+          </a:prstGeom>
+          <a:noFill/>
+        </p:spPr>
+        <p:txBody>
+          <a:bodyPr wrap="square" rtlCol="0">
+            <a:spAutoFit/>
+          </a:bodyPr>
+          <a:lstStyle/>
+          <a:p>
+            <a:r>
+              <a:rPr lang="en-US" sz="1200" b="1" dirty="0">
+                <a:solidFill>
+                  <a:schemeClr val="bg1"/>
+                </a:solidFill>
+              </a:rPr>
+              <a:t>f</a:t>
+            </a:r>
+            <a:endParaRPr lang="en-SG" sz="1200" b="1" dirty="0">
+              <a:solidFill>
+                <a:schemeClr val="bg1"/>
+              </a:solidFill>
+            </a:endParaRPr>
+          </a:p>
+        </p:txBody>
+      </p:sp>
+      <p:sp>
+        <p:nvSpPr>
+          <p:cNvPr id="35" name="TextBox 34">
+            <a:extLst>
+              <a:ext uri="{FF2B5EF4-FFF2-40B4-BE49-F238E27FC236}">
+                <a16:creationId xmlns:a16="http://schemas.microsoft.com/office/drawing/2014/main" id="{89AF792D-9737-28DA-7447-D82A1526CC9C}"/>
+              </a:ext>
+            </a:extLst>
+          </p:cNvPr>
+          <p:cNvSpPr txBox="1"/>
+          <p:nvPr/>
+        </p:nvSpPr>
+        <p:spPr>
+          <a:xfrm>
+            <a:off x="329183" y="341241"/>
+            <a:ext cx="3517883" cy="1173655"/>
+          </a:xfrm>
+          <a:prstGeom prst="rect">
+            <a:avLst/>
+          </a:prstGeom>
+          <a:noFill/>
+        </p:spPr>
+        <p:txBody>
+          <a:bodyPr wrap="square" rtlCol="0">
+            <a:spAutoFit/>
+          </a:bodyPr>
+          <a:lstStyle/>
+          <a:p>
+            <a:pPr marL="171450" indent="-171450">
+              <a:lnSpc>
+                <a:spcPct val="150000"/>
+              </a:lnSpc>
+              <a:buFont typeface="Arial" panose="020B0604020202020204" pitchFamily="34" charset="0"/>
+              <a:buChar char="•"/>
+            </a:pPr>
+            <a:r>
+              <a:rPr lang="en-US" sz="1200" b="1" dirty="0"/>
+              <a:t>theta0:  Base motor rotation angle </a:t>
+            </a:r>
+          </a:p>
+          <a:p>
+            <a:pPr marL="171450" indent="-171450">
+              <a:lnSpc>
+                <a:spcPct val="150000"/>
+              </a:lnSpc>
+              <a:buFont typeface="Arial" panose="020B0604020202020204" pitchFamily="34" charset="0"/>
+              <a:buChar char="•"/>
+            </a:pPr>
+            <a:r>
+              <a:rPr lang="en-US" sz="1200" b="1" dirty="0"/>
+              <a:t>theta1</a:t>
+            </a:r>
+            <a:r>
+              <a:rPr lang="en-US" sz="1200" b="1" dirty="0">
+                <a:solidFill>
+                  <a:schemeClr val="bg1"/>
+                </a:solidFill>
+              </a:rPr>
+              <a:t> </a:t>
+            </a:r>
+            <a:r>
+              <a:rPr lang="en-US" sz="1200" b="1" dirty="0"/>
+              <a:t>: Shoulder motor rotation angle </a:t>
+            </a:r>
+          </a:p>
+          <a:p>
+            <a:pPr marL="171450" indent="-171450">
+              <a:lnSpc>
+                <a:spcPct val="150000"/>
+              </a:lnSpc>
+              <a:buFont typeface="Arial" panose="020B0604020202020204" pitchFamily="34" charset="0"/>
+              <a:buChar char="•"/>
+            </a:pPr>
+            <a:r>
+              <a:rPr lang="en-US" sz="1200" b="1" dirty="0"/>
+              <a:t>theta2 : Elbow motor rotation angle</a:t>
+            </a:r>
+          </a:p>
+          <a:p>
+            <a:pPr marL="171450" indent="-171450">
+              <a:lnSpc>
+                <a:spcPct val="150000"/>
+              </a:lnSpc>
+              <a:buFont typeface="Arial" panose="020B0604020202020204" pitchFamily="34" charset="0"/>
+              <a:buChar char="•"/>
+            </a:pPr>
+            <a:r>
+              <a:rPr lang="en-US" sz="1200" b="1" dirty="0"/>
+              <a:t>theta3: Wrist</a:t>
+            </a:r>
+            <a:r>
+              <a:rPr lang="en-US" sz="1200" b="1" dirty="0">
+                <a:solidFill>
+                  <a:schemeClr val="bg1"/>
+                </a:solidFill>
+              </a:rPr>
+              <a:t> </a:t>
+            </a:r>
+            <a:r>
+              <a:rPr lang="en-US" sz="1200" b="1" dirty="0"/>
+              <a:t>motor rotation angle</a:t>
+            </a:r>
+          </a:p>
+        </p:txBody>
+      </p:sp>
+      <p:sp>
+        <p:nvSpPr>
+          <p:cNvPr id="37" name="Rectangle 36">
+            <a:extLst>
+              <a:ext uri="{FF2B5EF4-FFF2-40B4-BE49-F238E27FC236}">
+                <a16:creationId xmlns:a16="http://schemas.microsoft.com/office/drawing/2014/main" id="{E83EACD7-AF5A-EBC3-CE2E-B843DE2E705C}"/>
+              </a:ext>
+            </a:extLst>
+          </p:cNvPr>
+          <p:cNvSpPr/>
+          <p:nvPr/>
+        </p:nvSpPr>
+        <p:spPr>
+          <a:xfrm>
+            <a:off x="246490" y="267152"/>
+            <a:ext cx="11807687" cy="5449836"/>
+          </a:xfrm>
+          <a:prstGeom prst="rect">
+            <a:avLst/>
+          </a:prstGeom>
+          <a:noFill/>
+          <a:ln>
+            <a:prstDash val="sysDash"/>
+          </a:ln>
+        </p:spPr>
+        <p:style>
+          <a:lnRef idx="2">
+            <a:schemeClr val="accent1">
+              <a:shade val="15000"/>
+            </a:schemeClr>
+          </a:lnRef>
+          <a:fillRef idx="1">
+            <a:schemeClr val="accent1"/>
+          </a:fillRef>
+          <a:effectRef idx="0">
+            <a:schemeClr val="accent1"/>
+          </a:effectRef>
+          <a:fontRef idx="minor">
+            <a:schemeClr val="lt1"/>
+          </a:fontRef>
+        </p:style>
+        <p:txBody>
+          <a:bodyPr rtlCol="0" anchor="ctr"/>
+          <a:lstStyle/>
+          <a:p>
+            <a:pPr algn="ctr"/>
+            <a:endParaRPr lang="en-SG"/>
           </a:p>
         </p:txBody>
       </p:sp>

</xml_diff>

<commit_message>
Added the requirement document, log, introduction of usecase document and the usage manual file.
</commit_message>
<xml_diff>
--- a/doc/designDoc.pptx
+++ b/doc/designDoc.pptx
@@ -5,7 +5,7 @@
     <p:sldMasterId id="2147483648" r:id="rId1"/>
   </p:sldMasterIdLst>
   <p:notesMasterIdLst>
-    <p:notesMasterId r:id="rId8"/>
+    <p:notesMasterId r:id="rId9"/>
   </p:notesMasterIdLst>
   <p:sldIdLst>
     <p:sldId id="256" r:id="rId2"/>
@@ -14,6 +14,7 @@
     <p:sldId id="270" r:id="rId5"/>
     <p:sldId id="271" r:id="rId6"/>
     <p:sldId id="272" r:id="rId7"/>
+    <p:sldId id="273" r:id="rId8"/>
   </p:sldIdLst>
   <p:sldSz cx="12192000" cy="6858000"/>
   <p:notesSz cx="6858000" cy="9144000"/>
@@ -18777,6 +18778,203 @@
 </p:sld>
 </file>
 
+<file path=ppt/slides/slide7.xml><?xml version="1.0" encoding="utf-8"?>
+<p:sld xmlns:a="http://schemas.openxmlformats.org/drawingml/2006/main" xmlns:r="http://schemas.openxmlformats.org/officeDocument/2006/relationships" xmlns:p="http://schemas.openxmlformats.org/presentationml/2006/main">
+  <p:cSld>
+    <p:spTree>
+      <p:nvGrpSpPr>
+        <p:cNvPr id="1" name=""/>
+        <p:cNvGrpSpPr/>
+        <p:nvPr/>
+      </p:nvGrpSpPr>
+      <p:grpSpPr>
+        <a:xfrm>
+          <a:off x="0" y="0"/>
+          <a:ext cx="0" cy="0"/>
+          <a:chOff x="0" y="0"/>
+          <a:chExt cx="0" cy="0"/>
+        </a:xfrm>
+      </p:grpSpPr>
+      <p:pic>
+        <p:nvPicPr>
+          <p:cNvPr id="5" name="Picture 4">
+            <a:extLst>
+              <a:ext uri="{FF2B5EF4-FFF2-40B4-BE49-F238E27FC236}">
+                <a16:creationId xmlns:a16="http://schemas.microsoft.com/office/drawing/2014/main" id="{B22EB05E-1CFC-516A-0049-EA033874CF38}"/>
+              </a:ext>
+            </a:extLst>
+          </p:cNvPr>
+          <p:cNvPicPr>
+            <a:picLocks noChangeAspect="1"/>
+          </p:cNvPicPr>
+          <p:nvPr/>
+        </p:nvPicPr>
+        <p:blipFill>
+          <a:blip r:embed="rId2">
+            <a:extLst>
+              <a:ext uri="{28A0092B-C50C-407E-A947-70E740481C1C}">
+                <a14:useLocalDpi xmlns:a14="http://schemas.microsoft.com/office/drawing/2010/main" val="0"/>
+              </a:ext>
+            </a:extLst>
+          </a:blip>
+          <a:stretch>
+            <a:fillRect/>
+          </a:stretch>
+        </p:blipFill>
+        <p:spPr>
+          <a:xfrm>
+            <a:off x="1268643" y="2075688"/>
+            <a:ext cx="4622881" cy="2907792"/>
+          </a:xfrm>
+          <a:prstGeom prst="rect">
+            <a:avLst/>
+          </a:prstGeom>
+          <a:ln w="6350">
+            <a:solidFill>
+              <a:schemeClr val="tx1"/>
+            </a:solidFill>
+          </a:ln>
+        </p:spPr>
+      </p:pic>
+      <p:pic>
+        <p:nvPicPr>
+          <p:cNvPr id="7" name="Picture 6">
+            <a:extLst>
+              <a:ext uri="{FF2B5EF4-FFF2-40B4-BE49-F238E27FC236}">
+                <a16:creationId xmlns:a16="http://schemas.microsoft.com/office/drawing/2014/main" id="{CC09031B-0A26-E10F-A497-0EBE18319C87}"/>
+              </a:ext>
+            </a:extLst>
+          </p:cNvPr>
+          <p:cNvPicPr>
+            <a:picLocks noChangeAspect="1"/>
+          </p:cNvPicPr>
+          <p:nvPr/>
+        </p:nvPicPr>
+        <p:blipFill>
+          <a:blip r:embed="rId3">
+            <a:extLst>
+              <a:ext uri="{28A0092B-C50C-407E-A947-70E740481C1C}">
+                <a14:useLocalDpi xmlns:a14="http://schemas.microsoft.com/office/drawing/2010/main" val="0"/>
+              </a:ext>
+            </a:extLst>
+          </a:blip>
+          <a:srcRect r="16438"/>
+          <a:stretch>
+            <a:fillRect/>
+          </a:stretch>
+        </p:blipFill>
+        <p:spPr>
+          <a:xfrm>
+            <a:off x="6050749" y="2075688"/>
+            <a:ext cx="4329286" cy="2907792"/>
+          </a:xfrm>
+          <a:prstGeom prst="rect">
+            <a:avLst/>
+          </a:prstGeom>
+          <a:ln w="9525">
+            <a:solidFill>
+              <a:schemeClr val="tx1"/>
+            </a:solidFill>
+          </a:ln>
+        </p:spPr>
+      </p:pic>
+      <p:sp>
+        <p:nvSpPr>
+          <p:cNvPr id="8" name="TextBox 7">
+            <a:extLst>
+              <a:ext uri="{FF2B5EF4-FFF2-40B4-BE49-F238E27FC236}">
+                <a16:creationId xmlns:a16="http://schemas.microsoft.com/office/drawing/2014/main" id="{975A864E-BBAE-D70A-53CB-FA533A0EAE89}"/>
+              </a:ext>
+            </a:extLst>
+          </p:cNvPr>
+          <p:cNvSpPr txBox="1"/>
+          <p:nvPr/>
+        </p:nvSpPr>
+        <p:spPr>
+          <a:xfrm>
+            <a:off x="1196929" y="1726053"/>
+            <a:ext cx="3850559" cy="276999"/>
+          </a:xfrm>
+          <a:prstGeom prst="rect">
+            <a:avLst/>
+          </a:prstGeom>
+          <a:noFill/>
+        </p:spPr>
+        <p:txBody>
+          <a:bodyPr wrap="square" rtlCol="0">
+            <a:spAutoFit/>
+          </a:bodyPr>
+          <a:lstStyle/>
+          <a:p>
+            <a:r>
+              <a:rPr lang="en-US" sz="1200" b="1" dirty="0"/>
+              <a:t>CISS 2024 Control The </a:t>
+            </a:r>
+            <a:r>
+              <a:rPr lang="en-US" sz="1200" b="1" dirty="0" err="1"/>
+              <a:t>Orthanc</a:t>
+            </a:r>
+            <a:r>
+              <a:rPr lang="en-US" sz="1200" b="1" dirty="0"/>
+              <a:t> Obstacles Challenge</a:t>
+            </a:r>
+            <a:endParaRPr lang="en-SG" sz="1200" b="1" dirty="0"/>
+          </a:p>
+        </p:txBody>
+      </p:sp>
+      <p:sp>
+        <p:nvSpPr>
+          <p:cNvPr id="9" name="TextBox 8">
+            <a:extLst>
+              <a:ext uri="{FF2B5EF4-FFF2-40B4-BE49-F238E27FC236}">
+                <a16:creationId xmlns:a16="http://schemas.microsoft.com/office/drawing/2014/main" id="{6591A782-342A-48CA-E058-F3C53DE1C760}"/>
+              </a:ext>
+            </a:extLst>
+          </p:cNvPr>
+          <p:cNvSpPr txBox="1"/>
+          <p:nvPr/>
+        </p:nvSpPr>
+        <p:spPr>
+          <a:xfrm>
+            <a:off x="6005124" y="1726053"/>
+            <a:ext cx="4420535" cy="276999"/>
+          </a:xfrm>
+          <a:prstGeom prst="rect">
+            <a:avLst/>
+          </a:prstGeom>
+          <a:noFill/>
+        </p:spPr>
+        <p:txBody>
+          <a:bodyPr wrap="square" rtlCol="0">
+            <a:spAutoFit/>
+          </a:bodyPr>
+          <a:lstStyle/>
+          <a:p>
+            <a:r>
+              <a:rPr lang="en-US" sz="1200" b="1" dirty="0" err="1"/>
+              <a:t>Deutschlands</a:t>
+            </a:r>
+            <a:r>
+              <a:rPr lang="en-US" sz="1200" b="1" dirty="0"/>
+              <a:t> Bester Hacker 2024 OT Challenge 1 </a:t>
+            </a:r>
+            <a:endParaRPr lang="en-SG" sz="1200" b="1" dirty="0"/>
+          </a:p>
+        </p:txBody>
+      </p:sp>
+    </p:spTree>
+    <p:extLst>
+      <p:ext uri="{BB962C8B-B14F-4D97-AF65-F5344CB8AC3E}">
+        <p14:creationId xmlns:p14="http://schemas.microsoft.com/office/powerpoint/2010/main" val="289983706"/>
+      </p:ext>
+    </p:extLst>
+  </p:cSld>
+  <p:clrMapOvr>
+    <a:masterClrMapping/>
+  </p:clrMapOvr>
+</p:sld>
+</file>
+
 <file path=ppt/theme/theme1.xml><?xml version="1.0" encoding="utf-8"?>
 <a:theme xmlns:a="http://schemas.openxmlformats.org/drawingml/2006/main" name="Office Theme">
   <a:themeElements>

</xml_diff>

<commit_message>
Update the user manual file.
</commit_message>
<xml_diff>
--- a/doc/designDoc.pptx
+++ b/doc/designDoc.pptx
@@ -5,7 +5,7 @@
     <p:sldMasterId id="2147483648" r:id="rId1"/>
   </p:sldMasterIdLst>
   <p:notesMasterIdLst>
-    <p:notesMasterId r:id="rId9"/>
+    <p:notesMasterId r:id="rId10"/>
   </p:notesMasterIdLst>
   <p:sldIdLst>
     <p:sldId id="256" r:id="rId2"/>
@@ -15,6 +15,7 @@
     <p:sldId id="271" r:id="rId6"/>
     <p:sldId id="272" r:id="rId7"/>
     <p:sldId id="273" r:id="rId8"/>
+    <p:sldId id="274" r:id="rId9"/>
   </p:sldIdLst>
   <p:sldSz cx="12192000" cy="6858000"/>
   <p:notesSz cx="6858000" cy="9144000"/>
@@ -18975,6 +18976,1520 @@
 </p:sld>
 </file>
 
+<file path=ppt/slides/slide8.xml><?xml version="1.0" encoding="utf-8"?>
+<p:sld xmlns:a="http://schemas.openxmlformats.org/drawingml/2006/main" xmlns:r="http://schemas.openxmlformats.org/officeDocument/2006/relationships" xmlns:p="http://schemas.openxmlformats.org/presentationml/2006/main">
+  <p:cSld>
+    <p:spTree>
+      <p:nvGrpSpPr>
+        <p:cNvPr id="1" name=""/>
+        <p:cNvGrpSpPr/>
+        <p:nvPr/>
+      </p:nvGrpSpPr>
+      <p:grpSpPr>
+        <a:xfrm>
+          <a:off x="0" y="0"/>
+          <a:ext cx="0" cy="0"/>
+          <a:chOff x="0" y="0"/>
+          <a:chExt cx="0" cy="0"/>
+        </a:xfrm>
+      </p:grpSpPr>
+      <p:sp>
+        <p:nvSpPr>
+          <p:cNvPr id="4" name="Rectangle 3">
+            <a:extLst>
+              <a:ext uri="{FF2B5EF4-FFF2-40B4-BE49-F238E27FC236}">
+                <a16:creationId xmlns:a16="http://schemas.microsoft.com/office/drawing/2014/main" id="{20491055-D03C-9EF0-DEA6-E1FD1173E28C}"/>
+              </a:ext>
+            </a:extLst>
+          </p:cNvPr>
+          <p:cNvSpPr/>
+          <p:nvPr/>
+        </p:nvSpPr>
+        <p:spPr>
+          <a:xfrm>
+            <a:off x="1699076" y="857793"/>
+            <a:ext cx="1648109" cy="842815"/>
+          </a:xfrm>
+          <a:prstGeom prst="rect">
+            <a:avLst/>
+          </a:prstGeom>
+          <a:ln>
+            <a:prstDash val="sysDash"/>
+          </a:ln>
+        </p:spPr>
+        <p:style>
+          <a:lnRef idx="2">
+            <a:schemeClr val="accent6"/>
+          </a:lnRef>
+          <a:fillRef idx="1">
+            <a:schemeClr val="lt1"/>
+          </a:fillRef>
+          <a:effectRef idx="0">
+            <a:schemeClr val="accent6"/>
+          </a:effectRef>
+          <a:fontRef idx="minor">
+            <a:schemeClr val="dk1"/>
+          </a:fontRef>
+        </p:style>
+        <p:txBody>
+          <a:bodyPr rtlCol="0" anchor="ctr"/>
+          <a:lstStyle/>
+          <a:p>
+            <a:pPr algn="ctr"/>
+            <a:endParaRPr lang="en-SG"/>
+          </a:p>
+        </p:txBody>
+      </p:sp>
+      <p:sp>
+        <p:nvSpPr>
+          <p:cNvPr id="6" name="TextBox 5">
+            <a:extLst>
+              <a:ext uri="{FF2B5EF4-FFF2-40B4-BE49-F238E27FC236}">
+                <a16:creationId xmlns:a16="http://schemas.microsoft.com/office/drawing/2014/main" id="{477337DC-9254-203C-3328-7E9E26F09690}"/>
+              </a:ext>
+            </a:extLst>
+          </p:cNvPr>
+          <p:cNvSpPr txBox="1"/>
+          <p:nvPr/>
+        </p:nvSpPr>
+        <p:spPr>
+          <a:xfrm>
+            <a:off x="1699076" y="1244795"/>
+            <a:ext cx="1336383" cy="415498"/>
+          </a:xfrm>
+          <a:prstGeom prst="rect">
+            <a:avLst/>
+          </a:prstGeom>
+          <a:noFill/>
+        </p:spPr>
+        <p:txBody>
+          <a:bodyPr wrap="square" rtlCol="0">
+            <a:spAutoFit/>
+          </a:bodyPr>
+          <a:lstStyle/>
+          <a:p>
+            <a:r>
+              <a:rPr lang="en-US" sz="1050" dirty="0"/>
+              <a:t>Network type : NAT</a:t>
+            </a:r>
+          </a:p>
+          <a:p>
+            <a:r>
+              <a:rPr lang="en-US" sz="1050" dirty="0"/>
+              <a:t>IP:192.168.10.11</a:t>
+            </a:r>
+            <a:endParaRPr lang="en-US" sz="900" dirty="0"/>
+          </a:p>
+        </p:txBody>
+      </p:sp>
+      <p:sp>
+        <p:nvSpPr>
+          <p:cNvPr id="7" name="TextBox 6">
+            <a:extLst>
+              <a:ext uri="{FF2B5EF4-FFF2-40B4-BE49-F238E27FC236}">
+                <a16:creationId xmlns:a16="http://schemas.microsoft.com/office/drawing/2014/main" id="{832EE8BD-7906-243C-8A76-BA4E6EF62F8B}"/>
+              </a:ext>
+            </a:extLst>
+          </p:cNvPr>
+          <p:cNvSpPr txBox="1"/>
+          <p:nvPr/>
+        </p:nvSpPr>
+        <p:spPr>
+          <a:xfrm>
+            <a:off x="1650621" y="322660"/>
+            <a:ext cx="1696564" cy="523220"/>
+          </a:xfrm>
+          <a:prstGeom prst="rect">
+            <a:avLst/>
+          </a:prstGeom>
+          <a:noFill/>
+        </p:spPr>
+        <p:txBody>
+          <a:bodyPr wrap="square" rtlCol="0">
+            <a:spAutoFit/>
+          </a:bodyPr>
+          <a:lstStyle/>
+          <a:p>
+            <a:r>
+              <a:rPr lang="en-US" sz="1400" b="1" dirty="0"/>
+              <a:t>Robot Arm Simulator VM</a:t>
+            </a:r>
+            <a:endParaRPr lang="en-SG" sz="1400" b="1" dirty="0"/>
+          </a:p>
+        </p:txBody>
+      </p:sp>
+      <p:pic>
+        <p:nvPicPr>
+          <p:cNvPr id="8" name="Picture 7">
+            <a:extLst>
+              <a:ext uri="{FF2B5EF4-FFF2-40B4-BE49-F238E27FC236}">
+                <a16:creationId xmlns:a16="http://schemas.microsoft.com/office/drawing/2014/main" id="{229EFE0E-D65D-82D6-6C21-C9B662177C20}"/>
+              </a:ext>
+            </a:extLst>
+          </p:cNvPr>
+          <p:cNvPicPr>
+            <a:picLocks noChangeAspect="1"/>
+          </p:cNvPicPr>
+          <p:nvPr/>
+        </p:nvPicPr>
+        <p:blipFill>
+          <a:blip r:embed="rId2"/>
+          <a:stretch>
+            <a:fillRect/>
+          </a:stretch>
+        </p:blipFill>
+        <p:spPr>
+          <a:xfrm>
+            <a:off x="4266621" y="4038040"/>
+            <a:ext cx="698583" cy="379109"/>
+          </a:xfrm>
+          <a:prstGeom prst="rect">
+            <a:avLst/>
+          </a:prstGeom>
+        </p:spPr>
+      </p:pic>
+      <p:sp>
+        <p:nvSpPr>
+          <p:cNvPr id="11" name="Rectangle 10">
+            <a:extLst>
+              <a:ext uri="{FF2B5EF4-FFF2-40B4-BE49-F238E27FC236}">
+                <a16:creationId xmlns:a16="http://schemas.microsoft.com/office/drawing/2014/main" id="{59080069-6B85-6656-BB15-6EF4235C78C0}"/>
+              </a:ext>
+            </a:extLst>
+          </p:cNvPr>
+          <p:cNvSpPr/>
+          <p:nvPr/>
+        </p:nvSpPr>
+        <p:spPr>
+          <a:xfrm>
+            <a:off x="4221607" y="831376"/>
+            <a:ext cx="1894621" cy="842815"/>
+          </a:xfrm>
+          <a:prstGeom prst="rect">
+            <a:avLst/>
+          </a:prstGeom>
+          <a:ln>
+            <a:prstDash val="sysDash"/>
+          </a:ln>
+        </p:spPr>
+        <p:style>
+          <a:lnRef idx="2">
+            <a:schemeClr val="accent6"/>
+          </a:lnRef>
+          <a:fillRef idx="1">
+            <a:schemeClr val="lt1"/>
+          </a:fillRef>
+          <a:effectRef idx="0">
+            <a:schemeClr val="accent6"/>
+          </a:effectRef>
+          <a:fontRef idx="minor">
+            <a:schemeClr val="dk1"/>
+          </a:fontRef>
+        </p:style>
+        <p:txBody>
+          <a:bodyPr rtlCol="0" anchor="ctr"/>
+          <a:lstStyle/>
+          <a:p>
+            <a:pPr algn="ctr"/>
+            <a:endParaRPr lang="en-SG"/>
+          </a:p>
+        </p:txBody>
+      </p:sp>
+      <p:sp>
+        <p:nvSpPr>
+          <p:cNvPr id="13" name="TextBox 12">
+            <a:extLst>
+              <a:ext uri="{FF2B5EF4-FFF2-40B4-BE49-F238E27FC236}">
+                <a16:creationId xmlns:a16="http://schemas.microsoft.com/office/drawing/2014/main" id="{63106596-9DAB-C364-3851-8D7754FADE4B}"/>
+              </a:ext>
+            </a:extLst>
+          </p:cNvPr>
+          <p:cNvSpPr txBox="1"/>
+          <p:nvPr/>
+        </p:nvSpPr>
+        <p:spPr>
+          <a:xfrm>
+            <a:off x="4221607" y="281700"/>
+            <a:ext cx="1763901" cy="523220"/>
+          </a:xfrm>
+          <a:prstGeom prst="rect">
+            <a:avLst/>
+          </a:prstGeom>
+          <a:noFill/>
+        </p:spPr>
+        <p:txBody>
+          <a:bodyPr wrap="square" rtlCol="0">
+            <a:spAutoFit/>
+          </a:bodyPr>
+          <a:lstStyle/>
+          <a:p>
+            <a:r>
+              <a:rPr lang="en-SG" sz="1400" b="1" dirty="0"/>
+              <a:t>OPCUA PLC Simulator VM </a:t>
+            </a:r>
+          </a:p>
+        </p:txBody>
+      </p:sp>
+      <p:sp>
+        <p:nvSpPr>
+          <p:cNvPr id="14" name="TextBox 13">
+            <a:extLst>
+              <a:ext uri="{FF2B5EF4-FFF2-40B4-BE49-F238E27FC236}">
+                <a16:creationId xmlns:a16="http://schemas.microsoft.com/office/drawing/2014/main" id="{A39790E2-1DB3-8745-B818-FF15713A836A}"/>
+              </a:ext>
+            </a:extLst>
+          </p:cNvPr>
+          <p:cNvSpPr txBox="1"/>
+          <p:nvPr/>
+        </p:nvSpPr>
+        <p:spPr>
+          <a:xfrm>
+            <a:off x="4247418" y="1261035"/>
+            <a:ext cx="1336383" cy="253916"/>
+          </a:xfrm>
+          <a:prstGeom prst="rect">
+            <a:avLst/>
+          </a:prstGeom>
+          <a:noFill/>
+        </p:spPr>
+        <p:txBody>
+          <a:bodyPr wrap="square" rtlCol="0">
+            <a:spAutoFit/>
+          </a:bodyPr>
+          <a:lstStyle/>
+          <a:p>
+            <a:r>
+              <a:rPr lang="en-US" sz="1050" dirty="0"/>
+              <a:t>Network type : NAT</a:t>
+            </a:r>
+          </a:p>
+        </p:txBody>
+      </p:sp>
+      <p:pic>
+        <p:nvPicPr>
+          <p:cNvPr id="23" name="Picture 22">
+            <a:extLst>
+              <a:ext uri="{FF2B5EF4-FFF2-40B4-BE49-F238E27FC236}">
+                <a16:creationId xmlns:a16="http://schemas.microsoft.com/office/drawing/2014/main" id="{C3BBDF92-806B-26A6-6F30-8FF2613B37C6}"/>
+              </a:ext>
+            </a:extLst>
+          </p:cNvPr>
+          <p:cNvPicPr>
+            <a:picLocks noChangeAspect="1"/>
+          </p:cNvPicPr>
+          <p:nvPr/>
+        </p:nvPicPr>
+        <p:blipFill>
+          <a:blip r:embed="rId3"/>
+          <a:stretch>
+            <a:fillRect/>
+          </a:stretch>
+        </p:blipFill>
+        <p:spPr>
+          <a:xfrm>
+            <a:off x="4299852" y="851397"/>
+            <a:ext cx="597205" cy="387795"/>
+          </a:xfrm>
+          <a:prstGeom prst="rect">
+            <a:avLst/>
+          </a:prstGeom>
+        </p:spPr>
+      </p:pic>
+      <p:sp>
+        <p:nvSpPr>
+          <p:cNvPr id="26" name="TextBox 25">
+            <a:extLst>
+              <a:ext uri="{FF2B5EF4-FFF2-40B4-BE49-F238E27FC236}">
+                <a16:creationId xmlns:a16="http://schemas.microsoft.com/office/drawing/2014/main" id="{783245C3-7CA2-A8DD-FAA5-D2F9E6B7161D}"/>
+              </a:ext>
+            </a:extLst>
+          </p:cNvPr>
+          <p:cNvSpPr txBox="1"/>
+          <p:nvPr/>
+        </p:nvSpPr>
+        <p:spPr>
+          <a:xfrm>
+            <a:off x="2127959" y="922565"/>
+            <a:ext cx="1455603" cy="276999"/>
+          </a:xfrm>
+          <a:prstGeom prst="rect">
+            <a:avLst/>
+          </a:prstGeom>
+          <a:noFill/>
+        </p:spPr>
+        <p:txBody>
+          <a:bodyPr wrap="square" rtlCol="0">
+            <a:spAutoFit/>
+          </a:bodyPr>
+          <a:lstStyle/>
+          <a:p>
+            <a:r>
+              <a:rPr lang="en-US" sz="1200" b="1" dirty="0"/>
+              <a:t>Windows 10/11</a:t>
+            </a:r>
+            <a:endParaRPr lang="en-SG" sz="1200" b="1" dirty="0"/>
+          </a:p>
+        </p:txBody>
+      </p:sp>
+      <p:sp>
+        <p:nvSpPr>
+          <p:cNvPr id="27" name="TextBox 26">
+            <a:extLst>
+              <a:ext uri="{FF2B5EF4-FFF2-40B4-BE49-F238E27FC236}">
+                <a16:creationId xmlns:a16="http://schemas.microsoft.com/office/drawing/2014/main" id="{242FF82F-617C-A476-360E-E4548B3CF225}"/>
+              </a:ext>
+            </a:extLst>
+          </p:cNvPr>
+          <p:cNvSpPr txBox="1"/>
+          <p:nvPr/>
+        </p:nvSpPr>
+        <p:spPr>
+          <a:xfrm>
+            <a:off x="4875050" y="916906"/>
+            <a:ext cx="1455603" cy="276999"/>
+          </a:xfrm>
+          <a:prstGeom prst="rect">
+            <a:avLst/>
+          </a:prstGeom>
+          <a:noFill/>
+        </p:spPr>
+        <p:txBody>
+          <a:bodyPr wrap="square" rtlCol="0">
+            <a:spAutoFit/>
+          </a:bodyPr>
+          <a:lstStyle/>
+          <a:p>
+            <a:r>
+              <a:rPr lang="en-US" sz="1200" b="1" dirty="0"/>
+              <a:t>Ubuntu 20.04</a:t>
+            </a:r>
+            <a:endParaRPr lang="en-SG" sz="1200" b="1" dirty="0"/>
+          </a:p>
+        </p:txBody>
+      </p:sp>
+      <p:pic>
+        <p:nvPicPr>
+          <p:cNvPr id="29" name="Picture 28">
+            <a:extLst>
+              <a:ext uri="{FF2B5EF4-FFF2-40B4-BE49-F238E27FC236}">
+                <a16:creationId xmlns:a16="http://schemas.microsoft.com/office/drawing/2014/main" id="{03229587-09FB-7FC1-2537-1B23E830014B}"/>
+              </a:ext>
+            </a:extLst>
+          </p:cNvPr>
+          <p:cNvPicPr>
+            <a:picLocks noChangeAspect="1"/>
+          </p:cNvPicPr>
+          <p:nvPr/>
+        </p:nvPicPr>
+        <p:blipFill>
+          <a:blip r:embed="rId4"/>
+          <a:stretch>
+            <a:fillRect/>
+          </a:stretch>
+        </p:blipFill>
+        <p:spPr>
+          <a:xfrm>
+            <a:off x="1789935" y="921496"/>
+            <a:ext cx="390730" cy="367287"/>
+          </a:xfrm>
+          <a:prstGeom prst="rect">
+            <a:avLst/>
+          </a:prstGeom>
+        </p:spPr>
+      </p:pic>
+      <p:sp>
+        <p:nvSpPr>
+          <p:cNvPr id="32" name="Rectangle 31">
+            <a:extLst>
+              <a:ext uri="{FF2B5EF4-FFF2-40B4-BE49-F238E27FC236}">
+                <a16:creationId xmlns:a16="http://schemas.microsoft.com/office/drawing/2014/main" id="{67EC5E04-7218-B510-94D9-B5DBDF5BB040}"/>
+              </a:ext>
+            </a:extLst>
+          </p:cNvPr>
+          <p:cNvSpPr/>
+          <p:nvPr/>
+        </p:nvSpPr>
+        <p:spPr>
+          <a:xfrm>
+            <a:off x="6990650" y="817784"/>
+            <a:ext cx="1961326" cy="842815"/>
+          </a:xfrm>
+          <a:prstGeom prst="rect">
+            <a:avLst/>
+          </a:prstGeom>
+          <a:ln>
+            <a:prstDash val="sysDash"/>
+          </a:ln>
+        </p:spPr>
+        <p:style>
+          <a:lnRef idx="2">
+            <a:schemeClr val="accent6"/>
+          </a:lnRef>
+          <a:fillRef idx="1">
+            <a:schemeClr val="lt1"/>
+          </a:fillRef>
+          <a:effectRef idx="0">
+            <a:schemeClr val="accent6"/>
+          </a:effectRef>
+          <a:fontRef idx="minor">
+            <a:schemeClr val="dk1"/>
+          </a:fontRef>
+        </p:style>
+        <p:txBody>
+          <a:bodyPr rtlCol="0" anchor="ctr"/>
+          <a:lstStyle/>
+          <a:p>
+            <a:pPr algn="ctr"/>
+            <a:endParaRPr lang="en-SG"/>
+          </a:p>
+        </p:txBody>
+      </p:sp>
+      <p:sp>
+        <p:nvSpPr>
+          <p:cNvPr id="33" name="TextBox 32">
+            <a:extLst>
+              <a:ext uri="{FF2B5EF4-FFF2-40B4-BE49-F238E27FC236}">
+                <a16:creationId xmlns:a16="http://schemas.microsoft.com/office/drawing/2014/main" id="{9FF7E909-A065-1415-041A-84EE631CAECD}"/>
+              </a:ext>
+            </a:extLst>
+          </p:cNvPr>
+          <p:cNvSpPr txBox="1"/>
+          <p:nvPr/>
+        </p:nvSpPr>
+        <p:spPr>
+          <a:xfrm>
+            <a:off x="6859930" y="294564"/>
+            <a:ext cx="1763901" cy="523220"/>
+          </a:xfrm>
+          <a:prstGeom prst="rect">
+            <a:avLst/>
+          </a:prstGeom>
+          <a:noFill/>
+        </p:spPr>
+        <p:txBody>
+          <a:bodyPr wrap="square" rtlCol="0">
+            <a:spAutoFit/>
+          </a:bodyPr>
+          <a:lstStyle/>
+          <a:p>
+            <a:r>
+              <a:rPr lang="en-SG" sz="1400" b="1" dirty="0"/>
+              <a:t>Robot Arm Remote Controller VM </a:t>
+            </a:r>
+          </a:p>
+        </p:txBody>
+      </p:sp>
+      <p:sp>
+        <p:nvSpPr>
+          <p:cNvPr id="34" name="TextBox 33">
+            <a:extLst>
+              <a:ext uri="{FF2B5EF4-FFF2-40B4-BE49-F238E27FC236}">
+                <a16:creationId xmlns:a16="http://schemas.microsoft.com/office/drawing/2014/main" id="{2AB40CA0-1A63-3CAA-C31E-6C1BE1C49B54}"/>
+              </a:ext>
+            </a:extLst>
+          </p:cNvPr>
+          <p:cNvSpPr txBox="1"/>
+          <p:nvPr/>
+        </p:nvSpPr>
+        <p:spPr>
+          <a:xfrm>
+            <a:off x="7365184" y="880833"/>
+            <a:ext cx="1455603" cy="276999"/>
+          </a:xfrm>
+          <a:prstGeom prst="rect">
+            <a:avLst/>
+          </a:prstGeom>
+          <a:noFill/>
+        </p:spPr>
+        <p:txBody>
+          <a:bodyPr wrap="square" rtlCol="0">
+            <a:spAutoFit/>
+          </a:bodyPr>
+          <a:lstStyle/>
+          <a:p>
+            <a:r>
+              <a:rPr lang="en-US" sz="1200" b="1" dirty="0"/>
+              <a:t>Windows 10/11</a:t>
+            </a:r>
+            <a:endParaRPr lang="en-SG" sz="1200" b="1" dirty="0"/>
+          </a:p>
+        </p:txBody>
+      </p:sp>
+      <p:pic>
+        <p:nvPicPr>
+          <p:cNvPr id="35" name="Picture 34">
+            <a:extLst>
+              <a:ext uri="{FF2B5EF4-FFF2-40B4-BE49-F238E27FC236}">
+                <a16:creationId xmlns:a16="http://schemas.microsoft.com/office/drawing/2014/main" id="{C04E1182-6C19-E531-9064-46C68A463559}"/>
+              </a:ext>
+            </a:extLst>
+          </p:cNvPr>
+          <p:cNvPicPr>
+            <a:picLocks noChangeAspect="1"/>
+          </p:cNvPicPr>
+          <p:nvPr/>
+        </p:nvPicPr>
+        <p:blipFill>
+          <a:blip r:embed="rId4"/>
+          <a:stretch>
+            <a:fillRect/>
+          </a:stretch>
+        </p:blipFill>
+        <p:spPr>
+          <a:xfrm>
+            <a:off x="7027160" y="879764"/>
+            <a:ext cx="390730" cy="367287"/>
+          </a:xfrm>
+          <a:prstGeom prst="rect">
+            <a:avLst/>
+          </a:prstGeom>
+        </p:spPr>
+      </p:pic>
+      <p:cxnSp>
+        <p:nvCxnSpPr>
+          <p:cNvPr id="40" name="Straight Connector 39">
+            <a:extLst>
+              <a:ext uri="{FF2B5EF4-FFF2-40B4-BE49-F238E27FC236}">
+                <a16:creationId xmlns:a16="http://schemas.microsoft.com/office/drawing/2014/main" id="{E0C21F18-B84D-A0E6-3903-4EBD6429C892}"/>
+              </a:ext>
+            </a:extLst>
+          </p:cNvPr>
+          <p:cNvCxnSpPr>
+            <a:stCxn id="4" idx="3"/>
+          </p:cNvCxnSpPr>
+          <p:nvPr/>
+        </p:nvCxnSpPr>
+        <p:spPr>
+          <a:xfrm>
+            <a:off x="3347185" y="1279201"/>
+            <a:ext cx="874422" cy="9582"/>
+          </a:xfrm>
+          <a:prstGeom prst="line">
+            <a:avLst/>
+          </a:prstGeom>
+        </p:spPr>
+        <p:style>
+          <a:lnRef idx="2">
+            <a:schemeClr val="accent1"/>
+          </a:lnRef>
+          <a:fillRef idx="0">
+            <a:schemeClr val="accent1"/>
+          </a:fillRef>
+          <a:effectRef idx="1">
+            <a:schemeClr val="accent1"/>
+          </a:effectRef>
+          <a:fontRef idx="minor">
+            <a:schemeClr val="tx1"/>
+          </a:fontRef>
+        </p:style>
+      </p:cxnSp>
+      <p:cxnSp>
+        <p:nvCxnSpPr>
+          <p:cNvPr id="41" name="Straight Connector 40">
+            <a:extLst>
+              <a:ext uri="{FF2B5EF4-FFF2-40B4-BE49-F238E27FC236}">
+                <a16:creationId xmlns:a16="http://schemas.microsoft.com/office/drawing/2014/main" id="{5674E785-039F-6DDD-D854-C9B4DCA9D8F9}"/>
+              </a:ext>
+            </a:extLst>
+          </p:cNvPr>
+          <p:cNvCxnSpPr/>
+          <p:nvPr/>
+        </p:nvCxnSpPr>
+        <p:spPr>
+          <a:xfrm>
+            <a:off x="6116228" y="1294654"/>
+            <a:ext cx="874422" cy="9582"/>
+          </a:xfrm>
+          <a:prstGeom prst="line">
+            <a:avLst/>
+          </a:prstGeom>
+        </p:spPr>
+        <p:style>
+          <a:lnRef idx="2">
+            <a:schemeClr val="accent1"/>
+          </a:lnRef>
+          <a:fillRef idx="0">
+            <a:schemeClr val="accent1"/>
+          </a:fillRef>
+          <a:effectRef idx="1">
+            <a:schemeClr val="accent1"/>
+          </a:effectRef>
+          <a:fontRef idx="minor">
+            <a:schemeClr val="tx1"/>
+          </a:fontRef>
+        </p:style>
+      </p:cxnSp>
+      <p:sp>
+        <p:nvSpPr>
+          <p:cNvPr id="42" name="TextBox 41">
+            <a:extLst>
+              <a:ext uri="{FF2B5EF4-FFF2-40B4-BE49-F238E27FC236}">
+                <a16:creationId xmlns:a16="http://schemas.microsoft.com/office/drawing/2014/main" id="{CA5A8A6C-115F-220A-4921-3758DBB0A51E}"/>
+              </a:ext>
+            </a:extLst>
+          </p:cNvPr>
+          <p:cNvSpPr txBox="1"/>
+          <p:nvPr/>
+        </p:nvSpPr>
+        <p:spPr>
+          <a:xfrm>
+            <a:off x="7027160" y="1279200"/>
+            <a:ext cx="1336383" cy="415498"/>
+          </a:xfrm>
+          <a:prstGeom prst="rect">
+            <a:avLst/>
+          </a:prstGeom>
+          <a:noFill/>
+        </p:spPr>
+        <p:txBody>
+          <a:bodyPr wrap="square" rtlCol="0">
+            <a:spAutoFit/>
+          </a:bodyPr>
+          <a:lstStyle/>
+          <a:p>
+            <a:r>
+              <a:rPr lang="en-US" sz="1050" dirty="0"/>
+              <a:t>Network type : NAT</a:t>
+            </a:r>
+          </a:p>
+          <a:p>
+            <a:r>
+              <a:rPr lang="en-US" sz="1050" dirty="0"/>
+              <a:t>IP:192.168.12.11</a:t>
+            </a:r>
+            <a:endParaRPr lang="en-US" sz="900" dirty="0"/>
+          </a:p>
+        </p:txBody>
+      </p:sp>
+      <p:cxnSp>
+        <p:nvCxnSpPr>
+          <p:cNvPr id="44" name="Straight Arrow Connector 43">
+            <a:extLst>
+              <a:ext uri="{FF2B5EF4-FFF2-40B4-BE49-F238E27FC236}">
+                <a16:creationId xmlns:a16="http://schemas.microsoft.com/office/drawing/2014/main" id="{66802BAA-4EA9-372E-07EC-7434103B33D9}"/>
+              </a:ext>
+            </a:extLst>
+          </p:cNvPr>
+          <p:cNvCxnSpPr/>
+          <p:nvPr/>
+        </p:nvCxnSpPr>
+        <p:spPr>
+          <a:xfrm flipV="1">
+            <a:off x="4051548" y="1452544"/>
+            <a:ext cx="91321" cy="357968"/>
+          </a:xfrm>
+          <a:prstGeom prst="straightConnector1">
+            <a:avLst/>
+          </a:prstGeom>
+          <a:ln>
+            <a:prstDash val="sysDash"/>
+            <a:tailEnd type="triangle"/>
+          </a:ln>
+        </p:spPr>
+        <p:style>
+          <a:lnRef idx="1">
+            <a:schemeClr val="dk1"/>
+          </a:lnRef>
+          <a:fillRef idx="0">
+            <a:schemeClr val="dk1"/>
+          </a:fillRef>
+          <a:effectRef idx="0">
+            <a:schemeClr val="dk1"/>
+          </a:effectRef>
+          <a:fontRef idx="minor">
+            <a:schemeClr val="tx1"/>
+          </a:fontRef>
+        </p:style>
+      </p:cxnSp>
+      <p:sp>
+        <p:nvSpPr>
+          <p:cNvPr id="45" name="TextBox 44">
+            <a:extLst>
+              <a:ext uri="{FF2B5EF4-FFF2-40B4-BE49-F238E27FC236}">
+                <a16:creationId xmlns:a16="http://schemas.microsoft.com/office/drawing/2014/main" id="{C469A092-74BE-DA9B-3251-DC3865DC15C0}"/>
+              </a:ext>
+            </a:extLst>
+          </p:cNvPr>
+          <p:cNvSpPr txBox="1"/>
+          <p:nvPr/>
+        </p:nvSpPr>
+        <p:spPr>
+          <a:xfrm>
+            <a:off x="3335120" y="1854440"/>
+            <a:ext cx="1336383" cy="253916"/>
+          </a:xfrm>
+          <a:prstGeom prst="rect">
+            <a:avLst/>
+          </a:prstGeom>
+          <a:noFill/>
+        </p:spPr>
+        <p:txBody>
+          <a:bodyPr wrap="square" rtlCol="0">
+            <a:spAutoFit/>
+          </a:bodyPr>
+          <a:lstStyle/>
+          <a:p>
+            <a:r>
+              <a:rPr lang="en-US" sz="1050" dirty="0"/>
+              <a:t>IP:192.168.10.12</a:t>
+            </a:r>
+            <a:endParaRPr lang="en-US" sz="900" dirty="0"/>
+          </a:p>
+        </p:txBody>
+      </p:sp>
+      <p:cxnSp>
+        <p:nvCxnSpPr>
+          <p:cNvPr id="46" name="Straight Arrow Connector 45">
+            <a:extLst>
+              <a:ext uri="{FF2B5EF4-FFF2-40B4-BE49-F238E27FC236}">
+                <a16:creationId xmlns:a16="http://schemas.microsoft.com/office/drawing/2014/main" id="{E951263A-4415-D6BD-A5AB-CEBBE240496B}"/>
+              </a:ext>
+            </a:extLst>
+          </p:cNvPr>
+          <p:cNvCxnSpPr>
+            <a:cxnSpLocks/>
+          </p:cNvCxnSpPr>
+          <p:nvPr/>
+        </p:nvCxnSpPr>
+        <p:spPr>
+          <a:xfrm flipH="1" flipV="1">
+            <a:off x="6194966" y="1404680"/>
+            <a:ext cx="92422" cy="368393"/>
+          </a:xfrm>
+          <a:prstGeom prst="straightConnector1">
+            <a:avLst/>
+          </a:prstGeom>
+          <a:ln>
+            <a:prstDash val="sysDash"/>
+            <a:tailEnd type="triangle"/>
+          </a:ln>
+        </p:spPr>
+        <p:style>
+          <a:lnRef idx="1">
+            <a:schemeClr val="dk1"/>
+          </a:lnRef>
+          <a:fillRef idx="0">
+            <a:schemeClr val="dk1"/>
+          </a:fillRef>
+          <a:effectRef idx="0">
+            <a:schemeClr val="dk1"/>
+          </a:effectRef>
+          <a:fontRef idx="minor">
+            <a:schemeClr val="tx1"/>
+          </a:fontRef>
+        </p:style>
+      </p:cxnSp>
+      <p:sp>
+        <p:nvSpPr>
+          <p:cNvPr id="47" name="TextBox 46">
+            <a:extLst>
+              <a:ext uri="{FF2B5EF4-FFF2-40B4-BE49-F238E27FC236}">
+                <a16:creationId xmlns:a16="http://schemas.microsoft.com/office/drawing/2014/main" id="{E6ADF40B-EB51-0B16-F771-93BE38A38FE0}"/>
+              </a:ext>
+            </a:extLst>
+          </p:cNvPr>
+          <p:cNvSpPr txBox="1"/>
+          <p:nvPr/>
+        </p:nvSpPr>
+        <p:spPr>
+          <a:xfrm>
+            <a:off x="5690777" y="1871301"/>
+            <a:ext cx="1336383" cy="253916"/>
+          </a:xfrm>
+          <a:prstGeom prst="rect">
+            <a:avLst/>
+          </a:prstGeom>
+          <a:noFill/>
+        </p:spPr>
+        <p:txBody>
+          <a:bodyPr wrap="square" rtlCol="0">
+            <a:spAutoFit/>
+          </a:bodyPr>
+          <a:lstStyle/>
+          <a:p>
+            <a:r>
+              <a:rPr lang="en-US" sz="1050" dirty="0"/>
+              <a:t>IP:192.168.10.12</a:t>
+            </a:r>
+            <a:endParaRPr lang="en-US" sz="900" dirty="0"/>
+          </a:p>
+        </p:txBody>
+      </p:sp>
+      <p:sp>
+        <p:nvSpPr>
+          <p:cNvPr id="51" name="Rectangle 50">
+            <a:extLst>
+              <a:ext uri="{FF2B5EF4-FFF2-40B4-BE49-F238E27FC236}">
+                <a16:creationId xmlns:a16="http://schemas.microsoft.com/office/drawing/2014/main" id="{5AC375C7-BA5E-F711-8298-35C4EE4DCAA2}"/>
+              </a:ext>
+            </a:extLst>
+          </p:cNvPr>
+          <p:cNvSpPr/>
+          <p:nvPr/>
+        </p:nvSpPr>
+        <p:spPr>
+          <a:xfrm>
+            <a:off x="1732469" y="2897508"/>
+            <a:ext cx="1648109" cy="842815"/>
+          </a:xfrm>
+          <a:prstGeom prst="rect">
+            <a:avLst/>
+          </a:prstGeom>
+          <a:ln>
+            <a:prstDash val="sysDash"/>
+          </a:ln>
+        </p:spPr>
+        <p:style>
+          <a:lnRef idx="2">
+            <a:schemeClr val="accent6"/>
+          </a:lnRef>
+          <a:fillRef idx="1">
+            <a:schemeClr val="lt1"/>
+          </a:fillRef>
+          <a:effectRef idx="0">
+            <a:schemeClr val="accent6"/>
+          </a:effectRef>
+          <a:fontRef idx="minor">
+            <a:schemeClr val="dk1"/>
+          </a:fontRef>
+        </p:style>
+        <p:txBody>
+          <a:bodyPr rtlCol="0" anchor="ctr"/>
+          <a:lstStyle/>
+          <a:p>
+            <a:pPr algn="ctr"/>
+            <a:endParaRPr lang="en-SG"/>
+          </a:p>
+        </p:txBody>
+      </p:sp>
+      <p:sp>
+        <p:nvSpPr>
+          <p:cNvPr id="52" name="TextBox 51">
+            <a:extLst>
+              <a:ext uri="{FF2B5EF4-FFF2-40B4-BE49-F238E27FC236}">
+                <a16:creationId xmlns:a16="http://schemas.microsoft.com/office/drawing/2014/main" id="{1F45A3F5-24C0-348D-233C-5E896A053396}"/>
+              </a:ext>
+            </a:extLst>
+          </p:cNvPr>
+          <p:cNvSpPr txBox="1"/>
+          <p:nvPr/>
+        </p:nvSpPr>
+        <p:spPr>
+          <a:xfrm>
+            <a:off x="1732469" y="3284510"/>
+            <a:ext cx="1336383" cy="415498"/>
+          </a:xfrm>
+          <a:prstGeom prst="rect">
+            <a:avLst/>
+          </a:prstGeom>
+          <a:noFill/>
+        </p:spPr>
+        <p:txBody>
+          <a:bodyPr wrap="square" rtlCol="0">
+            <a:spAutoFit/>
+          </a:bodyPr>
+          <a:lstStyle/>
+          <a:p>
+            <a:r>
+              <a:rPr lang="en-US" sz="1050" dirty="0"/>
+              <a:t>Network type : NAT</a:t>
+            </a:r>
+          </a:p>
+          <a:p>
+            <a:r>
+              <a:rPr lang="en-US" sz="1050" dirty="0"/>
+              <a:t>IP:192.168.10.11</a:t>
+            </a:r>
+            <a:endParaRPr lang="en-US" sz="900" dirty="0"/>
+          </a:p>
+        </p:txBody>
+      </p:sp>
+      <p:sp>
+        <p:nvSpPr>
+          <p:cNvPr id="53" name="TextBox 52">
+            <a:extLst>
+              <a:ext uri="{FF2B5EF4-FFF2-40B4-BE49-F238E27FC236}">
+                <a16:creationId xmlns:a16="http://schemas.microsoft.com/office/drawing/2014/main" id="{20256CA7-9310-91AF-5EAF-E5ADFC61BD3D}"/>
+              </a:ext>
+            </a:extLst>
+          </p:cNvPr>
+          <p:cNvSpPr txBox="1"/>
+          <p:nvPr/>
+        </p:nvSpPr>
+        <p:spPr>
+          <a:xfrm>
+            <a:off x="1684014" y="2362375"/>
+            <a:ext cx="1696564" cy="523220"/>
+          </a:xfrm>
+          <a:prstGeom prst="rect">
+            <a:avLst/>
+          </a:prstGeom>
+          <a:noFill/>
+        </p:spPr>
+        <p:txBody>
+          <a:bodyPr wrap="square" rtlCol="0">
+            <a:spAutoFit/>
+          </a:bodyPr>
+          <a:lstStyle/>
+          <a:p>
+            <a:r>
+              <a:rPr lang="en-US" sz="1400" b="1" dirty="0"/>
+              <a:t>Robot Arm Simulator VM</a:t>
+            </a:r>
+            <a:endParaRPr lang="en-SG" sz="1400" b="1" dirty="0"/>
+          </a:p>
+        </p:txBody>
+      </p:sp>
+      <p:pic>
+        <p:nvPicPr>
+          <p:cNvPr id="54" name="Picture 53">
+            <a:extLst>
+              <a:ext uri="{FF2B5EF4-FFF2-40B4-BE49-F238E27FC236}">
+                <a16:creationId xmlns:a16="http://schemas.microsoft.com/office/drawing/2014/main" id="{EE8F26B4-5B4E-0029-BB3C-CFACDC561264}"/>
+              </a:ext>
+            </a:extLst>
+          </p:cNvPr>
+          <p:cNvPicPr>
+            <a:picLocks noChangeAspect="1"/>
+          </p:cNvPicPr>
+          <p:nvPr/>
+        </p:nvPicPr>
+        <p:blipFill>
+          <a:blip r:embed="rId4"/>
+          <a:stretch>
+            <a:fillRect/>
+          </a:stretch>
+        </p:blipFill>
+        <p:spPr>
+          <a:xfrm>
+            <a:off x="1823328" y="2961211"/>
+            <a:ext cx="390730" cy="367287"/>
+          </a:xfrm>
+          <a:prstGeom prst="rect">
+            <a:avLst/>
+          </a:prstGeom>
+        </p:spPr>
+      </p:pic>
+      <p:sp>
+        <p:nvSpPr>
+          <p:cNvPr id="55" name="Rectangle 54">
+            <a:extLst>
+              <a:ext uri="{FF2B5EF4-FFF2-40B4-BE49-F238E27FC236}">
+                <a16:creationId xmlns:a16="http://schemas.microsoft.com/office/drawing/2014/main" id="{F46938F2-F533-238D-8EDA-6F2E1F12E391}"/>
+              </a:ext>
+            </a:extLst>
+          </p:cNvPr>
+          <p:cNvSpPr/>
+          <p:nvPr/>
+        </p:nvSpPr>
+        <p:spPr>
+          <a:xfrm>
+            <a:off x="3843825" y="2885595"/>
+            <a:ext cx="1894621" cy="842815"/>
+          </a:xfrm>
+          <a:prstGeom prst="rect">
+            <a:avLst/>
+          </a:prstGeom>
+          <a:ln>
+            <a:prstDash val="sysDash"/>
+          </a:ln>
+        </p:spPr>
+        <p:style>
+          <a:lnRef idx="2">
+            <a:schemeClr val="accent6"/>
+          </a:lnRef>
+          <a:fillRef idx="1">
+            <a:schemeClr val="lt1"/>
+          </a:fillRef>
+          <a:effectRef idx="0">
+            <a:schemeClr val="accent6"/>
+          </a:effectRef>
+          <a:fontRef idx="minor">
+            <a:schemeClr val="dk1"/>
+          </a:fontRef>
+        </p:style>
+        <p:txBody>
+          <a:bodyPr rtlCol="0" anchor="ctr"/>
+          <a:lstStyle/>
+          <a:p>
+            <a:pPr algn="ctr"/>
+            <a:endParaRPr lang="en-SG"/>
+          </a:p>
+        </p:txBody>
+      </p:sp>
+      <p:sp>
+        <p:nvSpPr>
+          <p:cNvPr id="56" name="TextBox 55">
+            <a:extLst>
+              <a:ext uri="{FF2B5EF4-FFF2-40B4-BE49-F238E27FC236}">
+                <a16:creationId xmlns:a16="http://schemas.microsoft.com/office/drawing/2014/main" id="{AEEE66E7-F840-022B-BE05-1F0AC3EECBAC}"/>
+              </a:ext>
+            </a:extLst>
+          </p:cNvPr>
+          <p:cNvSpPr txBox="1"/>
+          <p:nvPr/>
+        </p:nvSpPr>
+        <p:spPr>
+          <a:xfrm>
+            <a:off x="3843825" y="2335919"/>
+            <a:ext cx="1763901" cy="523220"/>
+          </a:xfrm>
+          <a:prstGeom prst="rect">
+            <a:avLst/>
+          </a:prstGeom>
+          <a:noFill/>
+        </p:spPr>
+        <p:txBody>
+          <a:bodyPr wrap="square" rtlCol="0">
+            <a:spAutoFit/>
+          </a:bodyPr>
+          <a:lstStyle/>
+          <a:p>
+            <a:r>
+              <a:rPr lang="en-SG" sz="1400" b="1" dirty="0"/>
+              <a:t>OPCUA PLC Simulator VM </a:t>
+            </a:r>
+          </a:p>
+        </p:txBody>
+      </p:sp>
+      <p:sp>
+        <p:nvSpPr>
+          <p:cNvPr id="57" name="TextBox 56">
+            <a:extLst>
+              <a:ext uri="{FF2B5EF4-FFF2-40B4-BE49-F238E27FC236}">
+                <a16:creationId xmlns:a16="http://schemas.microsoft.com/office/drawing/2014/main" id="{C734EB77-4007-EF86-2E3A-489A7531544C}"/>
+              </a:ext>
+            </a:extLst>
+          </p:cNvPr>
+          <p:cNvSpPr txBox="1"/>
+          <p:nvPr/>
+        </p:nvSpPr>
+        <p:spPr>
+          <a:xfrm>
+            <a:off x="3869636" y="3315254"/>
+            <a:ext cx="1492555" cy="577081"/>
+          </a:xfrm>
+          <a:prstGeom prst="rect">
+            <a:avLst/>
+          </a:prstGeom>
+          <a:noFill/>
+        </p:spPr>
+        <p:txBody>
+          <a:bodyPr wrap="square" rtlCol="0">
+            <a:spAutoFit/>
+          </a:bodyPr>
+          <a:lstStyle/>
+          <a:p>
+            <a:r>
+              <a:rPr lang="en-US" sz="1050" dirty="0"/>
+              <a:t>Network type : NAT</a:t>
+            </a:r>
+          </a:p>
+          <a:p>
+            <a:r>
+              <a:rPr lang="en-US" sz="1050" dirty="0"/>
+              <a:t>IP:192.168.10.12</a:t>
+            </a:r>
+            <a:endParaRPr lang="en-US" sz="900" dirty="0"/>
+          </a:p>
+          <a:p>
+            <a:endParaRPr lang="en-US" sz="1050" dirty="0"/>
+          </a:p>
+        </p:txBody>
+      </p:sp>
+      <p:pic>
+        <p:nvPicPr>
+          <p:cNvPr id="58" name="Picture 57">
+            <a:extLst>
+              <a:ext uri="{FF2B5EF4-FFF2-40B4-BE49-F238E27FC236}">
+                <a16:creationId xmlns:a16="http://schemas.microsoft.com/office/drawing/2014/main" id="{2149F699-B36B-CA4D-C11E-21A45A078DA6}"/>
+              </a:ext>
+            </a:extLst>
+          </p:cNvPr>
+          <p:cNvPicPr>
+            <a:picLocks noChangeAspect="1"/>
+          </p:cNvPicPr>
+          <p:nvPr/>
+        </p:nvPicPr>
+        <p:blipFill>
+          <a:blip r:embed="rId3"/>
+          <a:stretch>
+            <a:fillRect/>
+          </a:stretch>
+        </p:blipFill>
+        <p:spPr>
+          <a:xfrm>
+            <a:off x="3922070" y="2905616"/>
+            <a:ext cx="597205" cy="387795"/>
+          </a:xfrm>
+          <a:prstGeom prst="rect">
+            <a:avLst/>
+          </a:prstGeom>
+        </p:spPr>
+      </p:pic>
+      <p:sp>
+        <p:nvSpPr>
+          <p:cNvPr id="59" name="Rectangle 58">
+            <a:extLst>
+              <a:ext uri="{FF2B5EF4-FFF2-40B4-BE49-F238E27FC236}">
+                <a16:creationId xmlns:a16="http://schemas.microsoft.com/office/drawing/2014/main" id="{AFC9B1B6-5C00-A6AD-A1D3-3A88B4B983A8}"/>
+              </a:ext>
+            </a:extLst>
+          </p:cNvPr>
+          <p:cNvSpPr/>
+          <p:nvPr/>
+        </p:nvSpPr>
+        <p:spPr>
+          <a:xfrm>
+            <a:off x="6224732" y="2885595"/>
+            <a:ext cx="1961326" cy="842815"/>
+          </a:xfrm>
+          <a:prstGeom prst="rect">
+            <a:avLst/>
+          </a:prstGeom>
+          <a:ln>
+            <a:prstDash val="sysDash"/>
+          </a:ln>
+        </p:spPr>
+        <p:style>
+          <a:lnRef idx="2">
+            <a:schemeClr val="accent6"/>
+          </a:lnRef>
+          <a:fillRef idx="1">
+            <a:schemeClr val="lt1"/>
+          </a:fillRef>
+          <a:effectRef idx="0">
+            <a:schemeClr val="accent6"/>
+          </a:effectRef>
+          <a:fontRef idx="minor">
+            <a:schemeClr val="dk1"/>
+          </a:fontRef>
+        </p:style>
+        <p:txBody>
+          <a:bodyPr rtlCol="0" anchor="ctr"/>
+          <a:lstStyle/>
+          <a:p>
+            <a:pPr algn="ctr"/>
+            <a:endParaRPr lang="en-SG"/>
+          </a:p>
+        </p:txBody>
+      </p:sp>
+      <p:sp>
+        <p:nvSpPr>
+          <p:cNvPr id="60" name="TextBox 59">
+            <a:extLst>
+              <a:ext uri="{FF2B5EF4-FFF2-40B4-BE49-F238E27FC236}">
+                <a16:creationId xmlns:a16="http://schemas.microsoft.com/office/drawing/2014/main" id="{32EEA0E9-2536-2332-3EBD-C4C209C267A3}"/>
+              </a:ext>
+            </a:extLst>
+          </p:cNvPr>
+          <p:cNvSpPr txBox="1"/>
+          <p:nvPr/>
+        </p:nvSpPr>
+        <p:spPr>
+          <a:xfrm>
+            <a:off x="6094012" y="2362375"/>
+            <a:ext cx="1763901" cy="523220"/>
+          </a:xfrm>
+          <a:prstGeom prst="rect">
+            <a:avLst/>
+          </a:prstGeom>
+          <a:noFill/>
+        </p:spPr>
+        <p:txBody>
+          <a:bodyPr wrap="square" rtlCol="0">
+            <a:spAutoFit/>
+          </a:bodyPr>
+          <a:lstStyle/>
+          <a:p>
+            <a:r>
+              <a:rPr lang="en-SG" sz="1400" b="1" dirty="0"/>
+              <a:t>Robot Arm Remote Controller VM </a:t>
+            </a:r>
+          </a:p>
+        </p:txBody>
+      </p:sp>
+      <p:sp>
+        <p:nvSpPr>
+          <p:cNvPr id="61" name="TextBox 60">
+            <a:extLst>
+              <a:ext uri="{FF2B5EF4-FFF2-40B4-BE49-F238E27FC236}">
+                <a16:creationId xmlns:a16="http://schemas.microsoft.com/office/drawing/2014/main" id="{C1A6E861-2DD4-7391-4937-A849FF1D5366}"/>
+              </a:ext>
+            </a:extLst>
+          </p:cNvPr>
+          <p:cNvSpPr txBox="1"/>
+          <p:nvPr/>
+        </p:nvSpPr>
+        <p:spPr>
+          <a:xfrm>
+            <a:off x="6599266" y="2948644"/>
+            <a:ext cx="1455603" cy="276999"/>
+          </a:xfrm>
+          <a:prstGeom prst="rect">
+            <a:avLst/>
+          </a:prstGeom>
+          <a:noFill/>
+        </p:spPr>
+        <p:txBody>
+          <a:bodyPr wrap="square" rtlCol="0">
+            <a:spAutoFit/>
+          </a:bodyPr>
+          <a:lstStyle/>
+          <a:p>
+            <a:r>
+              <a:rPr lang="en-US" sz="1200" b="1" dirty="0"/>
+              <a:t>Windows 10/11</a:t>
+            </a:r>
+            <a:endParaRPr lang="en-SG" sz="1200" b="1" dirty="0"/>
+          </a:p>
+        </p:txBody>
+      </p:sp>
+      <p:pic>
+        <p:nvPicPr>
+          <p:cNvPr id="62" name="Picture 61">
+            <a:extLst>
+              <a:ext uri="{FF2B5EF4-FFF2-40B4-BE49-F238E27FC236}">
+                <a16:creationId xmlns:a16="http://schemas.microsoft.com/office/drawing/2014/main" id="{3C1C82FE-B392-2D09-F189-27AB4858D347}"/>
+              </a:ext>
+            </a:extLst>
+          </p:cNvPr>
+          <p:cNvPicPr>
+            <a:picLocks noChangeAspect="1"/>
+          </p:cNvPicPr>
+          <p:nvPr/>
+        </p:nvPicPr>
+        <p:blipFill>
+          <a:blip r:embed="rId4"/>
+          <a:stretch>
+            <a:fillRect/>
+          </a:stretch>
+        </p:blipFill>
+        <p:spPr>
+          <a:xfrm>
+            <a:off x="6261242" y="2947575"/>
+            <a:ext cx="390730" cy="367287"/>
+          </a:xfrm>
+          <a:prstGeom prst="rect">
+            <a:avLst/>
+          </a:prstGeom>
+        </p:spPr>
+      </p:pic>
+      <p:sp>
+        <p:nvSpPr>
+          <p:cNvPr id="63" name="TextBox 62">
+            <a:extLst>
+              <a:ext uri="{FF2B5EF4-FFF2-40B4-BE49-F238E27FC236}">
+                <a16:creationId xmlns:a16="http://schemas.microsoft.com/office/drawing/2014/main" id="{CAD3FDF7-A861-0D5F-945A-EEBD753190F9}"/>
+              </a:ext>
+            </a:extLst>
+          </p:cNvPr>
+          <p:cNvSpPr txBox="1"/>
+          <p:nvPr/>
+        </p:nvSpPr>
+        <p:spPr>
+          <a:xfrm>
+            <a:off x="6229992" y="3284510"/>
+            <a:ext cx="1336383" cy="415498"/>
+          </a:xfrm>
+          <a:prstGeom prst="rect">
+            <a:avLst/>
+          </a:prstGeom>
+          <a:noFill/>
+        </p:spPr>
+        <p:txBody>
+          <a:bodyPr wrap="square" rtlCol="0">
+            <a:spAutoFit/>
+          </a:bodyPr>
+          <a:lstStyle/>
+          <a:p>
+            <a:r>
+              <a:rPr lang="en-US" sz="1050" dirty="0"/>
+              <a:t>Network type : NAT</a:t>
+            </a:r>
+          </a:p>
+          <a:p>
+            <a:r>
+              <a:rPr lang="en-US" sz="1050" dirty="0"/>
+              <a:t>IP:192.168.10.13</a:t>
+            </a:r>
+            <a:endParaRPr lang="en-US" sz="900" dirty="0"/>
+          </a:p>
+        </p:txBody>
+      </p:sp>
+      <p:cxnSp>
+        <p:nvCxnSpPr>
+          <p:cNvPr id="65" name="Connector: Elbow 64">
+            <a:extLst>
+              <a:ext uri="{FF2B5EF4-FFF2-40B4-BE49-F238E27FC236}">
+                <a16:creationId xmlns:a16="http://schemas.microsoft.com/office/drawing/2014/main" id="{5B75DDCC-87CC-4417-0E18-265108F524E0}"/>
+              </a:ext>
+            </a:extLst>
+          </p:cNvPr>
+          <p:cNvCxnSpPr>
+            <a:stCxn id="51" idx="2"/>
+            <a:endCxn id="8" idx="1"/>
+          </p:cNvCxnSpPr>
+          <p:nvPr/>
+        </p:nvCxnSpPr>
+        <p:spPr>
+          <a:xfrm rot="16200000" flipH="1">
+            <a:off x="3167936" y="3128910"/>
+            <a:ext cx="487272" cy="1710097"/>
+          </a:xfrm>
+          <a:prstGeom prst="bentConnector2">
+            <a:avLst/>
+          </a:prstGeom>
+        </p:spPr>
+        <p:style>
+          <a:lnRef idx="2">
+            <a:schemeClr val="accent1"/>
+          </a:lnRef>
+          <a:fillRef idx="0">
+            <a:schemeClr val="accent1"/>
+          </a:fillRef>
+          <a:effectRef idx="1">
+            <a:schemeClr val="accent1"/>
+          </a:effectRef>
+          <a:fontRef idx="minor">
+            <a:schemeClr val="tx1"/>
+          </a:fontRef>
+        </p:style>
+      </p:cxnSp>
+      <p:cxnSp>
+        <p:nvCxnSpPr>
+          <p:cNvPr id="66" name="Connector: Elbow 65">
+            <a:extLst>
+              <a:ext uri="{FF2B5EF4-FFF2-40B4-BE49-F238E27FC236}">
+                <a16:creationId xmlns:a16="http://schemas.microsoft.com/office/drawing/2014/main" id="{420ADE6B-3138-81FC-5043-E550A37FC2D9}"/>
+              </a:ext>
+            </a:extLst>
+          </p:cNvPr>
+          <p:cNvCxnSpPr>
+            <a:cxnSpLocks/>
+            <a:stCxn id="59" idx="2"/>
+            <a:endCxn id="8" idx="3"/>
+          </p:cNvCxnSpPr>
+          <p:nvPr/>
+        </p:nvCxnSpPr>
+        <p:spPr>
+          <a:xfrm rot="5400000">
+            <a:off x="5835708" y="2857907"/>
+            <a:ext cx="499185" cy="2240191"/>
+          </a:xfrm>
+          <a:prstGeom prst="bentConnector2">
+            <a:avLst/>
+          </a:prstGeom>
+        </p:spPr>
+        <p:style>
+          <a:lnRef idx="2">
+            <a:schemeClr val="accent1"/>
+          </a:lnRef>
+          <a:fillRef idx="0">
+            <a:schemeClr val="accent1"/>
+          </a:fillRef>
+          <a:effectRef idx="1">
+            <a:schemeClr val="accent1"/>
+          </a:effectRef>
+          <a:fontRef idx="minor">
+            <a:schemeClr val="tx1"/>
+          </a:fontRef>
+        </p:style>
+      </p:cxnSp>
+      <p:cxnSp>
+        <p:nvCxnSpPr>
+          <p:cNvPr id="70" name="Straight Connector 69">
+            <a:extLst>
+              <a:ext uri="{FF2B5EF4-FFF2-40B4-BE49-F238E27FC236}">
+                <a16:creationId xmlns:a16="http://schemas.microsoft.com/office/drawing/2014/main" id="{6AEA9162-A38C-815B-877E-3C3C1A779ADE}"/>
+              </a:ext>
+            </a:extLst>
+          </p:cNvPr>
+          <p:cNvCxnSpPr>
+            <a:cxnSpLocks/>
+            <a:endCxn id="8" idx="0"/>
+          </p:cNvCxnSpPr>
+          <p:nvPr/>
+        </p:nvCxnSpPr>
+        <p:spPr>
+          <a:xfrm>
+            <a:off x="4615912" y="3709418"/>
+            <a:ext cx="1" cy="328622"/>
+          </a:xfrm>
+          <a:prstGeom prst="line">
+            <a:avLst/>
+          </a:prstGeom>
+        </p:spPr>
+        <p:style>
+          <a:lnRef idx="2">
+            <a:schemeClr val="accent1"/>
+          </a:lnRef>
+          <a:fillRef idx="0">
+            <a:schemeClr val="accent1"/>
+          </a:fillRef>
+          <a:effectRef idx="1">
+            <a:schemeClr val="accent1"/>
+          </a:effectRef>
+          <a:fontRef idx="minor">
+            <a:schemeClr val="tx1"/>
+          </a:fontRef>
+        </p:style>
+      </p:cxnSp>
+      <p:sp>
+        <p:nvSpPr>
+          <p:cNvPr id="73" name="TextBox 72">
+            <a:extLst>
+              <a:ext uri="{FF2B5EF4-FFF2-40B4-BE49-F238E27FC236}">
+                <a16:creationId xmlns:a16="http://schemas.microsoft.com/office/drawing/2014/main" id="{75AC03BB-C03A-E06F-0454-A98F097C04F1}"/>
+              </a:ext>
+            </a:extLst>
+          </p:cNvPr>
+          <p:cNvSpPr txBox="1"/>
+          <p:nvPr/>
+        </p:nvSpPr>
+        <p:spPr>
+          <a:xfrm>
+            <a:off x="4874349" y="3771669"/>
+            <a:ext cx="1260907" cy="430887"/>
+          </a:xfrm>
+          <a:prstGeom prst="rect">
+            <a:avLst/>
+          </a:prstGeom>
+          <a:noFill/>
+        </p:spPr>
+        <p:txBody>
+          <a:bodyPr wrap="square" rtlCol="0">
+            <a:spAutoFit/>
+          </a:bodyPr>
+          <a:lstStyle/>
+          <a:p>
+            <a:r>
+              <a:rPr lang="en-US" sz="1100" dirty="0"/>
+              <a:t>Switch 1 </a:t>
+            </a:r>
+          </a:p>
+          <a:p>
+            <a:r>
+              <a:rPr lang="en-US" sz="1100" dirty="0"/>
+              <a:t>[192.168.10.1]</a:t>
+            </a:r>
+            <a:endParaRPr lang="en-SG" sz="1100" dirty="0"/>
+          </a:p>
+        </p:txBody>
+      </p:sp>
+    </p:spTree>
+    <p:extLst>
+      <p:ext uri="{BB962C8B-B14F-4D97-AF65-F5344CB8AC3E}">
+        <p14:creationId xmlns:p14="http://schemas.microsoft.com/office/powerpoint/2010/main" val="3939293828"/>
+      </p:ext>
+    </p:extLst>
+  </p:cSld>
+  <p:clrMapOvr>
+    <a:masterClrMapping/>
+  </p:clrMapOvr>
+</p:sld>
+</file>
+
 <file path=ppt/theme/theme1.xml><?xml version="1.0" encoding="utf-8"?>
 <a:theme xmlns:a="http://schemas.openxmlformats.org/drawingml/2006/main" name="Office Theme">
   <a:themeElements>

</xml_diff>

<commit_message>
Added the project introduction document and update the table of contents of the read me file.
</commit_message>
<xml_diff>
--- a/doc/designDoc.pptx
+++ b/doc/designDoc.pptx
@@ -5,7 +5,7 @@
     <p:sldMasterId id="2147483648" r:id="rId1"/>
   </p:sldMasterIdLst>
   <p:notesMasterIdLst>
-    <p:notesMasterId r:id="rId14"/>
+    <p:notesMasterId r:id="rId15"/>
   </p:notesMasterIdLst>
   <p:sldIdLst>
     <p:sldId id="275" r:id="rId2"/>
@@ -19,7 +19,8 @@
     <p:sldId id="272" r:id="rId10"/>
     <p:sldId id="273" r:id="rId11"/>
     <p:sldId id="274" r:id="rId12"/>
-    <p:sldId id="276" r:id="rId13"/>
+    <p:sldId id="279" r:id="rId13"/>
+    <p:sldId id="276" r:id="rId14"/>
   </p:sldIdLst>
   <p:sldSz cx="12192000" cy="6858000"/>
   <p:notesSz cx="6858000" cy="9144000"/>
@@ -5716,7 +5717,7 @@
           <a:p>
             <a:fld id="{7600FCCF-5CF4-404D-AD1B-36BEF022C4C2}" type="datetimeFigureOut">
               <a:rPr lang="en-SG" smtClean="0"/>
-              <a:t>27/2/2026</a:t>
+              <a:t>1/3/2026</a:t>
             </a:fld>
             <a:endParaRPr lang="en-SG"/>
           </a:p>
@@ -6577,7 +6578,7 @@
           <a:p>
             <a:fld id="{24E8A18A-5CE4-40C1-8227-52475E3DF71E}" type="datetimeFigureOut">
               <a:rPr lang="en-SG" smtClean="0"/>
-              <a:t>27/2/2026</a:t>
+              <a:t>1/3/2026</a:t>
             </a:fld>
             <a:endParaRPr lang="en-SG"/>
           </a:p>
@@ -6777,7 +6778,7 @@
           <a:p>
             <a:fld id="{24E8A18A-5CE4-40C1-8227-52475E3DF71E}" type="datetimeFigureOut">
               <a:rPr lang="en-SG" smtClean="0"/>
-              <a:t>27/2/2026</a:t>
+              <a:t>1/3/2026</a:t>
             </a:fld>
             <a:endParaRPr lang="en-SG"/>
           </a:p>
@@ -6987,7 +6988,7 @@
           <a:p>
             <a:fld id="{24E8A18A-5CE4-40C1-8227-52475E3DF71E}" type="datetimeFigureOut">
               <a:rPr lang="en-SG" smtClean="0"/>
-              <a:t>27/2/2026</a:t>
+              <a:t>1/3/2026</a:t>
             </a:fld>
             <a:endParaRPr lang="en-SG"/>
           </a:p>
@@ -7187,7 +7188,7 @@
           <a:p>
             <a:fld id="{24E8A18A-5CE4-40C1-8227-52475E3DF71E}" type="datetimeFigureOut">
               <a:rPr lang="en-SG" smtClean="0"/>
-              <a:t>27/2/2026</a:t>
+              <a:t>1/3/2026</a:t>
             </a:fld>
             <a:endParaRPr lang="en-SG"/>
           </a:p>
@@ -7463,7 +7464,7 @@
           <a:p>
             <a:fld id="{24E8A18A-5CE4-40C1-8227-52475E3DF71E}" type="datetimeFigureOut">
               <a:rPr lang="en-SG" smtClean="0"/>
-              <a:t>27/2/2026</a:t>
+              <a:t>1/3/2026</a:t>
             </a:fld>
             <a:endParaRPr lang="en-SG"/>
           </a:p>
@@ -7731,7 +7732,7 @@
           <a:p>
             <a:fld id="{24E8A18A-5CE4-40C1-8227-52475E3DF71E}" type="datetimeFigureOut">
               <a:rPr lang="en-SG" smtClean="0"/>
-              <a:t>27/2/2026</a:t>
+              <a:t>1/3/2026</a:t>
             </a:fld>
             <a:endParaRPr lang="en-SG"/>
           </a:p>
@@ -8146,7 +8147,7 @@
           <a:p>
             <a:fld id="{24E8A18A-5CE4-40C1-8227-52475E3DF71E}" type="datetimeFigureOut">
               <a:rPr lang="en-SG" smtClean="0"/>
-              <a:t>27/2/2026</a:t>
+              <a:t>1/3/2026</a:t>
             </a:fld>
             <a:endParaRPr lang="en-SG"/>
           </a:p>
@@ -8288,7 +8289,7 @@
           <a:p>
             <a:fld id="{24E8A18A-5CE4-40C1-8227-52475E3DF71E}" type="datetimeFigureOut">
               <a:rPr lang="en-SG" smtClean="0"/>
-              <a:t>27/2/2026</a:t>
+              <a:t>1/3/2026</a:t>
             </a:fld>
             <a:endParaRPr lang="en-SG"/>
           </a:p>
@@ -8401,7 +8402,7 @@
           <a:p>
             <a:fld id="{24E8A18A-5CE4-40C1-8227-52475E3DF71E}" type="datetimeFigureOut">
               <a:rPr lang="en-SG" smtClean="0"/>
-              <a:t>27/2/2026</a:t>
+              <a:t>1/3/2026</a:t>
             </a:fld>
             <a:endParaRPr lang="en-SG"/>
           </a:p>
@@ -8714,7 +8715,7 @@
           <a:p>
             <a:fld id="{24E8A18A-5CE4-40C1-8227-52475E3DF71E}" type="datetimeFigureOut">
               <a:rPr lang="en-SG" smtClean="0"/>
-              <a:t>27/2/2026</a:t>
+              <a:t>1/3/2026</a:t>
             </a:fld>
             <a:endParaRPr lang="en-SG"/>
           </a:p>
@@ -9003,7 +9004,7 @@
           <a:p>
             <a:fld id="{24E8A18A-5CE4-40C1-8227-52475E3DF71E}" type="datetimeFigureOut">
               <a:rPr lang="en-SG" smtClean="0"/>
-              <a:t>27/2/2026</a:t>
+              <a:t>1/3/2026</a:t>
             </a:fld>
             <a:endParaRPr lang="en-SG"/>
           </a:p>
@@ -9246,7 +9247,7 @@
           <a:p>
             <a:fld id="{24E8A18A-5CE4-40C1-8227-52475E3DF71E}" type="datetimeFigureOut">
               <a:rPr lang="en-SG" smtClean="0"/>
-              <a:t>27/2/2026</a:t>
+              <a:t>1/3/2026</a:t>
             </a:fld>
             <a:endParaRPr lang="en-SG"/>
           </a:p>
@@ -11689,6 +11690,98 @@
 </file>
 
 <file path=ppt/slides/slide12.xml><?xml version="1.0" encoding="utf-8"?>
+<p:sld xmlns:a="http://schemas.openxmlformats.org/drawingml/2006/main" xmlns:r="http://schemas.openxmlformats.org/officeDocument/2006/relationships" xmlns:p="http://schemas.openxmlformats.org/presentationml/2006/main">
+  <p:cSld>
+    <p:spTree>
+      <p:nvGrpSpPr>
+        <p:cNvPr id="1" name=""/>
+        <p:cNvGrpSpPr/>
+        <p:nvPr/>
+      </p:nvGrpSpPr>
+      <p:grpSpPr>
+        <a:xfrm>
+          <a:off x="0" y="0"/>
+          <a:ext cx="0" cy="0"/>
+          <a:chOff x="0" y="0"/>
+          <a:chExt cx="0" cy="0"/>
+        </a:xfrm>
+      </p:grpSpPr>
+      <p:pic>
+        <p:nvPicPr>
+          <p:cNvPr id="5" name="Picture 4">
+            <a:extLst>
+              <a:ext uri="{FF2B5EF4-FFF2-40B4-BE49-F238E27FC236}">
+                <a16:creationId xmlns:a16="http://schemas.microsoft.com/office/drawing/2014/main" id="{45DC6C33-0AD0-ED01-D347-64E941016A37}"/>
+              </a:ext>
+            </a:extLst>
+          </p:cNvPr>
+          <p:cNvPicPr>
+            <a:picLocks noChangeAspect="1"/>
+          </p:cNvPicPr>
+          <p:nvPr/>
+        </p:nvPicPr>
+        <p:blipFill>
+          <a:blip r:embed="rId2">
+            <a:extLst>
+              <a:ext uri="{28A0092B-C50C-407E-A947-70E740481C1C}">
+                <a14:useLocalDpi xmlns:a14="http://schemas.microsoft.com/office/drawing/2010/main" val="0"/>
+              </a:ext>
+            </a:extLst>
+          </a:blip>
+          <a:stretch>
+            <a:fillRect/>
+          </a:stretch>
+        </p:blipFill>
+        <p:spPr>
+          <a:xfrm>
+            <a:off x="4767071" y="1990343"/>
+            <a:ext cx="2045209" cy="1922497"/>
+          </a:xfrm>
+          <a:prstGeom prst="roundRect">
+            <a:avLst>
+              <a:gd name="adj" fmla="val 4167"/>
+            </a:avLst>
+          </a:prstGeom>
+          <a:solidFill>
+            <a:srgbClr val="FFFFFF"/>
+          </a:solidFill>
+          <a:ln w="76200" cap="sq">
+            <a:solidFill>
+              <a:srgbClr val="292929"/>
+            </a:solidFill>
+            <a:miter lim="800000"/>
+          </a:ln>
+          <a:effectLst>
+            <a:reflection blurRad="12700" stA="28000" endPos="28000" dist="5000" dir="5400000" sy="-100000" algn="bl" rotWithShape="0"/>
+          </a:effectLst>
+          <a:scene3d>
+            <a:camera prst="orthographicFront"/>
+            <a:lightRig rig="threePt" dir="t">
+              <a:rot lat="0" lon="0" rev="2700000"/>
+            </a:lightRig>
+          </a:scene3d>
+          <a:sp3d>
+            <a:bevelT h="38100"/>
+            <a:contourClr>
+              <a:srgbClr val="C0C0C0"/>
+            </a:contourClr>
+          </a:sp3d>
+        </p:spPr>
+      </p:pic>
+    </p:spTree>
+    <p:extLst>
+      <p:ext uri="{BB962C8B-B14F-4D97-AF65-F5344CB8AC3E}">
+        <p14:creationId xmlns:p14="http://schemas.microsoft.com/office/powerpoint/2010/main" val="1504914027"/>
+      </p:ext>
+    </p:extLst>
+  </p:cSld>
+  <p:clrMapOvr>
+    <a:masterClrMapping/>
+  </p:clrMapOvr>
+</p:sld>
+</file>
+
+<file path=ppt/slides/slide13.xml><?xml version="1.0" encoding="utf-8"?>
 <p:sld xmlns:a="http://schemas.openxmlformats.org/drawingml/2006/main" xmlns:r="http://schemas.openxmlformats.org/officeDocument/2006/relationships" xmlns:p="http://schemas.openxmlformats.org/presentationml/2006/main">
   <p:cSld>
     <p:spTree>

</xml_diff>